<commit_message>
preliminary updates for 22-23 T1
</commit_message>
<xml_diff>
--- a/HtmlIntro/HelloHtml.pptx
+++ b/HtmlIntro/HelloHtml.pptx
@@ -5,30 +5,31 @@
     <p:sldMasterId id="2147483676" r:id="rId4"/>
   </p:sldMasterIdLst>
   <p:notesMasterIdLst>
-    <p:notesMasterId r:id="rId14"/>
+    <p:notesMasterId r:id="rId15"/>
   </p:notesMasterIdLst>
   <p:sldIdLst>
-    <p:sldId id="256" r:id="rId5"/>
-    <p:sldId id="264" r:id="rId6"/>
-    <p:sldId id="261" r:id="rId7"/>
-    <p:sldId id="277" r:id="rId8"/>
-    <p:sldId id="302" r:id="rId9"/>
-    <p:sldId id="303" r:id="rId10"/>
-    <p:sldId id="304" r:id="rId11"/>
-    <p:sldId id="305" r:id="rId12"/>
-    <p:sldId id="279" r:id="rId13"/>
+    <p:sldId id="306" r:id="rId5"/>
+    <p:sldId id="256" r:id="rId6"/>
+    <p:sldId id="264" r:id="rId7"/>
+    <p:sldId id="261" r:id="rId8"/>
+    <p:sldId id="277" r:id="rId9"/>
+    <p:sldId id="302" r:id="rId10"/>
+    <p:sldId id="303" r:id="rId11"/>
+    <p:sldId id="304" r:id="rId12"/>
+    <p:sldId id="305" r:id="rId13"/>
+    <p:sldId id="279" r:id="rId14"/>
   </p:sldIdLst>
   <p:sldSz cx="9144000" cy="5143500" type="screen16x9"/>
   <p:notesSz cx="6858000" cy="9144000"/>
   <p:embeddedFontLst>
     <p:embeddedFont>
       <p:font typeface="Krona One" panose="020B0604020202020204" charset="0"/>
-      <p:regular r:id="rId15"/>
+      <p:regular r:id="rId16"/>
     </p:embeddedFont>
     <p:embeddedFont>
       <p:font typeface="Miriam Libre" panose="00000500000000000000" pitchFamily="2" charset="-79"/>
-      <p:regular r:id="rId16"/>
-      <p:bold r:id="rId17"/>
+      <p:regular r:id="rId17"/>
+      <p:bold r:id="rId18"/>
     </p:embeddedFont>
   </p:embeddedFontLst>
   <p:defaultTextStyle>
@@ -841,6 +842,115 @@
         </p:txBody>
       </p:sp>
     </p:spTree>
+    <p:extLst>
+      <p:ext uri="{BB962C8B-B14F-4D97-AF65-F5344CB8AC3E}">
+        <p14:creationId xmlns:p14="http://schemas.microsoft.com/office/powerpoint/2010/main" val="4085975664"/>
+      </p:ext>
+    </p:extLst>
+  </p:cSld>
+  <p:clrMapOvr>
+    <a:masterClrMapping/>
+  </p:clrMapOvr>
+</p:notes>
+</file>
+
+<file path=ppt/notesSlides/notesSlide10.xml><?xml version="1.0" encoding="utf-8"?>
+<p:notes xmlns:a="http://schemas.openxmlformats.org/drawingml/2006/main" xmlns:r="http://schemas.openxmlformats.org/officeDocument/2006/relationships" xmlns:p="http://schemas.openxmlformats.org/presentationml/2006/main" showMasterSp="0" showMasterPhAnim="0">
+  <p:cSld>
+    <p:spTree>
+      <p:nvGrpSpPr>
+        <p:cNvPr id="1" name="Shape 1499"/>
+        <p:cNvGrpSpPr/>
+        <p:nvPr/>
+      </p:nvGrpSpPr>
+      <p:grpSpPr>
+        <a:xfrm>
+          <a:off x="0" y="0"/>
+          <a:ext cx="0" cy="0"/>
+          <a:chOff x="0" y="0"/>
+          <a:chExt cx="0" cy="0"/>
+        </a:xfrm>
+      </p:grpSpPr>
+      <p:sp>
+        <p:nvSpPr>
+          <p:cNvPr id="1500" name="Google Shape;1500;ge30e247bb5_0_42916:notes"/>
+          <p:cNvSpPr>
+            <a:spLocks noGrp="1" noRot="1" noChangeAspect="1"/>
+          </p:cNvSpPr>
+          <p:nvPr>
+            <p:ph type="sldImg" idx="2"/>
+          </p:nvPr>
+        </p:nvSpPr>
+        <p:spPr>
+          <a:xfrm>
+            <a:off x="381000" y="685800"/>
+            <a:ext cx="6096000" cy="3429000"/>
+          </a:xfrm>
+          <a:custGeom>
+            <a:avLst/>
+            <a:gdLst/>
+            <a:ahLst/>
+            <a:cxnLst/>
+            <a:rect l="l" t="t" r="r" b="b"/>
+            <a:pathLst>
+              <a:path w="120000" h="120000" extrusionOk="0">
+                <a:moveTo>
+                  <a:pt x="0" y="0"/>
+                </a:moveTo>
+                <a:lnTo>
+                  <a:pt x="120000" y="0"/>
+                </a:lnTo>
+                <a:lnTo>
+                  <a:pt x="120000" y="120000"/>
+                </a:lnTo>
+                <a:lnTo>
+                  <a:pt x="0" y="120000"/>
+                </a:lnTo>
+                <a:close/>
+              </a:path>
+            </a:pathLst>
+          </a:custGeom>
+        </p:spPr>
+      </p:sp>
+      <p:sp>
+        <p:nvSpPr>
+          <p:cNvPr id="1501" name="Google Shape;1501;ge30e247bb5_0_42916:notes"/>
+          <p:cNvSpPr txBox="1">
+            <a:spLocks noGrp="1"/>
+          </p:cNvSpPr>
+          <p:nvPr>
+            <p:ph type="body" idx="1"/>
+          </p:nvPr>
+        </p:nvSpPr>
+        <p:spPr>
+          <a:xfrm>
+            <a:off x="685800" y="4343400"/>
+            <a:ext cx="5486400" cy="4114800"/>
+          </a:xfrm>
+          <a:prstGeom prst="rect">
+            <a:avLst/>
+          </a:prstGeom>
+        </p:spPr>
+        <p:txBody>
+          <a:bodyPr spcFirstLastPara="1" wrap="square" lIns="91425" tIns="91425" rIns="91425" bIns="91425" anchor="t" anchorCtr="0">
+            <a:noAutofit/>
+          </a:bodyPr>
+          <a:lstStyle/>
+          <a:p>
+            <a:pPr marL="0" lvl="0" indent="0" algn="l" rtl="0">
+              <a:spcBef>
+                <a:spcPts val="0"/>
+              </a:spcBef>
+              <a:spcAft>
+                <a:spcPts val="0"/>
+              </a:spcAft>
+              <a:buNone/>
+            </a:pPr>
+            <a:endParaRPr/>
+          </a:p>
+        </p:txBody>
+      </p:sp>
+    </p:spTree>
   </p:cSld>
   <p:clrMapOvr>
     <a:masterClrMapping/>
@@ -849,6 +959,134 @@
 </file>
 
 <file path=ppt/notesSlides/notesSlide2.xml><?xml version="1.0" encoding="utf-8"?>
+<p:notes xmlns:a="http://schemas.openxmlformats.org/drawingml/2006/main" xmlns:r="http://schemas.openxmlformats.org/officeDocument/2006/relationships" xmlns:p="http://schemas.openxmlformats.org/presentationml/2006/main" showMasterSp="0" showMasterPhAnim="0">
+  <p:cSld>
+    <p:spTree>
+      <p:nvGrpSpPr>
+        <p:cNvPr id="1" name="Shape 439"/>
+        <p:cNvGrpSpPr/>
+        <p:nvPr/>
+      </p:nvGrpSpPr>
+      <p:grpSpPr>
+        <a:xfrm>
+          <a:off x="0" y="0"/>
+          <a:ext cx="0" cy="0"/>
+          <a:chOff x="0" y="0"/>
+          <a:chExt cx="0" cy="0"/>
+        </a:xfrm>
+      </p:grpSpPr>
+      <p:sp>
+        <p:nvSpPr>
+          <p:cNvPr id="440" name="Google Shape;440;p:notes"/>
+          <p:cNvSpPr>
+            <a:spLocks noGrp="1" noRot="1" noChangeAspect="1"/>
+          </p:cNvSpPr>
+          <p:nvPr>
+            <p:ph type="sldImg" idx="2"/>
+          </p:nvPr>
+        </p:nvSpPr>
+        <p:spPr>
+          <a:xfrm>
+            <a:off x="381000" y="685800"/>
+            <a:ext cx="6096000" cy="3429000"/>
+          </a:xfrm>
+          <a:custGeom>
+            <a:avLst/>
+            <a:gdLst/>
+            <a:ahLst/>
+            <a:cxnLst/>
+            <a:rect l="l" t="t" r="r" b="b"/>
+            <a:pathLst>
+              <a:path w="120000" h="120000" extrusionOk="0">
+                <a:moveTo>
+                  <a:pt x="0" y="0"/>
+                </a:moveTo>
+                <a:lnTo>
+                  <a:pt x="120000" y="0"/>
+                </a:lnTo>
+                <a:lnTo>
+                  <a:pt x="120000" y="120000"/>
+                </a:lnTo>
+                <a:lnTo>
+                  <a:pt x="0" y="120000"/>
+                </a:lnTo>
+                <a:close/>
+              </a:path>
+            </a:pathLst>
+          </a:custGeom>
+        </p:spPr>
+      </p:sp>
+      <p:sp>
+        <p:nvSpPr>
+          <p:cNvPr id="441" name="Google Shape;441;p:notes"/>
+          <p:cNvSpPr txBox="1">
+            <a:spLocks noGrp="1"/>
+          </p:cNvSpPr>
+          <p:nvPr>
+            <p:ph type="body" idx="1"/>
+          </p:nvPr>
+        </p:nvSpPr>
+        <p:spPr>
+          <a:xfrm>
+            <a:off x="685800" y="4343400"/>
+            <a:ext cx="5486400" cy="4114800"/>
+          </a:xfrm>
+          <a:prstGeom prst="rect">
+            <a:avLst/>
+          </a:prstGeom>
+        </p:spPr>
+        <p:txBody>
+          <a:bodyPr spcFirstLastPara="1" wrap="square" lIns="91425" tIns="91425" rIns="91425" bIns="91425" anchor="t" anchorCtr="0">
+            <a:noAutofit/>
+          </a:bodyPr>
+          <a:lstStyle/>
+          <a:p>
+            <a:pPr marL="0" lvl="0" indent="0" algn="l" rtl="0">
+              <a:lnSpc>
+                <a:spcPct val="115000"/>
+              </a:lnSpc>
+              <a:spcBef>
+                <a:spcPts val="0"/>
+              </a:spcBef>
+              <a:spcAft>
+                <a:spcPts val="0"/>
+              </a:spcAft>
+              <a:buClr>
+                <a:schemeClr val="dk1"/>
+              </a:buClr>
+              <a:buSzPts val="1100"/>
+              <a:buFont typeface="Arial"/>
+              <a:buNone/>
+            </a:pPr>
+            <a:endParaRPr sz="850">
+              <a:solidFill>
+                <a:srgbClr val="5F7D96"/>
+              </a:solidFill>
+            </a:endParaRPr>
+          </a:p>
+          <a:p>
+            <a:pPr marL="0" lvl="0" indent="0" algn="l" rtl="0">
+              <a:spcBef>
+                <a:spcPts val="0"/>
+              </a:spcBef>
+              <a:spcAft>
+                <a:spcPts val="0"/>
+              </a:spcAft>
+              <a:buNone/>
+            </a:pPr>
+            <a:endParaRPr/>
+          </a:p>
+        </p:txBody>
+      </p:sp>
+    </p:spTree>
+  </p:cSld>
+  <p:clrMapOvr>
+    <a:masterClrMapping/>
+  </p:clrMapOvr>
+</p:notes>
+</file>
+
+<file path=ppt/notesSlides/notesSlide3.xml><?xml version="1.0" encoding="utf-8"?>
 <p:notes xmlns:a="http://schemas.openxmlformats.org/drawingml/2006/main" xmlns:r="http://schemas.openxmlformats.org/officeDocument/2006/relationships" xmlns:p="http://schemas.openxmlformats.org/presentationml/2006/main" showMasterSp="0" showMasterPhAnim="0">
   <p:cSld>
     <p:spTree>
@@ -961,7 +1199,7 @@
 </p:notes>
 </file>
 
-<file path=ppt/notesSlides/notesSlide3.xml><?xml version="1.0" encoding="utf-8"?>
+<file path=ppt/notesSlides/notesSlide4.xml><?xml version="1.0" encoding="utf-8"?>
 <p:notes xmlns:a="http://schemas.openxmlformats.org/drawingml/2006/main" xmlns:r="http://schemas.openxmlformats.org/officeDocument/2006/relationships" xmlns:p="http://schemas.openxmlformats.org/presentationml/2006/main" showMasterSp="0" showMasterPhAnim="0">
   <p:cSld>
     <p:spTree>
@@ -1139,7 +1377,7 @@
 </p:notes>
 </file>
 
-<file path=ppt/notesSlides/notesSlide4.xml><?xml version="1.0" encoding="utf-8"?>
+<file path=ppt/notesSlides/notesSlide5.xml><?xml version="1.0" encoding="utf-8"?>
 <p:notes xmlns:a="http://schemas.openxmlformats.org/drawingml/2006/main" xmlns:r="http://schemas.openxmlformats.org/officeDocument/2006/relationships" xmlns:p="http://schemas.openxmlformats.org/presentationml/2006/main" showMasterSp="0" showMasterPhAnim="0">
   <p:cSld>
     <p:spTree>
@@ -1273,7 +1511,7 @@
 </p:notes>
 </file>
 
-<file path=ppt/notesSlides/notesSlide5.xml><?xml version="1.0" encoding="utf-8"?>
+<file path=ppt/notesSlides/notesSlide6.xml><?xml version="1.0" encoding="utf-8"?>
 <p:notes xmlns:a="http://schemas.openxmlformats.org/drawingml/2006/main" xmlns:r="http://schemas.openxmlformats.org/officeDocument/2006/relationships" xmlns:p="http://schemas.openxmlformats.org/presentationml/2006/main" showMasterSp="0" showMasterPhAnim="0">
   <p:cSld>
     <p:spTree>
@@ -1407,7 +1645,7 @@
 </p:notes>
 </file>
 
-<file path=ppt/notesSlides/notesSlide6.xml><?xml version="1.0" encoding="utf-8"?>
+<file path=ppt/notesSlides/notesSlide7.xml><?xml version="1.0" encoding="utf-8"?>
 <p:notes xmlns:a="http://schemas.openxmlformats.org/drawingml/2006/main" xmlns:r="http://schemas.openxmlformats.org/officeDocument/2006/relationships" xmlns:p="http://schemas.openxmlformats.org/presentationml/2006/main" showMasterSp="0" showMasterPhAnim="0">
   <p:cSld>
     <p:spTree>
@@ -1531,7 +1769,7 @@
 </p:notes>
 </file>
 
-<file path=ppt/notesSlides/notesSlide7.xml><?xml version="1.0" encoding="utf-8"?>
+<file path=ppt/notesSlides/notesSlide8.xml><?xml version="1.0" encoding="utf-8"?>
 <p:notes xmlns:a="http://schemas.openxmlformats.org/drawingml/2006/main" xmlns:r="http://schemas.openxmlformats.org/officeDocument/2006/relationships" xmlns:p="http://schemas.openxmlformats.org/presentationml/2006/main" showMasterSp="0" showMasterPhAnim="0">
   <p:cSld>
     <p:spTree>
@@ -1674,7 +1912,7 @@
 </p:notes>
 </file>
 
-<file path=ppt/notesSlides/notesSlide8.xml><?xml version="1.0" encoding="utf-8"?>
+<file path=ppt/notesSlides/notesSlide9.xml><?xml version="1.0" encoding="utf-8"?>
 <p:notes xmlns:a="http://schemas.openxmlformats.org/drawingml/2006/main" xmlns:r="http://schemas.openxmlformats.org/officeDocument/2006/relationships" xmlns:p="http://schemas.openxmlformats.org/presentationml/2006/main" showMasterSp="0" showMasterPhAnim="0">
   <p:cSld>
     <p:spTree>
@@ -1782,110 +2020,6 @@
         <p14:creationId xmlns:p14="http://schemas.microsoft.com/office/powerpoint/2010/main" val="4051457860"/>
       </p:ext>
     </p:extLst>
-  </p:cSld>
-  <p:clrMapOvr>
-    <a:masterClrMapping/>
-  </p:clrMapOvr>
-</p:notes>
-</file>
-
-<file path=ppt/notesSlides/notesSlide9.xml><?xml version="1.0" encoding="utf-8"?>
-<p:notes xmlns:a="http://schemas.openxmlformats.org/drawingml/2006/main" xmlns:r="http://schemas.openxmlformats.org/officeDocument/2006/relationships" xmlns:p="http://schemas.openxmlformats.org/presentationml/2006/main" showMasterSp="0" showMasterPhAnim="0">
-  <p:cSld>
-    <p:spTree>
-      <p:nvGrpSpPr>
-        <p:cNvPr id="1" name="Shape 1499"/>
-        <p:cNvGrpSpPr/>
-        <p:nvPr/>
-      </p:nvGrpSpPr>
-      <p:grpSpPr>
-        <a:xfrm>
-          <a:off x="0" y="0"/>
-          <a:ext cx="0" cy="0"/>
-          <a:chOff x="0" y="0"/>
-          <a:chExt cx="0" cy="0"/>
-        </a:xfrm>
-      </p:grpSpPr>
-      <p:sp>
-        <p:nvSpPr>
-          <p:cNvPr id="1500" name="Google Shape;1500;ge30e247bb5_0_42916:notes"/>
-          <p:cNvSpPr>
-            <a:spLocks noGrp="1" noRot="1" noChangeAspect="1"/>
-          </p:cNvSpPr>
-          <p:nvPr>
-            <p:ph type="sldImg" idx="2"/>
-          </p:nvPr>
-        </p:nvSpPr>
-        <p:spPr>
-          <a:xfrm>
-            <a:off x="381000" y="685800"/>
-            <a:ext cx="6096000" cy="3429000"/>
-          </a:xfrm>
-          <a:custGeom>
-            <a:avLst/>
-            <a:gdLst/>
-            <a:ahLst/>
-            <a:cxnLst/>
-            <a:rect l="l" t="t" r="r" b="b"/>
-            <a:pathLst>
-              <a:path w="120000" h="120000" extrusionOk="0">
-                <a:moveTo>
-                  <a:pt x="0" y="0"/>
-                </a:moveTo>
-                <a:lnTo>
-                  <a:pt x="120000" y="0"/>
-                </a:lnTo>
-                <a:lnTo>
-                  <a:pt x="120000" y="120000"/>
-                </a:lnTo>
-                <a:lnTo>
-                  <a:pt x="0" y="120000"/>
-                </a:lnTo>
-                <a:close/>
-              </a:path>
-            </a:pathLst>
-          </a:custGeom>
-        </p:spPr>
-      </p:sp>
-      <p:sp>
-        <p:nvSpPr>
-          <p:cNvPr id="1501" name="Google Shape;1501;ge30e247bb5_0_42916:notes"/>
-          <p:cNvSpPr txBox="1">
-            <a:spLocks noGrp="1"/>
-          </p:cNvSpPr>
-          <p:nvPr>
-            <p:ph type="body" idx="1"/>
-          </p:nvPr>
-        </p:nvSpPr>
-        <p:spPr>
-          <a:xfrm>
-            <a:off x="685800" y="4343400"/>
-            <a:ext cx="5486400" cy="4114800"/>
-          </a:xfrm>
-          <a:prstGeom prst="rect">
-            <a:avLst/>
-          </a:prstGeom>
-        </p:spPr>
-        <p:txBody>
-          <a:bodyPr spcFirstLastPara="1" wrap="square" lIns="91425" tIns="91425" rIns="91425" bIns="91425" anchor="t" anchorCtr="0">
-            <a:noAutofit/>
-          </a:bodyPr>
-          <a:lstStyle/>
-          <a:p>
-            <a:pPr marL="0" lvl="0" indent="0" algn="l" rtl="0">
-              <a:spcBef>
-                <a:spcPts val="0"/>
-              </a:spcBef>
-              <a:spcAft>
-                <a:spcPts val="0"/>
-              </a:spcAft>
-              <a:buNone/>
-            </a:pPr>
-            <a:endParaRPr/>
-          </a:p>
-        </p:txBody>
-      </p:sp>
-    </p:spTree>
   </p:cSld>
   <p:clrMapOvr>
     <a:masterClrMapping/>
@@ -8282,19 +8416,12 @@
               <a:buNone/>
             </a:pPr>
             <a:r>
+              <a:rPr lang="en-US" sz="5400" dirty="0"/>
+              <a:t>b</a:t>
+            </a:r>
+            <a:r>
               <a:rPr lang="en" sz="5400" dirty="0"/>
-              <a:t>HELLO </a:t>
-            </a:r>
-            <a:br>
-              <a:rPr lang="en" sz="5400" dirty="0"/>
-            </a:br>
-            <a:r>
-              <a:rPr lang="en" sz="6600" dirty="0">
-                <a:highlight>
-                  <a:schemeClr val="accent3"/>
-                </a:highlight>
-              </a:rPr>
-              <a:t>HTML!</a:t>
+              <a:t>it.ly/ucshyland</a:t>
             </a:r>
             <a:endParaRPr sz="5400" dirty="0">
               <a:highlight>
@@ -8340,7 +8467,7 @@
             </a:pPr>
             <a:r>
               <a:rPr lang="en" sz="1800" dirty="0"/>
-              <a:t>Building Webpages Hy-Tech Camp</a:t>
+              <a:t>Code with Hyland Academy @ UCS</a:t>
             </a:r>
             <a:endParaRPr sz="1800" dirty="0"/>
           </a:p>
@@ -11555,6 +11682,11 @@
         </p:grpSp>
       </p:grpSp>
     </p:spTree>
+    <p:extLst>
+      <p:ext uri="{BB962C8B-B14F-4D97-AF65-F5344CB8AC3E}">
+        <p14:creationId xmlns:p14="http://schemas.microsoft.com/office/powerpoint/2010/main" val="2275565221"/>
+      </p:ext>
+    </p:extLst>
   </p:cSld>
   <p:clrMapOvr>
     <a:masterClrMapping/>
@@ -11562,7 +11694,3844 @@
 </p:sld>
 </file>
 
+<file path=ppt/slides/slide10.xml><?xml version="1.0" encoding="utf-8"?>
+<p:sld xmlns:a="http://schemas.openxmlformats.org/drawingml/2006/main" xmlns:r="http://schemas.openxmlformats.org/officeDocument/2006/relationships" xmlns:p="http://schemas.openxmlformats.org/presentationml/2006/main">
+  <p:cSld>
+    <p:spTree>
+      <p:nvGrpSpPr>
+        <p:cNvPr id="1" name="Shape 1502"/>
+        <p:cNvGrpSpPr/>
+        <p:nvPr/>
+      </p:nvGrpSpPr>
+      <p:grpSpPr>
+        <a:xfrm>
+          <a:off x="0" y="0"/>
+          <a:ext cx="0" cy="0"/>
+          <a:chOff x="0" y="0"/>
+          <a:chExt cx="0" cy="0"/>
+        </a:xfrm>
+      </p:grpSpPr>
+      <p:sp>
+        <p:nvSpPr>
+          <p:cNvPr id="1503" name="Google Shape;1503;p54"/>
+          <p:cNvSpPr txBox="1">
+            <a:spLocks noGrp="1"/>
+          </p:cNvSpPr>
+          <p:nvPr>
+            <p:ph type="subTitle" idx="1"/>
+          </p:nvPr>
+        </p:nvSpPr>
+        <p:spPr>
+          <a:xfrm>
+            <a:off x="693494" y="2122164"/>
+            <a:ext cx="7171671" cy="418291"/>
+          </a:xfrm>
+          <a:prstGeom prst="rect">
+            <a:avLst/>
+          </a:prstGeom>
+        </p:spPr>
+        <p:txBody>
+          <a:bodyPr spcFirstLastPara="1" wrap="square" lIns="91425" tIns="91425" rIns="91425" bIns="91425" anchor="t" anchorCtr="0">
+            <a:noAutofit/>
+          </a:bodyPr>
+          <a:lstStyle/>
+          <a:p>
+            <a:pPr marL="0" lvl="0" indent="0" algn="l" rtl="0">
+              <a:spcBef>
+                <a:spcPts val="0"/>
+              </a:spcBef>
+              <a:spcAft>
+                <a:spcPts val="0"/>
+              </a:spcAft>
+              <a:buNone/>
+            </a:pPr>
+            <a:r>
+              <a:rPr lang="en" sz="2400" dirty="0"/>
+              <a:t>WHAT QUESTIONS DO YOU HAVE?</a:t>
+            </a:r>
+            <a:endParaRPr sz="2400" dirty="0"/>
+          </a:p>
+        </p:txBody>
+      </p:sp>
+      <p:sp>
+        <p:nvSpPr>
+          <p:cNvPr id="1504" name="Google Shape;1504;p54"/>
+          <p:cNvSpPr txBox="1">
+            <a:spLocks noGrp="1"/>
+          </p:cNvSpPr>
+          <p:nvPr>
+            <p:ph type="ctrTitle"/>
+          </p:nvPr>
+        </p:nvSpPr>
+        <p:spPr>
+          <a:xfrm>
+            <a:off x="693494" y="1305339"/>
+            <a:ext cx="6601723" cy="856816"/>
+          </a:xfrm>
+          <a:prstGeom prst="rect">
+            <a:avLst/>
+          </a:prstGeom>
+        </p:spPr>
+        <p:txBody>
+          <a:bodyPr spcFirstLastPara="1" wrap="square" lIns="91425" tIns="91425" rIns="91425" bIns="91425" anchor="t" anchorCtr="0">
+            <a:noAutofit/>
+          </a:bodyPr>
+          <a:lstStyle/>
+          <a:p>
+            <a:pPr marL="0" lvl="0" indent="0" algn="l" rtl="0">
+              <a:spcBef>
+                <a:spcPts val="0"/>
+              </a:spcBef>
+              <a:spcAft>
+                <a:spcPts val="0"/>
+              </a:spcAft>
+              <a:buNone/>
+            </a:pPr>
+            <a:r>
+              <a:rPr lang="en" sz="4800" dirty="0"/>
+              <a:t>THANK YOU!</a:t>
+            </a:r>
+            <a:endParaRPr sz="4800" dirty="0"/>
+          </a:p>
+        </p:txBody>
+      </p:sp>
+      <p:sp>
+        <p:nvSpPr>
+          <p:cNvPr id="1542" name="Google Shape;1542;p54"/>
+          <p:cNvSpPr/>
+          <p:nvPr/>
+        </p:nvSpPr>
+        <p:spPr>
+          <a:xfrm>
+            <a:off x="570050" y="3746300"/>
+            <a:ext cx="939600" cy="939600"/>
+          </a:xfrm>
+          <a:prstGeom prst="snip1Rect">
+            <a:avLst>
+              <a:gd name="adj" fmla="val 11329"/>
+            </a:avLst>
+          </a:prstGeom>
+          <a:solidFill>
+            <a:schemeClr val="lt1"/>
+          </a:solidFill>
+          <a:ln w="28575" cap="flat" cmpd="sng">
+            <a:solidFill>
+              <a:schemeClr val="dk1"/>
+            </a:solidFill>
+            <a:prstDash val="solid"/>
+            <a:round/>
+            <a:headEnd type="none" w="sm" len="sm"/>
+            <a:tailEnd type="none" w="sm" len="sm"/>
+          </a:ln>
+        </p:spPr>
+        <p:txBody>
+          <a:bodyPr spcFirstLastPara="1" wrap="square" lIns="91425" tIns="91425" rIns="91425" bIns="91425" anchor="ctr" anchorCtr="0">
+            <a:noAutofit/>
+          </a:bodyPr>
+          <a:lstStyle/>
+          <a:p>
+            <a:pPr marL="0" lvl="0" indent="0" algn="l" rtl="0">
+              <a:spcBef>
+                <a:spcPts val="0"/>
+              </a:spcBef>
+              <a:spcAft>
+                <a:spcPts val="0"/>
+              </a:spcAft>
+              <a:buNone/>
+            </a:pPr>
+            <a:endParaRPr/>
+          </a:p>
+        </p:txBody>
+      </p:sp>
+      <p:sp>
+        <p:nvSpPr>
+          <p:cNvPr id="1543" name="Google Shape;1543;p54"/>
+          <p:cNvSpPr/>
+          <p:nvPr/>
+        </p:nvSpPr>
+        <p:spPr>
+          <a:xfrm>
+            <a:off x="490150" y="3665400"/>
+            <a:ext cx="939600" cy="939600"/>
+          </a:xfrm>
+          <a:prstGeom prst="snip1Rect">
+            <a:avLst>
+              <a:gd name="adj" fmla="val 11329"/>
+            </a:avLst>
+          </a:prstGeom>
+          <a:solidFill>
+            <a:schemeClr val="accent1"/>
+          </a:solidFill>
+          <a:ln w="28575" cap="flat" cmpd="sng">
+            <a:solidFill>
+              <a:schemeClr val="dk1"/>
+            </a:solidFill>
+            <a:prstDash val="solid"/>
+            <a:round/>
+            <a:headEnd type="none" w="sm" len="sm"/>
+            <a:tailEnd type="none" w="sm" len="sm"/>
+          </a:ln>
+        </p:spPr>
+        <p:txBody>
+          <a:bodyPr spcFirstLastPara="1" wrap="square" lIns="91425" tIns="91425" rIns="91425" bIns="91425" anchor="ctr" anchorCtr="0">
+            <a:noAutofit/>
+          </a:bodyPr>
+          <a:lstStyle/>
+          <a:p>
+            <a:pPr marL="0" lvl="0" indent="0" algn="l" rtl="0">
+              <a:spcBef>
+                <a:spcPts val="0"/>
+              </a:spcBef>
+              <a:spcAft>
+                <a:spcPts val="0"/>
+              </a:spcAft>
+              <a:buNone/>
+            </a:pPr>
+            <a:endParaRPr/>
+          </a:p>
+        </p:txBody>
+      </p:sp>
+      <p:sp>
+        <p:nvSpPr>
+          <p:cNvPr id="1544" name="Google Shape;1544;p54"/>
+          <p:cNvSpPr/>
+          <p:nvPr/>
+        </p:nvSpPr>
+        <p:spPr>
+          <a:xfrm>
+            <a:off x="1708675" y="3746300"/>
+            <a:ext cx="939600" cy="939600"/>
+          </a:xfrm>
+          <a:prstGeom prst="snip1Rect">
+            <a:avLst>
+              <a:gd name="adj" fmla="val 11329"/>
+            </a:avLst>
+          </a:prstGeom>
+          <a:solidFill>
+            <a:schemeClr val="lt1"/>
+          </a:solidFill>
+          <a:ln w="28575" cap="flat" cmpd="sng">
+            <a:solidFill>
+              <a:schemeClr val="dk1"/>
+            </a:solidFill>
+            <a:prstDash val="solid"/>
+            <a:round/>
+            <a:headEnd type="none" w="sm" len="sm"/>
+            <a:tailEnd type="none" w="sm" len="sm"/>
+          </a:ln>
+        </p:spPr>
+        <p:txBody>
+          <a:bodyPr spcFirstLastPara="1" wrap="square" lIns="91425" tIns="91425" rIns="91425" bIns="91425" anchor="ctr" anchorCtr="0">
+            <a:noAutofit/>
+          </a:bodyPr>
+          <a:lstStyle/>
+          <a:p>
+            <a:pPr marL="0" lvl="0" indent="0" algn="l" rtl="0">
+              <a:spcBef>
+                <a:spcPts val="0"/>
+              </a:spcBef>
+              <a:spcAft>
+                <a:spcPts val="0"/>
+              </a:spcAft>
+              <a:buNone/>
+            </a:pPr>
+            <a:endParaRPr/>
+          </a:p>
+        </p:txBody>
+      </p:sp>
+      <p:sp>
+        <p:nvSpPr>
+          <p:cNvPr id="1545" name="Google Shape;1545;p54"/>
+          <p:cNvSpPr/>
+          <p:nvPr/>
+        </p:nvSpPr>
+        <p:spPr>
+          <a:xfrm>
+            <a:off x="1628775" y="3665400"/>
+            <a:ext cx="939600" cy="939600"/>
+          </a:xfrm>
+          <a:prstGeom prst="snip1Rect">
+            <a:avLst>
+              <a:gd name="adj" fmla="val 11329"/>
+            </a:avLst>
+          </a:prstGeom>
+          <a:solidFill>
+            <a:schemeClr val="accent2"/>
+          </a:solidFill>
+          <a:ln w="28575" cap="flat" cmpd="sng">
+            <a:solidFill>
+              <a:schemeClr val="dk1"/>
+            </a:solidFill>
+            <a:prstDash val="solid"/>
+            <a:round/>
+            <a:headEnd type="none" w="sm" len="sm"/>
+            <a:tailEnd type="none" w="sm" len="sm"/>
+          </a:ln>
+        </p:spPr>
+        <p:txBody>
+          <a:bodyPr spcFirstLastPara="1" wrap="square" lIns="91425" tIns="91425" rIns="91425" bIns="91425" anchor="ctr" anchorCtr="0">
+            <a:noAutofit/>
+          </a:bodyPr>
+          <a:lstStyle/>
+          <a:p>
+            <a:pPr marL="0" lvl="0" indent="0" algn="l" rtl="0">
+              <a:spcBef>
+                <a:spcPts val="0"/>
+              </a:spcBef>
+              <a:spcAft>
+                <a:spcPts val="0"/>
+              </a:spcAft>
+              <a:buNone/>
+            </a:pPr>
+            <a:endParaRPr/>
+          </a:p>
+        </p:txBody>
+      </p:sp>
+      <p:sp>
+        <p:nvSpPr>
+          <p:cNvPr id="1546" name="Google Shape;1546;p54"/>
+          <p:cNvSpPr/>
+          <p:nvPr/>
+        </p:nvSpPr>
+        <p:spPr>
+          <a:xfrm>
+            <a:off x="2847300" y="3746300"/>
+            <a:ext cx="939600" cy="939600"/>
+          </a:xfrm>
+          <a:prstGeom prst="snip1Rect">
+            <a:avLst>
+              <a:gd name="adj" fmla="val 11329"/>
+            </a:avLst>
+          </a:prstGeom>
+          <a:solidFill>
+            <a:schemeClr val="lt1"/>
+          </a:solidFill>
+          <a:ln w="28575" cap="flat" cmpd="sng">
+            <a:solidFill>
+              <a:schemeClr val="dk1"/>
+            </a:solidFill>
+            <a:prstDash val="solid"/>
+            <a:round/>
+            <a:headEnd type="none" w="sm" len="sm"/>
+            <a:tailEnd type="none" w="sm" len="sm"/>
+          </a:ln>
+        </p:spPr>
+        <p:txBody>
+          <a:bodyPr spcFirstLastPara="1" wrap="square" lIns="91425" tIns="91425" rIns="91425" bIns="91425" anchor="ctr" anchorCtr="0">
+            <a:noAutofit/>
+          </a:bodyPr>
+          <a:lstStyle/>
+          <a:p>
+            <a:pPr marL="0" lvl="0" indent="0" algn="l" rtl="0">
+              <a:spcBef>
+                <a:spcPts val="0"/>
+              </a:spcBef>
+              <a:spcAft>
+                <a:spcPts val="0"/>
+              </a:spcAft>
+              <a:buNone/>
+            </a:pPr>
+            <a:endParaRPr/>
+          </a:p>
+        </p:txBody>
+      </p:sp>
+      <p:sp>
+        <p:nvSpPr>
+          <p:cNvPr id="1547" name="Google Shape;1547;p54"/>
+          <p:cNvSpPr/>
+          <p:nvPr/>
+        </p:nvSpPr>
+        <p:spPr>
+          <a:xfrm>
+            <a:off x="2767400" y="3665400"/>
+            <a:ext cx="939600" cy="939600"/>
+          </a:xfrm>
+          <a:prstGeom prst="snip1Rect">
+            <a:avLst>
+              <a:gd name="adj" fmla="val 11329"/>
+            </a:avLst>
+          </a:prstGeom>
+          <a:solidFill>
+            <a:schemeClr val="lt2"/>
+          </a:solidFill>
+          <a:ln w="28575" cap="flat" cmpd="sng">
+            <a:solidFill>
+              <a:schemeClr val="dk1"/>
+            </a:solidFill>
+            <a:prstDash val="solid"/>
+            <a:round/>
+            <a:headEnd type="none" w="sm" len="sm"/>
+            <a:tailEnd type="none" w="sm" len="sm"/>
+          </a:ln>
+        </p:spPr>
+        <p:txBody>
+          <a:bodyPr spcFirstLastPara="1" wrap="square" lIns="91425" tIns="91425" rIns="91425" bIns="91425" anchor="ctr" anchorCtr="0">
+            <a:noAutofit/>
+          </a:bodyPr>
+          <a:lstStyle/>
+          <a:p>
+            <a:pPr marL="0" lvl="0" indent="0" algn="l" rtl="0">
+              <a:spcBef>
+                <a:spcPts val="0"/>
+              </a:spcBef>
+              <a:spcAft>
+                <a:spcPts val="0"/>
+              </a:spcAft>
+              <a:buNone/>
+            </a:pPr>
+            <a:endParaRPr/>
+          </a:p>
+        </p:txBody>
+      </p:sp>
+      <p:sp>
+        <p:nvSpPr>
+          <p:cNvPr id="3" name="Rectangle 2"/>
+          <p:cNvSpPr/>
+          <p:nvPr/>
+        </p:nvSpPr>
+        <p:spPr>
+          <a:xfrm>
+            <a:off x="4260574" y="3856383"/>
+            <a:ext cx="4187687" cy="556591"/>
+          </a:xfrm>
+          <a:prstGeom prst="rect">
+            <a:avLst/>
+          </a:prstGeom>
+          <a:solidFill>
+            <a:schemeClr val="bg1"/>
+          </a:solidFill>
+          <a:ln>
+            <a:solidFill>
+              <a:schemeClr val="bg1"/>
+            </a:solidFill>
+          </a:ln>
+        </p:spPr>
+        <p:style>
+          <a:lnRef idx="2">
+            <a:schemeClr val="accent1">
+              <a:shade val="50000"/>
+            </a:schemeClr>
+          </a:lnRef>
+          <a:fillRef idx="1">
+            <a:schemeClr val="accent1"/>
+          </a:fillRef>
+          <a:effectRef idx="0">
+            <a:schemeClr val="accent1"/>
+          </a:effectRef>
+          <a:fontRef idx="minor">
+            <a:schemeClr val="lt1"/>
+          </a:fontRef>
+        </p:style>
+        <p:txBody>
+          <a:bodyPr rtlCol="0" anchor="ctr"/>
+          <a:lstStyle/>
+          <a:p>
+            <a:pPr algn="ctr"/>
+            <a:endParaRPr lang="en-US"/>
+          </a:p>
+        </p:txBody>
+      </p:sp>
+    </p:spTree>
+  </p:cSld>
+  <p:clrMapOvr>
+    <a:masterClrMapping/>
+  </p:clrMapOvr>
+  <mc:AlternateContent xmlns:mc="http://schemas.openxmlformats.org/markup-compatibility/2006" xmlns:p14="http://schemas.microsoft.com/office/powerpoint/2010/main">
+    <mc:Choice Requires="p14">
+      <p:transition spd="med" p14:dur="700">
+        <p:fade/>
+      </p:transition>
+    </mc:Choice>
+    <mc:Fallback xmlns="">
+      <p:transition spd="med">
+        <p:fade/>
+      </p:transition>
+    </mc:Fallback>
+  </mc:AlternateContent>
+</p:sld>
+</file>
+
 <file path=ppt/slides/slide2.xml><?xml version="1.0" encoding="utf-8"?>
+<p:sld xmlns:a="http://schemas.openxmlformats.org/drawingml/2006/main" xmlns:r="http://schemas.openxmlformats.org/officeDocument/2006/relationships" xmlns:p="http://schemas.openxmlformats.org/presentationml/2006/main">
+  <p:cSld>
+    <p:spTree>
+      <p:nvGrpSpPr>
+        <p:cNvPr id="1" name="Shape 442"/>
+        <p:cNvGrpSpPr/>
+        <p:nvPr/>
+      </p:nvGrpSpPr>
+      <p:grpSpPr>
+        <a:xfrm>
+          <a:off x="0" y="0"/>
+          <a:ext cx="0" cy="0"/>
+          <a:chOff x="0" y="0"/>
+          <a:chExt cx="0" cy="0"/>
+        </a:xfrm>
+      </p:grpSpPr>
+      <p:sp>
+        <p:nvSpPr>
+          <p:cNvPr id="443" name="Google Shape;443;p31"/>
+          <p:cNvSpPr/>
+          <p:nvPr/>
+        </p:nvSpPr>
+        <p:spPr>
+          <a:xfrm>
+            <a:off x="5517175" y="3746300"/>
+            <a:ext cx="939600" cy="939600"/>
+          </a:xfrm>
+          <a:prstGeom prst="snip1Rect">
+            <a:avLst>
+              <a:gd name="adj" fmla="val 11329"/>
+            </a:avLst>
+          </a:prstGeom>
+          <a:solidFill>
+            <a:schemeClr val="lt1"/>
+          </a:solidFill>
+          <a:ln w="28575" cap="flat" cmpd="sng">
+            <a:solidFill>
+              <a:schemeClr val="dk1"/>
+            </a:solidFill>
+            <a:prstDash val="solid"/>
+            <a:round/>
+            <a:headEnd type="none" w="sm" len="sm"/>
+            <a:tailEnd type="none" w="sm" len="sm"/>
+          </a:ln>
+        </p:spPr>
+        <p:txBody>
+          <a:bodyPr spcFirstLastPara="1" wrap="square" lIns="91425" tIns="91425" rIns="91425" bIns="91425" anchor="ctr" anchorCtr="0">
+            <a:noAutofit/>
+          </a:bodyPr>
+          <a:lstStyle/>
+          <a:p>
+            <a:pPr marL="0" lvl="0" indent="0" algn="l" rtl="0">
+              <a:spcBef>
+                <a:spcPts val="0"/>
+              </a:spcBef>
+              <a:spcAft>
+                <a:spcPts val="0"/>
+              </a:spcAft>
+              <a:buNone/>
+            </a:pPr>
+            <a:endParaRPr/>
+          </a:p>
+        </p:txBody>
+      </p:sp>
+      <p:sp>
+        <p:nvSpPr>
+          <p:cNvPr id="444" name="Google Shape;444;p31"/>
+          <p:cNvSpPr txBox="1">
+            <a:spLocks noGrp="1"/>
+          </p:cNvSpPr>
+          <p:nvPr>
+            <p:ph type="ctrTitle"/>
+          </p:nvPr>
+        </p:nvSpPr>
+        <p:spPr>
+          <a:xfrm>
+            <a:off x="720000" y="1138400"/>
+            <a:ext cx="7704000" cy="2004000"/>
+          </a:xfrm>
+          <a:prstGeom prst="rect">
+            <a:avLst/>
+          </a:prstGeom>
+        </p:spPr>
+        <p:txBody>
+          <a:bodyPr spcFirstLastPara="1" wrap="square" lIns="91425" tIns="91425" rIns="91425" bIns="91425" anchor="b" anchorCtr="0">
+            <a:noAutofit/>
+          </a:bodyPr>
+          <a:lstStyle/>
+          <a:p>
+            <a:pPr marL="0" lvl="0" indent="0" algn="l" rtl="0">
+              <a:spcBef>
+                <a:spcPts val="0"/>
+              </a:spcBef>
+              <a:spcAft>
+                <a:spcPts val="0"/>
+              </a:spcAft>
+              <a:buNone/>
+            </a:pPr>
+            <a:r>
+              <a:rPr lang="en" sz="5400" dirty="0"/>
+              <a:t>HELLO </a:t>
+            </a:r>
+            <a:br>
+              <a:rPr lang="en" sz="5400" dirty="0"/>
+            </a:br>
+            <a:r>
+              <a:rPr lang="en" sz="6600" dirty="0">
+                <a:highlight>
+                  <a:schemeClr val="accent3"/>
+                </a:highlight>
+              </a:rPr>
+              <a:t>HTML!</a:t>
+            </a:r>
+            <a:endParaRPr sz="5400" dirty="0">
+              <a:highlight>
+                <a:schemeClr val="accent3"/>
+              </a:highlight>
+            </a:endParaRPr>
+          </a:p>
+        </p:txBody>
+      </p:sp>
+      <p:sp>
+        <p:nvSpPr>
+          <p:cNvPr id="445" name="Google Shape;445;p31"/>
+          <p:cNvSpPr txBox="1">
+            <a:spLocks noGrp="1"/>
+          </p:cNvSpPr>
+          <p:nvPr>
+            <p:ph type="subTitle" idx="1"/>
+          </p:nvPr>
+        </p:nvSpPr>
+        <p:spPr>
+          <a:xfrm>
+            <a:off x="720000" y="3907725"/>
+            <a:ext cx="4152600" cy="451500"/>
+          </a:xfrm>
+          <a:prstGeom prst="rect">
+            <a:avLst/>
+          </a:prstGeom>
+        </p:spPr>
+        <p:txBody>
+          <a:bodyPr spcFirstLastPara="1" wrap="square" lIns="91425" tIns="91425" rIns="91425" bIns="91425" anchor="t" anchorCtr="0">
+            <a:noAutofit/>
+          </a:bodyPr>
+          <a:lstStyle/>
+          <a:p>
+            <a:pPr marL="0" lvl="0" indent="0" algn="l" rtl="0">
+              <a:spcBef>
+                <a:spcPts val="0"/>
+              </a:spcBef>
+              <a:spcAft>
+                <a:spcPts val="0"/>
+              </a:spcAft>
+              <a:buNone/>
+            </a:pPr>
+            <a:r>
+              <a:rPr lang="en" sz="1800" dirty="0"/>
+              <a:t>Introduction to Web Development</a:t>
+            </a:r>
+            <a:endParaRPr sz="1800" dirty="0"/>
+          </a:p>
+        </p:txBody>
+      </p:sp>
+      <p:sp>
+        <p:nvSpPr>
+          <p:cNvPr id="446" name="Google Shape;446;p31"/>
+          <p:cNvSpPr/>
+          <p:nvPr/>
+        </p:nvSpPr>
+        <p:spPr>
+          <a:xfrm>
+            <a:off x="5437275" y="3665400"/>
+            <a:ext cx="939600" cy="939600"/>
+          </a:xfrm>
+          <a:prstGeom prst="snip1Rect">
+            <a:avLst>
+              <a:gd name="adj" fmla="val 11329"/>
+            </a:avLst>
+          </a:prstGeom>
+          <a:solidFill>
+            <a:schemeClr val="accent1"/>
+          </a:solidFill>
+          <a:ln w="28575" cap="flat" cmpd="sng">
+            <a:solidFill>
+              <a:schemeClr val="dk1"/>
+            </a:solidFill>
+            <a:prstDash val="solid"/>
+            <a:round/>
+            <a:headEnd type="none" w="sm" len="sm"/>
+            <a:tailEnd type="none" w="sm" len="sm"/>
+          </a:ln>
+        </p:spPr>
+        <p:txBody>
+          <a:bodyPr spcFirstLastPara="1" wrap="square" lIns="91425" tIns="91425" rIns="91425" bIns="91425" anchor="ctr" anchorCtr="0">
+            <a:noAutofit/>
+          </a:bodyPr>
+          <a:lstStyle/>
+          <a:p>
+            <a:pPr marL="0" lvl="0" indent="0" algn="l" rtl="0">
+              <a:spcBef>
+                <a:spcPts val="0"/>
+              </a:spcBef>
+              <a:spcAft>
+                <a:spcPts val="0"/>
+              </a:spcAft>
+              <a:buNone/>
+            </a:pPr>
+            <a:endParaRPr/>
+          </a:p>
+        </p:txBody>
+      </p:sp>
+      <p:sp>
+        <p:nvSpPr>
+          <p:cNvPr id="447" name="Google Shape;447;p31"/>
+          <p:cNvSpPr/>
+          <p:nvPr/>
+        </p:nvSpPr>
+        <p:spPr>
+          <a:xfrm>
+            <a:off x="6655800" y="3746300"/>
+            <a:ext cx="939600" cy="939600"/>
+          </a:xfrm>
+          <a:prstGeom prst="snip1Rect">
+            <a:avLst>
+              <a:gd name="adj" fmla="val 11329"/>
+            </a:avLst>
+          </a:prstGeom>
+          <a:solidFill>
+            <a:schemeClr val="lt1"/>
+          </a:solidFill>
+          <a:ln w="28575" cap="flat" cmpd="sng">
+            <a:solidFill>
+              <a:schemeClr val="dk1"/>
+            </a:solidFill>
+            <a:prstDash val="solid"/>
+            <a:round/>
+            <a:headEnd type="none" w="sm" len="sm"/>
+            <a:tailEnd type="none" w="sm" len="sm"/>
+          </a:ln>
+        </p:spPr>
+        <p:txBody>
+          <a:bodyPr spcFirstLastPara="1" wrap="square" lIns="91425" tIns="91425" rIns="91425" bIns="91425" anchor="ctr" anchorCtr="0">
+            <a:noAutofit/>
+          </a:bodyPr>
+          <a:lstStyle/>
+          <a:p>
+            <a:pPr marL="0" lvl="0" indent="0" algn="l" rtl="0">
+              <a:spcBef>
+                <a:spcPts val="0"/>
+              </a:spcBef>
+              <a:spcAft>
+                <a:spcPts val="0"/>
+              </a:spcAft>
+              <a:buNone/>
+            </a:pPr>
+            <a:endParaRPr/>
+          </a:p>
+        </p:txBody>
+      </p:sp>
+      <p:sp>
+        <p:nvSpPr>
+          <p:cNvPr id="448" name="Google Shape;448;p31"/>
+          <p:cNvSpPr/>
+          <p:nvPr/>
+        </p:nvSpPr>
+        <p:spPr>
+          <a:xfrm>
+            <a:off x="6575900" y="3665400"/>
+            <a:ext cx="939600" cy="939600"/>
+          </a:xfrm>
+          <a:prstGeom prst="snip1Rect">
+            <a:avLst>
+              <a:gd name="adj" fmla="val 11329"/>
+            </a:avLst>
+          </a:prstGeom>
+          <a:solidFill>
+            <a:schemeClr val="accent2"/>
+          </a:solidFill>
+          <a:ln w="28575" cap="flat" cmpd="sng">
+            <a:solidFill>
+              <a:schemeClr val="dk1"/>
+            </a:solidFill>
+            <a:prstDash val="solid"/>
+            <a:round/>
+            <a:headEnd type="none" w="sm" len="sm"/>
+            <a:tailEnd type="none" w="sm" len="sm"/>
+          </a:ln>
+        </p:spPr>
+        <p:txBody>
+          <a:bodyPr spcFirstLastPara="1" wrap="square" lIns="91425" tIns="91425" rIns="91425" bIns="91425" anchor="ctr" anchorCtr="0">
+            <a:noAutofit/>
+          </a:bodyPr>
+          <a:lstStyle/>
+          <a:p>
+            <a:pPr marL="0" lvl="0" indent="0" algn="l" rtl="0">
+              <a:spcBef>
+                <a:spcPts val="0"/>
+              </a:spcBef>
+              <a:spcAft>
+                <a:spcPts val="0"/>
+              </a:spcAft>
+              <a:buNone/>
+            </a:pPr>
+            <a:endParaRPr/>
+          </a:p>
+        </p:txBody>
+      </p:sp>
+      <p:sp>
+        <p:nvSpPr>
+          <p:cNvPr id="449" name="Google Shape;449;p31"/>
+          <p:cNvSpPr/>
+          <p:nvPr/>
+        </p:nvSpPr>
+        <p:spPr>
+          <a:xfrm>
+            <a:off x="7794425" y="3746300"/>
+            <a:ext cx="939600" cy="939600"/>
+          </a:xfrm>
+          <a:prstGeom prst="snip1Rect">
+            <a:avLst>
+              <a:gd name="adj" fmla="val 11329"/>
+            </a:avLst>
+          </a:prstGeom>
+          <a:solidFill>
+            <a:schemeClr val="lt1"/>
+          </a:solidFill>
+          <a:ln w="28575" cap="flat" cmpd="sng">
+            <a:solidFill>
+              <a:schemeClr val="dk1"/>
+            </a:solidFill>
+            <a:prstDash val="solid"/>
+            <a:round/>
+            <a:headEnd type="none" w="sm" len="sm"/>
+            <a:tailEnd type="none" w="sm" len="sm"/>
+          </a:ln>
+        </p:spPr>
+        <p:txBody>
+          <a:bodyPr spcFirstLastPara="1" wrap="square" lIns="91425" tIns="91425" rIns="91425" bIns="91425" anchor="ctr" anchorCtr="0">
+            <a:noAutofit/>
+          </a:bodyPr>
+          <a:lstStyle/>
+          <a:p>
+            <a:pPr marL="0" lvl="0" indent="0" algn="l" rtl="0">
+              <a:spcBef>
+                <a:spcPts val="0"/>
+              </a:spcBef>
+              <a:spcAft>
+                <a:spcPts val="0"/>
+              </a:spcAft>
+              <a:buNone/>
+            </a:pPr>
+            <a:endParaRPr/>
+          </a:p>
+        </p:txBody>
+      </p:sp>
+      <p:sp>
+        <p:nvSpPr>
+          <p:cNvPr id="450" name="Google Shape;450;p31"/>
+          <p:cNvSpPr/>
+          <p:nvPr/>
+        </p:nvSpPr>
+        <p:spPr>
+          <a:xfrm>
+            <a:off x="7714525" y="3665400"/>
+            <a:ext cx="939600" cy="939600"/>
+          </a:xfrm>
+          <a:prstGeom prst="snip1Rect">
+            <a:avLst>
+              <a:gd name="adj" fmla="val 11329"/>
+            </a:avLst>
+          </a:prstGeom>
+          <a:solidFill>
+            <a:schemeClr val="lt2"/>
+          </a:solidFill>
+          <a:ln w="28575" cap="flat" cmpd="sng">
+            <a:solidFill>
+              <a:schemeClr val="dk1"/>
+            </a:solidFill>
+            <a:prstDash val="solid"/>
+            <a:round/>
+            <a:headEnd type="none" w="sm" len="sm"/>
+            <a:tailEnd type="none" w="sm" len="sm"/>
+          </a:ln>
+        </p:spPr>
+        <p:txBody>
+          <a:bodyPr spcFirstLastPara="1" wrap="square" lIns="91425" tIns="91425" rIns="91425" bIns="91425" anchor="ctr" anchorCtr="0">
+            <a:noAutofit/>
+          </a:bodyPr>
+          <a:lstStyle/>
+          <a:p>
+            <a:pPr marL="0" lvl="0" indent="0" algn="l" rtl="0">
+              <a:spcBef>
+                <a:spcPts val="0"/>
+              </a:spcBef>
+              <a:spcAft>
+                <a:spcPts val="0"/>
+              </a:spcAft>
+              <a:buNone/>
+            </a:pPr>
+            <a:endParaRPr/>
+          </a:p>
+        </p:txBody>
+      </p:sp>
+      <p:grpSp>
+        <p:nvGrpSpPr>
+          <p:cNvPr id="10" name="Group 9"/>
+          <p:cNvGrpSpPr>
+            <a:grpSpLocks noChangeAspect="1"/>
+          </p:cNvGrpSpPr>
+          <p:nvPr/>
+        </p:nvGrpSpPr>
+        <p:grpSpPr>
+          <a:xfrm>
+            <a:off x="7811047" y="3760197"/>
+            <a:ext cx="746555" cy="746555"/>
+            <a:chOff x="4724400" y="2057400"/>
+            <a:chExt cx="2743200" cy="2743200"/>
+          </a:xfrm>
+        </p:grpSpPr>
+        <p:sp>
+          <p:nvSpPr>
+            <p:cNvPr id="11" name="Rectangle 10">
+              <a:extLst>
+                <a:ext uri="{FF2B5EF4-FFF2-40B4-BE49-F238E27FC236}">
+                  <a16:creationId xmlns:a16="http://schemas.microsoft.com/office/drawing/2014/main" id="{D29DC7FE-AC82-431F-98BF-29FC267130B1}"/>
+                </a:ext>
+              </a:extLst>
+            </p:cNvPr>
+            <p:cNvSpPr/>
+            <p:nvPr/>
+          </p:nvSpPr>
+          <p:spPr>
+            <a:xfrm>
+              <a:off x="4724400" y="2057400"/>
+              <a:ext cx="2743200" cy="2743200"/>
+            </a:xfrm>
+            <a:prstGeom prst="rect">
+              <a:avLst/>
+            </a:prstGeom>
+            <a:gradFill flip="none" rotWithShape="1">
+              <a:gsLst>
+                <a:gs pos="0">
+                  <a:srgbClr val="6ABF4B"/>
+                </a:gs>
+                <a:gs pos="99000">
+                  <a:srgbClr val="54C8E8"/>
+                </a:gs>
+              </a:gsLst>
+              <a:lin ang="2700000" scaled="1"/>
+              <a:tileRect/>
+            </a:gradFill>
+            <a:ln>
+              <a:noFill/>
+            </a:ln>
+          </p:spPr>
+          <p:style>
+            <a:lnRef idx="2">
+              <a:schemeClr val="accent1">
+                <a:shade val="50000"/>
+              </a:schemeClr>
+            </a:lnRef>
+            <a:fillRef idx="1">
+              <a:schemeClr val="accent1"/>
+            </a:fillRef>
+            <a:effectRef idx="0">
+              <a:schemeClr val="accent1"/>
+            </a:effectRef>
+            <a:fontRef idx="minor">
+              <a:schemeClr val="lt1"/>
+            </a:fontRef>
+          </p:style>
+          <p:txBody>
+            <a:bodyPr rot="0" spcFirstLastPara="0" vertOverflow="overflow" horzOverflow="overflow" vert="horz" wrap="square" lIns="91440" tIns="45720" rIns="91440" bIns="45720" numCol="1" spcCol="0" rtlCol="0" fromWordArt="0" anchor="ctr" anchorCtr="0" forceAA="0" compatLnSpc="1">
+              <a:prstTxWarp prst="textNoShape">
+                <a:avLst/>
+              </a:prstTxWarp>
+              <a:noAutofit/>
+            </a:bodyPr>
+            <a:lstStyle/>
+            <a:p>
+              <a:pPr algn="ctr"/>
+              <a:endParaRPr lang="en-US" sz="2700" dirty="0"/>
+            </a:p>
+          </p:txBody>
+        </p:sp>
+        <p:grpSp>
+          <p:nvGrpSpPr>
+            <p:cNvPr id="12" name="Group 4">
+              <a:extLst>
+                <a:ext uri="{FF2B5EF4-FFF2-40B4-BE49-F238E27FC236}">
+                  <a16:creationId xmlns:a16="http://schemas.microsoft.com/office/drawing/2014/main" id="{BB74FD83-EF1E-43B0-BAC9-95799264DF40}"/>
+                </a:ext>
+              </a:extLst>
+            </p:cNvPr>
+            <p:cNvGrpSpPr>
+              <a:grpSpLocks noChangeAspect="1"/>
+            </p:cNvGrpSpPr>
+            <p:nvPr userDrawn="1"/>
+          </p:nvGrpSpPr>
+          <p:grpSpPr bwMode="auto">
+            <a:xfrm>
+              <a:off x="5154168" y="3116582"/>
+              <a:ext cx="1883664" cy="624837"/>
+              <a:chOff x="4992" y="1007"/>
+              <a:chExt cx="823" cy="273"/>
+            </a:xfrm>
+            <a:solidFill>
+              <a:srgbClr val="FFFFFF"/>
+            </a:solidFill>
+          </p:grpSpPr>
+          <p:sp>
+            <p:nvSpPr>
+              <p:cNvPr id="13" name="Freeform 5">
+                <a:extLst>
+                  <a:ext uri="{FF2B5EF4-FFF2-40B4-BE49-F238E27FC236}">
+                    <a16:creationId xmlns:a16="http://schemas.microsoft.com/office/drawing/2014/main" id="{684C248C-E801-46CE-89AA-270E8706AE3C}"/>
+                  </a:ext>
+                </a:extLst>
+              </p:cNvPr>
+              <p:cNvSpPr>
+                <a:spLocks/>
+              </p:cNvSpPr>
+              <p:nvPr/>
+            </p:nvSpPr>
+            <p:spPr bwMode="auto">
+              <a:xfrm>
+                <a:off x="4992" y="1017"/>
+                <a:ext cx="189" cy="197"/>
+              </a:xfrm>
+              <a:custGeom>
+                <a:avLst/>
+                <a:gdLst>
+                  <a:gd name="T0" fmla="*/ 0 w 189"/>
+                  <a:gd name="T1" fmla="*/ 187 h 197"/>
+                  <a:gd name="T2" fmla="*/ 21 w 189"/>
+                  <a:gd name="T3" fmla="*/ 183 h 197"/>
+                  <a:gd name="T4" fmla="*/ 21 w 189"/>
+                  <a:gd name="T5" fmla="*/ 15 h 197"/>
+                  <a:gd name="T6" fmla="*/ 0 w 189"/>
+                  <a:gd name="T7" fmla="*/ 12 h 197"/>
+                  <a:gd name="T8" fmla="*/ 0 w 189"/>
+                  <a:gd name="T9" fmla="*/ 0 h 197"/>
+                  <a:gd name="T10" fmla="*/ 66 w 189"/>
+                  <a:gd name="T11" fmla="*/ 0 h 197"/>
+                  <a:gd name="T12" fmla="*/ 66 w 189"/>
+                  <a:gd name="T13" fmla="*/ 12 h 197"/>
+                  <a:gd name="T14" fmla="*/ 46 w 189"/>
+                  <a:gd name="T15" fmla="*/ 14 h 197"/>
+                  <a:gd name="T16" fmla="*/ 46 w 189"/>
+                  <a:gd name="T17" fmla="*/ 94 h 197"/>
+                  <a:gd name="T18" fmla="*/ 143 w 189"/>
+                  <a:gd name="T19" fmla="*/ 94 h 197"/>
+                  <a:gd name="T20" fmla="*/ 143 w 189"/>
+                  <a:gd name="T21" fmla="*/ 14 h 197"/>
+                  <a:gd name="T22" fmla="*/ 122 w 189"/>
+                  <a:gd name="T23" fmla="*/ 12 h 197"/>
+                  <a:gd name="T24" fmla="*/ 122 w 189"/>
+                  <a:gd name="T25" fmla="*/ 0 h 197"/>
+                  <a:gd name="T26" fmla="*/ 188 w 189"/>
+                  <a:gd name="T27" fmla="*/ 0 h 197"/>
+                  <a:gd name="T28" fmla="*/ 188 w 189"/>
+                  <a:gd name="T29" fmla="*/ 12 h 197"/>
+                  <a:gd name="T30" fmla="*/ 168 w 189"/>
+                  <a:gd name="T31" fmla="*/ 14 h 197"/>
+                  <a:gd name="T32" fmla="*/ 168 w 189"/>
+                  <a:gd name="T33" fmla="*/ 183 h 197"/>
+                  <a:gd name="T34" fmla="*/ 189 w 189"/>
+                  <a:gd name="T35" fmla="*/ 187 h 197"/>
+                  <a:gd name="T36" fmla="*/ 189 w 189"/>
+                  <a:gd name="T37" fmla="*/ 197 h 197"/>
+                  <a:gd name="T38" fmla="*/ 121 w 189"/>
+                  <a:gd name="T39" fmla="*/ 197 h 197"/>
+                  <a:gd name="T40" fmla="*/ 121 w 189"/>
+                  <a:gd name="T41" fmla="*/ 187 h 197"/>
+                  <a:gd name="T42" fmla="*/ 143 w 189"/>
+                  <a:gd name="T43" fmla="*/ 183 h 197"/>
+                  <a:gd name="T44" fmla="*/ 143 w 189"/>
+                  <a:gd name="T45" fmla="*/ 109 h 197"/>
+                  <a:gd name="T46" fmla="*/ 46 w 189"/>
+                  <a:gd name="T47" fmla="*/ 109 h 197"/>
+                  <a:gd name="T48" fmla="*/ 46 w 189"/>
+                  <a:gd name="T49" fmla="*/ 183 h 197"/>
+                  <a:gd name="T50" fmla="*/ 68 w 189"/>
+                  <a:gd name="T51" fmla="*/ 187 h 197"/>
+                  <a:gd name="T52" fmla="*/ 68 w 189"/>
+                  <a:gd name="T53" fmla="*/ 197 h 197"/>
+                  <a:gd name="T54" fmla="*/ 0 w 189"/>
+                  <a:gd name="T55" fmla="*/ 197 h 197"/>
+                  <a:gd name="T56" fmla="*/ 0 w 189"/>
+                  <a:gd name="T57" fmla="*/ 187 h 197"/>
+                </a:gdLst>
+                <a:ahLst/>
+                <a:cxnLst>
+                  <a:cxn ang="0">
+                    <a:pos x="T0" y="T1"/>
+                  </a:cxn>
+                  <a:cxn ang="0">
+                    <a:pos x="T2" y="T3"/>
+                  </a:cxn>
+                  <a:cxn ang="0">
+                    <a:pos x="T4" y="T5"/>
+                  </a:cxn>
+                  <a:cxn ang="0">
+                    <a:pos x="T6" y="T7"/>
+                  </a:cxn>
+                  <a:cxn ang="0">
+                    <a:pos x="T8" y="T9"/>
+                  </a:cxn>
+                  <a:cxn ang="0">
+                    <a:pos x="T10" y="T11"/>
+                  </a:cxn>
+                  <a:cxn ang="0">
+                    <a:pos x="T12" y="T13"/>
+                  </a:cxn>
+                  <a:cxn ang="0">
+                    <a:pos x="T14" y="T15"/>
+                  </a:cxn>
+                  <a:cxn ang="0">
+                    <a:pos x="T16" y="T17"/>
+                  </a:cxn>
+                  <a:cxn ang="0">
+                    <a:pos x="T18" y="T19"/>
+                  </a:cxn>
+                  <a:cxn ang="0">
+                    <a:pos x="T20" y="T21"/>
+                  </a:cxn>
+                  <a:cxn ang="0">
+                    <a:pos x="T22" y="T23"/>
+                  </a:cxn>
+                  <a:cxn ang="0">
+                    <a:pos x="T24" y="T25"/>
+                  </a:cxn>
+                  <a:cxn ang="0">
+                    <a:pos x="T26" y="T27"/>
+                  </a:cxn>
+                  <a:cxn ang="0">
+                    <a:pos x="T28" y="T29"/>
+                  </a:cxn>
+                  <a:cxn ang="0">
+                    <a:pos x="T30" y="T31"/>
+                  </a:cxn>
+                  <a:cxn ang="0">
+                    <a:pos x="T32" y="T33"/>
+                  </a:cxn>
+                  <a:cxn ang="0">
+                    <a:pos x="T34" y="T35"/>
+                  </a:cxn>
+                  <a:cxn ang="0">
+                    <a:pos x="T36" y="T37"/>
+                  </a:cxn>
+                  <a:cxn ang="0">
+                    <a:pos x="T38" y="T39"/>
+                  </a:cxn>
+                  <a:cxn ang="0">
+                    <a:pos x="T40" y="T41"/>
+                  </a:cxn>
+                  <a:cxn ang="0">
+                    <a:pos x="T42" y="T43"/>
+                  </a:cxn>
+                  <a:cxn ang="0">
+                    <a:pos x="T44" y="T45"/>
+                  </a:cxn>
+                  <a:cxn ang="0">
+                    <a:pos x="T46" y="T47"/>
+                  </a:cxn>
+                  <a:cxn ang="0">
+                    <a:pos x="T48" y="T49"/>
+                  </a:cxn>
+                  <a:cxn ang="0">
+                    <a:pos x="T50" y="T51"/>
+                  </a:cxn>
+                  <a:cxn ang="0">
+                    <a:pos x="T52" y="T53"/>
+                  </a:cxn>
+                  <a:cxn ang="0">
+                    <a:pos x="T54" y="T55"/>
+                  </a:cxn>
+                  <a:cxn ang="0">
+                    <a:pos x="T56" y="T57"/>
+                  </a:cxn>
+                </a:cxnLst>
+                <a:rect l="0" t="0" r="r" b="b"/>
+                <a:pathLst>
+                  <a:path w="189" h="197">
+                    <a:moveTo>
+                      <a:pt x="0" y="187"/>
+                    </a:moveTo>
+                    <a:lnTo>
+                      <a:pt x="21" y="183"/>
+                    </a:lnTo>
+                    <a:lnTo>
+                      <a:pt x="21" y="15"/>
+                    </a:lnTo>
+                    <a:lnTo>
+                      <a:pt x="0" y="12"/>
+                    </a:lnTo>
+                    <a:lnTo>
+                      <a:pt x="0" y="0"/>
+                    </a:lnTo>
+                    <a:lnTo>
+                      <a:pt x="66" y="0"/>
+                    </a:lnTo>
+                    <a:lnTo>
+                      <a:pt x="66" y="12"/>
+                    </a:lnTo>
+                    <a:lnTo>
+                      <a:pt x="46" y="14"/>
+                    </a:lnTo>
+                    <a:lnTo>
+                      <a:pt x="46" y="94"/>
+                    </a:lnTo>
+                    <a:lnTo>
+                      <a:pt x="143" y="94"/>
+                    </a:lnTo>
+                    <a:lnTo>
+                      <a:pt x="143" y="14"/>
+                    </a:lnTo>
+                    <a:lnTo>
+                      <a:pt x="122" y="12"/>
+                    </a:lnTo>
+                    <a:lnTo>
+                      <a:pt x="122" y="0"/>
+                    </a:lnTo>
+                    <a:lnTo>
+                      <a:pt x="188" y="0"/>
+                    </a:lnTo>
+                    <a:lnTo>
+                      <a:pt x="188" y="12"/>
+                    </a:lnTo>
+                    <a:lnTo>
+                      <a:pt x="168" y="14"/>
+                    </a:lnTo>
+                    <a:lnTo>
+                      <a:pt x="168" y="183"/>
+                    </a:lnTo>
+                    <a:lnTo>
+                      <a:pt x="189" y="187"/>
+                    </a:lnTo>
+                    <a:lnTo>
+                      <a:pt x="189" y="197"/>
+                    </a:lnTo>
+                    <a:lnTo>
+                      <a:pt x="121" y="197"/>
+                    </a:lnTo>
+                    <a:lnTo>
+                      <a:pt x="121" y="187"/>
+                    </a:lnTo>
+                    <a:lnTo>
+                      <a:pt x="143" y="183"/>
+                    </a:lnTo>
+                    <a:lnTo>
+                      <a:pt x="143" y="109"/>
+                    </a:lnTo>
+                    <a:lnTo>
+                      <a:pt x="46" y="109"/>
+                    </a:lnTo>
+                    <a:lnTo>
+                      <a:pt x="46" y="183"/>
+                    </a:lnTo>
+                    <a:lnTo>
+                      <a:pt x="68" y="187"/>
+                    </a:lnTo>
+                    <a:lnTo>
+                      <a:pt x="68" y="197"/>
+                    </a:lnTo>
+                    <a:lnTo>
+                      <a:pt x="0" y="197"/>
+                    </a:lnTo>
+                    <a:lnTo>
+                      <a:pt x="0" y="187"/>
+                    </a:lnTo>
+                    <a:close/>
+                  </a:path>
+                </a:pathLst>
+              </a:custGeom>
+              <a:grpFill/>
+              <a:ln>
+                <a:noFill/>
+              </a:ln>
+              <a:extLst>
+                <a:ext uri="{91240B29-F687-4F45-9708-019B960494DF}">
+                  <a14:hiddenLine xmlns:a14="http://schemas.microsoft.com/office/drawing/2010/main" w="9525">
+                    <a:solidFill>
+                      <a:srgbClr val="000000"/>
+                    </a:solidFill>
+                    <a:round/>
+                    <a:headEnd/>
+                    <a:tailEnd/>
+                  </a14:hiddenLine>
+                </a:ext>
+              </a:extLst>
+            </p:spPr>
+            <p:txBody>
+              <a:bodyPr vert="horz" wrap="square" lIns="91440" tIns="45720" rIns="91440" bIns="45720" numCol="1" anchor="t" anchorCtr="0" compatLnSpc="1">
+                <a:prstTxWarp prst="textNoShape">
+                  <a:avLst/>
+                </a:prstTxWarp>
+              </a:bodyPr>
+              <a:lstStyle/>
+              <a:p>
+                <a:endParaRPr lang="en-US"/>
+              </a:p>
+            </p:txBody>
+          </p:sp>
+          <p:sp>
+            <p:nvSpPr>
+              <p:cNvPr id="14" name="Freeform 6">
+                <a:extLst>
+                  <a:ext uri="{FF2B5EF4-FFF2-40B4-BE49-F238E27FC236}">
+                    <a16:creationId xmlns:a16="http://schemas.microsoft.com/office/drawing/2014/main" id="{E53B33E3-324A-4532-975C-F9D23ED42041}"/>
+                  </a:ext>
+                </a:extLst>
+              </p:cNvPr>
+              <p:cNvSpPr>
+                <a:spLocks/>
+              </p:cNvSpPr>
+              <p:nvPr/>
+            </p:nvSpPr>
+            <p:spPr bwMode="auto">
+              <a:xfrm>
+                <a:off x="5173" y="1072"/>
+                <a:ext cx="146" cy="208"/>
+              </a:xfrm>
+              <a:custGeom>
+                <a:avLst/>
+                <a:gdLst>
+                  <a:gd name="T0" fmla="*/ 25 w 199"/>
+                  <a:gd name="T1" fmla="*/ 252 h 282"/>
+                  <a:gd name="T2" fmla="*/ 32 w 199"/>
+                  <a:gd name="T3" fmla="*/ 253 h 282"/>
+                  <a:gd name="T4" fmla="*/ 39 w 199"/>
+                  <a:gd name="T5" fmla="*/ 253 h 282"/>
+                  <a:gd name="T6" fmla="*/ 52 w 199"/>
+                  <a:gd name="T7" fmla="*/ 251 h 282"/>
+                  <a:gd name="T8" fmla="*/ 67 w 199"/>
+                  <a:gd name="T9" fmla="*/ 243 h 282"/>
+                  <a:gd name="T10" fmla="*/ 81 w 199"/>
+                  <a:gd name="T11" fmla="*/ 224 h 282"/>
+                  <a:gd name="T12" fmla="*/ 94 w 199"/>
+                  <a:gd name="T13" fmla="*/ 193 h 282"/>
+                  <a:gd name="T14" fmla="*/ 87 w 199"/>
+                  <a:gd name="T15" fmla="*/ 193 h 282"/>
+                  <a:gd name="T16" fmla="*/ 17 w 199"/>
+                  <a:gd name="T17" fmla="*/ 22 h 282"/>
+                  <a:gd name="T18" fmla="*/ 0 w 199"/>
+                  <a:gd name="T19" fmla="*/ 19 h 282"/>
+                  <a:gd name="T20" fmla="*/ 0 w 199"/>
+                  <a:gd name="T21" fmla="*/ 0 h 282"/>
+                  <a:gd name="T22" fmla="*/ 79 w 199"/>
+                  <a:gd name="T23" fmla="*/ 0 h 282"/>
+                  <a:gd name="T24" fmla="*/ 79 w 199"/>
+                  <a:gd name="T25" fmla="*/ 19 h 282"/>
+                  <a:gd name="T26" fmla="*/ 54 w 199"/>
+                  <a:gd name="T27" fmla="*/ 22 h 282"/>
+                  <a:gd name="T28" fmla="*/ 95 w 199"/>
+                  <a:gd name="T29" fmla="*/ 138 h 282"/>
+                  <a:gd name="T30" fmla="*/ 106 w 199"/>
+                  <a:gd name="T31" fmla="*/ 173 h 282"/>
+                  <a:gd name="T32" fmla="*/ 116 w 199"/>
+                  <a:gd name="T33" fmla="*/ 138 h 282"/>
+                  <a:gd name="T34" fmla="*/ 151 w 199"/>
+                  <a:gd name="T35" fmla="*/ 22 h 282"/>
+                  <a:gd name="T36" fmla="*/ 125 w 199"/>
+                  <a:gd name="T37" fmla="*/ 19 h 282"/>
+                  <a:gd name="T38" fmla="*/ 125 w 199"/>
+                  <a:gd name="T39" fmla="*/ 0 h 282"/>
+                  <a:gd name="T40" fmla="*/ 199 w 199"/>
+                  <a:gd name="T41" fmla="*/ 0 h 282"/>
+                  <a:gd name="T42" fmla="*/ 199 w 199"/>
+                  <a:gd name="T43" fmla="*/ 19 h 282"/>
+                  <a:gd name="T44" fmla="*/ 180 w 199"/>
+                  <a:gd name="T45" fmla="*/ 21 h 282"/>
+                  <a:gd name="T46" fmla="*/ 159 w 199"/>
+                  <a:gd name="T47" fmla="*/ 80 h 282"/>
+                  <a:gd name="T48" fmla="*/ 144 w 199"/>
+                  <a:gd name="T49" fmla="*/ 124 h 282"/>
+                  <a:gd name="T50" fmla="*/ 133 w 199"/>
+                  <a:gd name="T51" fmla="*/ 156 h 282"/>
+                  <a:gd name="T52" fmla="*/ 126 w 199"/>
+                  <a:gd name="T53" fmla="*/ 177 h 282"/>
+                  <a:gd name="T54" fmla="*/ 121 w 199"/>
+                  <a:gd name="T55" fmla="*/ 191 h 282"/>
+                  <a:gd name="T56" fmla="*/ 117 w 199"/>
+                  <a:gd name="T57" fmla="*/ 200 h 282"/>
+                  <a:gd name="T58" fmla="*/ 104 w 199"/>
+                  <a:gd name="T59" fmla="*/ 231 h 282"/>
+                  <a:gd name="T60" fmla="*/ 89 w 199"/>
+                  <a:gd name="T61" fmla="*/ 255 h 282"/>
+                  <a:gd name="T62" fmla="*/ 73 w 199"/>
+                  <a:gd name="T63" fmla="*/ 271 h 282"/>
+                  <a:gd name="T64" fmla="*/ 54 w 199"/>
+                  <a:gd name="T65" fmla="*/ 280 h 282"/>
+                  <a:gd name="T66" fmla="*/ 39 w 199"/>
+                  <a:gd name="T67" fmla="*/ 282 h 282"/>
+                  <a:gd name="T68" fmla="*/ 35 w 199"/>
+                  <a:gd name="T69" fmla="*/ 282 h 282"/>
+                  <a:gd name="T70" fmla="*/ 31 w 199"/>
+                  <a:gd name="T71" fmla="*/ 281 h 282"/>
+                  <a:gd name="T72" fmla="*/ 27 w 199"/>
+                  <a:gd name="T73" fmla="*/ 280 h 282"/>
+                  <a:gd name="T74" fmla="*/ 25 w 199"/>
+                  <a:gd name="T75" fmla="*/ 279 h 282"/>
+                  <a:gd name="T76" fmla="*/ 25 w 199"/>
+                  <a:gd name="T77" fmla="*/ 252 h 282"/>
+                </a:gdLst>
+                <a:ahLst/>
+                <a:cxnLst>
+                  <a:cxn ang="0">
+                    <a:pos x="T0" y="T1"/>
+                  </a:cxn>
+                  <a:cxn ang="0">
+                    <a:pos x="T2" y="T3"/>
+                  </a:cxn>
+                  <a:cxn ang="0">
+                    <a:pos x="T4" y="T5"/>
+                  </a:cxn>
+                  <a:cxn ang="0">
+                    <a:pos x="T6" y="T7"/>
+                  </a:cxn>
+                  <a:cxn ang="0">
+                    <a:pos x="T8" y="T9"/>
+                  </a:cxn>
+                  <a:cxn ang="0">
+                    <a:pos x="T10" y="T11"/>
+                  </a:cxn>
+                  <a:cxn ang="0">
+                    <a:pos x="T12" y="T13"/>
+                  </a:cxn>
+                  <a:cxn ang="0">
+                    <a:pos x="T14" y="T15"/>
+                  </a:cxn>
+                  <a:cxn ang="0">
+                    <a:pos x="T16" y="T17"/>
+                  </a:cxn>
+                  <a:cxn ang="0">
+                    <a:pos x="T18" y="T19"/>
+                  </a:cxn>
+                  <a:cxn ang="0">
+                    <a:pos x="T20" y="T21"/>
+                  </a:cxn>
+                  <a:cxn ang="0">
+                    <a:pos x="T22" y="T23"/>
+                  </a:cxn>
+                  <a:cxn ang="0">
+                    <a:pos x="T24" y="T25"/>
+                  </a:cxn>
+                  <a:cxn ang="0">
+                    <a:pos x="T26" y="T27"/>
+                  </a:cxn>
+                  <a:cxn ang="0">
+                    <a:pos x="T28" y="T29"/>
+                  </a:cxn>
+                  <a:cxn ang="0">
+                    <a:pos x="T30" y="T31"/>
+                  </a:cxn>
+                  <a:cxn ang="0">
+                    <a:pos x="T32" y="T33"/>
+                  </a:cxn>
+                  <a:cxn ang="0">
+                    <a:pos x="T34" y="T35"/>
+                  </a:cxn>
+                  <a:cxn ang="0">
+                    <a:pos x="T36" y="T37"/>
+                  </a:cxn>
+                  <a:cxn ang="0">
+                    <a:pos x="T38" y="T39"/>
+                  </a:cxn>
+                  <a:cxn ang="0">
+                    <a:pos x="T40" y="T41"/>
+                  </a:cxn>
+                  <a:cxn ang="0">
+                    <a:pos x="T42" y="T43"/>
+                  </a:cxn>
+                  <a:cxn ang="0">
+                    <a:pos x="T44" y="T45"/>
+                  </a:cxn>
+                  <a:cxn ang="0">
+                    <a:pos x="T46" y="T47"/>
+                  </a:cxn>
+                  <a:cxn ang="0">
+                    <a:pos x="T48" y="T49"/>
+                  </a:cxn>
+                  <a:cxn ang="0">
+                    <a:pos x="T50" y="T51"/>
+                  </a:cxn>
+                  <a:cxn ang="0">
+                    <a:pos x="T52" y="T53"/>
+                  </a:cxn>
+                  <a:cxn ang="0">
+                    <a:pos x="T54" y="T55"/>
+                  </a:cxn>
+                  <a:cxn ang="0">
+                    <a:pos x="T56" y="T57"/>
+                  </a:cxn>
+                  <a:cxn ang="0">
+                    <a:pos x="T58" y="T59"/>
+                  </a:cxn>
+                  <a:cxn ang="0">
+                    <a:pos x="T60" y="T61"/>
+                  </a:cxn>
+                  <a:cxn ang="0">
+                    <a:pos x="T62" y="T63"/>
+                  </a:cxn>
+                  <a:cxn ang="0">
+                    <a:pos x="T64" y="T65"/>
+                  </a:cxn>
+                  <a:cxn ang="0">
+                    <a:pos x="T66" y="T67"/>
+                  </a:cxn>
+                  <a:cxn ang="0">
+                    <a:pos x="T68" y="T69"/>
+                  </a:cxn>
+                  <a:cxn ang="0">
+                    <a:pos x="T70" y="T71"/>
+                  </a:cxn>
+                  <a:cxn ang="0">
+                    <a:pos x="T72" y="T73"/>
+                  </a:cxn>
+                  <a:cxn ang="0">
+                    <a:pos x="T74" y="T75"/>
+                  </a:cxn>
+                  <a:cxn ang="0">
+                    <a:pos x="T76" y="T77"/>
+                  </a:cxn>
+                </a:cxnLst>
+                <a:rect l="0" t="0" r="r" b="b"/>
+                <a:pathLst>
+                  <a:path w="199" h="282">
+                    <a:moveTo>
+                      <a:pt x="25" y="252"/>
+                    </a:moveTo>
+                    <a:cubicBezTo>
+                      <a:pt x="27" y="252"/>
+                      <a:pt x="29" y="253"/>
+                      <a:pt x="32" y="253"/>
+                    </a:cubicBezTo>
+                    <a:cubicBezTo>
+                      <a:pt x="34" y="253"/>
+                      <a:pt x="37" y="253"/>
+                      <a:pt x="39" y="253"/>
+                    </a:cubicBezTo>
+                    <a:cubicBezTo>
+                      <a:pt x="43" y="253"/>
+                      <a:pt x="47" y="253"/>
+                      <a:pt x="52" y="251"/>
+                    </a:cubicBezTo>
+                    <a:cubicBezTo>
+                      <a:pt x="57" y="250"/>
+                      <a:pt x="62" y="247"/>
+                      <a:pt x="67" y="243"/>
+                    </a:cubicBezTo>
+                    <a:cubicBezTo>
+                      <a:pt x="72" y="238"/>
+                      <a:pt x="77" y="232"/>
+                      <a:pt x="81" y="224"/>
+                    </a:cubicBezTo>
+                    <a:cubicBezTo>
+                      <a:pt x="86" y="216"/>
+                      <a:pt x="90" y="206"/>
+                      <a:pt x="94" y="193"/>
+                    </a:cubicBezTo>
+                    <a:cubicBezTo>
+                      <a:pt x="87" y="193"/>
+                      <a:pt x="87" y="193"/>
+                      <a:pt x="87" y="193"/>
+                    </a:cubicBezTo>
+                    <a:cubicBezTo>
+                      <a:pt x="17" y="22"/>
+                      <a:pt x="17" y="22"/>
+                      <a:pt x="17" y="22"/>
+                    </a:cubicBezTo>
+                    <a:cubicBezTo>
+                      <a:pt x="0" y="19"/>
+                      <a:pt x="0" y="19"/>
+                      <a:pt x="0" y="19"/>
+                    </a:cubicBezTo>
+                    <a:cubicBezTo>
+                      <a:pt x="0" y="0"/>
+                      <a:pt x="0" y="0"/>
+                      <a:pt x="0" y="0"/>
+                    </a:cubicBezTo>
+                    <a:cubicBezTo>
+                      <a:pt x="79" y="0"/>
+                      <a:pt x="79" y="0"/>
+                      <a:pt x="79" y="0"/>
+                    </a:cubicBezTo>
+                    <a:cubicBezTo>
+                      <a:pt x="79" y="19"/>
+                      <a:pt x="79" y="19"/>
+                      <a:pt x="79" y="19"/>
+                    </a:cubicBezTo>
+                    <a:cubicBezTo>
+                      <a:pt x="54" y="22"/>
+                      <a:pt x="54" y="22"/>
+                      <a:pt x="54" y="22"/>
+                    </a:cubicBezTo>
+                    <a:cubicBezTo>
+                      <a:pt x="95" y="138"/>
+                      <a:pt x="95" y="138"/>
+                      <a:pt x="95" y="138"/>
+                    </a:cubicBezTo>
+                    <a:cubicBezTo>
+                      <a:pt x="106" y="173"/>
+                      <a:pt x="106" y="173"/>
+                      <a:pt x="106" y="173"/>
+                    </a:cubicBezTo>
+                    <a:cubicBezTo>
+                      <a:pt x="116" y="138"/>
+                      <a:pt x="116" y="138"/>
+                      <a:pt x="116" y="138"/>
+                    </a:cubicBezTo>
+                    <a:cubicBezTo>
+                      <a:pt x="151" y="22"/>
+                      <a:pt x="151" y="22"/>
+                      <a:pt x="151" y="22"/>
+                    </a:cubicBezTo>
+                    <a:cubicBezTo>
+                      <a:pt x="125" y="19"/>
+                      <a:pt x="125" y="19"/>
+                      <a:pt x="125" y="19"/>
+                    </a:cubicBezTo>
+                    <a:cubicBezTo>
+                      <a:pt x="125" y="0"/>
+                      <a:pt x="125" y="0"/>
+                      <a:pt x="125" y="0"/>
+                    </a:cubicBezTo>
+                    <a:cubicBezTo>
+                      <a:pt x="199" y="0"/>
+                      <a:pt x="199" y="0"/>
+                      <a:pt x="199" y="0"/>
+                    </a:cubicBezTo>
+                    <a:cubicBezTo>
+                      <a:pt x="199" y="19"/>
+                      <a:pt x="199" y="19"/>
+                      <a:pt x="199" y="19"/>
+                    </a:cubicBezTo>
+                    <a:cubicBezTo>
+                      <a:pt x="180" y="21"/>
+                      <a:pt x="180" y="21"/>
+                      <a:pt x="180" y="21"/>
+                    </a:cubicBezTo>
+                    <a:cubicBezTo>
+                      <a:pt x="172" y="44"/>
+                      <a:pt x="165" y="63"/>
+                      <a:pt x="159" y="80"/>
+                    </a:cubicBezTo>
+                    <a:cubicBezTo>
+                      <a:pt x="154" y="97"/>
+                      <a:pt x="149" y="112"/>
+                      <a:pt x="144" y="124"/>
+                    </a:cubicBezTo>
+                    <a:cubicBezTo>
+                      <a:pt x="140" y="136"/>
+                      <a:pt x="136" y="147"/>
+                      <a:pt x="133" y="156"/>
+                    </a:cubicBezTo>
+                    <a:cubicBezTo>
+                      <a:pt x="130" y="164"/>
+                      <a:pt x="128" y="171"/>
+                      <a:pt x="126" y="177"/>
+                    </a:cubicBezTo>
+                    <a:cubicBezTo>
+                      <a:pt x="124" y="183"/>
+                      <a:pt x="122" y="187"/>
+                      <a:pt x="121" y="191"/>
+                    </a:cubicBezTo>
+                    <a:cubicBezTo>
+                      <a:pt x="119" y="195"/>
+                      <a:pt x="118" y="197"/>
+                      <a:pt x="117" y="200"/>
+                    </a:cubicBezTo>
+                    <a:cubicBezTo>
+                      <a:pt x="113" y="211"/>
+                      <a:pt x="108" y="222"/>
+                      <a:pt x="104" y="231"/>
+                    </a:cubicBezTo>
+                    <a:cubicBezTo>
+                      <a:pt x="99" y="240"/>
+                      <a:pt x="94" y="248"/>
+                      <a:pt x="89" y="255"/>
+                    </a:cubicBezTo>
+                    <a:cubicBezTo>
+                      <a:pt x="84" y="261"/>
+                      <a:pt x="79" y="267"/>
+                      <a:pt x="73" y="271"/>
+                    </a:cubicBezTo>
+                    <a:cubicBezTo>
+                      <a:pt x="67" y="275"/>
+                      <a:pt x="61" y="278"/>
+                      <a:pt x="54" y="280"/>
+                    </a:cubicBezTo>
+                    <a:cubicBezTo>
+                      <a:pt x="49" y="281"/>
+                      <a:pt x="44" y="282"/>
+                      <a:pt x="39" y="282"/>
+                    </a:cubicBezTo>
+                    <a:cubicBezTo>
+                      <a:pt x="37" y="282"/>
+                      <a:pt x="36" y="282"/>
+                      <a:pt x="35" y="282"/>
+                    </a:cubicBezTo>
+                    <a:cubicBezTo>
+                      <a:pt x="33" y="282"/>
+                      <a:pt x="32" y="281"/>
+                      <a:pt x="31" y="281"/>
+                    </a:cubicBezTo>
+                    <a:cubicBezTo>
+                      <a:pt x="29" y="281"/>
+                      <a:pt x="28" y="281"/>
+                      <a:pt x="27" y="280"/>
+                    </a:cubicBezTo>
+                    <a:cubicBezTo>
+                      <a:pt x="26" y="280"/>
+                      <a:pt x="25" y="280"/>
+                      <a:pt x="25" y="279"/>
+                    </a:cubicBezTo>
+                    <a:lnTo>
+                      <a:pt x="25" y="252"/>
+                    </a:lnTo>
+                    <a:close/>
+                  </a:path>
+                </a:pathLst>
+              </a:custGeom>
+              <a:grpFill/>
+              <a:ln>
+                <a:noFill/>
+              </a:ln>
+              <a:extLst>
+                <a:ext uri="{91240B29-F687-4F45-9708-019B960494DF}">
+                  <a14:hiddenLine xmlns:a14="http://schemas.microsoft.com/office/drawing/2010/main" w="9525">
+                    <a:solidFill>
+                      <a:srgbClr val="000000"/>
+                    </a:solidFill>
+                    <a:round/>
+                    <a:headEnd/>
+                    <a:tailEnd/>
+                  </a14:hiddenLine>
+                </a:ext>
+              </a:extLst>
+            </p:spPr>
+            <p:txBody>
+              <a:bodyPr vert="horz" wrap="square" lIns="91440" tIns="45720" rIns="91440" bIns="45720" numCol="1" anchor="t" anchorCtr="0" compatLnSpc="1">
+                <a:prstTxWarp prst="textNoShape">
+                  <a:avLst/>
+                </a:prstTxWarp>
+              </a:bodyPr>
+              <a:lstStyle/>
+              <a:p>
+                <a:endParaRPr lang="en-US"/>
+              </a:p>
+            </p:txBody>
+          </p:sp>
+          <p:sp>
+            <p:nvSpPr>
+              <p:cNvPr id="15" name="Freeform 7">
+                <a:extLst>
+                  <a:ext uri="{FF2B5EF4-FFF2-40B4-BE49-F238E27FC236}">
+                    <a16:creationId xmlns:a16="http://schemas.microsoft.com/office/drawing/2014/main" id="{FD727287-C9FF-49F5-8048-FECAA50EFFFC}"/>
+                  </a:ext>
+                </a:extLst>
+              </p:cNvPr>
+              <p:cNvSpPr>
+                <a:spLocks/>
+              </p:cNvSpPr>
+              <p:nvPr/>
+            </p:nvSpPr>
+            <p:spPr bwMode="auto">
+              <a:xfrm>
+                <a:off x="5312" y="1007"/>
+                <a:ext cx="69" cy="207"/>
+              </a:xfrm>
+              <a:custGeom>
+                <a:avLst/>
+                <a:gdLst>
+                  <a:gd name="T0" fmla="*/ 0 w 69"/>
+                  <a:gd name="T1" fmla="*/ 197 h 207"/>
+                  <a:gd name="T2" fmla="*/ 22 w 69"/>
+                  <a:gd name="T3" fmla="*/ 194 h 207"/>
+                  <a:gd name="T4" fmla="*/ 22 w 69"/>
+                  <a:gd name="T5" fmla="*/ 22 h 207"/>
+                  <a:gd name="T6" fmla="*/ 1 w 69"/>
+                  <a:gd name="T7" fmla="*/ 17 h 207"/>
+                  <a:gd name="T8" fmla="*/ 1 w 69"/>
+                  <a:gd name="T9" fmla="*/ 5 h 207"/>
+                  <a:gd name="T10" fmla="*/ 41 w 69"/>
+                  <a:gd name="T11" fmla="*/ 0 h 207"/>
+                  <a:gd name="T12" fmla="*/ 46 w 69"/>
+                  <a:gd name="T13" fmla="*/ 3 h 207"/>
+                  <a:gd name="T14" fmla="*/ 46 w 69"/>
+                  <a:gd name="T15" fmla="*/ 194 h 207"/>
+                  <a:gd name="T16" fmla="*/ 69 w 69"/>
+                  <a:gd name="T17" fmla="*/ 197 h 207"/>
+                  <a:gd name="T18" fmla="*/ 69 w 69"/>
+                  <a:gd name="T19" fmla="*/ 207 h 207"/>
+                  <a:gd name="T20" fmla="*/ 0 w 69"/>
+                  <a:gd name="T21" fmla="*/ 207 h 207"/>
+                  <a:gd name="T22" fmla="*/ 0 w 69"/>
+                  <a:gd name="T23" fmla="*/ 197 h 207"/>
+                </a:gdLst>
+                <a:ahLst/>
+                <a:cxnLst>
+                  <a:cxn ang="0">
+                    <a:pos x="T0" y="T1"/>
+                  </a:cxn>
+                  <a:cxn ang="0">
+                    <a:pos x="T2" y="T3"/>
+                  </a:cxn>
+                  <a:cxn ang="0">
+                    <a:pos x="T4" y="T5"/>
+                  </a:cxn>
+                  <a:cxn ang="0">
+                    <a:pos x="T6" y="T7"/>
+                  </a:cxn>
+                  <a:cxn ang="0">
+                    <a:pos x="T8" y="T9"/>
+                  </a:cxn>
+                  <a:cxn ang="0">
+                    <a:pos x="T10" y="T11"/>
+                  </a:cxn>
+                  <a:cxn ang="0">
+                    <a:pos x="T12" y="T13"/>
+                  </a:cxn>
+                  <a:cxn ang="0">
+                    <a:pos x="T14" y="T15"/>
+                  </a:cxn>
+                  <a:cxn ang="0">
+                    <a:pos x="T16" y="T17"/>
+                  </a:cxn>
+                  <a:cxn ang="0">
+                    <a:pos x="T18" y="T19"/>
+                  </a:cxn>
+                  <a:cxn ang="0">
+                    <a:pos x="T20" y="T21"/>
+                  </a:cxn>
+                  <a:cxn ang="0">
+                    <a:pos x="T22" y="T23"/>
+                  </a:cxn>
+                </a:cxnLst>
+                <a:rect l="0" t="0" r="r" b="b"/>
+                <a:pathLst>
+                  <a:path w="69" h="207">
+                    <a:moveTo>
+                      <a:pt x="0" y="197"/>
+                    </a:moveTo>
+                    <a:lnTo>
+                      <a:pt x="22" y="194"/>
+                    </a:lnTo>
+                    <a:lnTo>
+                      <a:pt x="22" y="22"/>
+                    </a:lnTo>
+                    <a:lnTo>
+                      <a:pt x="1" y="17"/>
+                    </a:lnTo>
+                    <a:lnTo>
+                      <a:pt x="1" y="5"/>
+                    </a:lnTo>
+                    <a:lnTo>
+                      <a:pt x="41" y="0"/>
+                    </a:lnTo>
+                    <a:lnTo>
+                      <a:pt x="46" y="3"/>
+                    </a:lnTo>
+                    <a:lnTo>
+                      <a:pt x="46" y="194"/>
+                    </a:lnTo>
+                    <a:lnTo>
+                      <a:pt x="69" y="197"/>
+                    </a:lnTo>
+                    <a:lnTo>
+                      <a:pt x="69" y="207"/>
+                    </a:lnTo>
+                    <a:lnTo>
+                      <a:pt x="0" y="207"/>
+                    </a:lnTo>
+                    <a:lnTo>
+                      <a:pt x="0" y="197"/>
+                    </a:lnTo>
+                    <a:close/>
+                  </a:path>
+                </a:pathLst>
+              </a:custGeom>
+              <a:grpFill/>
+              <a:ln>
+                <a:noFill/>
+              </a:ln>
+              <a:extLst>
+                <a:ext uri="{91240B29-F687-4F45-9708-019B960494DF}">
+                  <a14:hiddenLine xmlns:a14="http://schemas.microsoft.com/office/drawing/2010/main" w="9525">
+                    <a:solidFill>
+                      <a:srgbClr val="000000"/>
+                    </a:solidFill>
+                    <a:round/>
+                    <a:headEnd/>
+                    <a:tailEnd/>
+                  </a14:hiddenLine>
+                </a:ext>
+              </a:extLst>
+            </p:spPr>
+            <p:txBody>
+              <a:bodyPr vert="horz" wrap="square" lIns="91440" tIns="45720" rIns="91440" bIns="45720" numCol="1" anchor="t" anchorCtr="0" compatLnSpc="1">
+                <a:prstTxWarp prst="textNoShape">
+                  <a:avLst/>
+                </a:prstTxWarp>
+              </a:bodyPr>
+              <a:lstStyle/>
+              <a:p>
+                <a:endParaRPr lang="en-US"/>
+              </a:p>
+            </p:txBody>
+          </p:sp>
+          <p:sp>
+            <p:nvSpPr>
+              <p:cNvPr id="16" name="Freeform 8">
+                <a:extLst>
+                  <a:ext uri="{FF2B5EF4-FFF2-40B4-BE49-F238E27FC236}">
+                    <a16:creationId xmlns:a16="http://schemas.microsoft.com/office/drawing/2014/main" id="{45BAB9F8-3FA1-4FBD-878A-A0528C2607C8}"/>
+                  </a:ext>
+                </a:extLst>
+              </p:cNvPr>
+              <p:cNvSpPr>
+                <a:spLocks noEditPoints="1"/>
+              </p:cNvSpPr>
+              <p:nvPr/>
+            </p:nvSpPr>
+            <p:spPr bwMode="auto">
+              <a:xfrm>
+                <a:off x="5381" y="1069"/>
+                <a:ext cx="123" cy="148"/>
+              </a:xfrm>
+              <a:custGeom>
+                <a:avLst/>
+                <a:gdLst>
+                  <a:gd name="T0" fmla="*/ 1 w 167"/>
+                  <a:gd name="T1" fmla="*/ 141 h 200"/>
+                  <a:gd name="T2" fmla="*/ 8 w 167"/>
+                  <a:gd name="T3" fmla="*/ 120 h 200"/>
+                  <a:gd name="T4" fmla="*/ 24 w 167"/>
+                  <a:gd name="T5" fmla="*/ 104 h 200"/>
+                  <a:gd name="T6" fmla="*/ 46 w 167"/>
+                  <a:gd name="T7" fmla="*/ 93 h 200"/>
+                  <a:gd name="T8" fmla="*/ 70 w 167"/>
+                  <a:gd name="T9" fmla="*/ 86 h 200"/>
+                  <a:gd name="T10" fmla="*/ 93 w 167"/>
+                  <a:gd name="T11" fmla="*/ 83 h 200"/>
+                  <a:gd name="T12" fmla="*/ 112 w 167"/>
+                  <a:gd name="T13" fmla="*/ 82 h 200"/>
+                  <a:gd name="T14" fmla="*/ 112 w 167"/>
+                  <a:gd name="T15" fmla="*/ 67 h 200"/>
+                  <a:gd name="T16" fmla="*/ 108 w 167"/>
+                  <a:gd name="T17" fmla="*/ 44 h 200"/>
+                  <a:gd name="T18" fmla="*/ 98 w 167"/>
+                  <a:gd name="T19" fmla="*/ 31 h 200"/>
+                  <a:gd name="T20" fmla="*/ 83 w 167"/>
+                  <a:gd name="T21" fmla="*/ 25 h 200"/>
+                  <a:gd name="T22" fmla="*/ 64 w 167"/>
+                  <a:gd name="T23" fmla="*/ 23 h 200"/>
+                  <a:gd name="T24" fmla="*/ 53 w 167"/>
+                  <a:gd name="T25" fmla="*/ 24 h 200"/>
+                  <a:gd name="T26" fmla="*/ 40 w 167"/>
+                  <a:gd name="T27" fmla="*/ 26 h 200"/>
+                  <a:gd name="T28" fmla="*/ 27 w 167"/>
+                  <a:gd name="T29" fmla="*/ 31 h 200"/>
+                  <a:gd name="T30" fmla="*/ 14 w 167"/>
+                  <a:gd name="T31" fmla="*/ 36 h 200"/>
+                  <a:gd name="T32" fmla="*/ 8 w 167"/>
+                  <a:gd name="T33" fmla="*/ 20 h 200"/>
+                  <a:gd name="T34" fmla="*/ 24 w 167"/>
+                  <a:gd name="T35" fmla="*/ 11 h 200"/>
+                  <a:gd name="T36" fmla="*/ 43 w 167"/>
+                  <a:gd name="T37" fmla="*/ 5 h 200"/>
+                  <a:gd name="T38" fmla="*/ 61 w 167"/>
+                  <a:gd name="T39" fmla="*/ 1 h 200"/>
+                  <a:gd name="T40" fmla="*/ 77 w 167"/>
+                  <a:gd name="T41" fmla="*/ 0 h 200"/>
+                  <a:gd name="T42" fmla="*/ 103 w 167"/>
+                  <a:gd name="T43" fmla="*/ 3 h 200"/>
+                  <a:gd name="T44" fmla="*/ 125 w 167"/>
+                  <a:gd name="T45" fmla="*/ 13 h 200"/>
+                  <a:gd name="T46" fmla="*/ 139 w 167"/>
+                  <a:gd name="T47" fmla="*/ 32 h 200"/>
+                  <a:gd name="T48" fmla="*/ 145 w 167"/>
+                  <a:gd name="T49" fmla="*/ 63 h 200"/>
+                  <a:gd name="T50" fmla="*/ 145 w 167"/>
+                  <a:gd name="T51" fmla="*/ 182 h 200"/>
+                  <a:gd name="T52" fmla="*/ 167 w 167"/>
+                  <a:gd name="T53" fmla="*/ 182 h 200"/>
+                  <a:gd name="T54" fmla="*/ 167 w 167"/>
+                  <a:gd name="T55" fmla="*/ 193 h 200"/>
+                  <a:gd name="T56" fmla="*/ 152 w 167"/>
+                  <a:gd name="T57" fmla="*/ 198 h 200"/>
+                  <a:gd name="T58" fmla="*/ 134 w 167"/>
+                  <a:gd name="T59" fmla="*/ 200 h 200"/>
+                  <a:gd name="T60" fmla="*/ 127 w 167"/>
+                  <a:gd name="T61" fmla="*/ 200 h 200"/>
+                  <a:gd name="T62" fmla="*/ 121 w 167"/>
+                  <a:gd name="T63" fmla="*/ 198 h 200"/>
+                  <a:gd name="T64" fmla="*/ 116 w 167"/>
+                  <a:gd name="T65" fmla="*/ 192 h 200"/>
+                  <a:gd name="T66" fmla="*/ 114 w 167"/>
+                  <a:gd name="T67" fmla="*/ 182 h 200"/>
+                  <a:gd name="T68" fmla="*/ 114 w 167"/>
+                  <a:gd name="T69" fmla="*/ 178 h 200"/>
+                  <a:gd name="T70" fmla="*/ 104 w 167"/>
+                  <a:gd name="T71" fmla="*/ 187 h 200"/>
+                  <a:gd name="T72" fmla="*/ 92 w 167"/>
+                  <a:gd name="T73" fmla="*/ 194 h 200"/>
+                  <a:gd name="T74" fmla="*/ 76 w 167"/>
+                  <a:gd name="T75" fmla="*/ 199 h 200"/>
+                  <a:gd name="T76" fmla="*/ 56 w 167"/>
+                  <a:gd name="T77" fmla="*/ 200 h 200"/>
+                  <a:gd name="T78" fmla="*/ 32 w 167"/>
+                  <a:gd name="T79" fmla="*/ 195 h 200"/>
+                  <a:gd name="T80" fmla="*/ 14 w 167"/>
+                  <a:gd name="T81" fmla="*/ 182 h 200"/>
+                  <a:gd name="T82" fmla="*/ 3 w 167"/>
+                  <a:gd name="T83" fmla="*/ 164 h 200"/>
+                  <a:gd name="T84" fmla="*/ 1 w 167"/>
+                  <a:gd name="T85" fmla="*/ 141 h 200"/>
+                  <a:gd name="T86" fmla="*/ 34 w 167"/>
+                  <a:gd name="T87" fmla="*/ 141 h 200"/>
+                  <a:gd name="T88" fmla="*/ 37 w 167"/>
+                  <a:gd name="T89" fmla="*/ 159 h 200"/>
+                  <a:gd name="T90" fmla="*/ 45 w 167"/>
+                  <a:gd name="T91" fmla="*/ 170 h 200"/>
+                  <a:gd name="T92" fmla="*/ 58 w 167"/>
+                  <a:gd name="T93" fmla="*/ 176 h 200"/>
+                  <a:gd name="T94" fmla="*/ 75 w 167"/>
+                  <a:gd name="T95" fmla="*/ 178 h 200"/>
+                  <a:gd name="T96" fmla="*/ 85 w 167"/>
+                  <a:gd name="T97" fmla="*/ 177 h 200"/>
+                  <a:gd name="T98" fmla="*/ 95 w 167"/>
+                  <a:gd name="T99" fmla="*/ 174 h 200"/>
+                  <a:gd name="T100" fmla="*/ 105 w 167"/>
+                  <a:gd name="T101" fmla="*/ 169 h 200"/>
+                  <a:gd name="T102" fmla="*/ 111 w 167"/>
+                  <a:gd name="T103" fmla="*/ 164 h 200"/>
+                  <a:gd name="T104" fmla="*/ 111 w 167"/>
+                  <a:gd name="T105" fmla="*/ 131 h 200"/>
+                  <a:gd name="T106" fmla="*/ 112 w 167"/>
+                  <a:gd name="T107" fmla="*/ 99 h 200"/>
+                  <a:gd name="T108" fmla="*/ 96 w 167"/>
+                  <a:gd name="T109" fmla="*/ 100 h 200"/>
+                  <a:gd name="T110" fmla="*/ 79 w 167"/>
+                  <a:gd name="T111" fmla="*/ 103 h 200"/>
+                  <a:gd name="T112" fmla="*/ 62 w 167"/>
+                  <a:gd name="T113" fmla="*/ 108 h 200"/>
+                  <a:gd name="T114" fmla="*/ 48 w 167"/>
+                  <a:gd name="T115" fmla="*/ 116 h 200"/>
+                  <a:gd name="T116" fmla="*/ 38 w 167"/>
+                  <a:gd name="T117" fmla="*/ 127 h 200"/>
+                  <a:gd name="T118" fmla="*/ 34 w 167"/>
+                  <a:gd name="T119" fmla="*/ 141 h 200"/>
+                </a:gdLst>
+                <a:ahLst/>
+                <a:cxnLst>
+                  <a:cxn ang="0">
+                    <a:pos x="T0" y="T1"/>
+                  </a:cxn>
+                  <a:cxn ang="0">
+                    <a:pos x="T2" y="T3"/>
+                  </a:cxn>
+                  <a:cxn ang="0">
+                    <a:pos x="T4" y="T5"/>
+                  </a:cxn>
+                  <a:cxn ang="0">
+                    <a:pos x="T6" y="T7"/>
+                  </a:cxn>
+                  <a:cxn ang="0">
+                    <a:pos x="T8" y="T9"/>
+                  </a:cxn>
+                  <a:cxn ang="0">
+                    <a:pos x="T10" y="T11"/>
+                  </a:cxn>
+                  <a:cxn ang="0">
+                    <a:pos x="T12" y="T13"/>
+                  </a:cxn>
+                  <a:cxn ang="0">
+                    <a:pos x="T14" y="T15"/>
+                  </a:cxn>
+                  <a:cxn ang="0">
+                    <a:pos x="T16" y="T17"/>
+                  </a:cxn>
+                  <a:cxn ang="0">
+                    <a:pos x="T18" y="T19"/>
+                  </a:cxn>
+                  <a:cxn ang="0">
+                    <a:pos x="T20" y="T21"/>
+                  </a:cxn>
+                  <a:cxn ang="0">
+                    <a:pos x="T22" y="T23"/>
+                  </a:cxn>
+                  <a:cxn ang="0">
+                    <a:pos x="T24" y="T25"/>
+                  </a:cxn>
+                  <a:cxn ang="0">
+                    <a:pos x="T26" y="T27"/>
+                  </a:cxn>
+                  <a:cxn ang="0">
+                    <a:pos x="T28" y="T29"/>
+                  </a:cxn>
+                  <a:cxn ang="0">
+                    <a:pos x="T30" y="T31"/>
+                  </a:cxn>
+                  <a:cxn ang="0">
+                    <a:pos x="T32" y="T33"/>
+                  </a:cxn>
+                  <a:cxn ang="0">
+                    <a:pos x="T34" y="T35"/>
+                  </a:cxn>
+                  <a:cxn ang="0">
+                    <a:pos x="T36" y="T37"/>
+                  </a:cxn>
+                  <a:cxn ang="0">
+                    <a:pos x="T38" y="T39"/>
+                  </a:cxn>
+                  <a:cxn ang="0">
+                    <a:pos x="T40" y="T41"/>
+                  </a:cxn>
+                  <a:cxn ang="0">
+                    <a:pos x="T42" y="T43"/>
+                  </a:cxn>
+                  <a:cxn ang="0">
+                    <a:pos x="T44" y="T45"/>
+                  </a:cxn>
+                  <a:cxn ang="0">
+                    <a:pos x="T46" y="T47"/>
+                  </a:cxn>
+                  <a:cxn ang="0">
+                    <a:pos x="T48" y="T49"/>
+                  </a:cxn>
+                  <a:cxn ang="0">
+                    <a:pos x="T50" y="T51"/>
+                  </a:cxn>
+                  <a:cxn ang="0">
+                    <a:pos x="T52" y="T53"/>
+                  </a:cxn>
+                  <a:cxn ang="0">
+                    <a:pos x="T54" y="T55"/>
+                  </a:cxn>
+                  <a:cxn ang="0">
+                    <a:pos x="T56" y="T57"/>
+                  </a:cxn>
+                  <a:cxn ang="0">
+                    <a:pos x="T58" y="T59"/>
+                  </a:cxn>
+                  <a:cxn ang="0">
+                    <a:pos x="T60" y="T61"/>
+                  </a:cxn>
+                  <a:cxn ang="0">
+                    <a:pos x="T62" y="T63"/>
+                  </a:cxn>
+                  <a:cxn ang="0">
+                    <a:pos x="T64" y="T65"/>
+                  </a:cxn>
+                  <a:cxn ang="0">
+                    <a:pos x="T66" y="T67"/>
+                  </a:cxn>
+                  <a:cxn ang="0">
+                    <a:pos x="T68" y="T69"/>
+                  </a:cxn>
+                  <a:cxn ang="0">
+                    <a:pos x="T70" y="T71"/>
+                  </a:cxn>
+                  <a:cxn ang="0">
+                    <a:pos x="T72" y="T73"/>
+                  </a:cxn>
+                  <a:cxn ang="0">
+                    <a:pos x="T74" y="T75"/>
+                  </a:cxn>
+                  <a:cxn ang="0">
+                    <a:pos x="T76" y="T77"/>
+                  </a:cxn>
+                  <a:cxn ang="0">
+                    <a:pos x="T78" y="T79"/>
+                  </a:cxn>
+                  <a:cxn ang="0">
+                    <a:pos x="T80" y="T81"/>
+                  </a:cxn>
+                  <a:cxn ang="0">
+                    <a:pos x="T82" y="T83"/>
+                  </a:cxn>
+                  <a:cxn ang="0">
+                    <a:pos x="T84" y="T85"/>
+                  </a:cxn>
+                  <a:cxn ang="0">
+                    <a:pos x="T86" y="T87"/>
+                  </a:cxn>
+                  <a:cxn ang="0">
+                    <a:pos x="T88" y="T89"/>
+                  </a:cxn>
+                  <a:cxn ang="0">
+                    <a:pos x="T90" y="T91"/>
+                  </a:cxn>
+                  <a:cxn ang="0">
+                    <a:pos x="T92" y="T93"/>
+                  </a:cxn>
+                  <a:cxn ang="0">
+                    <a:pos x="T94" y="T95"/>
+                  </a:cxn>
+                  <a:cxn ang="0">
+                    <a:pos x="T96" y="T97"/>
+                  </a:cxn>
+                  <a:cxn ang="0">
+                    <a:pos x="T98" y="T99"/>
+                  </a:cxn>
+                  <a:cxn ang="0">
+                    <a:pos x="T100" y="T101"/>
+                  </a:cxn>
+                  <a:cxn ang="0">
+                    <a:pos x="T102" y="T103"/>
+                  </a:cxn>
+                  <a:cxn ang="0">
+                    <a:pos x="T104" y="T105"/>
+                  </a:cxn>
+                  <a:cxn ang="0">
+                    <a:pos x="T106" y="T107"/>
+                  </a:cxn>
+                  <a:cxn ang="0">
+                    <a:pos x="T108" y="T109"/>
+                  </a:cxn>
+                  <a:cxn ang="0">
+                    <a:pos x="T110" y="T111"/>
+                  </a:cxn>
+                  <a:cxn ang="0">
+                    <a:pos x="T112" y="T113"/>
+                  </a:cxn>
+                  <a:cxn ang="0">
+                    <a:pos x="T114" y="T115"/>
+                  </a:cxn>
+                  <a:cxn ang="0">
+                    <a:pos x="T116" y="T117"/>
+                  </a:cxn>
+                  <a:cxn ang="0">
+                    <a:pos x="T118" y="T119"/>
+                  </a:cxn>
+                </a:cxnLst>
+                <a:rect l="0" t="0" r="r" b="b"/>
+                <a:pathLst>
+                  <a:path w="167" h="200">
+                    <a:moveTo>
+                      <a:pt x="1" y="141"/>
+                    </a:moveTo>
+                    <a:cubicBezTo>
+                      <a:pt x="1" y="133"/>
+                      <a:pt x="4" y="126"/>
+                      <a:pt x="8" y="120"/>
+                    </a:cubicBezTo>
+                    <a:cubicBezTo>
+                      <a:pt x="13" y="114"/>
+                      <a:pt x="18" y="108"/>
+                      <a:pt x="24" y="104"/>
+                    </a:cubicBezTo>
+                    <a:cubicBezTo>
+                      <a:pt x="31" y="100"/>
+                      <a:pt x="38" y="96"/>
+                      <a:pt x="46" y="93"/>
+                    </a:cubicBezTo>
+                    <a:cubicBezTo>
+                      <a:pt x="54" y="90"/>
+                      <a:pt x="62" y="88"/>
+                      <a:pt x="70" y="86"/>
+                    </a:cubicBezTo>
+                    <a:cubicBezTo>
+                      <a:pt x="78" y="85"/>
+                      <a:pt x="85" y="83"/>
+                      <a:pt x="93" y="83"/>
+                    </a:cubicBezTo>
+                    <a:cubicBezTo>
+                      <a:pt x="100" y="82"/>
+                      <a:pt x="106" y="82"/>
+                      <a:pt x="112" y="82"/>
+                    </a:cubicBezTo>
+                    <a:cubicBezTo>
+                      <a:pt x="112" y="67"/>
+                      <a:pt x="112" y="67"/>
+                      <a:pt x="112" y="67"/>
+                    </a:cubicBezTo>
+                    <a:cubicBezTo>
+                      <a:pt x="112" y="58"/>
+                      <a:pt x="110" y="50"/>
+                      <a:pt x="108" y="44"/>
+                    </a:cubicBezTo>
+                    <a:cubicBezTo>
+                      <a:pt x="106" y="39"/>
+                      <a:pt x="102" y="34"/>
+                      <a:pt x="98" y="31"/>
+                    </a:cubicBezTo>
+                    <a:cubicBezTo>
+                      <a:pt x="94" y="28"/>
+                      <a:pt x="89" y="26"/>
+                      <a:pt x="83" y="25"/>
+                    </a:cubicBezTo>
+                    <a:cubicBezTo>
+                      <a:pt x="77" y="23"/>
+                      <a:pt x="71" y="23"/>
+                      <a:pt x="64" y="23"/>
+                    </a:cubicBezTo>
+                    <a:cubicBezTo>
+                      <a:pt x="61" y="23"/>
+                      <a:pt x="57" y="23"/>
+                      <a:pt x="53" y="24"/>
+                    </a:cubicBezTo>
+                    <a:cubicBezTo>
+                      <a:pt x="49" y="24"/>
+                      <a:pt x="45" y="25"/>
+                      <a:pt x="40" y="26"/>
+                    </a:cubicBezTo>
+                    <a:cubicBezTo>
+                      <a:pt x="36" y="28"/>
+                      <a:pt x="32" y="29"/>
+                      <a:pt x="27" y="31"/>
+                    </a:cubicBezTo>
+                    <a:cubicBezTo>
+                      <a:pt x="23" y="32"/>
+                      <a:pt x="18" y="34"/>
+                      <a:pt x="14" y="36"/>
+                    </a:cubicBezTo>
+                    <a:cubicBezTo>
+                      <a:pt x="8" y="20"/>
+                      <a:pt x="8" y="20"/>
+                      <a:pt x="8" y="20"/>
+                    </a:cubicBezTo>
+                    <a:cubicBezTo>
+                      <a:pt x="12" y="17"/>
+                      <a:pt x="17" y="14"/>
+                      <a:pt x="24" y="11"/>
+                    </a:cubicBezTo>
+                    <a:cubicBezTo>
+                      <a:pt x="30" y="9"/>
+                      <a:pt x="36" y="7"/>
+                      <a:pt x="43" y="5"/>
+                    </a:cubicBezTo>
+                    <a:cubicBezTo>
+                      <a:pt x="49" y="3"/>
+                      <a:pt x="55" y="2"/>
+                      <a:pt x="61" y="1"/>
+                    </a:cubicBezTo>
+                    <a:cubicBezTo>
+                      <a:pt x="68" y="0"/>
+                      <a:pt x="73" y="0"/>
+                      <a:pt x="77" y="0"/>
+                    </a:cubicBezTo>
+                    <a:cubicBezTo>
+                      <a:pt x="86" y="0"/>
+                      <a:pt x="95" y="1"/>
+                      <a:pt x="103" y="3"/>
+                    </a:cubicBezTo>
+                    <a:cubicBezTo>
+                      <a:pt x="111" y="5"/>
+                      <a:pt x="119" y="8"/>
+                      <a:pt x="125" y="13"/>
+                    </a:cubicBezTo>
+                    <a:cubicBezTo>
+                      <a:pt x="131" y="18"/>
+                      <a:pt x="136" y="24"/>
+                      <a:pt x="139" y="32"/>
+                    </a:cubicBezTo>
+                    <a:cubicBezTo>
+                      <a:pt x="143" y="40"/>
+                      <a:pt x="145" y="50"/>
+                      <a:pt x="145" y="63"/>
+                    </a:cubicBezTo>
+                    <a:cubicBezTo>
+                      <a:pt x="145" y="182"/>
+                      <a:pt x="145" y="182"/>
+                      <a:pt x="145" y="182"/>
+                    </a:cubicBezTo>
+                    <a:cubicBezTo>
+                      <a:pt x="167" y="182"/>
+                      <a:pt x="167" y="182"/>
+                      <a:pt x="167" y="182"/>
+                    </a:cubicBezTo>
+                    <a:cubicBezTo>
+                      <a:pt x="167" y="193"/>
+                      <a:pt x="167" y="193"/>
+                      <a:pt x="167" y="193"/>
+                    </a:cubicBezTo>
+                    <a:cubicBezTo>
+                      <a:pt x="163" y="195"/>
+                      <a:pt x="158" y="197"/>
+                      <a:pt x="152" y="198"/>
+                    </a:cubicBezTo>
+                    <a:cubicBezTo>
+                      <a:pt x="146" y="200"/>
+                      <a:pt x="140" y="200"/>
+                      <a:pt x="134" y="200"/>
+                    </a:cubicBezTo>
+                    <a:cubicBezTo>
+                      <a:pt x="132" y="200"/>
+                      <a:pt x="130" y="200"/>
+                      <a:pt x="127" y="200"/>
+                    </a:cubicBezTo>
+                    <a:cubicBezTo>
+                      <a:pt x="125" y="200"/>
+                      <a:pt x="123" y="199"/>
+                      <a:pt x="121" y="198"/>
+                    </a:cubicBezTo>
+                    <a:cubicBezTo>
+                      <a:pt x="119" y="197"/>
+                      <a:pt x="117" y="195"/>
+                      <a:pt x="116" y="192"/>
+                    </a:cubicBezTo>
+                    <a:cubicBezTo>
+                      <a:pt x="114" y="190"/>
+                      <a:pt x="114" y="187"/>
+                      <a:pt x="114" y="182"/>
+                    </a:cubicBezTo>
+                    <a:cubicBezTo>
+                      <a:pt x="114" y="178"/>
+                      <a:pt x="114" y="178"/>
+                      <a:pt x="114" y="178"/>
+                    </a:cubicBezTo>
+                    <a:cubicBezTo>
+                      <a:pt x="111" y="181"/>
+                      <a:pt x="108" y="184"/>
+                      <a:pt x="104" y="187"/>
+                    </a:cubicBezTo>
+                    <a:cubicBezTo>
+                      <a:pt x="101" y="189"/>
+                      <a:pt x="96" y="192"/>
+                      <a:pt x="92" y="194"/>
+                    </a:cubicBezTo>
+                    <a:cubicBezTo>
+                      <a:pt x="87" y="196"/>
+                      <a:pt x="82" y="197"/>
+                      <a:pt x="76" y="199"/>
+                    </a:cubicBezTo>
+                    <a:cubicBezTo>
+                      <a:pt x="70" y="200"/>
+                      <a:pt x="63" y="200"/>
+                      <a:pt x="56" y="200"/>
+                    </a:cubicBezTo>
+                    <a:cubicBezTo>
+                      <a:pt x="47" y="200"/>
+                      <a:pt x="39" y="199"/>
+                      <a:pt x="32" y="195"/>
+                    </a:cubicBezTo>
+                    <a:cubicBezTo>
+                      <a:pt x="25" y="192"/>
+                      <a:pt x="18" y="188"/>
+                      <a:pt x="14" y="182"/>
+                    </a:cubicBezTo>
+                    <a:cubicBezTo>
+                      <a:pt x="9" y="177"/>
+                      <a:pt x="5" y="171"/>
+                      <a:pt x="3" y="164"/>
+                    </a:cubicBezTo>
+                    <a:cubicBezTo>
+                      <a:pt x="0" y="156"/>
+                      <a:pt x="0" y="149"/>
+                      <a:pt x="1" y="141"/>
+                    </a:cubicBezTo>
+                    <a:close/>
+                    <a:moveTo>
+                      <a:pt x="34" y="141"/>
+                    </a:moveTo>
+                    <a:cubicBezTo>
+                      <a:pt x="34" y="148"/>
+                      <a:pt x="35" y="154"/>
+                      <a:pt x="37" y="159"/>
+                    </a:cubicBezTo>
+                    <a:cubicBezTo>
+                      <a:pt x="39" y="163"/>
+                      <a:pt x="41" y="167"/>
+                      <a:pt x="45" y="170"/>
+                    </a:cubicBezTo>
+                    <a:cubicBezTo>
+                      <a:pt x="48" y="173"/>
+                      <a:pt x="53" y="175"/>
+                      <a:pt x="58" y="176"/>
+                    </a:cubicBezTo>
+                    <a:cubicBezTo>
+                      <a:pt x="63" y="178"/>
+                      <a:pt x="68" y="178"/>
+                      <a:pt x="75" y="178"/>
+                    </a:cubicBezTo>
+                    <a:cubicBezTo>
+                      <a:pt x="78" y="178"/>
+                      <a:pt x="82" y="178"/>
+                      <a:pt x="85" y="177"/>
+                    </a:cubicBezTo>
+                    <a:cubicBezTo>
+                      <a:pt x="89" y="176"/>
+                      <a:pt x="92" y="175"/>
+                      <a:pt x="95" y="174"/>
+                    </a:cubicBezTo>
+                    <a:cubicBezTo>
+                      <a:pt x="99" y="172"/>
+                      <a:pt x="102" y="171"/>
+                      <a:pt x="105" y="169"/>
+                    </a:cubicBezTo>
+                    <a:cubicBezTo>
+                      <a:pt x="107" y="167"/>
+                      <a:pt x="110" y="165"/>
+                      <a:pt x="111" y="164"/>
+                    </a:cubicBezTo>
+                    <a:cubicBezTo>
+                      <a:pt x="111" y="153"/>
+                      <a:pt x="111" y="142"/>
+                      <a:pt x="111" y="131"/>
+                    </a:cubicBezTo>
+                    <a:cubicBezTo>
+                      <a:pt x="111" y="121"/>
+                      <a:pt x="112" y="110"/>
+                      <a:pt x="112" y="99"/>
+                    </a:cubicBezTo>
+                    <a:cubicBezTo>
+                      <a:pt x="107" y="99"/>
+                      <a:pt x="102" y="100"/>
+                      <a:pt x="96" y="100"/>
+                    </a:cubicBezTo>
+                    <a:cubicBezTo>
+                      <a:pt x="90" y="101"/>
+                      <a:pt x="84" y="102"/>
+                      <a:pt x="79" y="103"/>
+                    </a:cubicBezTo>
+                    <a:cubicBezTo>
+                      <a:pt x="73" y="104"/>
+                      <a:pt x="67" y="106"/>
+                      <a:pt x="62" y="108"/>
+                    </a:cubicBezTo>
+                    <a:cubicBezTo>
+                      <a:pt x="56" y="110"/>
+                      <a:pt x="52" y="112"/>
+                      <a:pt x="48" y="116"/>
+                    </a:cubicBezTo>
+                    <a:cubicBezTo>
+                      <a:pt x="43" y="119"/>
+                      <a:pt x="40" y="122"/>
+                      <a:pt x="38" y="127"/>
+                    </a:cubicBezTo>
+                    <a:cubicBezTo>
+                      <a:pt x="35" y="131"/>
+                      <a:pt x="34" y="136"/>
+                      <a:pt x="34" y="141"/>
+                    </a:cubicBezTo>
+                    <a:close/>
+                  </a:path>
+                </a:pathLst>
+              </a:custGeom>
+              <a:grpFill/>
+              <a:ln>
+                <a:noFill/>
+              </a:ln>
+              <a:extLst>
+                <a:ext uri="{91240B29-F687-4F45-9708-019B960494DF}">
+                  <a14:hiddenLine xmlns:a14="http://schemas.microsoft.com/office/drawing/2010/main" w="9525">
+                    <a:solidFill>
+                      <a:srgbClr val="000000"/>
+                    </a:solidFill>
+                    <a:round/>
+                    <a:headEnd/>
+                    <a:tailEnd/>
+                  </a14:hiddenLine>
+                </a:ext>
+              </a:extLst>
+            </p:spPr>
+            <p:txBody>
+              <a:bodyPr vert="horz" wrap="square" lIns="91440" tIns="45720" rIns="91440" bIns="45720" numCol="1" anchor="t" anchorCtr="0" compatLnSpc="1">
+                <a:prstTxWarp prst="textNoShape">
+                  <a:avLst/>
+                </a:prstTxWarp>
+              </a:bodyPr>
+              <a:lstStyle/>
+              <a:p>
+                <a:endParaRPr lang="en-US"/>
+              </a:p>
+            </p:txBody>
+          </p:sp>
+          <p:sp>
+            <p:nvSpPr>
+              <p:cNvPr id="17" name="Freeform 9">
+                <a:extLst>
+                  <a:ext uri="{FF2B5EF4-FFF2-40B4-BE49-F238E27FC236}">
+                    <a16:creationId xmlns:a16="http://schemas.microsoft.com/office/drawing/2014/main" id="{A26113FF-8A8B-473D-8F68-30656EAEABDB}"/>
+                  </a:ext>
+                </a:extLst>
+              </p:cNvPr>
+              <p:cNvSpPr>
+                <a:spLocks/>
+              </p:cNvSpPr>
+              <p:nvPr/>
+            </p:nvSpPr>
+            <p:spPr bwMode="auto">
+              <a:xfrm>
+                <a:off x="5508" y="1069"/>
+                <a:ext cx="152" cy="145"/>
+              </a:xfrm>
+              <a:custGeom>
+                <a:avLst/>
+                <a:gdLst>
+                  <a:gd name="T0" fmla="*/ 1 w 207"/>
+                  <a:gd name="T1" fmla="*/ 182 h 196"/>
+                  <a:gd name="T2" fmla="*/ 24 w 207"/>
+                  <a:gd name="T3" fmla="*/ 178 h 196"/>
+                  <a:gd name="T4" fmla="*/ 24 w 207"/>
+                  <a:gd name="T5" fmla="*/ 38 h 196"/>
+                  <a:gd name="T6" fmla="*/ 0 w 207"/>
+                  <a:gd name="T7" fmla="*/ 24 h 196"/>
+                  <a:gd name="T8" fmla="*/ 0 w 207"/>
+                  <a:gd name="T9" fmla="*/ 14 h 196"/>
+                  <a:gd name="T10" fmla="*/ 45 w 207"/>
+                  <a:gd name="T11" fmla="*/ 0 h 196"/>
+                  <a:gd name="T12" fmla="*/ 53 w 207"/>
+                  <a:gd name="T13" fmla="*/ 3 h 196"/>
+                  <a:gd name="T14" fmla="*/ 53 w 207"/>
+                  <a:gd name="T15" fmla="*/ 28 h 196"/>
+                  <a:gd name="T16" fmla="*/ 67 w 207"/>
+                  <a:gd name="T17" fmla="*/ 18 h 196"/>
+                  <a:gd name="T18" fmla="*/ 85 w 207"/>
+                  <a:gd name="T19" fmla="*/ 9 h 196"/>
+                  <a:gd name="T20" fmla="*/ 104 w 207"/>
+                  <a:gd name="T21" fmla="*/ 3 h 196"/>
+                  <a:gd name="T22" fmla="*/ 123 w 207"/>
+                  <a:gd name="T23" fmla="*/ 0 h 196"/>
+                  <a:gd name="T24" fmla="*/ 149 w 207"/>
+                  <a:gd name="T25" fmla="*/ 4 h 196"/>
+                  <a:gd name="T26" fmla="*/ 167 w 207"/>
+                  <a:gd name="T27" fmla="*/ 18 h 196"/>
+                  <a:gd name="T28" fmla="*/ 177 w 207"/>
+                  <a:gd name="T29" fmla="*/ 44 h 196"/>
+                  <a:gd name="T30" fmla="*/ 180 w 207"/>
+                  <a:gd name="T31" fmla="*/ 81 h 196"/>
+                  <a:gd name="T32" fmla="*/ 180 w 207"/>
+                  <a:gd name="T33" fmla="*/ 178 h 196"/>
+                  <a:gd name="T34" fmla="*/ 207 w 207"/>
+                  <a:gd name="T35" fmla="*/ 182 h 196"/>
+                  <a:gd name="T36" fmla="*/ 207 w 207"/>
+                  <a:gd name="T37" fmla="*/ 196 h 196"/>
+                  <a:gd name="T38" fmla="*/ 121 w 207"/>
+                  <a:gd name="T39" fmla="*/ 196 h 196"/>
+                  <a:gd name="T40" fmla="*/ 121 w 207"/>
+                  <a:gd name="T41" fmla="*/ 182 h 196"/>
+                  <a:gd name="T42" fmla="*/ 147 w 207"/>
+                  <a:gd name="T43" fmla="*/ 178 h 196"/>
+                  <a:gd name="T44" fmla="*/ 147 w 207"/>
+                  <a:gd name="T45" fmla="*/ 87 h 196"/>
+                  <a:gd name="T46" fmla="*/ 145 w 207"/>
+                  <a:gd name="T47" fmla="*/ 59 h 196"/>
+                  <a:gd name="T48" fmla="*/ 139 w 207"/>
+                  <a:gd name="T49" fmla="*/ 40 h 196"/>
+                  <a:gd name="T50" fmla="*/ 126 w 207"/>
+                  <a:gd name="T51" fmla="*/ 28 h 196"/>
+                  <a:gd name="T52" fmla="*/ 105 w 207"/>
+                  <a:gd name="T53" fmla="*/ 25 h 196"/>
+                  <a:gd name="T54" fmla="*/ 82 w 207"/>
+                  <a:gd name="T55" fmla="*/ 30 h 196"/>
+                  <a:gd name="T56" fmla="*/ 57 w 207"/>
+                  <a:gd name="T57" fmla="*/ 43 h 196"/>
+                  <a:gd name="T58" fmla="*/ 57 w 207"/>
+                  <a:gd name="T59" fmla="*/ 178 h 196"/>
+                  <a:gd name="T60" fmla="*/ 83 w 207"/>
+                  <a:gd name="T61" fmla="*/ 182 h 196"/>
+                  <a:gd name="T62" fmla="*/ 83 w 207"/>
+                  <a:gd name="T63" fmla="*/ 196 h 196"/>
+                  <a:gd name="T64" fmla="*/ 1 w 207"/>
+                  <a:gd name="T65" fmla="*/ 196 h 196"/>
+                  <a:gd name="T66" fmla="*/ 1 w 207"/>
+                  <a:gd name="T67" fmla="*/ 182 h 196"/>
+                </a:gdLst>
+                <a:ahLst/>
+                <a:cxnLst>
+                  <a:cxn ang="0">
+                    <a:pos x="T0" y="T1"/>
+                  </a:cxn>
+                  <a:cxn ang="0">
+                    <a:pos x="T2" y="T3"/>
+                  </a:cxn>
+                  <a:cxn ang="0">
+                    <a:pos x="T4" y="T5"/>
+                  </a:cxn>
+                  <a:cxn ang="0">
+                    <a:pos x="T6" y="T7"/>
+                  </a:cxn>
+                  <a:cxn ang="0">
+                    <a:pos x="T8" y="T9"/>
+                  </a:cxn>
+                  <a:cxn ang="0">
+                    <a:pos x="T10" y="T11"/>
+                  </a:cxn>
+                  <a:cxn ang="0">
+                    <a:pos x="T12" y="T13"/>
+                  </a:cxn>
+                  <a:cxn ang="0">
+                    <a:pos x="T14" y="T15"/>
+                  </a:cxn>
+                  <a:cxn ang="0">
+                    <a:pos x="T16" y="T17"/>
+                  </a:cxn>
+                  <a:cxn ang="0">
+                    <a:pos x="T18" y="T19"/>
+                  </a:cxn>
+                  <a:cxn ang="0">
+                    <a:pos x="T20" y="T21"/>
+                  </a:cxn>
+                  <a:cxn ang="0">
+                    <a:pos x="T22" y="T23"/>
+                  </a:cxn>
+                  <a:cxn ang="0">
+                    <a:pos x="T24" y="T25"/>
+                  </a:cxn>
+                  <a:cxn ang="0">
+                    <a:pos x="T26" y="T27"/>
+                  </a:cxn>
+                  <a:cxn ang="0">
+                    <a:pos x="T28" y="T29"/>
+                  </a:cxn>
+                  <a:cxn ang="0">
+                    <a:pos x="T30" y="T31"/>
+                  </a:cxn>
+                  <a:cxn ang="0">
+                    <a:pos x="T32" y="T33"/>
+                  </a:cxn>
+                  <a:cxn ang="0">
+                    <a:pos x="T34" y="T35"/>
+                  </a:cxn>
+                  <a:cxn ang="0">
+                    <a:pos x="T36" y="T37"/>
+                  </a:cxn>
+                  <a:cxn ang="0">
+                    <a:pos x="T38" y="T39"/>
+                  </a:cxn>
+                  <a:cxn ang="0">
+                    <a:pos x="T40" y="T41"/>
+                  </a:cxn>
+                  <a:cxn ang="0">
+                    <a:pos x="T42" y="T43"/>
+                  </a:cxn>
+                  <a:cxn ang="0">
+                    <a:pos x="T44" y="T45"/>
+                  </a:cxn>
+                  <a:cxn ang="0">
+                    <a:pos x="T46" y="T47"/>
+                  </a:cxn>
+                  <a:cxn ang="0">
+                    <a:pos x="T48" y="T49"/>
+                  </a:cxn>
+                  <a:cxn ang="0">
+                    <a:pos x="T50" y="T51"/>
+                  </a:cxn>
+                  <a:cxn ang="0">
+                    <a:pos x="T52" y="T53"/>
+                  </a:cxn>
+                  <a:cxn ang="0">
+                    <a:pos x="T54" y="T55"/>
+                  </a:cxn>
+                  <a:cxn ang="0">
+                    <a:pos x="T56" y="T57"/>
+                  </a:cxn>
+                  <a:cxn ang="0">
+                    <a:pos x="T58" y="T59"/>
+                  </a:cxn>
+                  <a:cxn ang="0">
+                    <a:pos x="T60" y="T61"/>
+                  </a:cxn>
+                  <a:cxn ang="0">
+                    <a:pos x="T62" y="T63"/>
+                  </a:cxn>
+                  <a:cxn ang="0">
+                    <a:pos x="T64" y="T65"/>
+                  </a:cxn>
+                  <a:cxn ang="0">
+                    <a:pos x="T66" y="T67"/>
+                  </a:cxn>
+                </a:cxnLst>
+                <a:rect l="0" t="0" r="r" b="b"/>
+                <a:pathLst>
+                  <a:path w="207" h="196">
+                    <a:moveTo>
+                      <a:pt x="1" y="182"/>
+                    </a:moveTo>
+                    <a:cubicBezTo>
+                      <a:pt x="24" y="178"/>
+                      <a:pt x="24" y="178"/>
+                      <a:pt x="24" y="178"/>
+                    </a:cubicBezTo>
+                    <a:cubicBezTo>
+                      <a:pt x="24" y="38"/>
+                      <a:pt x="24" y="38"/>
+                      <a:pt x="24" y="38"/>
+                    </a:cubicBezTo>
+                    <a:cubicBezTo>
+                      <a:pt x="0" y="24"/>
+                      <a:pt x="0" y="24"/>
+                      <a:pt x="0" y="24"/>
+                    </a:cubicBezTo>
+                    <a:cubicBezTo>
+                      <a:pt x="0" y="14"/>
+                      <a:pt x="0" y="14"/>
+                      <a:pt x="0" y="14"/>
+                    </a:cubicBezTo>
+                    <a:cubicBezTo>
+                      <a:pt x="45" y="0"/>
+                      <a:pt x="45" y="0"/>
+                      <a:pt x="45" y="0"/>
+                    </a:cubicBezTo>
+                    <a:cubicBezTo>
+                      <a:pt x="53" y="3"/>
+                      <a:pt x="53" y="3"/>
+                      <a:pt x="53" y="3"/>
+                    </a:cubicBezTo>
+                    <a:cubicBezTo>
+                      <a:pt x="53" y="28"/>
+                      <a:pt x="53" y="28"/>
+                      <a:pt x="53" y="28"/>
+                    </a:cubicBezTo>
+                    <a:cubicBezTo>
+                      <a:pt x="57" y="25"/>
+                      <a:pt x="62" y="21"/>
+                      <a:pt x="67" y="18"/>
+                    </a:cubicBezTo>
+                    <a:cubicBezTo>
+                      <a:pt x="73" y="15"/>
+                      <a:pt x="79" y="12"/>
+                      <a:pt x="85" y="9"/>
+                    </a:cubicBezTo>
+                    <a:cubicBezTo>
+                      <a:pt x="91" y="7"/>
+                      <a:pt x="97" y="4"/>
+                      <a:pt x="104" y="3"/>
+                    </a:cubicBezTo>
+                    <a:cubicBezTo>
+                      <a:pt x="111" y="1"/>
+                      <a:pt x="117" y="0"/>
+                      <a:pt x="123" y="0"/>
+                    </a:cubicBezTo>
+                    <a:cubicBezTo>
+                      <a:pt x="133" y="0"/>
+                      <a:pt x="142" y="1"/>
+                      <a:pt x="149" y="4"/>
+                    </a:cubicBezTo>
+                    <a:cubicBezTo>
+                      <a:pt x="157" y="7"/>
+                      <a:pt x="163" y="12"/>
+                      <a:pt x="167" y="18"/>
+                    </a:cubicBezTo>
+                    <a:cubicBezTo>
+                      <a:pt x="172" y="25"/>
+                      <a:pt x="175" y="33"/>
+                      <a:pt x="177" y="44"/>
+                    </a:cubicBezTo>
+                    <a:cubicBezTo>
+                      <a:pt x="179" y="54"/>
+                      <a:pt x="180" y="66"/>
+                      <a:pt x="180" y="81"/>
+                    </a:cubicBezTo>
+                    <a:cubicBezTo>
+                      <a:pt x="180" y="178"/>
+                      <a:pt x="180" y="178"/>
+                      <a:pt x="180" y="178"/>
+                    </a:cubicBezTo>
+                    <a:cubicBezTo>
+                      <a:pt x="207" y="182"/>
+                      <a:pt x="207" y="182"/>
+                      <a:pt x="207" y="182"/>
+                    </a:cubicBezTo>
+                    <a:cubicBezTo>
+                      <a:pt x="207" y="196"/>
+                      <a:pt x="207" y="196"/>
+                      <a:pt x="207" y="196"/>
+                    </a:cubicBezTo>
+                    <a:cubicBezTo>
+                      <a:pt x="121" y="196"/>
+                      <a:pt x="121" y="196"/>
+                      <a:pt x="121" y="196"/>
+                    </a:cubicBezTo>
+                    <a:cubicBezTo>
+                      <a:pt x="121" y="182"/>
+                      <a:pt x="121" y="182"/>
+                      <a:pt x="121" y="182"/>
+                    </a:cubicBezTo>
+                    <a:cubicBezTo>
+                      <a:pt x="147" y="178"/>
+                      <a:pt x="147" y="178"/>
+                      <a:pt x="147" y="178"/>
+                    </a:cubicBezTo>
+                    <a:cubicBezTo>
+                      <a:pt x="147" y="87"/>
+                      <a:pt x="147" y="87"/>
+                      <a:pt x="147" y="87"/>
+                    </a:cubicBezTo>
+                    <a:cubicBezTo>
+                      <a:pt x="147" y="76"/>
+                      <a:pt x="146" y="67"/>
+                      <a:pt x="145" y="59"/>
+                    </a:cubicBezTo>
+                    <a:cubicBezTo>
+                      <a:pt x="144" y="51"/>
+                      <a:pt x="142" y="45"/>
+                      <a:pt x="139" y="40"/>
+                    </a:cubicBezTo>
+                    <a:cubicBezTo>
+                      <a:pt x="136" y="34"/>
+                      <a:pt x="132" y="31"/>
+                      <a:pt x="126" y="28"/>
+                    </a:cubicBezTo>
+                    <a:cubicBezTo>
+                      <a:pt x="121" y="26"/>
+                      <a:pt x="114" y="25"/>
+                      <a:pt x="105" y="25"/>
+                    </a:cubicBezTo>
+                    <a:cubicBezTo>
+                      <a:pt x="98" y="25"/>
+                      <a:pt x="90" y="27"/>
+                      <a:pt x="82" y="30"/>
+                    </a:cubicBezTo>
+                    <a:cubicBezTo>
+                      <a:pt x="75" y="33"/>
+                      <a:pt x="66" y="37"/>
+                      <a:pt x="57" y="43"/>
+                    </a:cubicBezTo>
+                    <a:cubicBezTo>
+                      <a:pt x="57" y="178"/>
+                      <a:pt x="57" y="178"/>
+                      <a:pt x="57" y="178"/>
+                    </a:cubicBezTo>
+                    <a:cubicBezTo>
+                      <a:pt x="83" y="182"/>
+                      <a:pt x="83" y="182"/>
+                      <a:pt x="83" y="182"/>
+                    </a:cubicBezTo>
+                    <a:cubicBezTo>
+                      <a:pt x="83" y="196"/>
+                      <a:pt x="83" y="196"/>
+                      <a:pt x="83" y="196"/>
+                    </a:cubicBezTo>
+                    <a:cubicBezTo>
+                      <a:pt x="1" y="196"/>
+                      <a:pt x="1" y="196"/>
+                      <a:pt x="1" y="196"/>
+                    </a:cubicBezTo>
+                    <a:lnTo>
+                      <a:pt x="1" y="182"/>
+                    </a:lnTo>
+                    <a:close/>
+                  </a:path>
+                </a:pathLst>
+              </a:custGeom>
+              <a:grpFill/>
+              <a:ln>
+                <a:noFill/>
+              </a:ln>
+              <a:extLst>
+                <a:ext uri="{91240B29-F687-4F45-9708-019B960494DF}">
+                  <a14:hiddenLine xmlns:a14="http://schemas.microsoft.com/office/drawing/2010/main" w="9525">
+                    <a:solidFill>
+                      <a:srgbClr val="000000"/>
+                    </a:solidFill>
+                    <a:round/>
+                    <a:headEnd/>
+                    <a:tailEnd/>
+                  </a14:hiddenLine>
+                </a:ext>
+              </a:extLst>
+            </p:spPr>
+            <p:txBody>
+              <a:bodyPr vert="horz" wrap="square" lIns="91440" tIns="45720" rIns="91440" bIns="45720" numCol="1" anchor="t" anchorCtr="0" compatLnSpc="1">
+                <a:prstTxWarp prst="textNoShape">
+                  <a:avLst/>
+                </a:prstTxWarp>
+              </a:bodyPr>
+              <a:lstStyle/>
+              <a:p>
+                <a:endParaRPr lang="en-US"/>
+              </a:p>
+            </p:txBody>
+          </p:sp>
+          <p:sp>
+            <p:nvSpPr>
+              <p:cNvPr id="18" name="Freeform 10">
+                <a:extLst>
+                  <a:ext uri="{FF2B5EF4-FFF2-40B4-BE49-F238E27FC236}">
+                    <a16:creationId xmlns:a16="http://schemas.microsoft.com/office/drawing/2014/main" id="{0745DE31-2EA7-4FBB-A817-6C5F9741FB51}"/>
+                  </a:ext>
+                </a:extLst>
+              </p:cNvPr>
+              <p:cNvSpPr>
+                <a:spLocks noEditPoints="1"/>
+              </p:cNvSpPr>
+              <p:nvPr/>
+            </p:nvSpPr>
+            <p:spPr bwMode="auto">
+              <a:xfrm>
+                <a:off x="5654" y="1007"/>
+                <a:ext cx="139" cy="212"/>
+              </a:xfrm>
+              <a:custGeom>
+                <a:avLst/>
+                <a:gdLst>
+                  <a:gd name="T0" fmla="*/ 76 w 189"/>
+                  <a:gd name="T1" fmla="*/ 284 h 286"/>
+                  <a:gd name="T2" fmla="*/ 47 w 189"/>
+                  <a:gd name="T3" fmla="*/ 279 h 286"/>
+                  <a:gd name="T4" fmla="*/ 23 w 189"/>
+                  <a:gd name="T5" fmla="*/ 261 h 286"/>
+                  <a:gd name="T6" fmla="*/ 7 w 189"/>
+                  <a:gd name="T7" fmla="*/ 230 h 286"/>
+                  <a:gd name="T8" fmla="*/ 0 w 189"/>
+                  <a:gd name="T9" fmla="*/ 187 h 286"/>
+                  <a:gd name="T10" fmla="*/ 8 w 189"/>
+                  <a:gd name="T11" fmla="*/ 144 h 286"/>
+                  <a:gd name="T12" fmla="*/ 29 w 189"/>
+                  <a:gd name="T13" fmla="*/ 111 h 286"/>
+                  <a:gd name="T14" fmla="*/ 61 w 189"/>
+                  <a:gd name="T15" fmla="*/ 89 h 286"/>
+                  <a:gd name="T16" fmla="*/ 100 w 189"/>
+                  <a:gd name="T17" fmla="*/ 82 h 286"/>
+                  <a:gd name="T18" fmla="*/ 118 w 189"/>
+                  <a:gd name="T19" fmla="*/ 83 h 286"/>
+                  <a:gd name="T20" fmla="*/ 132 w 189"/>
+                  <a:gd name="T21" fmla="*/ 86 h 286"/>
+                  <a:gd name="T22" fmla="*/ 132 w 189"/>
+                  <a:gd name="T23" fmla="*/ 29 h 286"/>
+                  <a:gd name="T24" fmla="*/ 96 w 189"/>
+                  <a:gd name="T25" fmla="*/ 22 h 286"/>
+                  <a:gd name="T26" fmla="*/ 96 w 189"/>
+                  <a:gd name="T27" fmla="*/ 7 h 286"/>
+                  <a:gd name="T28" fmla="*/ 158 w 189"/>
+                  <a:gd name="T29" fmla="*/ 0 h 286"/>
+                  <a:gd name="T30" fmla="*/ 165 w 189"/>
+                  <a:gd name="T31" fmla="*/ 4 h 286"/>
+                  <a:gd name="T32" fmla="*/ 165 w 189"/>
+                  <a:gd name="T33" fmla="*/ 266 h 286"/>
+                  <a:gd name="T34" fmla="*/ 189 w 189"/>
+                  <a:gd name="T35" fmla="*/ 266 h 286"/>
+                  <a:gd name="T36" fmla="*/ 189 w 189"/>
+                  <a:gd name="T37" fmla="*/ 278 h 286"/>
+                  <a:gd name="T38" fmla="*/ 181 w 189"/>
+                  <a:gd name="T39" fmla="*/ 281 h 286"/>
+                  <a:gd name="T40" fmla="*/ 172 w 189"/>
+                  <a:gd name="T41" fmla="*/ 284 h 286"/>
+                  <a:gd name="T42" fmla="*/ 162 w 189"/>
+                  <a:gd name="T43" fmla="*/ 285 h 286"/>
+                  <a:gd name="T44" fmla="*/ 153 w 189"/>
+                  <a:gd name="T45" fmla="*/ 286 h 286"/>
+                  <a:gd name="T46" fmla="*/ 146 w 189"/>
+                  <a:gd name="T47" fmla="*/ 285 h 286"/>
+                  <a:gd name="T48" fmla="*/ 140 w 189"/>
+                  <a:gd name="T49" fmla="*/ 283 h 286"/>
+                  <a:gd name="T50" fmla="*/ 135 w 189"/>
+                  <a:gd name="T51" fmla="*/ 278 h 286"/>
+                  <a:gd name="T52" fmla="*/ 134 w 189"/>
+                  <a:gd name="T53" fmla="*/ 268 h 286"/>
+                  <a:gd name="T54" fmla="*/ 134 w 189"/>
+                  <a:gd name="T55" fmla="*/ 264 h 286"/>
+                  <a:gd name="T56" fmla="*/ 126 w 189"/>
+                  <a:gd name="T57" fmla="*/ 270 h 286"/>
+                  <a:gd name="T58" fmla="*/ 114 w 189"/>
+                  <a:gd name="T59" fmla="*/ 277 h 286"/>
+                  <a:gd name="T60" fmla="*/ 97 w 189"/>
+                  <a:gd name="T61" fmla="*/ 282 h 286"/>
+                  <a:gd name="T62" fmla="*/ 76 w 189"/>
+                  <a:gd name="T63" fmla="*/ 284 h 286"/>
+                  <a:gd name="T64" fmla="*/ 89 w 189"/>
+                  <a:gd name="T65" fmla="*/ 261 h 286"/>
+                  <a:gd name="T66" fmla="*/ 99 w 189"/>
+                  <a:gd name="T67" fmla="*/ 260 h 286"/>
+                  <a:gd name="T68" fmla="*/ 108 w 189"/>
+                  <a:gd name="T69" fmla="*/ 258 h 286"/>
+                  <a:gd name="T70" fmla="*/ 122 w 189"/>
+                  <a:gd name="T71" fmla="*/ 253 h 286"/>
+                  <a:gd name="T72" fmla="*/ 132 w 189"/>
+                  <a:gd name="T73" fmla="*/ 246 h 286"/>
+                  <a:gd name="T74" fmla="*/ 132 w 189"/>
+                  <a:gd name="T75" fmla="*/ 114 h 286"/>
+                  <a:gd name="T76" fmla="*/ 128 w 189"/>
+                  <a:gd name="T77" fmla="*/ 109 h 286"/>
+                  <a:gd name="T78" fmla="*/ 121 w 189"/>
+                  <a:gd name="T79" fmla="*/ 105 h 286"/>
+                  <a:gd name="T80" fmla="*/ 110 w 189"/>
+                  <a:gd name="T81" fmla="*/ 101 h 286"/>
+                  <a:gd name="T82" fmla="*/ 96 w 189"/>
+                  <a:gd name="T83" fmla="*/ 100 h 286"/>
+                  <a:gd name="T84" fmla="*/ 82 w 189"/>
+                  <a:gd name="T85" fmla="*/ 102 h 286"/>
+                  <a:gd name="T86" fmla="*/ 68 w 189"/>
+                  <a:gd name="T87" fmla="*/ 107 h 286"/>
+                  <a:gd name="T88" fmla="*/ 55 w 189"/>
+                  <a:gd name="T89" fmla="*/ 117 h 286"/>
+                  <a:gd name="T90" fmla="*/ 44 w 189"/>
+                  <a:gd name="T91" fmla="*/ 132 h 286"/>
+                  <a:gd name="T92" fmla="*/ 36 w 189"/>
+                  <a:gd name="T93" fmla="*/ 152 h 286"/>
+                  <a:gd name="T94" fmla="*/ 33 w 189"/>
+                  <a:gd name="T95" fmla="*/ 179 h 286"/>
+                  <a:gd name="T96" fmla="*/ 37 w 189"/>
+                  <a:gd name="T97" fmla="*/ 215 h 286"/>
+                  <a:gd name="T98" fmla="*/ 50 w 189"/>
+                  <a:gd name="T99" fmla="*/ 241 h 286"/>
+                  <a:gd name="T100" fmla="*/ 68 w 189"/>
+                  <a:gd name="T101" fmla="*/ 256 h 286"/>
+                  <a:gd name="T102" fmla="*/ 89 w 189"/>
+                  <a:gd name="T103" fmla="*/ 261 h 286"/>
+                </a:gdLst>
+                <a:ahLst/>
+                <a:cxnLst>
+                  <a:cxn ang="0">
+                    <a:pos x="T0" y="T1"/>
+                  </a:cxn>
+                  <a:cxn ang="0">
+                    <a:pos x="T2" y="T3"/>
+                  </a:cxn>
+                  <a:cxn ang="0">
+                    <a:pos x="T4" y="T5"/>
+                  </a:cxn>
+                  <a:cxn ang="0">
+                    <a:pos x="T6" y="T7"/>
+                  </a:cxn>
+                  <a:cxn ang="0">
+                    <a:pos x="T8" y="T9"/>
+                  </a:cxn>
+                  <a:cxn ang="0">
+                    <a:pos x="T10" y="T11"/>
+                  </a:cxn>
+                  <a:cxn ang="0">
+                    <a:pos x="T12" y="T13"/>
+                  </a:cxn>
+                  <a:cxn ang="0">
+                    <a:pos x="T14" y="T15"/>
+                  </a:cxn>
+                  <a:cxn ang="0">
+                    <a:pos x="T16" y="T17"/>
+                  </a:cxn>
+                  <a:cxn ang="0">
+                    <a:pos x="T18" y="T19"/>
+                  </a:cxn>
+                  <a:cxn ang="0">
+                    <a:pos x="T20" y="T21"/>
+                  </a:cxn>
+                  <a:cxn ang="0">
+                    <a:pos x="T22" y="T23"/>
+                  </a:cxn>
+                  <a:cxn ang="0">
+                    <a:pos x="T24" y="T25"/>
+                  </a:cxn>
+                  <a:cxn ang="0">
+                    <a:pos x="T26" y="T27"/>
+                  </a:cxn>
+                  <a:cxn ang="0">
+                    <a:pos x="T28" y="T29"/>
+                  </a:cxn>
+                  <a:cxn ang="0">
+                    <a:pos x="T30" y="T31"/>
+                  </a:cxn>
+                  <a:cxn ang="0">
+                    <a:pos x="T32" y="T33"/>
+                  </a:cxn>
+                  <a:cxn ang="0">
+                    <a:pos x="T34" y="T35"/>
+                  </a:cxn>
+                  <a:cxn ang="0">
+                    <a:pos x="T36" y="T37"/>
+                  </a:cxn>
+                  <a:cxn ang="0">
+                    <a:pos x="T38" y="T39"/>
+                  </a:cxn>
+                  <a:cxn ang="0">
+                    <a:pos x="T40" y="T41"/>
+                  </a:cxn>
+                  <a:cxn ang="0">
+                    <a:pos x="T42" y="T43"/>
+                  </a:cxn>
+                  <a:cxn ang="0">
+                    <a:pos x="T44" y="T45"/>
+                  </a:cxn>
+                  <a:cxn ang="0">
+                    <a:pos x="T46" y="T47"/>
+                  </a:cxn>
+                  <a:cxn ang="0">
+                    <a:pos x="T48" y="T49"/>
+                  </a:cxn>
+                  <a:cxn ang="0">
+                    <a:pos x="T50" y="T51"/>
+                  </a:cxn>
+                  <a:cxn ang="0">
+                    <a:pos x="T52" y="T53"/>
+                  </a:cxn>
+                  <a:cxn ang="0">
+                    <a:pos x="T54" y="T55"/>
+                  </a:cxn>
+                  <a:cxn ang="0">
+                    <a:pos x="T56" y="T57"/>
+                  </a:cxn>
+                  <a:cxn ang="0">
+                    <a:pos x="T58" y="T59"/>
+                  </a:cxn>
+                  <a:cxn ang="0">
+                    <a:pos x="T60" y="T61"/>
+                  </a:cxn>
+                  <a:cxn ang="0">
+                    <a:pos x="T62" y="T63"/>
+                  </a:cxn>
+                  <a:cxn ang="0">
+                    <a:pos x="T64" y="T65"/>
+                  </a:cxn>
+                  <a:cxn ang="0">
+                    <a:pos x="T66" y="T67"/>
+                  </a:cxn>
+                  <a:cxn ang="0">
+                    <a:pos x="T68" y="T69"/>
+                  </a:cxn>
+                  <a:cxn ang="0">
+                    <a:pos x="T70" y="T71"/>
+                  </a:cxn>
+                  <a:cxn ang="0">
+                    <a:pos x="T72" y="T73"/>
+                  </a:cxn>
+                  <a:cxn ang="0">
+                    <a:pos x="T74" y="T75"/>
+                  </a:cxn>
+                  <a:cxn ang="0">
+                    <a:pos x="T76" y="T77"/>
+                  </a:cxn>
+                  <a:cxn ang="0">
+                    <a:pos x="T78" y="T79"/>
+                  </a:cxn>
+                  <a:cxn ang="0">
+                    <a:pos x="T80" y="T81"/>
+                  </a:cxn>
+                  <a:cxn ang="0">
+                    <a:pos x="T82" y="T83"/>
+                  </a:cxn>
+                  <a:cxn ang="0">
+                    <a:pos x="T84" y="T85"/>
+                  </a:cxn>
+                  <a:cxn ang="0">
+                    <a:pos x="T86" y="T87"/>
+                  </a:cxn>
+                  <a:cxn ang="0">
+                    <a:pos x="T88" y="T89"/>
+                  </a:cxn>
+                  <a:cxn ang="0">
+                    <a:pos x="T90" y="T91"/>
+                  </a:cxn>
+                  <a:cxn ang="0">
+                    <a:pos x="T92" y="T93"/>
+                  </a:cxn>
+                  <a:cxn ang="0">
+                    <a:pos x="T94" y="T95"/>
+                  </a:cxn>
+                  <a:cxn ang="0">
+                    <a:pos x="T96" y="T97"/>
+                  </a:cxn>
+                  <a:cxn ang="0">
+                    <a:pos x="T98" y="T99"/>
+                  </a:cxn>
+                  <a:cxn ang="0">
+                    <a:pos x="T100" y="T101"/>
+                  </a:cxn>
+                  <a:cxn ang="0">
+                    <a:pos x="T102" y="T103"/>
+                  </a:cxn>
+                </a:cxnLst>
+                <a:rect l="0" t="0" r="r" b="b"/>
+                <a:pathLst>
+                  <a:path w="189" h="286">
+                    <a:moveTo>
+                      <a:pt x="76" y="284"/>
+                    </a:moveTo>
+                    <a:cubicBezTo>
+                      <a:pt x="66" y="284"/>
+                      <a:pt x="57" y="282"/>
+                      <a:pt x="47" y="279"/>
+                    </a:cubicBezTo>
+                    <a:cubicBezTo>
+                      <a:pt x="38" y="275"/>
+                      <a:pt x="30" y="269"/>
+                      <a:pt x="23" y="261"/>
+                    </a:cubicBezTo>
+                    <a:cubicBezTo>
+                      <a:pt x="17" y="253"/>
+                      <a:pt x="11" y="243"/>
+                      <a:pt x="7" y="230"/>
+                    </a:cubicBezTo>
+                    <a:cubicBezTo>
+                      <a:pt x="2" y="218"/>
+                      <a:pt x="0" y="204"/>
+                      <a:pt x="0" y="187"/>
+                    </a:cubicBezTo>
+                    <a:cubicBezTo>
+                      <a:pt x="0" y="172"/>
+                      <a:pt x="3" y="157"/>
+                      <a:pt x="8" y="144"/>
+                    </a:cubicBezTo>
+                    <a:cubicBezTo>
+                      <a:pt x="13" y="132"/>
+                      <a:pt x="20" y="120"/>
+                      <a:pt x="29" y="111"/>
+                    </a:cubicBezTo>
+                    <a:cubicBezTo>
+                      <a:pt x="38" y="102"/>
+                      <a:pt x="49" y="95"/>
+                      <a:pt x="61" y="89"/>
+                    </a:cubicBezTo>
+                    <a:cubicBezTo>
+                      <a:pt x="73" y="84"/>
+                      <a:pt x="86" y="82"/>
+                      <a:pt x="100" y="82"/>
+                    </a:cubicBezTo>
+                    <a:cubicBezTo>
+                      <a:pt x="106" y="82"/>
+                      <a:pt x="112" y="82"/>
+                      <a:pt x="118" y="83"/>
+                    </a:cubicBezTo>
+                    <a:cubicBezTo>
+                      <a:pt x="123" y="84"/>
+                      <a:pt x="128" y="85"/>
+                      <a:pt x="132" y="86"/>
+                    </a:cubicBezTo>
+                    <a:cubicBezTo>
+                      <a:pt x="132" y="29"/>
+                      <a:pt x="132" y="29"/>
+                      <a:pt x="132" y="29"/>
+                    </a:cubicBezTo>
+                    <a:cubicBezTo>
+                      <a:pt x="96" y="22"/>
+                      <a:pt x="96" y="22"/>
+                      <a:pt x="96" y="22"/>
+                    </a:cubicBezTo>
+                    <a:cubicBezTo>
+                      <a:pt x="96" y="7"/>
+                      <a:pt x="96" y="7"/>
+                      <a:pt x="96" y="7"/>
+                    </a:cubicBezTo>
+                    <a:cubicBezTo>
+                      <a:pt x="158" y="0"/>
+                      <a:pt x="158" y="0"/>
+                      <a:pt x="158" y="0"/>
+                    </a:cubicBezTo>
+                    <a:cubicBezTo>
+                      <a:pt x="165" y="4"/>
+                      <a:pt x="165" y="4"/>
+                      <a:pt x="165" y="4"/>
+                    </a:cubicBezTo>
+                    <a:cubicBezTo>
+                      <a:pt x="165" y="266"/>
+                      <a:pt x="165" y="266"/>
+                      <a:pt x="165" y="266"/>
+                    </a:cubicBezTo>
+                    <a:cubicBezTo>
+                      <a:pt x="189" y="266"/>
+                      <a:pt x="189" y="266"/>
+                      <a:pt x="189" y="266"/>
+                    </a:cubicBezTo>
+                    <a:cubicBezTo>
+                      <a:pt x="189" y="278"/>
+                      <a:pt x="189" y="278"/>
+                      <a:pt x="189" y="278"/>
+                    </a:cubicBezTo>
+                    <a:cubicBezTo>
+                      <a:pt x="187" y="279"/>
+                      <a:pt x="184" y="280"/>
+                      <a:pt x="181" y="281"/>
+                    </a:cubicBezTo>
+                    <a:cubicBezTo>
+                      <a:pt x="178" y="282"/>
+                      <a:pt x="175" y="283"/>
+                      <a:pt x="172" y="284"/>
+                    </a:cubicBezTo>
+                    <a:cubicBezTo>
+                      <a:pt x="169" y="284"/>
+                      <a:pt x="166" y="285"/>
+                      <a:pt x="162" y="285"/>
+                    </a:cubicBezTo>
+                    <a:cubicBezTo>
+                      <a:pt x="159" y="286"/>
+                      <a:pt x="156" y="286"/>
+                      <a:pt x="153" y="286"/>
+                    </a:cubicBezTo>
+                    <a:cubicBezTo>
+                      <a:pt x="151" y="286"/>
+                      <a:pt x="148" y="286"/>
+                      <a:pt x="146" y="285"/>
+                    </a:cubicBezTo>
+                    <a:cubicBezTo>
+                      <a:pt x="144" y="285"/>
+                      <a:pt x="142" y="284"/>
+                      <a:pt x="140" y="283"/>
+                    </a:cubicBezTo>
+                    <a:cubicBezTo>
+                      <a:pt x="138" y="282"/>
+                      <a:pt x="137" y="280"/>
+                      <a:pt x="135" y="278"/>
+                    </a:cubicBezTo>
+                    <a:cubicBezTo>
+                      <a:pt x="134" y="275"/>
+                      <a:pt x="134" y="272"/>
+                      <a:pt x="134" y="268"/>
+                    </a:cubicBezTo>
+                    <a:cubicBezTo>
+                      <a:pt x="134" y="264"/>
+                      <a:pt x="134" y="264"/>
+                      <a:pt x="134" y="264"/>
+                    </a:cubicBezTo>
+                    <a:cubicBezTo>
+                      <a:pt x="132" y="266"/>
+                      <a:pt x="129" y="268"/>
+                      <a:pt x="126" y="270"/>
+                    </a:cubicBezTo>
+                    <a:cubicBezTo>
+                      <a:pt x="123" y="273"/>
+                      <a:pt x="119" y="275"/>
+                      <a:pt x="114" y="277"/>
+                    </a:cubicBezTo>
+                    <a:cubicBezTo>
+                      <a:pt x="109" y="279"/>
+                      <a:pt x="103" y="281"/>
+                      <a:pt x="97" y="282"/>
+                    </a:cubicBezTo>
+                    <a:cubicBezTo>
+                      <a:pt x="90" y="284"/>
+                      <a:pt x="83" y="284"/>
+                      <a:pt x="76" y="284"/>
+                    </a:cubicBezTo>
+                    <a:close/>
+                    <a:moveTo>
+                      <a:pt x="89" y="261"/>
+                    </a:moveTo>
+                    <a:cubicBezTo>
+                      <a:pt x="93" y="261"/>
+                      <a:pt x="96" y="260"/>
+                      <a:pt x="99" y="260"/>
+                    </a:cubicBezTo>
+                    <a:cubicBezTo>
+                      <a:pt x="102" y="260"/>
+                      <a:pt x="105" y="259"/>
+                      <a:pt x="108" y="258"/>
+                    </a:cubicBezTo>
+                    <a:cubicBezTo>
+                      <a:pt x="114" y="257"/>
+                      <a:pt x="118" y="255"/>
+                      <a:pt x="122" y="253"/>
+                    </a:cubicBezTo>
+                    <a:cubicBezTo>
+                      <a:pt x="126" y="251"/>
+                      <a:pt x="130" y="248"/>
+                      <a:pt x="132" y="246"/>
+                    </a:cubicBezTo>
+                    <a:cubicBezTo>
+                      <a:pt x="132" y="114"/>
+                      <a:pt x="132" y="114"/>
+                      <a:pt x="132" y="114"/>
+                    </a:cubicBezTo>
+                    <a:cubicBezTo>
+                      <a:pt x="131" y="112"/>
+                      <a:pt x="130" y="111"/>
+                      <a:pt x="128" y="109"/>
+                    </a:cubicBezTo>
+                    <a:cubicBezTo>
+                      <a:pt x="126" y="107"/>
+                      <a:pt x="124" y="106"/>
+                      <a:pt x="121" y="105"/>
+                    </a:cubicBezTo>
+                    <a:cubicBezTo>
+                      <a:pt x="118" y="103"/>
+                      <a:pt x="114" y="102"/>
+                      <a:pt x="110" y="101"/>
+                    </a:cubicBezTo>
+                    <a:cubicBezTo>
+                      <a:pt x="106" y="100"/>
+                      <a:pt x="101" y="100"/>
+                      <a:pt x="96" y="100"/>
+                    </a:cubicBezTo>
+                    <a:cubicBezTo>
+                      <a:pt x="91" y="100"/>
+                      <a:pt x="87" y="101"/>
+                      <a:pt x="82" y="102"/>
+                    </a:cubicBezTo>
+                    <a:cubicBezTo>
+                      <a:pt x="77" y="103"/>
+                      <a:pt x="73" y="104"/>
+                      <a:pt x="68" y="107"/>
+                    </a:cubicBezTo>
+                    <a:cubicBezTo>
+                      <a:pt x="64" y="110"/>
+                      <a:pt x="59" y="113"/>
+                      <a:pt x="55" y="117"/>
+                    </a:cubicBezTo>
+                    <a:cubicBezTo>
+                      <a:pt x="51" y="121"/>
+                      <a:pt x="47" y="126"/>
+                      <a:pt x="44" y="132"/>
+                    </a:cubicBezTo>
+                    <a:cubicBezTo>
+                      <a:pt x="41" y="137"/>
+                      <a:pt x="38" y="144"/>
+                      <a:pt x="36" y="152"/>
+                    </a:cubicBezTo>
+                    <a:cubicBezTo>
+                      <a:pt x="34" y="160"/>
+                      <a:pt x="33" y="169"/>
+                      <a:pt x="33" y="179"/>
+                    </a:cubicBezTo>
+                    <a:cubicBezTo>
+                      <a:pt x="33" y="193"/>
+                      <a:pt x="34" y="205"/>
+                      <a:pt x="37" y="215"/>
+                    </a:cubicBezTo>
+                    <a:cubicBezTo>
+                      <a:pt x="41" y="226"/>
+                      <a:pt x="45" y="234"/>
+                      <a:pt x="50" y="241"/>
+                    </a:cubicBezTo>
+                    <a:cubicBezTo>
+                      <a:pt x="55" y="248"/>
+                      <a:pt x="61" y="253"/>
+                      <a:pt x="68" y="256"/>
+                    </a:cubicBezTo>
+                    <a:cubicBezTo>
+                      <a:pt x="75" y="259"/>
+                      <a:pt x="82" y="261"/>
+                      <a:pt x="89" y="261"/>
+                    </a:cubicBezTo>
+                    <a:close/>
+                  </a:path>
+                </a:pathLst>
+              </a:custGeom>
+              <a:grpFill/>
+              <a:ln>
+                <a:noFill/>
+              </a:ln>
+              <a:extLst>
+                <a:ext uri="{91240B29-F687-4F45-9708-019B960494DF}">
+                  <a14:hiddenLine xmlns:a14="http://schemas.microsoft.com/office/drawing/2010/main" w="9525">
+                    <a:solidFill>
+                      <a:srgbClr val="000000"/>
+                    </a:solidFill>
+                    <a:round/>
+                    <a:headEnd/>
+                    <a:tailEnd/>
+                  </a14:hiddenLine>
+                </a:ext>
+              </a:extLst>
+            </p:spPr>
+            <p:txBody>
+              <a:bodyPr vert="horz" wrap="square" lIns="91440" tIns="45720" rIns="91440" bIns="45720" numCol="1" anchor="t" anchorCtr="0" compatLnSpc="1">
+                <a:prstTxWarp prst="textNoShape">
+                  <a:avLst/>
+                </a:prstTxWarp>
+              </a:bodyPr>
+              <a:lstStyle/>
+              <a:p>
+                <a:endParaRPr lang="en-US"/>
+              </a:p>
+            </p:txBody>
+          </p:sp>
+          <p:sp>
+            <p:nvSpPr>
+              <p:cNvPr id="19" name="Freeform 11">
+                <a:extLst>
+                  <a:ext uri="{FF2B5EF4-FFF2-40B4-BE49-F238E27FC236}">
+                    <a16:creationId xmlns:a16="http://schemas.microsoft.com/office/drawing/2014/main" id="{03ABCE4C-8F3F-495D-81DE-0857738BB089}"/>
+                  </a:ext>
+                </a:extLst>
+              </p:cNvPr>
+              <p:cNvSpPr>
+                <a:spLocks noEditPoints="1"/>
+              </p:cNvSpPr>
+              <p:nvPr/>
+            </p:nvSpPr>
+            <p:spPr bwMode="auto">
+              <a:xfrm>
+                <a:off x="5784" y="1008"/>
+                <a:ext cx="31" cy="30"/>
+              </a:xfrm>
+              <a:custGeom>
+                <a:avLst/>
+                <a:gdLst>
+                  <a:gd name="T0" fmla="*/ 21 w 42"/>
+                  <a:gd name="T1" fmla="*/ 0 h 41"/>
+                  <a:gd name="T2" fmla="*/ 42 w 42"/>
+                  <a:gd name="T3" fmla="*/ 20 h 41"/>
+                  <a:gd name="T4" fmla="*/ 21 w 42"/>
+                  <a:gd name="T5" fmla="*/ 41 h 41"/>
+                  <a:gd name="T6" fmla="*/ 0 w 42"/>
+                  <a:gd name="T7" fmla="*/ 20 h 41"/>
+                  <a:gd name="T8" fmla="*/ 21 w 42"/>
+                  <a:gd name="T9" fmla="*/ 0 h 41"/>
+                  <a:gd name="T10" fmla="*/ 21 w 42"/>
+                  <a:gd name="T11" fmla="*/ 38 h 41"/>
+                  <a:gd name="T12" fmla="*/ 38 w 42"/>
+                  <a:gd name="T13" fmla="*/ 20 h 41"/>
+                  <a:gd name="T14" fmla="*/ 21 w 42"/>
+                  <a:gd name="T15" fmla="*/ 3 h 41"/>
+                  <a:gd name="T16" fmla="*/ 4 w 42"/>
+                  <a:gd name="T17" fmla="*/ 20 h 41"/>
+                  <a:gd name="T18" fmla="*/ 21 w 42"/>
+                  <a:gd name="T19" fmla="*/ 38 h 41"/>
+                  <a:gd name="T20" fmla="*/ 13 w 42"/>
+                  <a:gd name="T21" fmla="*/ 8 h 41"/>
+                  <a:gd name="T22" fmla="*/ 22 w 42"/>
+                  <a:gd name="T23" fmla="*/ 8 h 41"/>
+                  <a:gd name="T24" fmla="*/ 31 w 42"/>
+                  <a:gd name="T25" fmla="*/ 15 h 41"/>
+                  <a:gd name="T26" fmla="*/ 24 w 42"/>
+                  <a:gd name="T27" fmla="*/ 22 h 41"/>
+                  <a:gd name="T28" fmla="*/ 31 w 42"/>
+                  <a:gd name="T29" fmla="*/ 33 h 41"/>
+                  <a:gd name="T30" fmla="*/ 27 w 42"/>
+                  <a:gd name="T31" fmla="*/ 33 h 41"/>
+                  <a:gd name="T32" fmla="*/ 21 w 42"/>
+                  <a:gd name="T33" fmla="*/ 22 h 41"/>
+                  <a:gd name="T34" fmla="*/ 17 w 42"/>
+                  <a:gd name="T35" fmla="*/ 22 h 41"/>
+                  <a:gd name="T36" fmla="*/ 17 w 42"/>
+                  <a:gd name="T37" fmla="*/ 33 h 41"/>
+                  <a:gd name="T38" fmla="*/ 13 w 42"/>
+                  <a:gd name="T39" fmla="*/ 33 h 41"/>
+                  <a:gd name="T40" fmla="*/ 13 w 42"/>
+                  <a:gd name="T41" fmla="*/ 8 h 41"/>
+                  <a:gd name="T42" fmla="*/ 17 w 42"/>
+                  <a:gd name="T43" fmla="*/ 19 h 41"/>
+                  <a:gd name="T44" fmla="*/ 20 w 42"/>
+                  <a:gd name="T45" fmla="*/ 19 h 41"/>
+                  <a:gd name="T46" fmla="*/ 27 w 42"/>
+                  <a:gd name="T47" fmla="*/ 15 h 41"/>
+                  <a:gd name="T48" fmla="*/ 22 w 42"/>
+                  <a:gd name="T49" fmla="*/ 11 h 41"/>
+                  <a:gd name="T50" fmla="*/ 17 w 42"/>
+                  <a:gd name="T51" fmla="*/ 11 h 41"/>
+                  <a:gd name="T52" fmla="*/ 17 w 42"/>
+                  <a:gd name="T53" fmla="*/ 19 h 41"/>
+                </a:gdLst>
+                <a:ahLst/>
+                <a:cxnLst>
+                  <a:cxn ang="0">
+                    <a:pos x="T0" y="T1"/>
+                  </a:cxn>
+                  <a:cxn ang="0">
+                    <a:pos x="T2" y="T3"/>
+                  </a:cxn>
+                  <a:cxn ang="0">
+                    <a:pos x="T4" y="T5"/>
+                  </a:cxn>
+                  <a:cxn ang="0">
+                    <a:pos x="T6" y="T7"/>
+                  </a:cxn>
+                  <a:cxn ang="0">
+                    <a:pos x="T8" y="T9"/>
+                  </a:cxn>
+                  <a:cxn ang="0">
+                    <a:pos x="T10" y="T11"/>
+                  </a:cxn>
+                  <a:cxn ang="0">
+                    <a:pos x="T12" y="T13"/>
+                  </a:cxn>
+                  <a:cxn ang="0">
+                    <a:pos x="T14" y="T15"/>
+                  </a:cxn>
+                  <a:cxn ang="0">
+                    <a:pos x="T16" y="T17"/>
+                  </a:cxn>
+                  <a:cxn ang="0">
+                    <a:pos x="T18" y="T19"/>
+                  </a:cxn>
+                  <a:cxn ang="0">
+                    <a:pos x="T20" y="T21"/>
+                  </a:cxn>
+                  <a:cxn ang="0">
+                    <a:pos x="T22" y="T23"/>
+                  </a:cxn>
+                  <a:cxn ang="0">
+                    <a:pos x="T24" y="T25"/>
+                  </a:cxn>
+                  <a:cxn ang="0">
+                    <a:pos x="T26" y="T27"/>
+                  </a:cxn>
+                  <a:cxn ang="0">
+                    <a:pos x="T28" y="T29"/>
+                  </a:cxn>
+                  <a:cxn ang="0">
+                    <a:pos x="T30" y="T31"/>
+                  </a:cxn>
+                  <a:cxn ang="0">
+                    <a:pos x="T32" y="T33"/>
+                  </a:cxn>
+                  <a:cxn ang="0">
+                    <a:pos x="T34" y="T35"/>
+                  </a:cxn>
+                  <a:cxn ang="0">
+                    <a:pos x="T36" y="T37"/>
+                  </a:cxn>
+                  <a:cxn ang="0">
+                    <a:pos x="T38" y="T39"/>
+                  </a:cxn>
+                  <a:cxn ang="0">
+                    <a:pos x="T40" y="T41"/>
+                  </a:cxn>
+                  <a:cxn ang="0">
+                    <a:pos x="T42" y="T43"/>
+                  </a:cxn>
+                  <a:cxn ang="0">
+                    <a:pos x="T44" y="T45"/>
+                  </a:cxn>
+                  <a:cxn ang="0">
+                    <a:pos x="T46" y="T47"/>
+                  </a:cxn>
+                  <a:cxn ang="0">
+                    <a:pos x="T48" y="T49"/>
+                  </a:cxn>
+                  <a:cxn ang="0">
+                    <a:pos x="T50" y="T51"/>
+                  </a:cxn>
+                  <a:cxn ang="0">
+                    <a:pos x="T52" y="T53"/>
+                  </a:cxn>
+                </a:cxnLst>
+                <a:rect l="0" t="0" r="r" b="b"/>
+                <a:pathLst>
+                  <a:path w="42" h="41">
+                    <a:moveTo>
+                      <a:pt x="21" y="0"/>
+                    </a:moveTo>
+                    <a:cubicBezTo>
+                      <a:pt x="32" y="0"/>
+                      <a:pt x="42" y="9"/>
+                      <a:pt x="42" y="20"/>
+                    </a:cubicBezTo>
+                    <a:cubicBezTo>
+                      <a:pt x="42" y="32"/>
+                      <a:pt x="32" y="41"/>
+                      <a:pt x="21" y="41"/>
+                    </a:cubicBezTo>
+                    <a:cubicBezTo>
+                      <a:pt x="9" y="41"/>
+                      <a:pt x="0" y="32"/>
+                      <a:pt x="0" y="20"/>
+                    </a:cubicBezTo>
+                    <a:cubicBezTo>
+                      <a:pt x="0" y="9"/>
+                      <a:pt x="9" y="0"/>
+                      <a:pt x="21" y="0"/>
+                    </a:cubicBezTo>
+                    <a:close/>
+                    <a:moveTo>
+                      <a:pt x="21" y="38"/>
+                    </a:moveTo>
+                    <a:cubicBezTo>
+                      <a:pt x="31" y="38"/>
+                      <a:pt x="38" y="31"/>
+                      <a:pt x="38" y="20"/>
+                    </a:cubicBezTo>
+                    <a:cubicBezTo>
+                      <a:pt x="38" y="10"/>
+                      <a:pt x="31" y="3"/>
+                      <a:pt x="21" y="3"/>
+                    </a:cubicBezTo>
+                    <a:cubicBezTo>
+                      <a:pt x="11" y="3"/>
+                      <a:pt x="4" y="10"/>
+                      <a:pt x="4" y="20"/>
+                    </a:cubicBezTo>
+                    <a:cubicBezTo>
+                      <a:pt x="4" y="31"/>
+                      <a:pt x="11" y="38"/>
+                      <a:pt x="21" y="38"/>
+                    </a:cubicBezTo>
+                    <a:close/>
+                    <a:moveTo>
+                      <a:pt x="13" y="8"/>
+                    </a:moveTo>
+                    <a:cubicBezTo>
+                      <a:pt x="22" y="8"/>
+                      <a:pt x="22" y="8"/>
+                      <a:pt x="22" y="8"/>
+                    </a:cubicBezTo>
+                    <a:cubicBezTo>
+                      <a:pt x="28" y="8"/>
+                      <a:pt x="31" y="11"/>
+                      <a:pt x="31" y="15"/>
+                    </a:cubicBezTo>
+                    <a:cubicBezTo>
+                      <a:pt x="31" y="20"/>
+                      <a:pt x="28" y="22"/>
+                      <a:pt x="24" y="22"/>
+                    </a:cubicBezTo>
+                    <a:cubicBezTo>
+                      <a:pt x="31" y="33"/>
+                      <a:pt x="31" y="33"/>
+                      <a:pt x="31" y="33"/>
+                    </a:cubicBezTo>
+                    <a:cubicBezTo>
+                      <a:pt x="27" y="33"/>
+                      <a:pt x="27" y="33"/>
+                      <a:pt x="27" y="33"/>
+                    </a:cubicBezTo>
+                    <a:cubicBezTo>
+                      <a:pt x="21" y="22"/>
+                      <a:pt x="21" y="22"/>
+                      <a:pt x="21" y="22"/>
+                    </a:cubicBezTo>
+                    <a:cubicBezTo>
+                      <a:pt x="17" y="22"/>
+                      <a:pt x="17" y="22"/>
+                      <a:pt x="17" y="22"/>
+                    </a:cubicBezTo>
+                    <a:cubicBezTo>
+                      <a:pt x="17" y="33"/>
+                      <a:pt x="17" y="33"/>
+                      <a:pt x="17" y="33"/>
+                    </a:cubicBezTo>
+                    <a:cubicBezTo>
+                      <a:pt x="13" y="33"/>
+                      <a:pt x="13" y="33"/>
+                      <a:pt x="13" y="33"/>
+                    </a:cubicBezTo>
+                    <a:lnTo>
+                      <a:pt x="13" y="8"/>
+                    </a:lnTo>
+                    <a:close/>
+                    <a:moveTo>
+                      <a:pt x="17" y="19"/>
+                    </a:moveTo>
+                    <a:cubicBezTo>
+                      <a:pt x="20" y="19"/>
+                      <a:pt x="20" y="19"/>
+                      <a:pt x="20" y="19"/>
+                    </a:cubicBezTo>
+                    <a:cubicBezTo>
+                      <a:pt x="24" y="19"/>
+                      <a:pt x="27" y="19"/>
+                      <a:pt x="27" y="15"/>
+                    </a:cubicBezTo>
+                    <a:cubicBezTo>
+                      <a:pt x="27" y="12"/>
+                      <a:pt x="24" y="11"/>
+                      <a:pt x="22" y="11"/>
+                    </a:cubicBezTo>
+                    <a:cubicBezTo>
+                      <a:pt x="17" y="11"/>
+                      <a:pt x="17" y="11"/>
+                      <a:pt x="17" y="11"/>
+                    </a:cubicBezTo>
+                    <a:lnTo>
+                      <a:pt x="17" y="19"/>
+                    </a:lnTo>
+                    <a:close/>
+                  </a:path>
+                </a:pathLst>
+              </a:custGeom>
+              <a:grpFill/>
+              <a:ln>
+                <a:noFill/>
+              </a:ln>
+              <a:extLst>
+                <a:ext uri="{91240B29-F687-4F45-9708-019B960494DF}">
+                  <a14:hiddenLine xmlns:a14="http://schemas.microsoft.com/office/drawing/2010/main" w="9525">
+                    <a:solidFill>
+                      <a:srgbClr val="000000"/>
+                    </a:solidFill>
+                    <a:round/>
+                    <a:headEnd/>
+                    <a:tailEnd/>
+                  </a14:hiddenLine>
+                </a:ext>
+              </a:extLst>
+            </p:spPr>
+            <p:txBody>
+              <a:bodyPr vert="horz" wrap="square" lIns="91440" tIns="45720" rIns="91440" bIns="45720" numCol="1" anchor="t" anchorCtr="0" compatLnSpc="1">
+                <a:prstTxWarp prst="textNoShape">
+                  <a:avLst/>
+                </a:prstTxWarp>
+              </a:bodyPr>
+              <a:lstStyle/>
+              <a:p>
+                <a:endParaRPr lang="en-US"/>
+              </a:p>
+            </p:txBody>
+          </p:sp>
+        </p:grpSp>
+      </p:grpSp>
+    </p:spTree>
+  </p:cSld>
+  <p:clrMapOvr>
+    <a:masterClrMapping/>
+  </p:clrMapOvr>
+</p:sld>
+</file>
+
+<file path=ppt/slides/slide3.xml><?xml version="1.0" encoding="utf-8"?>
 <p:sld xmlns:a="http://schemas.openxmlformats.org/drawingml/2006/main" xmlns:r="http://schemas.openxmlformats.org/officeDocument/2006/relationships" xmlns:p="http://schemas.openxmlformats.org/presentationml/2006/main">
   <p:cSld>
     <p:spTree>
@@ -12004,7 +15973,7 @@
 </p:sld>
 </file>
 
-<file path=ppt/slides/slide3.xml><?xml version="1.0" encoding="utf-8"?>
+<file path=ppt/slides/slide4.xml><?xml version="1.0" encoding="utf-8"?>
 <p:sld xmlns:a="http://schemas.openxmlformats.org/drawingml/2006/main" xmlns:r="http://schemas.openxmlformats.org/officeDocument/2006/relationships" xmlns:p="http://schemas.openxmlformats.org/presentationml/2006/main">
   <p:cSld>
     <p:spTree>
@@ -12914,7 +16883,7 @@
 </p:sld>
 </file>
 
-<file path=ppt/slides/slide4.xml><?xml version="1.0" encoding="utf-8"?>
+<file path=ppt/slides/slide5.xml><?xml version="1.0" encoding="utf-8"?>
 <p:sld xmlns:a="http://schemas.openxmlformats.org/drawingml/2006/main" xmlns:r="http://schemas.openxmlformats.org/officeDocument/2006/relationships" xmlns:p="http://schemas.openxmlformats.org/presentationml/2006/main">
   <p:cSld>
     <p:spTree>
@@ -13582,7 +17551,7 @@
 </p:sld>
 </file>
 
-<file path=ppt/slides/slide5.xml><?xml version="1.0" encoding="utf-8"?>
+<file path=ppt/slides/slide6.xml><?xml version="1.0" encoding="utf-8"?>
 <p:sld xmlns:a="http://schemas.openxmlformats.org/drawingml/2006/main" xmlns:r="http://schemas.openxmlformats.org/officeDocument/2006/relationships" xmlns:p="http://schemas.openxmlformats.org/presentationml/2006/main">
   <p:cSld>
     <p:spTree>
@@ -14179,7 +18148,7 @@
 </p:sld>
 </file>
 
-<file path=ppt/slides/slide6.xml><?xml version="1.0" encoding="utf-8"?>
+<file path=ppt/slides/slide7.xml><?xml version="1.0" encoding="utf-8"?>
 <p:sld xmlns:a="http://schemas.openxmlformats.org/drawingml/2006/main" xmlns:r="http://schemas.openxmlformats.org/officeDocument/2006/relationships" xmlns:p="http://schemas.openxmlformats.org/presentationml/2006/main">
   <p:cSld>
     <p:spTree>
@@ -14905,7 +18874,7 @@
 </p:sld>
 </file>
 
-<file path=ppt/slides/slide7.xml><?xml version="1.0" encoding="utf-8"?>
+<file path=ppt/slides/slide8.xml><?xml version="1.0" encoding="utf-8"?>
 <p:sld xmlns:a="http://schemas.openxmlformats.org/drawingml/2006/main" xmlns:r="http://schemas.openxmlformats.org/officeDocument/2006/relationships" xmlns:p="http://schemas.openxmlformats.org/presentationml/2006/main">
   <p:cSld>
     <p:spTree>
@@ -15899,7 +19868,7 @@
 </p:sld>
 </file>
 
-<file path=ppt/slides/slide8.xml><?xml version="1.0" encoding="utf-8"?>
+<file path=ppt/slides/slide9.xml><?xml version="1.0" encoding="utf-8"?>
 <p:sld xmlns:a="http://schemas.openxmlformats.org/drawingml/2006/main" xmlns:r="http://schemas.openxmlformats.org/officeDocument/2006/relationships" xmlns:p="http://schemas.openxmlformats.org/presentationml/2006/main">
   <p:cSld>
     <p:spTree>
@@ -16581,463 +20550,6 @@
       </p:par>
     </p:tnLst>
   </p:timing>
-</p:sld>
-</file>
-
-<file path=ppt/slides/slide9.xml><?xml version="1.0" encoding="utf-8"?>
-<p:sld xmlns:a="http://schemas.openxmlformats.org/drawingml/2006/main" xmlns:r="http://schemas.openxmlformats.org/officeDocument/2006/relationships" xmlns:p="http://schemas.openxmlformats.org/presentationml/2006/main">
-  <p:cSld>
-    <p:spTree>
-      <p:nvGrpSpPr>
-        <p:cNvPr id="1" name="Shape 1502"/>
-        <p:cNvGrpSpPr/>
-        <p:nvPr/>
-      </p:nvGrpSpPr>
-      <p:grpSpPr>
-        <a:xfrm>
-          <a:off x="0" y="0"/>
-          <a:ext cx="0" cy="0"/>
-          <a:chOff x="0" y="0"/>
-          <a:chExt cx="0" cy="0"/>
-        </a:xfrm>
-      </p:grpSpPr>
-      <p:sp>
-        <p:nvSpPr>
-          <p:cNvPr id="1503" name="Google Shape;1503;p54"/>
-          <p:cNvSpPr txBox="1">
-            <a:spLocks noGrp="1"/>
-          </p:cNvSpPr>
-          <p:nvPr>
-            <p:ph type="subTitle" idx="1"/>
-          </p:nvPr>
-        </p:nvSpPr>
-        <p:spPr>
-          <a:xfrm>
-            <a:off x="693494" y="2122164"/>
-            <a:ext cx="7171671" cy="418291"/>
-          </a:xfrm>
-          <a:prstGeom prst="rect">
-            <a:avLst/>
-          </a:prstGeom>
-        </p:spPr>
-        <p:txBody>
-          <a:bodyPr spcFirstLastPara="1" wrap="square" lIns="91425" tIns="91425" rIns="91425" bIns="91425" anchor="t" anchorCtr="0">
-            <a:noAutofit/>
-          </a:bodyPr>
-          <a:lstStyle/>
-          <a:p>
-            <a:pPr marL="0" lvl="0" indent="0" algn="l" rtl="0">
-              <a:spcBef>
-                <a:spcPts val="0"/>
-              </a:spcBef>
-              <a:spcAft>
-                <a:spcPts val="0"/>
-              </a:spcAft>
-              <a:buNone/>
-            </a:pPr>
-            <a:r>
-              <a:rPr lang="en" sz="2400" dirty="0"/>
-              <a:t>WHAT QUESTIONS DO YOU HAVE?</a:t>
-            </a:r>
-            <a:endParaRPr sz="2400" dirty="0"/>
-          </a:p>
-        </p:txBody>
-      </p:sp>
-      <p:sp>
-        <p:nvSpPr>
-          <p:cNvPr id="1504" name="Google Shape;1504;p54"/>
-          <p:cNvSpPr txBox="1">
-            <a:spLocks noGrp="1"/>
-          </p:cNvSpPr>
-          <p:nvPr>
-            <p:ph type="ctrTitle"/>
-          </p:nvPr>
-        </p:nvSpPr>
-        <p:spPr>
-          <a:xfrm>
-            <a:off x="693494" y="1305339"/>
-            <a:ext cx="6601723" cy="856816"/>
-          </a:xfrm>
-          <a:prstGeom prst="rect">
-            <a:avLst/>
-          </a:prstGeom>
-        </p:spPr>
-        <p:txBody>
-          <a:bodyPr spcFirstLastPara="1" wrap="square" lIns="91425" tIns="91425" rIns="91425" bIns="91425" anchor="t" anchorCtr="0">
-            <a:noAutofit/>
-          </a:bodyPr>
-          <a:lstStyle/>
-          <a:p>
-            <a:pPr marL="0" lvl="0" indent="0" algn="l" rtl="0">
-              <a:spcBef>
-                <a:spcPts val="0"/>
-              </a:spcBef>
-              <a:spcAft>
-                <a:spcPts val="0"/>
-              </a:spcAft>
-              <a:buNone/>
-            </a:pPr>
-            <a:r>
-              <a:rPr lang="en" sz="4800" dirty="0"/>
-              <a:t>THANK YOU!</a:t>
-            </a:r>
-            <a:endParaRPr sz="4800" dirty="0"/>
-          </a:p>
-        </p:txBody>
-      </p:sp>
-      <p:sp>
-        <p:nvSpPr>
-          <p:cNvPr id="1542" name="Google Shape;1542;p54"/>
-          <p:cNvSpPr/>
-          <p:nvPr/>
-        </p:nvSpPr>
-        <p:spPr>
-          <a:xfrm>
-            <a:off x="570050" y="3746300"/>
-            <a:ext cx="939600" cy="939600"/>
-          </a:xfrm>
-          <a:prstGeom prst="snip1Rect">
-            <a:avLst>
-              <a:gd name="adj" fmla="val 11329"/>
-            </a:avLst>
-          </a:prstGeom>
-          <a:solidFill>
-            <a:schemeClr val="lt1"/>
-          </a:solidFill>
-          <a:ln w="28575" cap="flat" cmpd="sng">
-            <a:solidFill>
-              <a:schemeClr val="dk1"/>
-            </a:solidFill>
-            <a:prstDash val="solid"/>
-            <a:round/>
-            <a:headEnd type="none" w="sm" len="sm"/>
-            <a:tailEnd type="none" w="sm" len="sm"/>
-          </a:ln>
-        </p:spPr>
-        <p:txBody>
-          <a:bodyPr spcFirstLastPara="1" wrap="square" lIns="91425" tIns="91425" rIns="91425" bIns="91425" anchor="ctr" anchorCtr="0">
-            <a:noAutofit/>
-          </a:bodyPr>
-          <a:lstStyle/>
-          <a:p>
-            <a:pPr marL="0" lvl="0" indent="0" algn="l" rtl="0">
-              <a:spcBef>
-                <a:spcPts val="0"/>
-              </a:spcBef>
-              <a:spcAft>
-                <a:spcPts val="0"/>
-              </a:spcAft>
-              <a:buNone/>
-            </a:pPr>
-            <a:endParaRPr/>
-          </a:p>
-        </p:txBody>
-      </p:sp>
-      <p:sp>
-        <p:nvSpPr>
-          <p:cNvPr id="1543" name="Google Shape;1543;p54"/>
-          <p:cNvSpPr/>
-          <p:nvPr/>
-        </p:nvSpPr>
-        <p:spPr>
-          <a:xfrm>
-            <a:off x="490150" y="3665400"/>
-            <a:ext cx="939600" cy="939600"/>
-          </a:xfrm>
-          <a:prstGeom prst="snip1Rect">
-            <a:avLst>
-              <a:gd name="adj" fmla="val 11329"/>
-            </a:avLst>
-          </a:prstGeom>
-          <a:solidFill>
-            <a:schemeClr val="accent1"/>
-          </a:solidFill>
-          <a:ln w="28575" cap="flat" cmpd="sng">
-            <a:solidFill>
-              <a:schemeClr val="dk1"/>
-            </a:solidFill>
-            <a:prstDash val="solid"/>
-            <a:round/>
-            <a:headEnd type="none" w="sm" len="sm"/>
-            <a:tailEnd type="none" w="sm" len="sm"/>
-          </a:ln>
-        </p:spPr>
-        <p:txBody>
-          <a:bodyPr spcFirstLastPara="1" wrap="square" lIns="91425" tIns="91425" rIns="91425" bIns="91425" anchor="ctr" anchorCtr="0">
-            <a:noAutofit/>
-          </a:bodyPr>
-          <a:lstStyle/>
-          <a:p>
-            <a:pPr marL="0" lvl="0" indent="0" algn="l" rtl="0">
-              <a:spcBef>
-                <a:spcPts val="0"/>
-              </a:spcBef>
-              <a:spcAft>
-                <a:spcPts val="0"/>
-              </a:spcAft>
-              <a:buNone/>
-            </a:pPr>
-            <a:endParaRPr/>
-          </a:p>
-        </p:txBody>
-      </p:sp>
-      <p:sp>
-        <p:nvSpPr>
-          <p:cNvPr id="1544" name="Google Shape;1544;p54"/>
-          <p:cNvSpPr/>
-          <p:nvPr/>
-        </p:nvSpPr>
-        <p:spPr>
-          <a:xfrm>
-            <a:off x="1708675" y="3746300"/>
-            <a:ext cx="939600" cy="939600"/>
-          </a:xfrm>
-          <a:prstGeom prst="snip1Rect">
-            <a:avLst>
-              <a:gd name="adj" fmla="val 11329"/>
-            </a:avLst>
-          </a:prstGeom>
-          <a:solidFill>
-            <a:schemeClr val="lt1"/>
-          </a:solidFill>
-          <a:ln w="28575" cap="flat" cmpd="sng">
-            <a:solidFill>
-              <a:schemeClr val="dk1"/>
-            </a:solidFill>
-            <a:prstDash val="solid"/>
-            <a:round/>
-            <a:headEnd type="none" w="sm" len="sm"/>
-            <a:tailEnd type="none" w="sm" len="sm"/>
-          </a:ln>
-        </p:spPr>
-        <p:txBody>
-          <a:bodyPr spcFirstLastPara="1" wrap="square" lIns="91425" tIns="91425" rIns="91425" bIns="91425" anchor="ctr" anchorCtr="0">
-            <a:noAutofit/>
-          </a:bodyPr>
-          <a:lstStyle/>
-          <a:p>
-            <a:pPr marL="0" lvl="0" indent="0" algn="l" rtl="0">
-              <a:spcBef>
-                <a:spcPts val="0"/>
-              </a:spcBef>
-              <a:spcAft>
-                <a:spcPts val="0"/>
-              </a:spcAft>
-              <a:buNone/>
-            </a:pPr>
-            <a:endParaRPr/>
-          </a:p>
-        </p:txBody>
-      </p:sp>
-      <p:sp>
-        <p:nvSpPr>
-          <p:cNvPr id="1545" name="Google Shape;1545;p54"/>
-          <p:cNvSpPr/>
-          <p:nvPr/>
-        </p:nvSpPr>
-        <p:spPr>
-          <a:xfrm>
-            <a:off x="1628775" y="3665400"/>
-            <a:ext cx="939600" cy="939600"/>
-          </a:xfrm>
-          <a:prstGeom prst="snip1Rect">
-            <a:avLst>
-              <a:gd name="adj" fmla="val 11329"/>
-            </a:avLst>
-          </a:prstGeom>
-          <a:solidFill>
-            <a:schemeClr val="accent2"/>
-          </a:solidFill>
-          <a:ln w="28575" cap="flat" cmpd="sng">
-            <a:solidFill>
-              <a:schemeClr val="dk1"/>
-            </a:solidFill>
-            <a:prstDash val="solid"/>
-            <a:round/>
-            <a:headEnd type="none" w="sm" len="sm"/>
-            <a:tailEnd type="none" w="sm" len="sm"/>
-          </a:ln>
-        </p:spPr>
-        <p:txBody>
-          <a:bodyPr spcFirstLastPara="1" wrap="square" lIns="91425" tIns="91425" rIns="91425" bIns="91425" anchor="ctr" anchorCtr="0">
-            <a:noAutofit/>
-          </a:bodyPr>
-          <a:lstStyle/>
-          <a:p>
-            <a:pPr marL="0" lvl="0" indent="0" algn="l" rtl="0">
-              <a:spcBef>
-                <a:spcPts val="0"/>
-              </a:spcBef>
-              <a:spcAft>
-                <a:spcPts val="0"/>
-              </a:spcAft>
-              <a:buNone/>
-            </a:pPr>
-            <a:endParaRPr/>
-          </a:p>
-        </p:txBody>
-      </p:sp>
-      <p:sp>
-        <p:nvSpPr>
-          <p:cNvPr id="1546" name="Google Shape;1546;p54"/>
-          <p:cNvSpPr/>
-          <p:nvPr/>
-        </p:nvSpPr>
-        <p:spPr>
-          <a:xfrm>
-            <a:off x="2847300" y="3746300"/>
-            <a:ext cx="939600" cy="939600"/>
-          </a:xfrm>
-          <a:prstGeom prst="snip1Rect">
-            <a:avLst>
-              <a:gd name="adj" fmla="val 11329"/>
-            </a:avLst>
-          </a:prstGeom>
-          <a:solidFill>
-            <a:schemeClr val="lt1"/>
-          </a:solidFill>
-          <a:ln w="28575" cap="flat" cmpd="sng">
-            <a:solidFill>
-              <a:schemeClr val="dk1"/>
-            </a:solidFill>
-            <a:prstDash val="solid"/>
-            <a:round/>
-            <a:headEnd type="none" w="sm" len="sm"/>
-            <a:tailEnd type="none" w="sm" len="sm"/>
-          </a:ln>
-        </p:spPr>
-        <p:txBody>
-          <a:bodyPr spcFirstLastPara="1" wrap="square" lIns="91425" tIns="91425" rIns="91425" bIns="91425" anchor="ctr" anchorCtr="0">
-            <a:noAutofit/>
-          </a:bodyPr>
-          <a:lstStyle/>
-          <a:p>
-            <a:pPr marL="0" lvl="0" indent="0" algn="l" rtl="0">
-              <a:spcBef>
-                <a:spcPts val="0"/>
-              </a:spcBef>
-              <a:spcAft>
-                <a:spcPts val="0"/>
-              </a:spcAft>
-              <a:buNone/>
-            </a:pPr>
-            <a:endParaRPr/>
-          </a:p>
-        </p:txBody>
-      </p:sp>
-      <p:sp>
-        <p:nvSpPr>
-          <p:cNvPr id="1547" name="Google Shape;1547;p54"/>
-          <p:cNvSpPr/>
-          <p:nvPr/>
-        </p:nvSpPr>
-        <p:spPr>
-          <a:xfrm>
-            <a:off x="2767400" y="3665400"/>
-            <a:ext cx="939600" cy="939600"/>
-          </a:xfrm>
-          <a:prstGeom prst="snip1Rect">
-            <a:avLst>
-              <a:gd name="adj" fmla="val 11329"/>
-            </a:avLst>
-          </a:prstGeom>
-          <a:solidFill>
-            <a:schemeClr val="lt2"/>
-          </a:solidFill>
-          <a:ln w="28575" cap="flat" cmpd="sng">
-            <a:solidFill>
-              <a:schemeClr val="dk1"/>
-            </a:solidFill>
-            <a:prstDash val="solid"/>
-            <a:round/>
-            <a:headEnd type="none" w="sm" len="sm"/>
-            <a:tailEnd type="none" w="sm" len="sm"/>
-          </a:ln>
-        </p:spPr>
-        <p:txBody>
-          <a:bodyPr spcFirstLastPara="1" wrap="square" lIns="91425" tIns="91425" rIns="91425" bIns="91425" anchor="ctr" anchorCtr="0">
-            <a:noAutofit/>
-          </a:bodyPr>
-          <a:lstStyle/>
-          <a:p>
-            <a:pPr marL="0" lvl="0" indent="0" algn="l" rtl="0">
-              <a:spcBef>
-                <a:spcPts val="0"/>
-              </a:spcBef>
-              <a:spcAft>
-                <a:spcPts val="0"/>
-              </a:spcAft>
-              <a:buNone/>
-            </a:pPr>
-            <a:endParaRPr/>
-          </a:p>
-        </p:txBody>
-      </p:sp>
-      <p:sp>
-        <p:nvSpPr>
-          <p:cNvPr id="3" name="Rectangle 2"/>
-          <p:cNvSpPr/>
-          <p:nvPr/>
-        </p:nvSpPr>
-        <p:spPr>
-          <a:xfrm>
-            <a:off x="4260574" y="3856383"/>
-            <a:ext cx="4187687" cy="556591"/>
-          </a:xfrm>
-          <a:prstGeom prst="rect">
-            <a:avLst/>
-          </a:prstGeom>
-          <a:solidFill>
-            <a:schemeClr val="bg1"/>
-          </a:solidFill>
-          <a:ln>
-            <a:solidFill>
-              <a:schemeClr val="bg1"/>
-            </a:solidFill>
-          </a:ln>
-        </p:spPr>
-        <p:style>
-          <a:lnRef idx="2">
-            <a:schemeClr val="accent1">
-              <a:shade val="50000"/>
-            </a:schemeClr>
-          </a:lnRef>
-          <a:fillRef idx="1">
-            <a:schemeClr val="accent1"/>
-          </a:fillRef>
-          <a:effectRef idx="0">
-            <a:schemeClr val="accent1"/>
-          </a:effectRef>
-          <a:fontRef idx="minor">
-            <a:schemeClr val="lt1"/>
-          </a:fontRef>
-        </p:style>
-        <p:txBody>
-          <a:bodyPr rtlCol="0" anchor="ctr"/>
-          <a:lstStyle/>
-          <a:p>
-            <a:pPr algn="ctr"/>
-            <a:endParaRPr lang="en-US"/>
-          </a:p>
-        </p:txBody>
-      </p:sp>
-    </p:spTree>
-  </p:cSld>
-  <p:clrMapOvr>
-    <a:masterClrMapping/>
-  </p:clrMapOvr>
-  <mc:AlternateContent xmlns:mc="http://schemas.openxmlformats.org/markup-compatibility/2006" xmlns:p14="http://schemas.microsoft.com/office/powerpoint/2010/main">
-    <mc:Choice Requires="p14">
-      <p:transition spd="med" p14:dur="700">
-        <p:fade/>
-      </p:transition>
-    </mc:Choice>
-    <mc:Fallback xmlns="">
-      <p:transition spd="med">
-        <p:fade/>
-      </p:transition>
-    </mc:Fallback>
-  </mc:AlternateContent>
 </p:sld>
 </file>
 
@@ -17604,21 +21116,6 @@
 </file>
 
 <file path=customXml/item1.xml><?xml version="1.0" encoding="utf-8"?>
-<p:properties xmlns:p="http://schemas.microsoft.com/office/2006/metadata/properties" xmlns:xsi="http://www.w3.org/2001/XMLSchema-instance" xmlns:pc="http://schemas.microsoft.com/office/infopath/2007/PartnerControls">
-  <documentManagement/>
-</p:properties>
-</file>
-
-<file path=customXml/item2.xml><?xml version="1.0" encoding="utf-8"?>
-<?mso-contentType ?>
-<FormTemplates xmlns="http://schemas.microsoft.com/sharepoint/v3/contenttype/forms">
-  <Display>DocumentLibraryForm</Display>
-  <Edit>DocumentLibraryForm</Edit>
-  <New>DocumentLibraryForm</New>
-</FormTemplates>
-</file>
-
-<file path=customXml/item3.xml><?xml version="1.0" encoding="utf-8"?>
 <ct:contentTypeSchema xmlns:ct="http://schemas.microsoft.com/office/2006/metadata/contentType" xmlns:ma="http://schemas.microsoft.com/office/2006/metadata/properties/metaAttributes" ct:_="" ma:_="" ma:contentTypeName="Document" ma:contentTypeID="0x010100F7E48E236368D941AD67930EE5175560" ma:contentTypeVersion="13" ma:contentTypeDescription="Create a new document." ma:contentTypeScope="" ma:versionID="a8b62d4193a4647119b3edc959bbfb1d">
   <xsd:schema xmlns:xsd="http://www.w3.org/2001/XMLSchema" xmlns:xs="http://www.w3.org/2001/XMLSchema" xmlns:p="http://schemas.microsoft.com/office/2006/metadata/properties" xmlns:ns3="17e6e5dc-a594-403d-bfc5-efbaf78a0399" xmlns:ns4="44228d15-58ec-4b0a-a019-13a419712495" targetNamespace="http://schemas.microsoft.com/office/2006/metadata/properties" ma:root="true" ma:fieldsID="118fe3d96a5ccae0e4af529a0f000ce1" ns3:_="" ns4:_="">
     <xsd:import namespace="17e6e5dc-a594-403d-bfc5-efbaf78a0399"/>
@@ -17841,32 +21338,22 @@
 </ct:contentTypeSchema>
 </file>
 
-<file path=customXml/itemProps1.xml><?xml version="1.0" encoding="utf-8"?>
-<ds:datastoreItem xmlns:ds="http://schemas.openxmlformats.org/officeDocument/2006/customXml" ds:itemID="{20250E26-A743-4B3A-A820-CBA7B0238C68}">
-  <ds:schemaRefs>
-    <ds:schemaRef ds:uri="http://schemas.microsoft.com/office/2006/documentManagement/types"/>
-    <ds:schemaRef ds:uri="44228d15-58ec-4b0a-a019-13a419712495"/>
-    <ds:schemaRef ds:uri="17e6e5dc-a594-403d-bfc5-efbaf78a0399"/>
-    <ds:schemaRef ds:uri="http://purl.org/dc/terms/"/>
-    <ds:schemaRef ds:uri="http://schemas.microsoft.com/office/2006/metadata/properties"/>
-    <ds:schemaRef ds:uri="http://schemas.openxmlformats.org/package/2006/metadata/core-properties"/>
-    <ds:schemaRef ds:uri="http://purl.org/dc/elements/1.1/"/>
-    <ds:schemaRef ds:uri="http://www.w3.org/XML/1998/namespace"/>
-    <ds:schemaRef ds:uri="http://schemas.microsoft.com/office/infopath/2007/PartnerControls"/>
-    <ds:schemaRef ds:uri="http://purl.org/dc/dcmitype/"/>
-  </ds:schemaRefs>
-</ds:datastoreItem>
+<file path=customXml/item2.xml><?xml version="1.0" encoding="utf-8"?>
+<?mso-contentType ?>
+<FormTemplates xmlns="http://schemas.microsoft.com/sharepoint/v3/contenttype/forms">
+  <Display>DocumentLibraryForm</Display>
+  <Edit>DocumentLibraryForm</Edit>
+  <New>DocumentLibraryForm</New>
+</FormTemplates>
 </file>
 
-<file path=customXml/itemProps2.xml><?xml version="1.0" encoding="utf-8"?>
-<ds:datastoreItem xmlns:ds="http://schemas.openxmlformats.org/officeDocument/2006/customXml" ds:itemID="{A9484E29-245E-42D2-9DF8-7C37C811B585}">
-  <ds:schemaRefs>
-    <ds:schemaRef ds:uri="http://schemas.microsoft.com/sharepoint/v3/contenttype/forms"/>
-  </ds:schemaRefs>
-</ds:datastoreItem>
+<file path=customXml/item3.xml><?xml version="1.0" encoding="utf-8"?>
+<p:properties xmlns:p="http://schemas.microsoft.com/office/2006/metadata/properties" xmlns:xsi="http://www.w3.org/2001/XMLSchema-instance" xmlns:pc="http://schemas.microsoft.com/office/infopath/2007/PartnerControls">
+  <documentManagement/>
+</p:properties>
 </file>
 
-<file path=customXml/itemProps3.xml><?xml version="1.0" encoding="utf-8"?>
+<file path=customXml/itemProps1.xml><?xml version="1.0" encoding="utf-8"?>
 <ds:datastoreItem xmlns:ds="http://schemas.openxmlformats.org/officeDocument/2006/customXml" ds:itemID="{EFCC125F-73E4-4435-82DB-25EBFD6BD756}">
   <ds:schemaRefs>
     <ds:schemaRef ds:uri="http://schemas.microsoft.com/office/2006/metadata/contentType"/>
@@ -17883,4 +21370,29 @@
     <ds:schemaRef ds:uri="http://schemas.microsoft.com/internal/obd"/>
   </ds:schemaRefs>
 </ds:datastoreItem>
+</file>
+
+<file path=customXml/itemProps2.xml><?xml version="1.0" encoding="utf-8"?>
+<ds:datastoreItem xmlns:ds="http://schemas.openxmlformats.org/officeDocument/2006/customXml" ds:itemID="{A9484E29-245E-42D2-9DF8-7C37C811B585}">
+  <ds:schemaRefs>
+    <ds:schemaRef ds:uri="http://schemas.microsoft.com/sharepoint/v3/contenttype/forms"/>
+  </ds:schemaRefs>
+</ds:datastoreItem>
+</file>
+
+<file path=customXml/itemProps3.xml><?xml version="1.0" encoding="utf-8"?>
+<ds:datastoreItem xmlns:ds="http://schemas.openxmlformats.org/officeDocument/2006/customXml" ds:itemID="{20250E26-A743-4B3A-A820-CBA7B0238C68}">
+  <ds:schemaRefs>
+    <ds:schemaRef ds:uri="http://schemas.microsoft.com/office/2006/documentManagement/types"/>
+    <ds:schemaRef ds:uri="44228d15-58ec-4b0a-a019-13a419712495"/>
+    <ds:schemaRef ds:uri="17e6e5dc-a594-403d-bfc5-efbaf78a0399"/>
+    <ds:schemaRef ds:uri="http://purl.org/dc/terms/"/>
+    <ds:schemaRef ds:uri="http://schemas.microsoft.com/office/2006/metadata/properties"/>
+    <ds:schemaRef ds:uri="http://schemas.openxmlformats.org/package/2006/metadata/core-properties"/>
+    <ds:schemaRef ds:uri="http://purl.org/dc/elements/1.1/"/>
+    <ds:schemaRef ds:uri="http://www.w3.org/XML/1998/namespace"/>
+    <ds:schemaRef ds:uri="http://schemas.microsoft.com/office/infopath/2007/PartnerControls"/>
+    <ds:schemaRef ds:uri="http://purl.org/dc/dcmitype/"/>
+  </ds:schemaRefs>
+</ds:datastoreItem>
 </file>
</xml_diff>

<commit_message>
Update gitbook 2022-08-23 18:38:22
</commit_message>
<xml_diff>
--- a/HtmlIntro/HelloHtml.pptx
+++ b/HtmlIntro/HelloHtml.pptx
@@ -5,30 +5,31 @@
     <p:sldMasterId id="2147483676" r:id="rId4"/>
   </p:sldMasterIdLst>
   <p:notesMasterIdLst>
-    <p:notesMasterId r:id="rId14"/>
+    <p:notesMasterId r:id="rId15"/>
   </p:notesMasterIdLst>
   <p:sldIdLst>
-    <p:sldId id="256" r:id="rId5"/>
-    <p:sldId id="264" r:id="rId6"/>
-    <p:sldId id="261" r:id="rId7"/>
-    <p:sldId id="277" r:id="rId8"/>
-    <p:sldId id="302" r:id="rId9"/>
-    <p:sldId id="303" r:id="rId10"/>
-    <p:sldId id="304" r:id="rId11"/>
-    <p:sldId id="305" r:id="rId12"/>
-    <p:sldId id="279" r:id="rId13"/>
+    <p:sldId id="306" r:id="rId5"/>
+    <p:sldId id="256" r:id="rId6"/>
+    <p:sldId id="264" r:id="rId7"/>
+    <p:sldId id="261" r:id="rId8"/>
+    <p:sldId id="277" r:id="rId9"/>
+    <p:sldId id="302" r:id="rId10"/>
+    <p:sldId id="303" r:id="rId11"/>
+    <p:sldId id="304" r:id="rId12"/>
+    <p:sldId id="305" r:id="rId13"/>
+    <p:sldId id="279" r:id="rId14"/>
   </p:sldIdLst>
   <p:sldSz cx="9144000" cy="5143500" type="screen16x9"/>
   <p:notesSz cx="6858000" cy="9144000"/>
   <p:embeddedFontLst>
     <p:embeddedFont>
       <p:font typeface="Krona One" panose="020B0604020202020204" charset="0"/>
-      <p:regular r:id="rId15"/>
+      <p:regular r:id="rId16"/>
     </p:embeddedFont>
     <p:embeddedFont>
       <p:font typeface="Miriam Libre" panose="00000500000000000000" pitchFamily="2" charset="-79"/>
-      <p:regular r:id="rId16"/>
-      <p:bold r:id="rId17"/>
+      <p:regular r:id="rId17"/>
+      <p:bold r:id="rId18"/>
     </p:embeddedFont>
   </p:embeddedFontLst>
   <p:defaultTextStyle>
@@ -841,6 +842,115 @@
         </p:txBody>
       </p:sp>
     </p:spTree>
+    <p:extLst>
+      <p:ext uri="{BB962C8B-B14F-4D97-AF65-F5344CB8AC3E}">
+        <p14:creationId xmlns:p14="http://schemas.microsoft.com/office/powerpoint/2010/main" val="4085975664"/>
+      </p:ext>
+    </p:extLst>
+  </p:cSld>
+  <p:clrMapOvr>
+    <a:masterClrMapping/>
+  </p:clrMapOvr>
+</p:notes>
+</file>
+
+<file path=ppt/notesSlides/notesSlide10.xml><?xml version="1.0" encoding="utf-8"?>
+<p:notes xmlns:a="http://schemas.openxmlformats.org/drawingml/2006/main" xmlns:r="http://schemas.openxmlformats.org/officeDocument/2006/relationships" xmlns:p="http://schemas.openxmlformats.org/presentationml/2006/main" showMasterSp="0" showMasterPhAnim="0">
+  <p:cSld>
+    <p:spTree>
+      <p:nvGrpSpPr>
+        <p:cNvPr id="1" name="Shape 1499"/>
+        <p:cNvGrpSpPr/>
+        <p:nvPr/>
+      </p:nvGrpSpPr>
+      <p:grpSpPr>
+        <a:xfrm>
+          <a:off x="0" y="0"/>
+          <a:ext cx="0" cy="0"/>
+          <a:chOff x="0" y="0"/>
+          <a:chExt cx="0" cy="0"/>
+        </a:xfrm>
+      </p:grpSpPr>
+      <p:sp>
+        <p:nvSpPr>
+          <p:cNvPr id="1500" name="Google Shape;1500;ge30e247bb5_0_42916:notes"/>
+          <p:cNvSpPr>
+            <a:spLocks noGrp="1" noRot="1" noChangeAspect="1"/>
+          </p:cNvSpPr>
+          <p:nvPr>
+            <p:ph type="sldImg" idx="2"/>
+          </p:nvPr>
+        </p:nvSpPr>
+        <p:spPr>
+          <a:xfrm>
+            <a:off x="381000" y="685800"/>
+            <a:ext cx="6096000" cy="3429000"/>
+          </a:xfrm>
+          <a:custGeom>
+            <a:avLst/>
+            <a:gdLst/>
+            <a:ahLst/>
+            <a:cxnLst/>
+            <a:rect l="l" t="t" r="r" b="b"/>
+            <a:pathLst>
+              <a:path w="120000" h="120000" extrusionOk="0">
+                <a:moveTo>
+                  <a:pt x="0" y="0"/>
+                </a:moveTo>
+                <a:lnTo>
+                  <a:pt x="120000" y="0"/>
+                </a:lnTo>
+                <a:lnTo>
+                  <a:pt x="120000" y="120000"/>
+                </a:lnTo>
+                <a:lnTo>
+                  <a:pt x="0" y="120000"/>
+                </a:lnTo>
+                <a:close/>
+              </a:path>
+            </a:pathLst>
+          </a:custGeom>
+        </p:spPr>
+      </p:sp>
+      <p:sp>
+        <p:nvSpPr>
+          <p:cNvPr id="1501" name="Google Shape;1501;ge30e247bb5_0_42916:notes"/>
+          <p:cNvSpPr txBox="1">
+            <a:spLocks noGrp="1"/>
+          </p:cNvSpPr>
+          <p:nvPr>
+            <p:ph type="body" idx="1"/>
+          </p:nvPr>
+        </p:nvSpPr>
+        <p:spPr>
+          <a:xfrm>
+            <a:off x="685800" y="4343400"/>
+            <a:ext cx="5486400" cy="4114800"/>
+          </a:xfrm>
+          <a:prstGeom prst="rect">
+            <a:avLst/>
+          </a:prstGeom>
+        </p:spPr>
+        <p:txBody>
+          <a:bodyPr spcFirstLastPara="1" wrap="square" lIns="91425" tIns="91425" rIns="91425" bIns="91425" anchor="t" anchorCtr="0">
+            <a:noAutofit/>
+          </a:bodyPr>
+          <a:lstStyle/>
+          <a:p>
+            <a:pPr marL="0" lvl="0" indent="0" algn="l" rtl="0">
+              <a:spcBef>
+                <a:spcPts val="0"/>
+              </a:spcBef>
+              <a:spcAft>
+                <a:spcPts val="0"/>
+              </a:spcAft>
+              <a:buNone/>
+            </a:pPr>
+            <a:endParaRPr/>
+          </a:p>
+        </p:txBody>
+      </p:sp>
+    </p:spTree>
   </p:cSld>
   <p:clrMapOvr>
     <a:masterClrMapping/>
@@ -849,6 +959,134 @@
 </file>
 
 <file path=ppt/notesSlides/notesSlide2.xml><?xml version="1.0" encoding="utf-8"?>
+<p:notes xmlns:a="http://schemas.openxmlformats.org/drawingml/2006/main" xmlns:r="http://schemas.openxmlformats.org/officeDocument/2006/relationships" xmlns:p="http://schemas.openxmlformats.org/presentationml/2006/main" showMasterSp="0" showMasterPhAnim="0">
+  <p:cSld>
+    <p:spTree>
+      <p:nvGrpSpPr>
+        <p:cNvPr id="1" name="Shape 439"/>
+        <p:cNvGrpSpPr/>
+        <p:nvPr/>
+      </p:nvGrpSpPr>
+      <p:grpSpPr>
+        <a:xfrm>
+          <a:off x="0" y="0"/>
+          <a:ext cx="0" cy="0"/>
+          <a:chOff x="0" y="0"/>
+          <a:chExt cx="0" cy="0"/>
+        </a:xfrm>
+      </p:grpSpPr>
+      <p:sp>
+        <p:nvSpPr>
+          <p:cNvPr id="440" name="Google Shape;440;p:notes"/>
+          <p:cNvSpPr>
+            <a:spLocks noGrp="1" noRot="1" noChangeAspect="1"/>
+          </p:cNvSpPr>
+          <p:nvPr>
+            <p:ph type="sldImg" idx="2"/>
+          </p:nvPr>
+        </p:nvSpPr>
+        <p:spPr>
+          <a:xfrm>
+            <a:off x="381000" y="685800"/>
+            <a:ext cx="6096000" cy="3429000"/>
+          </a:xfrm>
+          <a:custGeom>
+            <a:avLst/>
+            <a:gdLst/>
+            <a:ahLst/>
+            <a:cxnLst/>
+            <a:rect l="l" t="t" r="r" b="b"/>
+            <a:pathLst>
+              <a:path w="120000" h="120000" extrusionOk="0">
+                <a:moveTo>
+                  <a:pt x="0" y="0"/>
+                </a:moveTo>
+                <a:lnTo>
+                  <a:pt x="120000" y="0"/>
+                </a:lnTo>
+                <a:lnTo>
+                  <a:pt x="120000" y="120000"/>
+                </a:lnTo>
+                <a:lnTo>
+                  <a:pt x="0" y="120000"/>
+                </a:lnTo>
+                <a:close/>
+              </a:path>
+            </a:pathLst>
+          </a:custGeom>
+        </p:spPr>
+      </p:sp>
+      <p:sp>
+        <p:nvSpPr>
+          <p:cNvPr id="441" name="Google Shape;441;p:notes"/>
+          <p:cNvSpPr txBox="1">
+            <a:spLocks noGrp="1"/>
+          </p:cNvSpPr>
+          <p:nvPr>
+            <p:ph type="body" idx="1"/>
+          </p:nvPr>
+        </p:nvSpPr>
+        <p:spPr>
+          <a:xfrm>
+            <a:off x="685800" y="4343400"/>
+            <a:ext cx="5486400" cy="4114800"/>
+          </a:xfrm>
+          <a:prstGeom prst="rect">
+            <a:avLst/>
+          </a:prstGeom>
+        </p:spPr>
+        <p:txBody>
+          <a:bodyPr spcFirstLastPara="1" wrap="square" lIns="91425" tIns="91425" rIns="91425" bIns="91425" anchor="t" anchorCtr="0">
+            <a:noAutofit/>
+          </a:bodyPr>
+          <a:lstStyle/>
+          <a:p>
+            <a:pPr marL="0" lvl="0" indent="0" algn="l" rtl="0">
+              <a:lnSpc>
+                <a:spcPct val="115000"/>
+              </a:lnSpc>
+              <a:spcBef>
+                <a:spcPts val="0"/>
+              </a:spcBef>
+              <a:spcAft>
+                <a:spcPts val="0"/>
+              </a:spcAft>
+              <a:buClr>
+                <a:schemeClr val="dk1"/>
+              </a:buClr>
+              <a:buSzPts val="1100"/>
+              <a:buFont typeface="Arial"/>
+              <a:buNone/>
+            </a:pPr>
+            <a:endParaRPr sz="850">
+              <a:solidFill>
+                <a:srgbClr val="5F7D96"/>
+              </a:solidFill>
+            </a:endParaRPr>
+          </a:p>
+          <a:p>
+            <a:pPr marL="0" lvl="0" indent="0" algn="l" rtl="0">
+              <a:spcBef>
+                <a:spcPts val="0"/>
+              </a:spcBef>
+              <a:spcAft>
+                <a:spcPts val="0"/>
+              </a:spcAft>
+              <a:buNone/>
+            </a:pPr>
+            <a:endParaRPr/>
+          </a:p>
+        </p:txBody>
+      </p:sp>
+    </p:spTree>
+  </p:cSld>
+  <p:clrMapOvr>
+    <a:masterClrMapping/>
+  </p:clrMapOvr>
+</p:notes>
+</file>
+
+<file path=ppt/notesSlides/notesSlide3.xml><?xml version="1.0" encoding="utf-8"?>
 <p:notes xmlns:a="http://schemas.openxmlformats.org/drawingml/2006/main" xmlns:r="http://schemas.openxmlformats.org/officeDocument/2006/relationships" xmlns:p="http://schemas.openxmlformats.org/presentationml/2006/main" showMasterSp="0" showMasterPhAnim="0">
   <p:cSld>
     <p:spTree>
@@ -961,7 +1199,7 @@
 </p:notes>
 </file>
 
-<file path=ppt/notesSlides/notesSlide3.xml><?xml version="1.0" encoding="utf-8"?>
+<file path=ppt/notesSlides/notesSlide4.xml><?xml version="1.0" encoding="utf-8"?>
 <p:notes xmlns:a="http://schemas.openxmlformats.org/drawingml/2006/main" xmlns:r="http://schemas.openxmlformats.org/officeDocument/2006/relationships" xmlns:p="http://schemas.openxmlformats.org/presentationml/2006/main" showMasterSp="0" showMasterPhAnim="0">
   <p:cSld>
     <p:spTree>
@@ -1139,7 +1377,7 @@
 </p:notes>
 </file>
 
-<file path=ppt/notesSlides/notesSlide4.xml><?xml version="1.0" encoding="utf-8"?>
+<file path=ppt/notesSlides/notesSlide5.xml><?xml version="1.0" encoding="utf-8"?>
 <p:notes xmlns:a="http://schemas.openxmlformats.org/drawingml/2006/main" xmlns:r="http://schemas.openxmlformats.org/officeDocument/2006/relationships" xmlns:p="http://schemas.openxmlformats.org/presentationml/2006/main" showMasterSp="0" showMasterPhAnim="0">
   <p:cSld>
     <p:spTree>
@@ -1273,7 +1511,7 @@
 </p:notes>
 </file>
 
-<file path=ppt/notesSlides/notesSlide5.xml><?xml version="1.0" encoding="utf-8"?>
+<file path=ppt/notesSlides/notesSlide6.xml><?xml version="1.0" encoding="utf-8"?>
 <p:notes xmlns:a="http://schemas.openxmlformats.org/drawingml/2006/main" xmlns:r="http://schemas.openxmlformats.org/officeDocument/2006/relationships" xmlns:p="http://schemas.openxmlformats.org/presentationml/2006/main" showMasterSp="0" showMasterPhAnim="0">
   <p:cSld>
     <p:spTree>
@@ -1407,7 +1645,7 @@
 </p:notes>
 </file>
 
-<file path=ppt/notesSlides/notesSlide6.xml><?xml version="1.0" encoding="utf-8"?>
+<file path=ppt/notesSlides/notesSlide7.xml><?xml version="1.0" encoding="utf-8"?>
 <p:notes xmlns:a="http://schemas.openxmlformats.org/drawingml/2006/main" xmlns:r="http://schemas.openxmlformats.org/officeDocument/2006/relationships" xmlns:p="http://schemas.openxmlformats.org/presentationml/2006/main" showMasterSp="0" showMasterPhAnim="0">
   <p:cSld>
     <p:spTree>
@@ -1531,7 +1769,7 @@
 </p:notes>
 </file>
 
-<file path=ppt/notesSlides/notesSlide7.xml><?xml version="1.0" encoding="utf-8"?>
+<file path=ppt/notesSlides/notesSlide8.xml><?xml version="1.0" encoding="utf-8"?>
 <p:notes xmlns:a="http://schemas.openxmlformats.org/drawingml/2006/main" xmlns:r="http://schemas.openxmlformats.org/officeDocument/2006/relationships" xmlns:p="http://schemas.openxmlformats.org/presentationml/2006/main" showMasterSp="0" showMasterPhAnim="0">
   <p:cSld>
     <p:spTree>
@@ -1674,7 +1912,7 @@
 </p:notes>
 </file>
 
-<file path=ppt/notesSlides/notesSlide8.xml><?xml version="1.0" encoding="utf-8"?>
+<file path=ppt/notesSlides/notesSlide9.xml><?xml version="1.0" encoding="utf-8"?>
 <p:notes xmlns:a="http://schemas.openxmlformats.org/drawingml/2006/main" xmlns:r="http://schemas.openxmlformats.org/officeDocument/2006/relationships" xmlns:p="http://schemas.openxmlformats.org/presentationml/2006/main" showMasterSp="0" showMasterPhAnim="0">
   <p:cSld>
     <p:spTree>
@@ -1782,110 +2020,6 @@
         <p14:creationId xmlns:p14="http://schemas.microsoft.com/office/powerpoint/2010/main" val="4051457860"/>
       </p:ext>
     </p:extLst>
-  </p:cSld>
-  <p:clrMapOvr>
-    <a:masterClrMapping/>
-  </p:clrMapOvr>
-</p:notes>
-</file>
-
-<file path=ppt/notesSlides/notesSlide9.xml><?xml version="1.0" encoding="utf-8"?>
-<p:notes xmlns:a="http://schemas.openxmlformats.org/drawingml/2006/main" xmlns:r="http://schemas.openxmlformats.org/officeDocument/2006/relationships" xmlns:p="http://schemas.openxmlformats.org/presentationml/2006/main" showMasterSp="0" showMasterPhAnim="0">
-  <p:cSld>
-    <p:spTree>
-      <p:nvGrpSpPr>
-        <p:cNvPr id="1" name="Shape 1499"/>
-        <p:cNvGrpSpPr/>
-        <p:nvPr/>
-      </p:nvGrpSpPr>
-      <p:grpSpPr>
-        <a:xfrm>
-          <a:off x="0" y="0"/>
-          <a:ext cx="0" cy="0"/>
-          <a:chOff x="0" y="0"/>
-          <a:chExt cx="0" cy="0"/>
-        </a:xfrm>
-      </p:grpSpPr>
-      <p:sp>
-        <p:nvSpPr>
-          <p:cNvPr id="1500" name="Google Shape;1500;ge30e247bb5_0_42916:notes"/>
-          <p:cNvSpPr>
-            <a:spLocks noGrp="1" noRot="1" noChangeAspect="1"/>
-          </p:cNvSpPr>
-          <p:nvPr>
-            <p:ph type="sldImg" idx="2"/>
-          </p:nvPr>
-        </p:nvSpPr>
-        <p:spPr>
-          <a:xfrm>
-            <a:off x="381000" y="685800"/>
-            <a:ext cx="6096000" cy="3429000"/>
-          </a:xfrm>
-          <a:custGeom>
-            <a:avLst/>
-            <a:gdLst/>
-            <a:ahLst/>
-            <a:cxnLst/>
-            <a:rect l="l" t="t" r="r" b="b"/>
-            <a:pathLst>
-              <a:path w="120000" h="120000" extrusionOk="0">
-                <a:moveTo>
-                  <a:pt x="0" y="0"/>
-                </a:moveTo>
-                <a:lnTo>
-                  <a:pt x="120000" y="0"/>
-                </a:lnTo>
-                <a:lnTo>
-                  <a:pt x="120000" y="120000"/>
-                </a:lnTo>
-                <a:lnTo>
-                  <a:pt x="0" y="120000"/>
-                </a:lnTo>
-                <a:close/>
-              </a:path>
-            </a:pathLst>
-          </a:custGeom>
-        </p:spPr>
-      </p:sp>
-      <p:sp>
-        <p:nvSpPr>
-          <p:cNvPr id="1501" name="Google Shape;1501;ge30e247bb5_0_42916:notes"/>
-          <p:cNvSpPr txBox="1">
-            <a:spLocks noGrp="1"/>
-          </p:cNvSpPr>
-          <p:nvPr>
-            <p:ph type="body" idx="1"/>
-          </p:nvPr>
-        </p:nvSpPr>
-        <p:spPr>
-          <a:xfrm>
-            <a:off x="685800" y="4343400"/>
-            <a:ext cx="5486400" cy="4114800"/>
-          </a:xfrm>
-          <a:prstGeom prst="rect">
-            <a:avLst/>
-          </a:prstGeom>
-        </p:spPr>
-        <p:txBody>
-          <a:bodyPr spcFirstLastPara="1" wrap="square" lIns="91425" tIns="91425" rIns="91425" bIns="91425" anchor="t" anchorCtr="0">
-            <a:noAutofit/>
-          </a:bodyPr>
-          <a:lstStyle/>
-          <a:p>
-            <a:pPr marL="0" lvl="0" indent="0" algn="l" rtl="0">
-              <a:spcBef>
-                <a:spcPts val="0"/>
-              </a:spcBef>
-              <a:spcAft>
-                <a:spcPts val="0"/>
-              </a:spcAft>
-              <a:buNone/>
-            </a:pPr>
-            <a:endParaRPr/>
-          </a:p>
-        </p:txBody>
-      </p:sp>
-    </p:spTree>
   </p:cSld>
   <p:clrMapOvr>
     <a:masterClrMapping/>
@@ -8282,19 +8416,12 @@
               <a:buNone/>
             </a:pPr>
             <a:r>
+              <a:rPr lang="en-US" sz="5400" dirty="0"/>
+              <a:t>b</a:t>
+            </a:r>
+            <a:r>
               <a:rPr lang="en" sz="5400" dirty="0"/>
-              <a:t>HELLO </a:t>
-            </a:r>
-            <a:br>
-              <a:rPr lang="en" sz="5400" dirty="0"/>
-            </a:br>
-            <a:r>
-              <a:rPr lang="en" sz="6600" dirty="0">
-                <a:highlight>
-                  <a:schemeClr val="accent3"/>
-                </a:highlight>
-              </a:rPr>
-              <a:t>HTML!</a:t>
+              <a:t>it.ly/ucshyland</a:t>
             </a:r>
             <a:endParaRPr sz="5400" dirty="0">
               <a:highlight>
@@ -8340,7 +8467,7 @@
             </a:pPr>
             <a:r>
               <a:rPr lang="en" sz="1800" dirty="0"/>
-              <a:t>Building Webpages Hy-Tech Camp</a:t>
+              <a:t>Code with Hyland Academy @ UCS</a:t>
             </a:r>
             <a:endParaRPr sz="1800" dirty="0"/>
           </a:p>
@@ -11555,6 +11682,11 @@
         </p:grpSp>
       </p:grpSp>
     </p:spTree>
+    <p:extLst>
+      <p:ext uri="{BB962C8B-B14F-4D97-AF65-F5344CB8AC3E}">
+        <p14:creationId xmlns:p14="http://schemas.microsoft.com/office/powerpoint/2010/main" val="2275565221"/>
+      </p:ext>
+    </p:extLst>
   </p:cSld>
   <p:clrMapOvr>
     <a:masterClrMapping/>
@@ -11562,7 +11694,3844 @@
 </p:sld>
 </file>
 
+<file path=ppt/slides/slide10.xml><?xml version="1.0" encoding="utf-8"?>
+<p:sld xmlns:a="http://schemas.openxmlformats.org/drawingml/2006/main" xmlns:r="http://schemas.openxmlformats.org/officeDocument/2006/relationships" xmlns:p="http://schemas.openxmlformats.org/presentationml/2006/main">
+  <p:cSld>
+    <p:spTree>
+      <p:nvGrpSpPr>
+        <p:cNvPr id="1" name="Shape 1502"/>
+        <p:cNvGrpSpPr/>
+        <p:nvPr/>
+      </p:nvGrpSpPr>
+      <p:grpSpPr>
+        <a:xfrm>
+          <a:off x="0" y="0"/>
+          <a:ext cx="0" cy="0"/>
+          <a:chOff x="0" y="0"/>
+          <a:chExt cx="0" cy="0"/>
+        </a:xfrm>
+      </p:grpSpPr>
+      <p:sp>
+        <p:nvSpPr>
+          <p:cNvPr id="1503" name="Google Shape;1503;p54"/>
+          <p:cNvSpPr txBox="1">
+            <a:spLocks noGrp="1"/>
+          </p:cNvSpPr>
+          <p:nvPr>
+            <p:ph type="subTitle" idx="1"/>
+          </p:nvPr>
+        </p:nvSpPr>
+        <p:spPr>
+          <a:xfrm>
+            <a:off x="693494" y="2122164"/>
+            <a:ext cx="7171671" cy="418291"/>
+          </a:xfrm>
+          <a:prstGeom prst="rect">
+            <a:avLst/>
+          </a:prstGeom>
+        </p:spPr>
+        <p:txBody>
+          <a:bodyPr spcFirstLastPara="1" wrap="square" lIns="91425" tIns="91425" rIns="91425" bIns="91425" anchor="t" anchorCtr="0">
+            <a:noAutofit/>
+          </a:bodyPr>
+          <a:lstStyle/>
+          <a:p>
+            <a:pPr marL="0" lvl="0" indent="0" algn="l" rtl="0">
+              <a:spcBef>
+                <a:spcPts val="0"/>
+              </a:spcBef>
+              <a:spcAft>
+                <a:spcPts val="0"/>
+              </a:spcAft>
+              <a:buNone/>
+            </a:pPr>
+            <a:r>
+              <a:rPr lang="en" sz="2400" dirty="0"/>
+              <a:t>WHAT QUESTIONS DO YOU HAVE?</a:t>
+            </a:r>
+            <a:endParaRPr sz="2400" dirty="0"/>
+          </a:p>
+        </p:txBody>
+      </p:sp>
+      <p:sp>
+        <p:nvSpPr>
+          <p:cNvPr id="1504" name="Google Shape;1504;p54"/>
+          <p:cNvSpPr txBox="1">
+            <a:spLocks noGrp="1"/>
+          </p:cNvSpPr>
+          <p:nvPr>
+            <p:ph type="ctrTitle"/>
+          </p:nvPr>
+        </p:nvSpPr>
+        <p:spPr>
+          <a:xfrm>
+            <a:off x="693494" y="1305339"/>
+            <a:ext cx="6601723" cy="856816"/>
+          </a:xfrm>
+          <a:prstGeom prst="rect">
+            <a:avLst/>
+          </a:prstGeom>
+        </p:spPr>
+        <p:txBody>
+          <a:bodyPr spcFirstLastPara="1" wrap="square" lIns="91425" tIns="91425" rIns="91425" bIns="91425" anchor="t" anchorCtr="0">
+            <a:noAutofit/>
+          </a:bodyPr>
+          <a:lstStyle/>
+          <a:p>
+            <a:pPr marL="0" lvl="0" indent="0" algn="l" rtl="0">
+              <a:spcBef>
+                <a:spcPts val="0"/>
+              </a:spcBef>
+              <a:spcAft>
+                <a:spcPts val="0"/>
+              </a:spcAft>
+              <a:buNone/>
+            </a:pPr>
+            <a:r>
+              <a:rPr lang="en" sz="4800" dirty="0"/>
+              <a:t>THANK YOU!</a:t>
+            </a:r>
+            <a:endParaRPr sz="4800" dirty="0"/>
+          </a:p>
+        </p:txBody>
+      </p:sp>
+      <p:sp>
+        <p:nvSpPr>
+          <p:cNvPr id="1542" name="Google Shape;1542;p54"/>
+          <p:cNvSpPr/>
+          <p:nvPr/>
+        </p:nvSpPr>
+        <p:spPr>
+          <a:xfrm>
+            <a:off x="570050" y="3746300"/>
+            <a:ext cx="939600" cy="939600"/>
+          </a:xfrm>
+          <a:prstGeom prst="snip1Rect">
+            <a:avLst>
+              <a:gd name="adj" fmla="val 11329"/>
+            </a:avLst>
+          </a:prstGeom>
+          <a:solidFill>
+            <a:schemeClr val="lt1"/>
+          </a:solidFill>
+          <a:ln w="28575" cap="flat" cmpd="sng">
+            <a:solidFill>
+              <a:schemeClr val="dk1"/>
+            </a:solidFill>
+            <a:prstDash val="solid"/>
+            <a:round/>
+            <a:headEnd type="none" w="sm" len="sm"/>
+            <a:tailEnd type="none" w="sm" len="sm"/>
+          </a:ln>
+        </p:spPr>
+        <p:txBody>
+          <a:bodyPr spcFirstLastPara="1" wrap="square" lIns="91425" tIns="91425" rIns="91425" bIns="91425" anchor="ctr" anchorCtr="0">
+            <a:noAutofit/>
+          </a:bodyPr>
+          <a:lstStyle/>
+          <a:p>
+            <a:pPr marL="0" lvl="0" indent="0" algn="l" rtl="0">
+              <a:spcBef>
+                <a:spcPts val="0"/>
+              </a:spcBef>
+              <a:spcAft>
+                <a:spcPts val="0"/>
+              </a:spcAft>
+              <a:buNone/>
+            </a:pPr>
+            <a:endParaRPr/>
+          </a:p>
+        </p:txBody>
+      </p:sp>
+      <p:sp>
+        <p:nvSpPr>
+          <p:cNvPr id="1543" name="Google Shape;1543;p54"/>
+          <p:cNvSpPr/>
+          <p:nvPr/>
+        </p:nvSpPr>
+        <p:spPr>
+          <a:xfrm>
+            <a:off x="490150" y="3665400"/>
+            <a:ext cx="939600" cy="939600"/>
+          </a:xfrm>
+          <a:prstGeom prst="snip1Rect">
+            <a:avLst>
+              <a:gd name="adj" fmla="val 11329"/>
+            </a:avLst>
+          </a:prstGeom>
+          <a:solidFill>
+            <a:schemeClr val="accent1"/>
+          </a:solidFill>
+          <a:ln w="28575" cap="flat" cmpd="sng">
+            <a:solidFill>
+              <a:schemeClr val="dk1"/>
+            </a:solidFill>
+            <a:prstDash val="solid"/>
+            <a:round/>
+            <a:headEnd type="none" w="sm" len="sm"/>
+            <a:tailEnd type="none" w="sm" len="sm"/>
+          </a:ln>
+        </p:spPr>
+        <p:txBody>
+          <a:bodyPr spcFirstLastPara="1" wrap="square" lIns="91425" tIns="91425" rIns="91425" bIns="91425" anchor="ctr" anchorCtr="0">
+            <a:noAutofit/>
+          </a:bodyPr>
+          <a:lstStyle/>
+          <a:p>
+            <a:pPr marL="0" lvl="0" indent="0" algn="l" rtl="0">
+              <a:spcBef>
+                <a:spcPts val="0"/>
+              </a:spcBef>
+              <a:spcAft>
+                <a:spcPts val="0"/>
+              </a:spcAft>
+              <a:buNone/>
+            </a:pPr>
+            <a:endParaRPr/>
+          </a:p>
+        </p:txBody>
+      </p:sp>
+      <p:sp>
+        <p:nvSpPr>
+          <p:cNvPr id="1544" name="Google Shape;1544;p54"/>
+          <p:cNvSpPr/>
+          <p:nvPr/>
+        </p:nvSpPr>
+        <p:spPr>
+          <a:xfrm>
+            <a:off x="1708675" y="3746300"/>
+            <a:ext cx="939600" cy="939600"/>
+          </a:xfrm>
+          <a:prstGeom prst="snip1Rect">
+            <a:avLst>
+              <a:gd name="adj" fmla="val 11329"/>
+            </a:avLst>
+          </a:prstGeom>
+          <a:solidFill>
+            <a:schemeClr val="lt1"/>
+          </a:solidFill>
+          <a:ln w="28575" cap="flat" cmpd="sng">
+            <a:solidFill>
+              <a:schemeClr val="dk1"/>
+            </a:solidFill>
+            <a:prstDash val="solid"/>
+            <a:round/>
+            <a:headEnd type="none" w="sm" len="sm"/>
+            <a:tailEnd type="none" w="sm" len="sm"/>
+          </a:ln>
+        </p:spPr>
+        <p:txBody>
+          <a:bodyPr spcFirstLastPara="1" wrap="square" lIns="91425" tIns="91425" rIns="91425" bIns="91425" anchor="ctr" anchorCtr="0">
+            <a:noAutofit/>
+          </a:bodyPr>
+          <a:lstStyle/>
+          <a:p>
+            <a:pPr marL="0" lvl="0" indent="0" algn="l" rtl="0">
+              <a:spcBef>
+                <a:spcPts val="0"/>
+              </a:spcBef>
+              <a:spcAft>
+                <a:spcPts val="0"/>
+              </a:spcAft>
+              <a:buNone/>
+            </a:pPr>
+            <a:endParaRPr/>
+          </a:p>
+        </p:txBody>
+      </p:sp>
+      <p:sp>
+        <p:nvSpPr>
+          <p:cNvPr id="1545" name="Google Shape;1545;p54"/>
+          <p:cNvSpPr/>
+          <p:nvPr/>
+        </p:nvSpPr>
+        <p:spPr>
+          <a:xfrm>
+            <a:off x="1628775" y="3665400"/>
+            <a:ext cx="939600" cy="939600"/>
+          </a:xfrm>
+          <a:prstGeom prst="snip1Rect">
+            <a:avLst>
+              <a:gd name="adj" fmla="val 11329"/>
+            </a:avLst>
+          </a:prstGeom>
+          <a:solidFill>
+            <a:schemeClr val="accent2"/>
+          </a:solidFill>
+          <a:ln w="28575" cap="flat" cmpd="sng">
+            <a:solidFill>
+              <a:schemeClr val="dk1"/>
+            </a:solidFill>
+            <a:prstDash val="solid"/>
+            <a:round/>
+            <a:headEnd type="none" w="sm" len="sm"/>
+            <a:tailEnd type="none" w="sm" len="sm"/>
+          </a:ln>
+        </p:spPr>
+        <p:txBody>
+          <a:bodyPr spcFirstLastPara="1" wrap="square" lIns="91425" tIns="91425" rIns="91425" bIns="91425" anchor="ctr" anchorCtr="0">
+            <a:noAutofit/>
+          </a:bodyPr>
+          <a:lstStyle/>
+          <a:p>
+            <a:pPr marL="0" lvl="0" indent="0" algn="l" rtl="0">
+              <a:spcBef>
+                <a:spcPts val="0"/>
+              </a:spcBef>
+              <a:spcAft>
+                <a:spcPts val="0"/>
+              </a:spcAft>
+              <a:buNone/>
+            </a:pPr>
+            <a:endParaRPr/>
+          </a:p>
+        </p:txBody>
+      </p:sp>
+      <p:sp>
+        <p:nvSpPr>
+          <p:cNvPr id="1546" name="Google Shape;1546;p54"/>
+          <p:cNvSpPr/>
+          <p:nvPr/>
+        </p:nvSpPr>
+        <p:spPr>
+          <a:xfrm>
+            <a:off x="2847300" y="3746300"/>
+            <a:ext cx="939600" cy="939600"/>
+          </a:xfrm>
+          <a:prstGeom prst="snip1Rect">
+            <a:avLst>
+              <a:gd name="adj" fmla="val 11329"/>
+            </a:avLst>
+          </a:prstGeom>
+          <a:solidFill>
+            <a:schemeClr val="lt1"/>
+          </a:solidFill>
+          <a:ln w="28575" cap="flat" cmpd="sng">
+            <a:solidFill>
+              <a:schemeClr val="dk1"/>
+            </a:solidFill>
+            <a:prstDash val="solid"/>
+            <a:round/>
+            <a:headEnd type="none" w="sm" len="sm"/>
+            <a:tailEnd type="none" w="sm" len="sm"/>
+          </a:ln>
+        </p:spPr>
+        <p:txBody>
+          <a:bodyPr spcFirstLastPara="1" wrap="square" lIns="91425" tIns="91425" rIns="91425" bIns="91425" anchor="ctr" anchorCtr="0">
+            <a:noAutofit/>
+          </a:bodyPr>
+          <a:lstStyle/>
+          <a:p>
+            <a:pPr marL="0" lvl="0" indent="0" algn="l" rtl="0">
+              <a:spcBef>
+                <a:spcPts val="0"/>
+              </a:spcBef>
+              <a:spcAft>
+                <a:spcPts val="0"/>
+              </a:spcAft>
+              <a:buNone/>
+            </a:pPr>
+            <a:endParaRPr/>
+          </a:p>
+        </p:txBody>
+      </p:sp>
+      <p:sp>
+        <p:nvSpPr>
+          <p:cNvPr id="1547" name="Google Shape;1547;p54"/>
+          <p:cNvSpPr/>
+          <p:nvPr/>
+        </p:nvSpPr>
+        <p:spPr>
+          <a:xfrm>
+            <a:off x="2767400" y="3665400"/>
+            <a:ext cx="939600" cy="939600"/>
+          </a:xfrm>
+          <a:prstGeom prst="snip1Rect">
+            <a:avLst>
+              <a:gd name="adj" fmla="val 11329"/>
+            </a:avLst>
+          </a:prstGeom>
+          <a:solidFill>
+            <a:schemeClr val="lt2"/>
+          </a:solidFill>
+          <a:ln w="28575" cap="flat" cmpd="sng">
+            <a:solidFill>
+              <a:schemeClr val="dk1"/>
+            </a:solidFill>
+            <a:prstDash val="solid"/>
+            <a:round/>
+            <a:headEnd type="none" w="sm" len="sm"/>
+            <a:tailEnd type="none" w="sm" len="sm"/>
+          </a:ln>
+        </p:spPr>
+        <p:txBody>
+          <a:bodyPr spcFirstLastPara="1" wrap="square" lIns="91425" tIns="91425" rIns="91425" bIns="91425" anchor="ctr" anchorCtr="0">
+            <a:noAutofit/>
+          </a:bodyPr>
+          <a:lstStyle/>
+          <a:p>
+            <a:pPr marL="0" lvl="0" indent="0" algn="l" rtl="0">
+              <a:spcBef>
+                <a:spcPts val="0"/>
+              </a:spcBef>
+              <a:spcAft>
+                <a:spcPts val="0"/>
+              </a:spcAft>
+              <a:buNone/>
+            </a:pPr>
+            <a:endParaRPr/>
+          </a:p>
+        </p:txBody>
+      </p:sp>
+      <p:sp>
+        <p:nvSpPr>
+          <p:cNvPr id="3" name="Rectangle 2"/>
+          <p:cNvSpPr/>
+          <p:nvPr/>
+        </p:nvSpPr>
+        <p:spPr>
+          <a:xfrm>
+            <a:off x="4260574" y="3856383"/>
+            <a:ext cx="4187687" cy="556591"/>
+          </a:xfrm>
+          <a:prstGeom prst="rect">
+            <a:avLst/>
+          </a:prstGeom>
+          <a:solidFill>
+            <a:schemeClr val="bg1"/>
+          </a:solidFill>
+          <a:ln>
+            <a:solidFill>
+              <a:schemeClr val="bg1"/>
+            </a:solidFill>
+          </a:ln>
+        </p:spPr>
+        <p:style>
+          <a:lnRef idx="2">
+            <a:schemeClr val="accent1">
+              <a:shade val="50000"/>
+            </a:schemeClr>
+          </a:lnRef>
+          <a:fillRef idx="1">
+            <a:schemeClr val="accent1"/>
+          </a:fillRef>
+          <a:effectRef idx="0">
+            <a:schemeClr val="accent1"/>
+          </a:effectRef>
+          <a:fontRef idx="minor">
+            <a:schemeClr val="lt1"/>
+          </a:fontRef>
+        </p:style>
+        <p:txBody>
+          <a:bodyPr rtlCol="0" anchor="ctr"/>
+          <a:lstStyle/>
+          <a:p>
+            <a:pPr algn="ctr"/>
+            <a:endParaRPr lang="en-US"/>
+          </a:p>
+        </p:txBody>
+      </p:sp>
+    </p:spTree>
+  </p:cSld>
+  <p:clrMapOvr>
+    <a:masterClrMapping/>
+  </p:clrMapOvr>
+  <mc:AlternateContent xmlns:mc="http://schemas.openxmlformats.org/markup-compatibility/2006" xmlns:p14="http://schemas.microsoft.com/office/powerpoint/2010/main">
+    <mc:Choice Requires="p14">
+      <p:transition spd="med" p14:dur="700">
+        <p:fade/>
+      </p:transition>
+    </mc:Choice>
+    <mc:Fallback xmlns="">
+      <p:transition spd="med">
+        <p:fade/>
+      </p:transition>
+    </mc:Fallback>
+  </mc:AlternateContent>
+</p:sld>
+</file>
+
 <file path=ppt/slides/slide2.xml><?xml version="1.0" encoding="utf-8"?>
+<p:sld xmlns:a="http://schemas.openxmlformats.org/drawingml/2006/main" xmlns:r="http://schemas.openxmlformats.org/officeDocument/2006/relationships" xmlns:p="http://schemas.openxmlformats.org/presentationml/2006/main">
+  <p:cSld>
+    <p:spTree>
+      <p:nvGrpSpPr>
+        <p:cNvPr id="1" name="Shape 442"/>
+        <p:cNvGrpSpPr/>
+        <p:nvPr/>
+      </p:nvGrpSpPr>
+      <p:grpSpPr>
+        <a:xfrm>
+          <a:off x="0" y="0"/>
+          <a:ext cx="0" cy="0"/>
+          <a:chOff x="0" y="0"/>
+          <a:chExt cx="0" cy="0"/>
+        </a:xfrm>
+      </p:grpSpPr>
+      <p:sp>
+        <p:nvSpPr>
+          <p:cNvPr id="443" name="Google Shape;443;p31"/>
+          <p:cNvSpPr/>
+          <p:nvPr/>
+        </p:nvSpPr>
+        <p:spPr>
+          <a:xfrm>
+            <a:off x="5517175" y="3746300"/>
+            <a:ext cx="939600" cy="939600"/>
+          </a:xfrm>
+          <a:prstGeom prst="snip1Rect">
+            <a:avLst>
+              <a:gd name="adj" fmla="val 11329"/>
+            </a:avLst>
+          </a:prstGeom>
+          <a:solidFill>
+            <a:schemeClr val="lt1"/>
+          </a:solidFill>
+          <a:ln w="28575" cap="flat" cmpd="sng">
+            <a:solidFill>
+              <a:schemeClr val="dk1"/>
+            </a:solidFill>
+            <a:prstDash val="solid"/>
+            <a:round/>
+            <a:headEnd type="none" w="sm" len="sm"/>
+            <a:tailEnd type="none" w="sm" len="sm"/>
+          </a:ln>
+        </p:spPr>
+        <p:txBody>
+          <a:bodyPr spcFirstLastPara="1" wrap="square" lIns="91425" tIns="91425" rIns="91425" bIns="91425" anchor="ctr" anchorCtr="0">
+            <a:noAutofit/>
+          </a:bodyPr>
+          <a:lstStyle/>
+          <a:p>
+            <a:pPr marL="0" lvl="0" indent="0" algn="l" rtl="0">
+              <a:spcBef>
+                <a:spcPts val="0"/>
+              </a:spcBef>
+              <a:spcAft>
+                <a:spcPts val="0"/>
+              </a:spcAft>
+              <a:buNone/>
+            </a:pPr>
+            <a:endParaRPr/>
+          </a:p>
+        </p:txBody>
+      </p:sp>
+      <p:sp>
+        <p:nvSpPr>
+          <p:cNvPr id="444" name="Google Shape;444;p31"/>
+          <p:cNvSpPr txBox="1">
+            <a:spLocks noGrp="1"/>
+          </p:cNvSpPr>
+          <p:nvPr>
+            <p:ph type="ctrTitle"/>
+          </p:nvPr>
+        </p:nvSpPr>
+        <p:spPr>
+          <a:xfrm>
+            <a:off x="720000" y="1138400"/>
+            <a:ext cx="7704000" cy="2004000"/>
+          </a:xfrm>
+          <a:prstGeom prst="rect">
+            <a:avLst/>
+          </a:prstGeom>
+        </p:spPr>
+        <p:txBody>
+          <a:bodyPr spcFirstLastPara="1" wrap="square" lIns="91425" tIns="91425" rIns="91425" bIns="91425" anchor="b" anchorCtr="0">
+            <a:noAutofit/>
+          </a:bodyPr>
+          <a:lstStyle/>
+          <a:p>
+            <a:pPr marL="0" lvl="0" indent="0" algn="l" rtl="0">
+              <a:spcBef>
+                <a:spcPts val="0"/>
+              </a:spcBef>
+              <a:spcAft>
+                <a:spcPts val="0"/>
+              </a:spcAft>
+              <a:buNone/>
+            </a:pPr>
+            <a:r>
+              <a:rPr lang="en" sz="5400" dirty="0"/>
+              <a:t>HELLO </a:t>
+            </a:r>
+            <a:br>
+              <a:rPr lang="en" sz="5400" dirty="0"/>
+            </a:br>
+            <a:r>
+              <a:rPr lang="en" sz="6600" dirty="0">
+                <a:highlight>
+                  <a:schemeClr val="accent3"/>
+                </a:highlight>
+              </a:rPr>
+              <a:t>HTML!</a:t>
+            </a:r>
+            <a:endParaRPr sz="5400" dirty="0">
+              <a:highlight>
+                <a:schemeClr val="accent3"/>
+              </a:highlight>
+            </a:endParaRPr>
+          </a:p>
+        </p:txBody>
+      </p:sp>
+      <p:sp>
+        <p:nvSpPr>
+          <p:cNvPr id="445" name="Google Shape;445;p31"/>
+          <p:cNvSpPr txBox="1">
+            <a:spLocks noGrp="1"/>
+          </p:cNvSpPr>
+          <p:nvPr>
+            <p:ph type="subTitle" idx="1"/>
+          </p:nvPr>
+        </p:nvSpPr>
+        <p:spPr>
+          <a:xfrm>
+            <a:off x="720000" y="3907725"/>
+            <a:ext cx="4152600" cy="451500"/>
+          </a:xfrm>
+          <a:prstGeom prst="rect">
+            <a:avLst/>
+          </a:prstGeom>
+        </p:spPr>
+        <p:txBody>
+          <a:bodyPr spcFirstLastPara="1" wrap="square" lIns="91425" tIns="91425" rIns="91425" bIns="91425" anchor="t" anchorCtr="0">
+            <a:noAutofit/>
+          </a:bodyPr>
+          <a:lstStyle/>
+          <a:p>
+            <a:pPr marL="0" lvl="0" indent="0" algn="l" rtl="0">
+              <a:spcBef>
+                <a:spcPts val="0"/>
+              </a:spcBef>
+              <a:spcAft>
+                <a:spcPts val="0"/>
+              </a:spcAft>
+              <a:buNone/>
+            </a:pPr>
+            <a:r>
+              <a:rPr lang="en" sz="1800" dirty="0"/>
+              <a:t>Introduction to Web Development</a:t>
+            </a:r>
+            <a:endParaRPr sz="1800" dirty="0"/>
+          </a:p>
+        </p:txBody>
+      </p:sp>
+      <p:sp>
+        <p:nvSpPr>
+          <p:cNvPr id="446" name="Google Shape;446;p31"/>
+          <p:cNvSpPr/>
+          <p:nvPr/>
+        </p:nvSpPr>
+        <p:spPr>
+          <a:xfrm>
+            <a:off x="5437275" y="3665400"/>
+            <a:ext cx="939600" cy="939600"/>
+          </a:xfrm>
+          <a:prstGeom prst="snip1Rect">
+            <a:avLst>
+              <a:gd name="adj" fmla="val 11329"/>
+            </a:avLst>
+          </a:prstGeom>
+          <a:solidFill>
+            <a:schemeClr val="accent1"/>
+          </a:solidFill>
+          <a:ln w="28575" cap="flat" cmpd="sng">
+            <a:solidFill>
+              <a:schemeClr val="dk1"/>
+            </a:solidFill>
+            <a:prstDash val="solid"/>
+            <a:round/>
+            <a:headEnd type="none" w="sm" len="sm"/>
+            <a:tailEnd type="none" w="sm" len="sm"/>
+          </a:ln>
+        </p:spPr>
+        <p:txBody>
+          <a:bodyPr spcFirstLastPara="1" wrap="square" lIns="91425" tIns="91425" rIns="91425" bIns="91425" anchor="ctr" anchorCtr="0">
+            <a:noAutofit/>
+          </a:bodyPr>
+          <a:lstStyle/>
+          <a:p>
+            <a:pPr marL="0" lvl="0" indent="0" algn="l" rtl="0">
+              <a:spcBef>
+                <a:spcPts val="0"/>
+              </a:spcBef>
+              <a:spcAft>
+                <a:spcPts val="0"/>
+              </a:spcAft>
+              <a:buNone/>
+            </a:pPr>
+            <a:endParaRPr/>
+          </a:p>
+        </p:txBody>
+      </p:sp>
+      <p:sp>
+        <p:nvSpPr>
+          <p:cNvPr id="447" name="Google Shape;447;p31"/>
+          <p:cNvSpPr/>
+          <p:nvPr/>
+        </p:nvSpPr>
+        <p:spPr>
+          <a:xfrm>
+            <a:off x="6655800" y="3746300"/>
+            <a:ext cx="939600" cy="939600"/>
+          </a:xfrm>
+          <a:prstGeom prst="snip1Rect">
+            <a:avLst>
+              <a:gd name="adj" fmla="val 11329"/>
+            </a:avLst>
+          </a:prstGeom>
+          <a:solidFill>
+            <a:schemeClr val="lt1"/>
+          </a:solidFill>
+          <a:ln w="28575" cap="flat" cmpd="sng">
+            <a:solidFill>
+              <a:schemeClr val="dk1"/>
+            </a:solidFill>
+            <a:prstDash val="solid"/>
+            <a:round/>
+            <a:headEnd type="none" w="sm" len="sm"/>
+            <a:tailEnd type="none" w="sm" len="sm"/>
+          </a:ln>
+        </p:spPr>
+        <p:txBody>
+          <a:bodyPr spcFirstLastPara="1" wrap="square" lIns="91425" tIns="91425" rIns="91425" bIns="91425" anchor="ctr" anchorCtr="0">
+            <a:noAutofit/>
+          </a:bodyPr>
+          <a:lstStyle/>
+          <a:p>
+            <a:pPr marL="0" lvl="0" indent="0" algn="l" rtl="0">
+              <a:spcBef>
+                <a:spcPts val="0"/>
+              </a:spcBef>
+              <a:spcAft>
+                <a:spcPts val="0"/>
+              </a:spcAft>
+              <a:buNone/>
+            </a:pPr>
+            <a:endParaRPr/>
+          </a:p>
+        </p:txBody>
+      </p:sp>
+      <p:sp>
+        <p:nvSpPr>
+          <p:cNvPr id="448" name="Google Shape;448;p31"/>
+          <p:cNvSpPr/>
+          <p:nvPr/>
+        </p:nvSpPr>
+        <p:spPr>
+          <a:xfrm>
+            <a:off x="6575900" y="3665400"/>
+            <a:ext cx="939600" cy="939600"/>
+          </a:xfrm>
+          <a:prstGeom prst="snip1Rect">
+            <a:avLst>
+              <a:gd name="adj" fmla="val 11329"/>
+            </a:avLst>
+          </a:prstGeom>
+          <a:solidFill>
+            <a:schemeClr val="accent2"/>
+          </a:solidFill>
+          <a:ln w="28575" cap="flat" cmpd="sng">
+            <a:solidFill>
+              <a:schemeClr val="dk1"/>
+            </a:solidFill>
+            <a:prstDash val="solid"/>
+            <a:round/>
+            <a:headEnd type="none" w="sm" len="sm"/>
+            <a:tailEnd type="none" w="sm" len="sm"/>
+          </a:ln>
+        </p:spPr>
+        <p:txBody>
+          <a:bodyPr spcFirstLastPara="1" wrap="square" lIns="91425" tIns="91425" rIns="91425" bIns="91425" anchor="ctr" anchorCtr="0">
+            <a:noAutofit/>
+          </a:bodyPr>
+          <a:lstStyle/>
+          <a:p>
+            <a:pPr marL="0" lvl="0" indent="0" algn="l" rtl="0">
+              <a:spcBef>
+                <a:spcPts val="0"/>
+              </a:spcBef>
+              <a:spcAft>
+                <a:spcPts val="0"/>
+              </a:spcAft>
+              <a:buNone/>
+            </a:pPr>
+            <a:endParaRPr/>
+          </a:p>
+        </p:txBody>
+      </p:sp>
+      <p:sp>
+        <p:nvSpPr>
+          <p:cNvPr id="449" name="Google Shape;449;p31"/>
+          <p:cNvSpPr/>
+          <p:nvPr/>
+        </p:nvSpPr>
+        <p:spPr>
+          <a:xfrm>
+            <a:off x="7794425" y="3746300"/>
+            <a:ext cx="939600" cy="939600"/>
+          </a:xfrm>
+          <a:prstGeom prst="snip1Rect">
+            <a:avLst>
+              <a:gd name="adj" fmla="val 11329"/>
+            </a:avLst>
+          </a:prstGeom>
+          <a:solidFill>
+            <a:schemeClr val="lt1"/>
+          </a:solidFill>
+          <a:ln w="28575" cap="flat" cmpd="sng">
+            <a:solidFill>
+              <a:schemeClr val="dk1"/>
+            </a:solidFill>
+            <a:prstDash val="solid"/>
+            <a:round/>
+            <a:headEnd type="none" w="sm" len="sm"/>
+            <a:tailEnd type="none" w="sm" len="sm"/>
+          </a:ln>
+        </p:spPr>
+        <p:txBody>
+          <a:bodyPr spcFirstLastPara="1" wrap="square" lIns="91425" tIns="91425" rIns="91425" bIns="91425" anchor="ctr" anchorCtr="0">
+            <a:noAutofit/>
+          </a:bodyPr>
+          <a:lstStyle/>
+          <a:p>
+            <a:pPr marL="0" lvl="0" indent="0" algn="l" rtl="0">
+              <a:spcBef>
+                <a:spcPts val="0"/>
+              </a:spcBef>
+              <a:spcAft>
+                <a:spcPts val="0"/>
+              </a:spcAft>
+              <a:buNone/>
+            </a:pPr>
+            <a:endParaRPr/>
+          </a:p>
+        </p:txBody>
+      </p:sp>
+      <p:sp>
+        <p:nvSpPr>
+          <p:cNvPr id="450" name="Google Shape;450;p31"/>
+          <p:cNvSpPr/>
+          <p:nvPr/>
+        </p:nvSpPr>
+        <p:spPr>
+          <a:xfrm>
+            <a:off x="7714525" y="3665400"/>
+            <a:ext cx="939600" cy="939600"/>
+          </a:xfrm>
+          <a:prstGeom prst="snip1Rect">
+            <a:avLst>
+              <a:gd name="adj" fmla="val 11329"/>
+            </a:avLst>
+          </a:prstGeom>
+          <a:solidFill>
+            <a:schemeClr val="lt2"/>
+          </a:solidFill>
+          <a:ln w="28575" cap="flat" cmpd="sng">
+            <a:solidFill>
+              <a:schemeClr val="dk1"/>
+            </a:solidFill>
+            <a:prstDash val="solid"/>
+            <a:round/>
+            <a:headEnd type="none" w="sm" len="sm"/>
+            <a:tailEnd type="none" w="sm" len="sm"/>
+          </a:ln>
+        </p:spPr>
+        <p:txBody>
+          <a:bodyPr spcFirstLastPara="1" wrap="square" lIns="91425" tIns="91425" rIns="91425" bIns="91425" anchor="ctr" anchorCtr="0">
+            <a:noAutofit/>
+          </a:bodyPr>
+          <a:lstStyle/>
+          <a:p>
+            <a:pPr marL="0" lvl="0" indent="0" algn="l" rtl="0">
+              <a:spcBef>
+                <a:spcPts val="0"/>
+              </a:spcBef>
+              <a:spcAft>
+                <a:spcPts val="0"/>
+              </a:spcAft>
+              <a:buNone/>
+            </a:pPr>
+            <a:endParaRPr/>
+          </a:p>
+        </p:txBody>
+      </p:sp>
+      <p:grpSp>
+        <p:nvGrpSpPr>
+          <p:cNvPr id="10" name="Group 9"/>
+          <p:cNvGrpSpPr>
+            <a:grpSpLocks noChangeAspect="1"/>
+          </p:cNvGrpSpPr>
+          <p:nvPr/>
+        </p:nvGrpSpPr>
+        <p:grpSpPr>
+          <a:xfrm>
+            <a:off x="7811047" y="3760197"/>
+            <a:ext cx="746555" cy="746555"/>
+            <a:chOff x="4724400" y="2057400"/>
+            <a:chExt cx="2743200" cy="2743200"/>
+          </a:xfrm>
+        </p:grpSpPr>
+        <p:sp>
+          <p:nvSpPr>
+            <p:cNvPr id="11" name="Rectangle 10">
+              <a:extLst>
+                <a:ext uri="{FF2B5EF4-FFF2-40B4-BE49-F238E27FC236}">
+                  <a16:creationId xmlns:a16="http://schemas.microsoft.com/office/drawing/2014/main" id="{D29DC7FE-AC82-431F-98BF-29FC267130B1}"/>
+                </a:ext>
+              </a:extLst>
+            </p:cNvPr>
+            <p:cNvSpPr/>
+            <p:nvPr/>
+          </p:nvSpPr>
+          <p:spPr>
+            <a:xfrm>
+              <a:off x="4724400" y="2057400"/>
+              <a:ext cx="2743200" cy="2743200"/>
+            </a:xfrm>
+            <a:prstGeom prst="rect">
+              <a:avLst/>
+            </a:prstGeom>
+            <a:gradFill flip="none" rotWithShape="1">
+              <a:gsLst>
+                <a:gs pos="0">
+                  <a:srgbClr val="6ABF4B"/>
+                </a:gs>
+                <a:gs pos="99000">
+                  <a:srgbClr val="54C8E8"/>
+                </a:gs>
+              </a:gsLst>
+              <a:lin ang="2700000" scaled="1"/>
+              <a:tileRect/>
+            </a:gradFill>
+            <a:ln>
+              <a:noFill/>
+            </a:ln>
+          </p:spPr>
+          <p:style>
+            <a:lnRef idx="2">
+              <a:schemeClr val="accent1">
+                <a:shade val="50000"/>
+              </a:schemeClr>
+            </a:lnRef>
+            <a:fillRef idx="1">
+              <a:schemeClr val="accent1"/>
+            </a:fillRef>
+            <a:effectRef idx="0">
+              <a:schemeClr val="accent1"/>
+            </a:effectRef>
+            <a:fontRef idx="minor">
+              <a:schemeClr val="lt1"/>
+            </a:fontRef>
+          </p:style>
+          <p:txBody>
+            <a:bodyPr rot="0" spcFirstLastPara="0" vertOverflow="overflow" horzOverflow="overflow" vert="horz" wrap="square" lIns="91440" tIns="45720" rIns="91440" bIns="45720" numCol="1" spcCol="0" rtlCol="0" fromWordArt="0" anchor="ctr" anchorCtr="0" forceAA="0" compatLnSpc="1">
+              <a:prstTxWarp prst="textNoShape">
+                <a:avLst/>
+              </a:prstTxWarp>
+              <a:noAutofit/>
+            </a:bodyPr>
+            <a:lstStyle/>
+            <a:p>
+              <a:pPr algn="ctr"/>
+              <a:endParaRPr lang="en-US" sz="2700" dirty="0"/>
+            </a:p>
+          </p:txBody>
+        </p:sp>
+        <p:grpSp>
+          <p:nvGrpSpPr>
+            <p:cNvPr id="12" name="Group 4">
+              <a:extLst>
+                <a:ext uri="{FF2B5EF4-FFF2-40B4-BE49-F238E27FC236}">
+                  <a16:creationId xmlns:a16="http://schemas.microsoft.com/office/drawing/2014/main" id="{BB74FD83-EF1E-43B0-BAC9-95799264DF40}"/>
+                </a:ext>
+              </a:extLst>
+            </p:cNvPr>
+            <p:cNvGrpSpPr>
+              <a:grpSpLocks noChangeAspect="1"/>
+            </p:cNvGrpSpPr>
+            <p:nvPr userDrawn="1"/>
+          </p:nvGrpSpPr>
+          <p:grpSpPr bwMode="auto">
+            <a:xfrm>
+              <a:off x="5154168" y="3116582"/>
+              <a:ext cx="1883664" cy="624837"/>
+              <a:chOff x="4992" y="1007"/>
+              <a:chExt cx="823" cy="273"/>
+            </a:xfrm>
+            <a:solidFill>
+              <a:srgbClr val="FFFFFF"/>
+            </a:solidFill>
+          </p:grpSpPr>
+          <p:sp>
+            <p:nvSpPr>
+              <p:cNvPr id="13" name="Freeform 5">
+                <a:extLst>
+                  <a:ext uri="{FF2B5EF4-FFF2-40B4-BE49-F238E27FC236}">
+                    <a16:creationId xmlns:a16="http://schemas.microsoft.com/office/drawing/2014/main" id="{684C248C-E801-46CE-89AA-270E8706AE3C}"/>
+                  </a:ext>
+                </a:extLst>
+              </p:cNvPr>
+              <p:cNvSpPr>
+                <a:spLocks/>
+              </p:cNvSpPr>
+              <p:nvPr/>
+            </p:nvSpPr>
+            <p:spPr bwMode="auto">
+              <a:xfrm>
+                <a:off x="4992" y="1017"/>
+                <a:ext cx="189" cy="197"/>
+              </a:xfrm>
+              <a:custGeom>
+                <a:avLst/>
+                <a:gdLst>
+                  <a:gd name="T0" fmla="*/ 0 w 189"/>
+                  <a:gd name="T1" fmla="*/ 187 h 197"/>
+                  <a:gd name="T2" fmla="*/ 21 w 189"/>
+                  <a:gd name="T3" fmla="*/ 183 h 197"/>
+                  <a:gd name="T4" fmla="*/ 21 w 189"/>
+                  <a:gd name="T5" fmla="*/ 15 h 197"/>
+                  <a:gd name="T6" fmla="*/ 0 w 189"/>
+                  <a:gd name="T7" fmla="*/ 12 h 197"/>
+                  <a:gd name="T8" fmla="*/ 0 w 189"/>
+                  <a:gd name="T9" fmla="*/ 0 h 197"/>
+                  <a:gd name="T10" fmla="*/ 66 w 189"/>
+                  <a:gd name="T11" fmla="*/ 0 h 197"/>
+                  <a:gd name="T12" fmla="*/ 66 w 189"/>
+                  <a:gd name="T13" fmla="*/ 12 h 197"/>
+                  <a:gd name="T14" fmla="*/ 46 w 189"/>
+                  <a:gd name="T15" fmla="*/ 14 h 197"/>
+                  <a:gd name="T16" fmla="*/ 46 w 189"/>
+                  <a:gd name="T17" fmla="*/ 94 h 197"/>
+                  <a:gd name="T18" fmla="*/ 143 w 189"/>
+                  <a:gd name="T19" fmla="*/ 94 h 197"/>
+                  <a:gd name="T20" fmla="*/ 143 w 189"/>
+                  <a:gd name="T21" fmla="*/ 14 h 197"/>
+                  <a:gd name="T22" fmla="*/ 122 w 189"/>
+                  <a:gd name="T23" fmla="*/ 12 h 197"/>
+                  <a:gd name="T24" fmla="*/ 122 w 189"/>
+                  <a:gd name="T25" fmla="*/ 0 h 197"/>
+                  <a:gd name="T26" fmla="*/ 188 w 189"/>
+                  <a:gd name="T27" fmla="*/ 0 h 197"/>
+                  <a:gd name="T28" fmla="*/ 188 w 189"/>
+                  <a:gd name="T29" fmla="*/ 12 h 197"/>
+                  <a:gd name="T30" fmla="*/ 168 w 189"/>
+                  <a:gd name="T31" fmla="*/ 14 h 197"/>
+                  <a:gd name="T32" fmla="*/ 168 w 189"/>
+                  <a:gd name="T33" fmla="*/ 183 h 197"/>
+                  <a:gd name="T34" fmla="*/ 189 w 189"/>
+                  <a:gd name="T35" fmla="*/ 187 h 197"/>
+                  <a:gd name="T36" fmla="*/ 189 w 189"/>
+                  <a:gd name="T37" fmla="*/ 197 h 197"/>
+                  <a:gd name="T38" fmla="*/ 121 w 189"/>
+                  <a:gd name="T39" fmla="*/ 197 h 197"/>
+                  <a:gd name="T40" fmla="*/ 121 w 189"/>
+                  <a:gd name="T41" fmla="*/ 187 h 197"/>
+                  <a:gd name="T42" fmla="*/ 143 w 189"/>
+                  <a:gd name="T43" fmla="*/ 183 h 197"/>
+                  <a:gd name="T44" fmla="*/ 143 w 189"/>
+                  <a:gd name="T45" fmla="*/ 109 h 197"/>
+                  <a:gd name="T46" fmla="*/ 46 w 189"/>
+                  <a:gd name="T47" fmla="*/ 109 h 197"/>
+                  <a:gd name="T48" fmla="*/ 46 w 189"/>
+                  <a:gd name="T49" fmla="*/ 183 h 197"/>
+                  <a:gd name="T50" fmla="*/ 68 w 189"/>
+                  <a:gd name="T51" fmla="*/ 187 h 197"/>
+                  <a:gd name="T52" fmla="*/ 68 w 189"/>
+                  <a:gd name="T53" fmla="*/ 197 h 197"/>
+                  <a:gd name="T54" fmla="*/ 0 w 189"/>
+                  <a:gd name="T55" fmla="*/ 197 h 197"/>
+                  <a:gd name="T56" fmla="*/ 0 w 189"/>
+                  <a:gd name="T57" fmla="*/ 187 h 197"/>
+                </a:gdLst>
+                <a:ahLst/>
+                <a:cxnLst>
+                  <a:cxn ang="0">
+                    <a:pos x="T0" y="T1"/>
+                  </a:cxn>
+                  <a:cxn ang="0">
+                    <a:pos x="T2" y="T3"/>
+                  </a:cxn>
+                  <a:cxn ang="0">
+                    <a:pos x="T4" y="T5"/>
+                  </a:cxn>
+                  <a:cxn ang="0">
+                    <a:pos x="T6" y="T7"/>
+                  </a:cxn>
+                  <a:cxn ang="0">
+                    <a:pos x="T8" y="T9"/>
+                  </a:cxn>
+                  <a:cxn ang="0">
+                    <a:pos x="T10" y="T11"/>
+                  </a:cxn>
+                  <a:cxn ang="0">
+                    <a:pos x="T12" y="T13"/>
+                  </a:cxn>
+                  <a:cxn ang="0">
+                    <a:pos x="T14" y="T15"/>
+                  </a:cxn>
+                  <a:cxn ang="0">
+                    <a:pos x="T16" y="T17"/>
+                  </a:cxn>
+                  <a:cxn ang="0">
+                    <a:pos x="T18" y="T19"/>
+                  </a:cxn>
+                  <a:cxn ang="0">
+                    <a:pos x="T20" y="T21"/>
+                  </a:cxn>
+                  <a:cxn ang="0">
+                    <a:pos x="T22" y="T23"/>
+                  </a:cxn>
+                  <a:cxn ang="0">
+                    <a:pos x="T24" y="T25"/>
+                  </a:cxn>
+                  <a:cxn ang="0">
+                    <a:pos x="T26" y="T27"/>
+                  </a:cxn>
+                  <a:cxn ang="0">
+                    <a:pos x="T28" y="T29"/>
+                  </a:cxn>
+                  <a:cxn ang="0">
+                    <a:pos x="T30" y="T31"/>
+                  </a:cxn>
+                  <a:cxn ang="0">
+                    <a:pos x="T32" y="T33"/>
+                  </a:cxn>
+                  <a:cxn ang="0">
+                    <a:pos x="T34" y="T35"/>
+                  </a:cxn>
+                  <a:cxn ang="0">
+                    <a:pos x="T36" y="T37"/>
+                  </a:cxn>
+                  <a:cxn ang="0">
+                    <a:pos x="T38" y="T39"/>
+                  </a:cxn>
+                  <a:cxn ang="0">
+                    <a:pos x="T40" y="T41"/>
+                  </a:cxn>
+                  <a:cxn ang="0">
+                    <a:pos x="T42" y="T43"/>
+                  </a:cxn>
+                  <a:cxn ang="0">
+                    <a:pos x="T44" y="T45"/>
+                  </a:cxn>
+                  <a:cxn ang="0">
+                    <a:pos x="T46" y="T47"/>
+                  </a:cxn>
+                  <a:cxn ang="0">
+                    <a:pos x="T48" y="T49"/>
+                  </a:cxn>
+                  <a:cxn ang="0">
+                    <a:pos x="T50" y="T51"/>
+                  </a:cxn>
+                  <a:cxn ang="0">
+                    <a:pos x="T52" y="T53"/>
+                  </a:cxn>
+                  <a:cxn ang="0">
+                    <a:pos x="T54" y="T55"/>
+                  </a:cxn>
+                  <a:cxn ang="0">
+                    <a:pos x="T56" y="T57"/>
+                  </a:cxn>
+                </a:cxnLst>
+                <a:rect l="0" t="0" r="r" b="b"/>
+                <a:pathLst>
+                  <a:path w="189" h="197">
+                    <a:moveTo>
+                      <a:pt x="0" y="187"/>
+                    </a:moveTo>
+                    <a:lnTo>
+                      <a:pt x="21" y="183"/>
+                    </a:lnTo>
+                    <a:lnTo>
+                      <a:pt x="21" y="15"/>
+                    </a:lnTo>
+                    <a:lnTo>
+                      <a:pt x="0" y="12"/>
+                    </a:lnTo>
+                    <a:lnTo>
+                      <a:pt x="0" y="0"/>
+                    </a:lnTo>
+                    <a:lnTo>
+                      <a:pt x="66" y="0"/>
+                    </a:lnTo>
+                    <a:lnTo>
+                      <a:pt x="66" y="12"/>
+                    </a:lnTo>
+                    <a:lnTo>
+                      <a:pt x="46" y="14"/>
+                    </a:lnTo>
+                    <a:lnTo>
+                      <a:pt x="46" y="94"/>
+                    </a:lnTo>
+                    <a:lnTo>
+                      <a:pt x="143" y="94"/>
+                    </a:lnTo>
+                    <a:lnTo>
+                      <a:pt x="143" y="14"/>
+                    </a:lnTo>
+                    <a:lnTo>
+                      <a:pt x="122" y="12"/>
+                    </a:lnTo>
+                    <a:lnTo>
+                      <a:pt x="122" y="0"/>
+                    </a:lnTo>
+                    <a:lnTo>
+                      <a:pt x="188" y="0"/>
+                    </a:lnTo>
+                    <a:lnTo>
+                      <a:pt x="188" y="12"/>
+                    </a:lnTo>
+                    <a:lnTo>
+                      <a:pt x="168" y="14"/>
+                    </a:lnTo>
+                    <a:lnTo>
+                      <a:pt x="168" y="183"/>
+                    </a:lnTo>
+                    <a:lnTo>
+                      <a:pt x="189" y="187"/>
+                    </a:lnTo>
+                    <a:lnTo>
+                      <a:pt x="189" y="197"/>
+                    </a:lnTo>
+                    <a:lnTo>
+                      <a:pt x="121" y="197"/>
+                    </a:lnTo>
+                    <a:lnTo>
+                      <a:pt x="121" y="187"/>
+                    </a:lnTo>
+                    <a:lnTo>
+                      <a:pt x="143" y="183"/>
+                    </a:lnTo>
+                    <a:lnTo>
+                      <a:pt x="143" y="109"/>
+                    </a:lnTo>
+                    <a:lnTo>
+                      <a:pt x="46" y="109"/>
+                    </a:lnTo>
+                    <a:lnTo>
+                      <a:pt x="46" y="183"/>
+                    </a:lnTo>
+                    <a:lnTo>
+                      <a:pt x="68" y="187"/>
+                    </a:lnTo>
+                    <a:lnTo>
+                      <a:pt x="68" y="197"/>
+                    </a:lnTo>
+                    <a:lnTo>
+                      <a:pt x="0" y="197"/>
+                    </a:lnTo>
+                    <a:lnTo>
+                      <a:pt x="0" y="187"/>
+                    </a:lnTo>
+                    <a:close/>
+                  </a:path>
+                </a:pathLst>
+              </a:custGeom>
+              <a:grpFill/>
+              <a:ln>
+                <a:noFill/>
+              </a:ln>
+              <a:extLst>
+                <a:ext uri="{91240B29-F687-4F45-9708-019B960494DF}">
+                  <a14:hiddenLine xmlns:a14="http://schemas.microsoft.com/office/drawing/2010/main" w="9525">
+                    <a:solidFill>
+                      <a:srgbClr val="000000"/>
+                    </a:solidFill>
+                    <a:round/>
+                    <a:headEnd/>
+                    <a:tailEnd/>
+                  </a14:hiddenLine>
+                </a:ext>
+              </a:extLst>
+            </p:spPr>
+            <p:txBody>
+              <a:bodyPr vert="horz" wrap="square" lIns="91440" tIns="45720" rIns="91440" bIns="45720" numCol="1" anchor="t" anchorCtr="0" compatLnSpc="1">
+                <a:prstTxWarp prst="textNoShape">
+                  <a:avLst/>
+                </a:prstTxWarp>
+              </a:bodyPr>
+              <a:lstStyle/>
+              <a:p>
+                <a:endParaRPr lang="en-US"/>
+              </a:p>
+            </p:txBody>
+          </p:sp>
+          <p:sp>
+            <p:nvSpPr>
+              <p:cNvPr id="14" name="Freeform 6">
+                <a:extLst>
+                  <a:ext uri="{FF2B5EF4-FFF2-40B4-BE49-F238E27FC236}">
+                    <a16:creationId xmlns:a16="http://schemas.microsoft.com/office/drawing/2014/main" id="{E53B33E3-324A-4532-975C-F9D23ED42041}"/>
+                  </a:ext>
+                </a:extLst>
+              </p:cNvPr>
+              <p:cNvSpPr>
+                <a:spLocks/>
+              </p:cNvSpPr>
+              <p:nvPr/>
+            </p:nvSpPr>
+            <p:spPr bwMode="auto">
+              <a:xfrm>
+                <a:off x="5173" y="1072"/>
+                <a:ext cx="146" cy="208"/>
+              </a:xfrm>
+              <a:custGeom>
+                <a:avLst/>
+                <a:gdLst>
+                  <a:gd name="T0" fmla="*/ 25 w 199"/>
+                  <a:gd name="T1" fmla="*/ 252 h 282"/>
+                  <a:gd name="T2" fmla="*/ 32 w 199"/>
+                  <a:gd name="T3" fmla="*/ 253 h 282"/>
+                  <a:gd name="T4" fmla="*/ 39 w 199"/>
+                  <a:gd name="T5" fmla="*/ 253 h 282"/>
+                  <a:gd name="T6" fmla="*/ 52 w 199"/>
+                  <a:gd name="T7" fmla="*/ 251 h 282"/>
+                  <a:gd name="T8" fmla="*/ 67 w 199"/>
+                  <a:gd name="T9" fmla="*/ 243 h 282"/>
+                  <a:gd name="T10" fmla="*/ 81 w 199"/>
+                  <a:gd name="T11" fmla="*/ 224 h 282"/>
+                  <a:gd name="T12" fmla="*/ 94 w 199"/>
+                  <a:gd name="T13" fmla="*/ 193 h 282"/>
+                  <a:gd name="T14" fmla="*/ 87 w 199"/>
+                  <a:gd name="T15" fmla="*/ 193 h 282"/>
+                  <a:gd name="T16" fmla="*/ 17 w 199"/>
+                  <a:gd name="T17" fmla="*/ 22 h 282"/>
+                  <a:gd name="T18" fmla="*/ 0 w 199"/>
+                  <a:gd name="T19" fmla="*/ 19 h 282"/>
+                  <a:gd name="T20" fmla="*/ 0 w 199"/>
+                  <a:gd name="T21" fmla="*/ 0 h 282"/>
+                  <a:gd name="T22" fmla="*/ 79 w 199"/>
+                  <a:gd name="T23" fmla="*/ 0 h 282"/>
+                  <a:gd name="T24" fmla="*/ 79 w 199"/>
+                  <a:gd name="T25" fmla="*/ 19 h 282"/>
+                  <a:gd name="T26" fmla="*/ 54 w 199"/>
+                  <a:gd name="T27" fmla="*/ 22 h 282"/>
+                  <a:gd name="T28" fmla="*/ 95 w 199"/>
+                  <a:gd name="T29" fmla="*/ 138 h 282"/>
+                  <a:gd name="T30" fmla="*/ 106 w 199"/>
+                  <a:gd name="T31" fmla="*/ 173 h 282"/>
+                  <a:gd name="T32" fmla="*/ 116 w 199"/>
+                  <a:gd name="T33" fmla="*/ 138 h 282"/>
+                  <a:gd name="T34" fmla="*/ 151 w 199"/>
+                  <a:gd name="T35" fmla="*/ 22 h 282"/>
+                  <a:gd name="T36" fmla="*/ 125 w 199"/>
+                  <a:gd name="T37" fmla="*/ 19 h 282"/>
+                  <a:gd name="T38" fmla="*/ 125 w 199"/>
+                  <a:gd name="T39" fmla="*/ 0 h 282"/>
+                  <a:gd name="T40" fmla="*/ 199 w 199"/>
+                  <a:gd name="T41" fmla="*/ 0 h 282"/>
+                  <a:gd name="T42" fmla="*/ 199 w 199"/>
+                  <a:gd name="T43" fmla="*/ 19 h 282"/>
+                  <a:gd name="T44" fmla="*/ 180 w 199"/>
+                  <a:gd name="T45" fmla="*/ 21 h 282"/>
+                  <a:gd name="T46" fmla="*/ 159 w 199"/>
+                  <a:gd name="T47" fmla="*/ 80 h 282"/>
+                  <a:gd name="T48" fmla="*/ 144 w 199"/>
+                  <a:gd name="T49" fmla="*/ 124 h 282"/>
+                  <a:gd name="T50" fmla="*/ 133 w 199"/>
+                  <a:gd name="T51" fmla="*/ 156 h 282"/>
+                  <a:gd name="T52" fmla="*/ 126 w 199"/>
+                  <a:gd name="T53" fmla="*/ 177 h 282"/>
+                  <a:gd name="T54" fmla="*/ 121 w 199"/>
+                  <a:gd name="T55" fmla="*/ 191 h 282"/>
+                  <a:gd name="T56" fmla="*/ 117 w 199"/>
+                  <a:gd name="T57" fmla="*/ 200 h 282"/>
+                  <a:gd name="T58" fmla="*/ 104 w 199"/>
+                  <a:gd name="T59" fmla="*/ 231 h 282"/>
+                  <a:gd name="T60" fmla="*/ 89 w 199"/>
+                  <a:gd name="T61" fmla="*/ 255 h 282"/>
+                  <a:gd name="T62" fmla="*/ 73 w 199"/>
+                  <a:gd name="T63" fmla="*/ 271 h 282"/>
+                  <a:gd name="T64" fmla="*/ 54 w 199"/>
+                  <a:gd name="T65" fmla="*/ 280 h 282"/>
+                  <a:gd name="T66" fmla="*/ 39 w 199"/>
+                  <a:gd name="T67" fmla="*/ 282 h 282"/>
+                  <a:gd name="T68" fmla="*/ 35 w 199"/>
+                  <a:gd name="T69" fmla="*/ 282 h 282"/>
+                  <a:gd name="T70" fmla="*/ 31 w 199"/>
+                  <a:gd name="T71" fmla="*/ 281 h 282"/>
+                  <a:gd name="T72" fmla="*/ 27 w 199"/>
+                  <a:gd name="T73" fmla="*/ 280 h 282"/>
+                  <a:gd name="T74" fmla="*/ 25 w 199"/>
+                  <a:gd name="T75" fmla="*/ 279 h 282"/>
+                  <a:gd name="T76" fmla="*/ 25 w 199"/>
+                  <a:gd name="T77" fmla="*/ 252 h 282"/>
+                </a:gdLst>
+                <a:ahLst/>
+                <a:cxnLst>
+                  <a:cxn ang="0">
+                    <a:pos x="T0" y="T1"/>
+                  </a:cxn>
+                  <a:cxn ang="0">
+                    <a:pos x="T2" y="T3"/>
+                  </a:cxn>
+                  <a:cxn ang="0">
+                    <a:pos x="T4" y="T5"/>
+                  </a:cxn>
+                  <a:cxn ang="0">
+                    <a:pos x="T6" y="T7"/>
+                  </a:cxn>
+                  <a:cxn ang="0">
+                    <a:pos x="T8" y="T9"/>
+                  </a:cxn>
+                  <a:cxn ang="0">
+                    <a:pos x="T10" y="T11"/>
+                  </a:cxn>
+                  <a:cxn ang="0">
+                    <a:pos x="T12" y="T13"/>
+                  </a:cxn>
+                  <a:cxn ang="0">
+                    <a:pos x="T14" y="T15"/>
+                  </a:cxn>
+                  <a:cxn ang="0">
+                    <a:pos x="T16" y="T17"/>
+                  </a:cxn>
+                  <a:cxn ang="0">
+                    <a:pos x="T18" y="T19"/>
+                  </a:cxn>
+                  <a:cxn ang="0">
+                    <a:pos x="T20" y="T21"/>
+                  </a:cxn>
+                  <a:cxn ang="0">
+                    <a:pos x="T22" y="T23"/>
+                  </a:cxn>
+                  <a:cxn ang="0">
+                    <a:pos x="T24" y="T25"/>
+                  </a:cxn>
+                  <a:cxn ang="0">
+                    <a:pos x="T26" y="T27"/>
+                  </a:cxn>
+                  <a:cxn ang="0">
+                    <a:pos x="T28" y="T29"/>
+                  </a:cxn>
+                  <a:cxn ang="0">
+                    <a:pos x="T30" y="T31"/>
+                  </a:cxn>
+                  <a:cxn ang="0">
+                    <a:pos x="T32" y="T33"/>
+                  </a:cxn>
+                  <a:cxn ang="0">
+                    <a:pos x="T34" y="T35"/>
+                  </a:cxn>
+                  <a:cxn ang="0">
+                    <a:pos x="T36" y="T37"/>
+                  </a:cxn>
+                  <a:cxn ang="0">
+                    <a:pos x="T38" y="T39"/>
+                  </a:cxn>
+                  <a:cxn ang="0">
+                    <a:pos x="T40" y="T41"/>
+                  </a:cxn>
+                  <a:cxn ang="0">
+                    <a:pos x="T42" y="T43"/>
+                  </a:cxn>
+                  <a:cxn ang="0">
+                    <a:pos x="T44" y="T45"/>
+                  </a:cxn>
+                  <a:cxn ang="0">
+                    <a:pos x="T46" y="T47"/>
+                  </a:cxn>
+                  <a:cxn ang="0">
+                    <a:pos x="T48" y="T49"/>
+                  </a:cxn>
+                  <a:cxn ang="0">
+                    <a:pos x="T50" y="T51"/>
+                  </a:cxn>
+                  <a:cxn ang="0">
+                    <a:pos x="T52" y="T53"/>
+                  </a:cxn>
+                  <a:cxn ang="0">
+                    <a:pos x="T54" y="T55"/>
+                  </a:cxn>
+                  <a:cxn ang="0">
+                    <a:pos x="T56" y="T57"/>
+                  </a:cxn>
+                  <a:cxn ang="0">
+                    <a:pos x="T58" y="T59"/>
+                  </a:cxn>
+                  <a:cxn ang="0">
+                    <a:pos x="T60" y="T61"/>
+                  </a:cxn>
+                  <a:cxn ang="0">
+                    <a:pos x="T62" y="T63"/>
+                  </a:cxn>
+                  <a:cxn ang="0">
+                    <a:pos x="T64" y="T65"/>
+                  </a:cxn>
+                  <a:cxn ang="0">
+                    <a:pos x="T66" y="T67"/>
+                  </a:cxn>
+                  <a:cxn ang="0">
+                    <a:pos x="T68" y="T69"/>
+                  </a:cxn>
+                  <a:cxn ang="0">
+                    <a:pos x="T70" y="T71"/>
+                  </a:cxn>
+                  <a:cxn ang="0">
+                    <a:pos x="T72" y="T73"/>
+                  </a:cxn>
+                  <a:cxn ang="0">
+                    <a:pos x="T74" y="T75"/>
+                  </a:cxn>
+                  <a:cxn ang="0">
+                    <a:pos x="T76" y="T77"/>
+                  </a:cxn>
+                </a:cxnLst>
+                <a:rect l="0" t="0" r="r" b="b"/>
+                <a:pathLst>
+                  <a:path w="199" h="282">
+                    <a:moveTo>
+                      <a:pt x="25" y="252"/>
+                    </a:moveTo>
+                    <a:cubicBezTo>
+                      <a:pt x="27" y="252"/>
+                      <a:pt x="29" y="253"/>
+                      <a:pt x="32" y="253"/>
+                    </a:cubicBezTo>
+                    <a:cubicBezTo>
+                      <a:pt x="34" y="253"/>
+                      <a:pt x="37" y="253"/>
+                      <a:pt x="39" y="253"/>
+                    </a:cubicBezTo>
+                    <a:cubicBezTo>
+                      <a:pt x="43" y="253"/>
+                      <a:pt x="47" y="253"/>
+                      <a:pt x="52" y="251"/>
+                    </a:cubicBezTo>
+                    <a:cubicBezTo>
+                      <a:pt x="57" y="250"/>
+                      <a:pt x="62" y="247"/>
+                      <a:pt x="67" y="243"/>
+                    </a:cubicBezTo>
+                    <a:cubicBezTo>
+                      <a:pt x="72" y="238"/>
+                      <a:pt x="77" y="232"/>
+                      <a:pt x="81" y="224"/>
+                    </a:cubicBezTo>
+                    <a:cubicBezTo>
+                      <a:pt x="86" y="216"/>
+                      <a:pt x="90" y="206"/>
+                      <a:pt x="94" y="193"/>
+                    </a:cubicBezTo>
+                    <a:cubicBezTo>
+                      <a:pt x="87" y="193"/>
+                      <a:pt x="87" y="193"/>
+                      <a:pt x="87" y="193"/>
+                    </a:cubicBezTo>
+                    <a:cubicBezTo>
+                      <a:pt x="17" y="22"/>
+                      <a:pt x="17" y="22"/>
+                      <a:pt x="17" y="22"/>
+                    </a:cubicBezTo>
+                    <a:cubicBezTo>
+                      <a:pt x="0" y="19"/>
+                      <a:pt x="0" y="19"/>
+                      <a:pt x="0" y="19"/>
+                    </a:cubicBezTo>
+                    <a:cubicBezTo>
+                      <a:pt x="0" y="0"/>
+                      <a:pt x="0" y="0"/>
+                      <a:pt x="0" y="0"/>
+                    </a:cubicBezTo>
+                    <a:cubicBezTo>
+                      <a:pt x="79" y="0"/>
+                      <a:pt x="79" y="0"/>
+                      <a:pt x="79" y="0"/>
+                    </a:cubicBezTo>
+                    <a:cubicBezTo>
+                      <a:pt x="79" y="19"/>
+                      <a:pt x="79" y="19"/>
+                      <a:pt x="79" y="19"/>
+                    </a:cubicBezTo>
+                    <a:cubicBezTo>
+                      <a:pt x="54" y="22"/>
+                      <a:pt x="54" y="22"/>
+                      <a:pt x="54" y="22"/>
+                    </a:cubicBezTo>
+                    <a:cubicBezTo>
+                      <a:pt x="95" y="138"/>
+                      <a:pt x="95" y="138"/>
+                      <a:pt x="95" y="138"/>
+                    </a:cubicBezTo>
+                    <a:cubicBezTo>
+                      <a:pt x="106" y="173"/>
+                      <a:pt x="106" y="173"/>
+                      <a:pt x="106" y="173"/>
+                    </a:cubicBezTo>
+                    <a:cubicBezTo>
+                      <a:pt x="116" y="138"/>
+                      <a:pt x="116" y="138"/>
+                      <a:pt x="116" y="138"/>
+                    </a:cubicBezTo>
+                    <a:cubicBezTo>
+                      <a:pt x="151" y="22"/>
+                      <a:pt x="151" y="22"/>
+                      <a:pt x="151" y="22"/>
+                    </a:cubicBezTo>
+                    <a:cubicBezTo>
+                      <a:pt x="125" y="19"/>
+                      <a:pt x="125" y="19"/>
+                      <a:pt x="125" y="19"/>
+                    </a:cubicBezTo>
+                    <a:cubicBezTo>
+                      <a:pt x="125" y="0"/>
+                      <a:pt x="125" y="0"/>
+                      <a:pt x="125" y="0"/>
+                    </a:cubicBezTo>
+                    <a:cubicBezTo>
+                      <a:pt x="199" y="0"/>
+                      <a:pt x="199" y="0"/>
+                      <a:pt x="199" y="0"/>
+                    </a:cubicBezTo>
+                    <a:cubicBezTo>
+                      <a:pt x="199" y="19"/>
+                      <a:pt x="199" y="19"/>
+                      <a:pt x="199" y="19"/>
+                    </a:cubicBezTo>
+                    <a:cubicBezTo>
+                      <a:pt x="180" y="21"/>
+                      <a:pt x="180" y="21"/>
+                      <a:pt x="180" y="21"/>
+                    </a:cubicBezTo>
+                    <a:cubicBezTo>
+                      <a:pt x="172" y="44"/>
+                      <a:pt x="165" y="63"/>
+                      <a:pt x="159" y="80"/>
+                    </a:cubicBezTo>
+                    <a:cubicBezTo>
+                      <a:pt x="154" y="97"/>
+                      <a:pt x="149" y="112"/>
+                      <a:pt x="144" y="124"/>
+                    </a:cubicBezTo>
+                    <a:cubicBezTo>
+                      <a:pt x="140" y="136"/>
+                      <a:pt x="136" y="147"/>
+                      <a:pt x="133" y="156"/>
+                    </a:cubicBezTo>
+                    <a:cubicBezTo>
+                      <a:pt x="130" y="164"/>
+                      <a:pt x="128" y="171"/>
+                      <a:pt x="126" y="177"/>
+                    </a:cubicBezTo>
+                    <a:cubicBezTo>
+                      <a:pt x="124" y="183"/>
+                      <a:pt x="122" y="187"/>
+                      <a:pt x="121" y="191"/>
+                    </a:cubicBezTo>
+                    <a:cubicBezTo>
+                      <a:pt x="119" y="195"/>
+                      <a:pt x="118" y="197"/>
+                      <a:pt x="117" y="200"/>
+                    </a:cubicBezTo>
+                    <a:cubicBezTo>
+                      <a:pt x="113" y="211"/>
+                      <a:pt x="108" y="222"/>
+                      <a:pt x="104" y="231"/>
+                    </a:cubicBezTo>
+                    <a:cubicBezTo>
+                      <a:pt x="99" y="240"/>
+                      <a:pt x="94" y="248"/>
+                      <a:pt x="89" y="255"/>
+                    </a:cubicBezTo>
+                    <a:cubicBezTo>
+                      <a:pt x="84" y="261"/>
+                      <a:pt x="79" y="267"/>
+                      <a:pt x="73" y="271"/>
+                    </a:cubicBezTo>
+                    <a:cubicBezTo>
+                      <a:pt x="67" y="275"/>
+                      <a:pt x="61" y="278"/>
+                      <a:pt x="54" y="280"/>
+                    </a:cubicBezTo>
+                    <a:cubicBezTo>
+                      <a:pt x="49" y="281"/>
+                      <a:pt x="44" y="282"/>
+                      <a:pt x="39" y="282"/>
+                    </a:cubicBezTo>
+                    <a:cubicBezTo>
+                      <a:pt x="37" y="282"/>
+                      <a:pt x="36" y="282"/>
+                      <a:pt x="35" y="282"/>
+                    </a:cubicBezTo>
+                    <a:cubicBezTo>
+                      <a:pt x="33" y="282"/>
+                      <a:pt x="32" y="281"/>
+                      <a:pt x="31" y="281"/>
+                    </a:cubicBezTo>
+                    <a:cubicBezTo>
+                      <a:pt x="29" y="281"/>
+                      <a:pt x="28" y="281"/>
+                      <a:pt x="27" y="280"/>
+                    </a:cubicBezTo>
+                    <a:cubicBezTo>
+                      <a:pt x="26" y="280"/>
+                      <a:pt x="25" y="280"/>
+                      <a:pt x="25" y="279"/>
+                    </a:cubicBezTo>
+                    <a:lnTo>
+                      <a:pt x="25" y="252"/>
+                    </a:lnTo>
+                    <a:close/>
+                  </a:path>
+                </a:pathLst>
+              </a:custGeom>
+              <a:grpFill/>
+              <a:ln>
+                <a:noFill/>
+              </a:ln>
+              <a:extLst>
+                <a:ext uri="{91240B29-F687-4F45-9708-019B960494DF}">
+                  <a14:hiddenLine xmlns:a14="http://schemas.microsoft.com/office/drawing/2010/main" w="9525">
+                    <a:solidFill>
+                      <a:srgbClr val="000000"/>
+                    </a:solidFill>
+                    <a:round/>
+                    <a:headEnd/>
+                    <a:tailEnd/>
+                  </a14:hiddenLine>
+                </a:ext>
+              </a:extLst>
+            </p:spPr>
+            <p:txBody>
+              <a:bodyPr vert="horz" wrap="square" lIns="91440" tIns="45720" rIns="91440" bIns="45720" numCol="1" anchor="t" anchorCtr="0" compatLnSpc="1">
+                <a:prstTxWarp prst="textNoShape">
+                  <a:avLst/>
+                </a:prstTxWarp>
+              </a:bodyPr>
+              <a:lstStyle/>
+              <a:p>
+                <a:endParaRPr lang="en-US"/>
+              </a:p>
+            </p:txBody>
+          </p:sp>
+          <p:sp>
+            <p:nvSpPr>
+              <p:cNvPr id="15" name="Freeform 7">
+                <a:extLst>
+                  <a:ext uri="{FF2B5EF4-FFF2-40B4-BE49-F238E27FC236}">
+                    <a16:creationId xmlns:a16="http://schemas.microsoft.com/office/drawing/2014/main" id="{FD727287-C9FF-49F5-8048-FECAA50EFFFC}"/>
+                  </a:ext>
+                </a:extLst>
+              </p:cNvPr>
+              <p:cNvSpPr>
+                <a:spLocks/>
+              </p:cNvSpPr>
+              <p:nvPr/>
+            </p:nvSpPr>
+            <p:spPr bwMode="auto">
+              <a:xfrm>
+                <a:off x="5312" y="1007"/>
+                <a:ext cx="69" cy="207"/>
+              </a:xfrm>
+              <a:custGeom>
+                <a:avLst/>
+                <a:gdLst>
+                  <a:gd name="T0" fmla="*/ 0 w 69"/>
+                  <a:gd name="T1" fmla="*/ 197 h 207"/>
+                  <a:gd name="T2" fmla="*/ 22 w 69"/>
+                  <a:gd name="T3" fmla="*/ 194 h 207"/>
+                  <a:gd name="T4" fmla="*/ 22 w 69"/>
+                  <a:gd name="T5" fmla="*/ 22 h 207"/>
+                  <a:gd name="T6" fmla="*/ 1 w 69"/>
+                  <a:gd name="T7" fmla="*/ 17 h 207"/>
+                  <a:gd name="T8" fmla="*/ 1 w 69"/>
+                  <a:gd name="T9" fmla="*/ 5 h 207"/>
+                  <a:gd name="T10" fmla="*/ 41 w 69"/>
+                  <a:gd name="T11" fmla="*/ 0 h 207"/>
+                  <a:gd name="T12" fmla="*/ 46 w 69"/>
+                  <a:gd name="T13" fmla="*/ 3 h 207"/>
+                  <a:gd name="T14" fmla="*/ 46 w 69"/>
+                  <a:gd name="T15" fmla="*/ 194 h 207"/>
+                  <a:gd name="T16" fmla="*/ 69 w 69"/>
+                  <a:gd name="T17" fmla="*/ 197 h 207"/>
+                  <a:gd name="T18" fmla="*/ 69 w 69"/>
+                  <a:gd name="T19" fmla="*/ 207 h 207"/>
+                  <a:gd name="T20" fmla="*/ 0 w 69"/>
+                  <a:gd name="T21" fmla="*/ 207 h 207"/>
+                  <a:gd name="T22" fmla="*/ 0 w 69"/>
+                  <a:gd name="T23" fmla="*/ 197 h 207"/>
+                </a:gdLst>
+                <a:ahLst/>
+                <a:cxnLst>
+                  <a:cxn ang="0">
+                    <a:pos x="T0" y="T1"/>
+                  </a:cxn>
+                  <a:cxn ang="0">
+                    <a:pos x="T2" y="T3"/>
+                  </a:cxn>
+                  <a:cxn ang="0">
+                    <a:pos x="T4" y="T5"/>
+                  </a:cxn>
+                  <a:cxn ang="0">
+                    <a:pos x="T6" y="T7"/>
+                  </a:cxn>
+                  <a:cxn ang="0">
+                    <a:pos x="T8" y="T9"/>
+                  </a:cxn>
+                  <a:cxn ang="0">
+                    <a:pos x="T10" y="T11"/>
+                  </a:cxn>
+                  <a:cxn ang="0">
+                    <a:pos x="T12" y="T13"/>
+                  </a:cxn>
+                  <a:cxn ang="0">
+                    <a:pos x="T14" y="T15"/>
+                  </a:cxn>
+                  <a:cxn ang="0">
+                    <a:pos x="T16" y="T17"/>
+                  </a:cxn>
+                  <a:cxn ang="0">
+                    <a:pos x="T18" y="T19"/>
+                  </a:cxn>
+                  <a:cxn ang="0">
+                    <a:pos x="T20" y="T21"/>
+                  </a:cxn>
+                  <a:cxn ang="0">
+                    <a:pos x="T22" y="T23"/>
+                  </a:cxn>
+                </a:cxnLst>
+                <a:rect l="0" t="0" r="r" b="b"/>
+                <a:pathLst>
+                  <a:path w="69" h="207">
+                    <a:moveTo>
+                      <a:pt x="0" y="197"/>
+                    </a:moveTo>
+                    <a:lnTo>
+                      <a:pt x="22" y="194"/>
+                    </a:lnTo>
+                    <a:lnTo>
+                      <a:pt x="22" y="22"/>
+                    </a:lnTo>
+                    <a:lnTo>
+                      <a:pt x="1" y="17"/>
+                    </a:lnTo>
+                    <a:lnTo>
+                      <a:pt x="1" y="5"/>
+                    </a:lnTo>
+                    <a:lnTo>
+                      <a:pt x="41" y="0"/>
+                    </a:lnTo>
+                    <a:lnTo>
+                      <a:pt x="46" y="3"/>
+                    </a:lnTo>
+                    <a:lnTo>
+                      <a:pt x="46" y="194"/>
+                    </a:lnTo>
+                    <a:lnTo>
+                      <a:pt x="69" y="197"/>
+                    </a:lnTo>
+                    <a:lnTo>
+                      <a:pt x="69" y="207"/>
+                    </a:lnTo>
+                    <a:lnTo>
+                      <a:pt x="0" y="207"/>
+                    </a:lnTo>
+                    <a:lnTo>
+                      <a:pt x="0" y="197"/>
+                    </a:lnTo>
+                    <a:close/>
+                  </a:path>
+                </a:pathLst>
+              </a:custGeom>
+              <a:grpFill/>
+              <a:ln>
+                <a:noFill/>
+              </a:ln>
+              <a:extLst>
+                <a:ext uri="{91240B29-F687-4F45-9708-019B960494DF}">
+                  <a14:hiddenLine xmlns:a14="http://schemas.microsoft.com/office/drawing/2010/main" w="9525">
+                    <a:solidFill>
+                      <a:srgbClr val="000000"/>
+                    </a:solidFill>
+                    <a:round/>
+                    <a:headEnd/>
+                    <a:tailEnd/>
+                  </a14:hiddenLine>
+                </a:ext>
+              </a:extLst>
+            </p:spPr>
+            <p:txBody>
+              <a:bodyPr vert="horz" wrap="square" lIns="91440" tIns="45720" rIns="91440" bIns="45720" numCol="1" anchor="t" anchorCtr="0" compatLnSpc="1">
+                <a:prstTxWarp prst="textNoShape">
+                  <a:avLst/>
+                </a:prstTxWarp>
+              </a:bodyPr>
+              <a:lstStyle/>
+              <a:p>
+                <a:endParaRPr lang="en-US"/>
+              </a:p>
+            </p:txBody>
+          </p:sp>
+          <p:sp>
+            <p:nvSpPr>
+              <p:cNvPr id="16" name="Freeform 8">
+                <a:extLst>
+                  <a:ext uri="{FF2B5EF4-FFF2-40B4-BE49-F238E27FC236}">
+                    <a16:creationId xmlns:a16="http://schemas.microsoft.com/office/drawing/2014/main" id="{45BAB9F8-3FA1-4FBD-878A-A0528C2607C8}"/>
+                  </a:ext>
+                </a:extLst>
+              </p:cNvPr>
+              <p:cNvSpPr>
+                <a:spLocks noEditPoints="1"/>
+              </p:cNvSpPr>
+              <p:nvPr/>
+            </p:nvSpPr>
+            <p:spPr bwMode="auto">
+              <a:xfrm>
+                <a:off x="5381" y="1069"/>
+                <a:ext cx="123" cy="148"/>
+              </a:xfrm>
+              <a:custGeom>
+                <a:avLst/>
+                <a:gdLst>
+                  <a:gd name="T0" fmla="*/ 1 w 167"/>
+                  <a:gd name="T1" fmla="*/ 141 h 200"/>
+                  <a:gd name="T2" fmla="*/ 8 w 167"/>
+                  <a:gd name="T3" fmla="*/ 120 h 200"/>
+                  <a:gd name="T4" fmla="*/ 24 w 167"/>
+                  <a:gd name="T5" fmla="*/ 104 h 200"/>
+                  <a:gd name="T6" fmla="*/ 46 w 167"/>
+                  <a:gd name="T7" fmla="*/ 93 h 200"/>
+                  <a:gd name="T8" fmla="*/ 70 w 167"/>
+                  <a:gd name="T9" fmla="*/ 86 h 200"/>
+                  <a:gd name="T10" fmla="*/ 93 w 167"/>
+                  <a:gd name="T11" fmla="*/ 83 h 200"/>
+                  <a:gd name="T12" fmla="*/ 112 w 167"/>
+                  <a:gd name="T13" fmla="*/ 82 h 200"/>
+                  <a:gd name="T14" fmla="*/ 112 w 167"/>
+                  <a:gd name="T15" fmla="*/ 67 h 200"/>
+                  <a:gd name="T16" fmla="*/ 108 w 167"/>
+                  <a:gd name="T17" fmla="*/ 44 h 200"/>
+                  <a:gd name="T18" fmla="*/ 98 w 167"/>
+                  <a:gd name="T19" fmla="*/ 31 h 200"/>
+                  <a:gd name="T20" fmla="*/ 83 w 167"/>
+                  <a:gd name="T21" fmla="*/ 25 h 200"/>
+                  <a:gd name="T22" fmla="*/ 64 w 167"/>
+                  <a:gd name="T23" fmla="*/ 23 h 200"/>
+                  <a:gd name="T24" fmla="*/ 53 w 167"/>
+                  <a:gd name="T25" fmla="*/ 24 h 200"/>
+                  <a:gd name="T26" fmla="*/ 40 w 167"/>
+                  <a:gd name="T27" fmla="*/ 26 h 200"/>
+                  <a:gd name="T28" fmla="*/ 27 w 167"/>
+                  <a:gd name="T29" fmla="*/ 31 h 200"/>
+                  <a:gd name="T30" fmla="*/ 14 w 167"/>
+                  <a:gd name="T31" fmla="*/ 36 h 200"/>
+                  <a:gd name="T32" fmla="*/ 8 w 167"/>
+                  <a:gd name="T33" fmla="*/ 20 h 200"/>
+                  <a:gd name="T34" fmla="*/ 24 w 167"/>
+                  <a:gd name="T35" fmla="*/ 11 h 200"/>
+                  <a:gd name="T36" fmla="*/ 43 w 167"/>
+                  <a:gd name="T37" fmla="*/ 5 h 200"/>
+                  <a:gd name="T38" fmla="*/ 61 w 167"/>
+                  <a:gd name="T39" fmla="*/ 1 h 200"/>
+                  <a:gd name="T40" fmla="*/ 77 w 167"/>
+                  <a:gd name="T41" fmla="*/ 0 h 200"/>
+                  <a:gd name="T42" fmla="*/ 103 w 167"/>
+                  <a:gd name="T43" fmla="*/ 3 h 200"/>
+                  <a:gd name="T44" fmla="*/ 125 w 167"/>
+                  <a:gd name="T45" fmla="*/ 13 h 200"/>
+                  <a:gd name="T46" fmla="*/ 139 w 167"/>
+                  <a:gd name="T47" fmla="*/ 32 h 200"/>
+                  <a:gd name="T48" fmla="*/ 145 w 167"/>
+                  <a:gd name="T49" fmla="*/ 63 h 200"/>
+                  <a:gd name="T50" fmla="*/ 145 w 167"/>
+                  <a:gd name="T51" fmla="*/ 182 h 200"/>
+                  <a:gd name="T52" fmla="*/ 167 w 167"/>
+                  <a:gd name="T53" fmla="*/ 182 h 200"/>
+                  <a:gd name="T54" fmla="*/ 167 w 167"/>
+                  <a:gd name="T55" fmla="*/ 193 h 200"/>
+                  <a:gd name="T56" fmla="*/ 152 w 167"/>
+                  <a:gd name="T57" fmla="*/ 198 h 200"/>
+                  <a:gd name="T58" fmla="*/ 134 w 167"/>
+                  <a:gd name="T59" fmla="*/ 200 h 200"/>
+                  <a:gd name="T60" fmla="*/ 127 w 167"/>
+                  <a:gd name="T61" fmla="*/ 200 h 200"/>
+                  <a:gd name="T62" fmla="*/ 121 w 167"/>
+                  <a:gd name="T63" fmla="*/ 198 h 200"/>
+                  <a:gd name="T64" fmla="*/ 116 w 167"/>
+                  <a:gd name="T65" fmla="*/ 192 h 200"/>
+                  <a:gd name="T66" fmla="*/ 114 w 167"/>
+                  <a:gd name="T67" fmla="*/ 182 h 200"/>
+                  <a:gd name="T68" fmla="*/ 114 w 167"/>
+                  <a:gd name="T69" fmla="*/ 178 h 200"/>
+                  <a:gd name="T70" fmla="*/ 104 w 167"/>
+                  <a:gd name="T71" fmla="*/ 187 h 200"/>
+                  <a:gd name="T72" fmla="*/ 92 w 167"/>
+                  <a:gd name="T73" fmla="*/ 194 h 200"/>
+                  <a:gd name="T74" fmla="*/ 76 w 167"/>
+                  <a:gd name="T75" fmla="*/ 199 h 200"/>
+                  <a:gd name="T76" fmla="*/ 56 w 167"/>
+                  <a:gd name="T77" fmla="*/ 200 h 200"/>
+                  <a:gd name="T78" fmla="*/ 32 w 167"/>
+                  <a:gd name="T79" fmla="*/ 195 h 200"/>
+                  <a:gd name="T80" fmla="*/ 14 w 167"/>
+                  <a:gd name="T81" fmla="*/ 182 h 200"/>
+                  <a:gd name="T82" fmla="*/ 3 w 167"/>
+                  <a:gd name="T83" fmla="*/ 164 h 200"/>
+                  <a:gd name="T84" fmla="*/ 1 w 167"/>
+                  <a:gd name="T85" fmla="*/ 141 h 200"/>
+                  <a:gd name="T86" fmla="*/ 34 w 167"/>
+                  <a:gd name="T87" fmla="*/ 141 h 200"/>
+                  <a:gd name="T88" fmla="*/ 37 w 167"/>
+                  <a:gd name="T89" fmla="*/ 159 h 200"/>
+                  <a:gd name="T90" fmla="*/ 45 w 167"/>
+                  <a:gd name="T91" fmla="*/ 170 h 200"/>
+                  <a:gd name="T92" fmla="*/ 58 w 167"/>
+                  <a:gd name="T93" fmla="*/ 176 h 200"/>
+                  <a:gd name="T94" fmla="*/ 75 w 167"/>
+                  <a:gd name="T95" fmla="*/ 178 h 200"/>
+                  <a:gd name="T96" fmla="*/ 85 w 167"/>
+                  <a:gd name="T97" fmla="*/ 177 h 200"/>
+                  <a:gd name="T98" fmla="*/ 95 w 167"/>
+                  <a:gd name="T99" fmla="*/ 174 h 200"/>
+                  <a:gd name="T100" fmla="*/ 105 w 167"/>
+                  <a:gd name="T101" fmla="*/ 169 h 200"/>
+                  <a:gd name="T102" fmla="*/ 111 w 167"/>
+                  <a:gd name="T103" fmla="*/ 164 h 200"/>
+                  <a:gd name="T104" fmla="*/ 111 w 167"/>
+                  <a:gd name="T105" fmla="*/ 131 h 200"/>
+                  <a:gd name="T106" fmla="*/ 112 w 167"/>
+                  <a:gd name="T107" fmla="*/ 99 h 200"/>
+                  <a:gd name="T108" fmla="*/ 96 w 167"/>
+                  <a:gd name="T109" fmla="*/ 100 h 200"/>
+                  <a:gd name="T110" fmla="*/ 79 w 167"/>
+                  <a:gd name="T111" fmla="*/ 103 h 200"/>
+                  <a:gd name="T112" fmla="*/ 62 w 167"/>
+                  <a:gd name="T113" fmla="*/ 108 h 200"/>
+                  <a:gd name="T114" fmla="*/ 48 w 167"/>
+                  <a:gd name="T115" fmla="*/ 116 h 200"/>
+                  <a:gd name="T116" fmla="*/ 38 w 167"/>
+                  <a:gd name="T117" fmla="*/ 127 h 200"/>
+                  <a:gd name="T118" fmla="*/ 34 w 167"/>
+                  <a:gd name="T119" fmla="*/ 141 h 200"/>
+                </a:gdLst>
+                <a:ahLst/>
+                <a:cxnLst>
+                  <a:cxn ang="0">
+                    <a:pos x="T0" y="T1"/>
+                  </a:cxn>
+                  <a:cxn ang="0">
+                    <a:pos x="T2" y="T3"/>
+                  </a:cxn>
+                  <a:cxn ang="0">
+                    <a:pos x="T4" y="T5"/>
+                  </a:cxn>
+                  <a:cxn ang="0">
+                    <a:pos x="T6" y="T7"/>
+                  </a:cxn>
+                  <a:cxn ang="0">
+                    <a:pos x="T8" y="T9"/>
+                  </a:cxn>
+                  <a:cxn ang="0">
+                    <a:pos x="T10" y="T11"/>
+                  </a:cxn>
+                  <a:cxn ang="0">
+                    <a:pos x="T12" y="T13"/>
+                  </a:cxn>
+                  <a:cxn ang="0">
+                    <a:pos x="T14" y="T15"/>
+                  </a:cxn>
+                  <a:cxn ang="0">
+                    <a:pos x="T16" y="T17"/>
+                  </a:cxn>
+                  <a:cxn ang="0">
+                    <a:pos x="T18" y="T19"/>
+                  </a:cxn>
+                  <a:cxn ang="0">
+                    <a:pos x="T20" y="T21"/>
+                  </a:cxn>
+                  <a:cxn ang="0">
+                    <a:pos x="T22" y="T23"/>
+                  </a:cxn>
+                  <a:cxn ang="0">
+                    <a:pos x="T24" y="T25"/>
+                  </a:cxn>
+                  <a:cxn ang="0">
+                    <a:pos x="T26" y="T27"/>
+                  </a:cxn>
+                  <a:cxn ang="0">
+                    <a:pos x="T28" y="T29"/>
+                  </a:cxn>
+                  <a:cxn ang="0">
+                    <a:pos x="T30" y="T31"/>
+                  </a:cxn>
+                  <a:cxn ang="0">
+                    <a:pos x="T32" y="T33"/>
+                  </a:cxn>
+                  <a:cxn ang="0">
+                    <a:pos x="T34" y="T35"/>
+                  </a:cxn>
+                  <a:cxn ang="0">
+                    <a:pos x="T36" y="T37"/>
+                  </a:cxn>
+                  <a:cxn ang="0">
+                    <a:pos x="T38" y="T39"/>
+                  </a:cxn>
+                  <a:cxn ang="0">
+                    <a:pos x="T40" y="T41"/>
+                  </a:cxn>
+                  <a:cxn ang="0">
+                    <a:pos x="T42" y="T43"/>
+                  </a:cxn>
+                  <a:cxn ang="0">
+                    <a:pos x="T44" y="T45"/>
+                  </a:cxn>
+                  <a:cxn ang="0">
+                    <a:pos x="T46" y="T47"/>
+                  </a:cxn>
+                  <a:cxn ang="0">
+                    <a:pos x="T48" y="T49"/>
+                  </a:cxn>
+                  <a:cxn ang="0">
+                    <a:pos x="T50" y="T51"/>
+                  </a:cxn>
+                  <a:cxn ang="0">
+                    <a:pos x="T52" y="T53"/>
+                  </a:cxn>
+                  <a:cxn ang="0">
+                    <a:pos x="T54" y="T55"/>
+                  </a:cxn>
+                  <a:cxn ang="0">
+                    <a:pos x="T56" y="T57"/>
+                  </a:cxn>
+                  <a:cxn ang="0">
+                    <a:pos x="T58" y="T59"/>
+                  </a:cxn>
+                  <a:cxn ang="0">
+                    <a:pos x="T60" y="T61"/>
+                  </a:cxn>
+                  <a:cxn ang="0">
+                    <a:pos x="T62" y="T63"/>
+                  </a:cxn>
+                  <a:cxn ang="0">
+                    <a:pos x="T64" y="T65"/>
+                  </a:cxn>
+                  <a:cxn ang="0">
+                    <a:pos x="T66" y="T67"/>
+                  </a:cxn>
+                  <a:cxn ang="0">
+                    <a:pos x="T68" y="T69"/>
+                  </a:cxn>
+                  <a:cxn ang="0">
+                    <a:pos x="T70" y="T71"/>
+                  </a:cxn>
+                  <a:cxn ang="0">
+                    <a:pos x="T72" y="T73"/>
+                  </a:cxn>
+                  <a:cxn ang="0">
+                    <a:pos x="T74" y="T75"/>
+                  </a:cxn>
+                  <a:cxn ang="0">
+                    <a:pos x="T76" y="T77"/>
+                  </a:cxn>
+                  <a:cxn ang="0">
+                    <a:pos x="T78" y="T79"/>
+                  </a:cxn>
+                  <a:cxn ang="0">
+                    <a:pos x="T80" y="T81"/>
+                  </a:cxn>
+                  <a:cxn ang="0">
+                    <a:pos x="T82" y="T83"/>
+                  </a:cxn>
+                  <a:cxn ang="0">
+                    <a:pos x="T84" y="T85"/>
+                  </a:cxn>
+                  <a:cxn ang="0">
+                    <a:pos x="T86" y="T87"/>
+                  </a:cxn>
+                  <a:cxn ang="0">
+                    <a:pos x="T88" y="T89"/>
+                  </a:cxn>
+                  <a:cxn ang="0">
+                    <a:pos x="T90" y="T91"/>
+                  </a:cxn>
+                  <a:cxn ang="0">
+                    <a:pos x="T92" y="T93"/>
+                  </a:cxn>
+                  <a:cxn ang="0">
+                    <a:pos x="T94" y="T95"/>
+                  </a:cxn>
+                  <a:cxn ang="0">
+                    <a:pos x="T96" y="T97"/>
+                  </a:cxn>
+                  <a:cxn ang="0">
+                    <a:pos x="T98" y="T99"/>
+                  </a:cxn>
+                  <a:cxn ang="0">
+                    <a:pos x="T100" y="T101"/>
+                  </a:cxn>
+                  <a:cxn ang="0">
+                    <a:pos x="T102" y="T103"/>
+                  </a:cxn>
+                  <a:cxn ang="0">
+                    <a:pos x="T104" y="T105"/>
+                  </a:cxn>
+                  <a:cxn ang="0">
+                    <a:pos x="T106" y="T107"/>
+                  </a:cxn>
+                  <a:cxn ang="0">
+                    <a:pos x="T108" y="T109"/>
+                  </a:cxn>
+                  <a:cxn ang="0">
+                    <a:pos x="T110" y="T111"/>
+                  </a:cxn>
+                  <a:cxn ang="0">
+                    <a:pos x="T112" y="T113"/>
+                  </a:cxn>
+                  <a:cxn ang="0">
+                    <a:pos x="T114" y="T115"/>
+                  </a:cxn>
+                  <a:cxn ang="0">
+                    <a:pos x="T116" y="T117"/>
+                  </a:cxn>
+                  <a:cxn ang="0">
+                    <a:pos x="T118" y="T119"/>
+                  </a:cxn>
+                </a:cxnLst>
+                <a:rect l="0" t="0" r="r" b="b"/>
+                <a:pathLst>
+                  <a:path w="167" h="200">
+                    <a:moveTo>
+                      <a:pt x="1" y="141"/>
+                    </a:moveTo>
+                    <a:cubicBezTo>
+                      <a:pt x="1" y="133"/>
+                      <a:pt x="4" y="126"/>
+                      <a:pt x="8" y="120"/>
+                    </a:cubicBezTo>
+                    <a:cubicBezTo>
+                      <a:pt x="13" y="114"/>
+                      <a:pt x="18" y="108"/>
+                      <a:pt x="24" y="104"/>
+                    </a:cubicBezTo>
+                    <a:cubicBezTo>
+                      <a:pt x="31" y="100"/>
+                      <a:pt x="38" y="96"/>
+                      <a:pt x="46" y="93"/>
+                    </a:cubicBezTo>
+                    <a:cubicBezTo>
+                      <a:pt x="54" y="90"/>
+                      <a:pt x="62" y="88"/>
+                      <a:pt x="70" y="86"/>
+                    </a:cubicBezTo>
+                    <a:cubicBezTo>
+                      <a:pt x="78" y="85"/>
+                      <a:pt x="85" y="83"/>
+                      <a:pt x="93" y="83"/>
+                    </a:cubicBezTo>
+                    <a:cubicBezTo>
+                      <a:pt x="100" y="82"/>
+                      <a:pt x="106" y="82"/>
+                      <a:pt x="112" y="82"/>
+                    </a:cubicBezTo>
+                    <a:cubicBezTo>
+                      <a:pt x="112" y="67"/>
+                      <a:pt x="112" y="67"/>
+                      <a:pt x="112" y="67"/>
+                    </a:cubicBezTo>
+                    <a:cubicBezTo>
+                      <a:pt x="112" y="58"/>
+                      <a:pt x="110" y="50"/>
+                      <a:pt x="108" y="44"/>
+                    </a:cubicBezTo>
+                    <a:cubicBezTo>
+                      <a:pt x="106" y="39"/>
+                      <a:pt x="102" y="34"/>
+                      <a:pt x="98" y="31"/>
+                    </a:cubicBezTo>
+                    <a:cubicBezTo>
+                      <a:pt x="94" y="28"/>
+                      <a:pt x="89" y="26"/>
+                      <a:pt x="83" y="25"/>
+                    </a:cubicBezTo>
+                    <a:cubicBezTo>
+                      <a:pt x="77" y="23"/>
+                      <a:pt x="71" y="23"/>
+                      <a:pt x="64" y="23"/>
+                    </a:cubicBezTo>
+                    <a:cubicBezTo>
+                      <a:pt x="61" y="23"/>
+                      <a:pt x="57" y="23"/>
+                      <a:pt x="53" y="24"/>
+                    </a:cubicBezTo>
+                    <a:cubicBezTo>
+                      <a:pt x="49" y="24"/>
+                      <a:pt x="45" y="25"/>
+                      <a:pt x="40" y="26"/>
+                    </a:cubicBezTo>
+                    <a:cubicBezTo>
+                      <a:pt x="36" y="28"/>
+                      <a:pt x="32" y="29"/>
+                      <a:pt x="27" y="31"/>
+                    </a:cubicBezTo>
+                    <a:cubicBezTo>
+                      <a:pt x="23" y="32"/>
+                      <a:pt x="18" y="34"/>
+                      <a:pt x="14" y="36"/>
+                    </a:cubicBezTo>
+                    <a:cubicBezTo>
+                      <a:pt x="8" y="20"/>
+                      <a:pt x="8" y="20"/>
+                      <a:pt x="8" y="20"/>
+                    </a:cubicBezTo>
+                    <a:cubicBezTo>
+                      <a:pt x="12" y="17"/>
+                      <a:pt x="17" y="14"/>
+                      <a:pt x="24" y="11"/>
+                    </a:cubicBezTo>
+                    <a:cubicBezTo>
+                      <a:pt x="30" y="9"/>
+                      <a:pt x="36" y="7"/>
+                      <a:pt x="43" y="5"/>
+                    </a:cubicBezTo>
+                    <a:cubicBezTo>
+                      <a:pt x="49" y="3"/>
+                      <a:pt x="55" y="2"/>
+                      <a:pt x="61" y="1"/>
+                    </a:cubicBezTo>
+                    <a:cubicBezTo>
+                      <a:pt x="68" y="0"/>
+                      <a:pt x="73" y="0"/>
+                      <a:pt x="77" y="0"/>
+                    </a:cubicBezTo>
+                    <a:cubicBezTo>
+                      <a:pt x="86" y="0"/>
+                      <a:pt x="95" y="1"/>
+                      <a:pt x="103" y="3"/>
+                    </a:cubicBezTo>
+                    <a:cubicBezTo>
+                      <a:pt x="111" y="5"/>
+                      <a:pt x="119" y="8"/>
+                      <a:pt x="125" y="13"/>
+                    </a:cubicBezTo>
+                    <a:cubicBezTo>
+                      <a:pt x="131" y="18"/>
+                      <a:pt x="136" y="24"/>
+                      <a:pt x="139" y="32"/>
+                    </a:cubicBezTo>
+                    <a:cubicBezTo>
+                      <a:pt x="143" y="40"/>
+                      <a:pt x="145" y="50"/>
+                      <a:pt x="145" y="63"/>
+                    </a:cubicBezTo>
+                    <a:cubicBezTo>
+                      <a:pt x="145" y="182"/>
+                      <a:pt x="145" y="182"/>
+                      <a:pt x="145" y="182"/>
+                    </a:cubicBezTo>
+                    <a:cubicBezTo>
+                      <a:pt x="167" y="182"/>
+                      <a:pt x="167" y="182"/>
+                      <a:pt x="167" y="182"/>
+                    </a:cubicBezTo>
+                    <a:cubicBezTo>
+                      <a:pt x="167" y="193"/>
+                      <a:pt x="167" y="193"/>
+                      <a:pt x="167" y="193"/>
+                    </a:cubicBezTo>
+                    <a:cubicBezTo>
+                      <a:pt x="163" y="195"/>
+                      <a:pt x="158" y="197"/>
+                      <a:pt x="152" y="198"/>
+                    </a:cubicBezTo>
+                    <a:cubicBezTo>
+                      <a:pt x="146" y="200"/>
+                      <a:pt x="140" y="200"/>
+                      <a:pt x="134" y="200"/>
+                    </a:cubicBezTo>
+                    <a:cubicBezTo>
+                      <a:pt x="132" y="200"/>
+                      <a:pt x="130" y="200"/>
+                      <a:pt x="127" y="200"/>
+                    </a:cubicBezTo>
+                    <a:cubicBezTo>
+                      <a:pt x="125" y="200"/>
+                      <a:pt x="123" y="199"/>
+                      <a:pt x="121" y="198"/>
+                    </a:cubicBezTo>
+                    <a:cubicBezTo>
+                      <a:pt x="119" y="197"/>
+                      <a:pt x="117" y="195"/>
+                      <a:pt x="116" y="192"/>
+                    </a:cubicBezTo>
+                    <a:cubicBezTo>
+                      <a:pt x="114" y="190"/>
+                      <a:pt x="114" y="187"/>
+                      <a:pt x="114" y="182"/>
+                    </a:cubicBezTo>
+                    <a:cubicBezTo>
+                      <a:pt x="114" y="178"/>
+                      <a:pt x="114" y="178"/>
+                      <a:pt x="114" y="178"/>
+                    </a:cubicBezTo>
+                    <a:cubicBezTo>
+                      <a:pt x="111" y="181"/>
+                      <a:pt x="108" y="184"/>
+                      <a:pt x="104" y="187"/>
+                    </a:cubicBezTo>
+                    <a:cubicBezTo>
+                      <a:pt x="101" y="189"/>
+                      <a:pt x="96" y="192"/>
+                      <a:pt x="92" y="194"/>
+                    </a:cubicBezTo>
+                    <a:cubicBezTo>
+                      <a:pt x="87" y="196"/>
+                      <a:pt x="82" y="197"/>
+                      <a:pt x="76" y="199"/>
+                    </a:cubicBezTo>
+                    <a:cubicBezTo>
+                      <a:pt x="70" y="200"/>
+                      <a:pt x="63" y="200"/>
+                      <a:pt x="56" y="200"/>
+                    </a:cubicBezTo>
+                    <a:cubicBezTo>
+                      <a:pt x="47" y="200"/>
+                      <a:pt x="39" y="199"/>
+                      <a:pt x="32" y="195"/>
+                    </a:cubicBezTo>
+                    <a:cubicBezTo>
+                      <a:pt x="25" y="192"/>
+                      <a:pt x="18" y="188"/>
+                      <a:pt x="14" y="182"/>
+                    </a:cubicBezTo>
+                    <a:cubicBezTo>
+                      <a:pt x="9" y="177"/>
+                      <a:pt x="5" y="171"/>
+                      <a:pt x="3" y="164"/>
+                    </a:cubicBezTo>
+                    <a:cubicBezTo>
+                      <a:pt x="0" y="156"/>
+                      <a:pt x="0" y="149"/>
+                      <a:pt x="1" y="141"/>
+                    </a:cubicBezTo>
+                    <a:close/>
+                    <a:moveTo>
+                      <a:pt x="34" y="141"/>
+                    </a:moveTo>
+                    <a:cubicBezTo>
+                      <a:pt x="34" y="148"/>
+                      <a:pt x="35" y="154"/>
+                      <a:pt x="37" y="159"/>
+                    </a:cubicBezTo>
+                    <a:cubicBezTo>
+                      <a:pt x="39" y="163"/>
+                      <a:pt x="41" y="167"/>
+                      <a:pt x="45" y="170"/>
+                    </a:cubicBezTo>
+                    <a:cubicBezTo>
+                      <a:pt x="48" y="173"/>
+                      <a:pt x="53" y="175"/>
+                      <a:pt x="58" y="176"/>
+                    </a:cubicBezTo>
+                    <a:cubicBezTo>
+                      <a:pt x="63" y="178"/>
+                      <a:pt x="68" y="178"/>
+                      <a:pt x="75" y="178"/>
+                    </a:cubicBezTo>
+                    <a:cubicBezTo>
+                      <a:pt x="78" y="178"/>
+                      <a:pt x="82" y="178"/>
+                      <a:pt x="85" y="177"/>
+                    </a:cubicBezTo>
+                    <a:cubicBezTo>
+                      <a:pt x="89" y="176"/>
+                      <a:pt x="92" y="175"/>
+                      <a:pt x="95" y="174"/>
+                    </a:cubicBezTo>
+                    <a:cubicBezTo>
+                      <a:pt x="99" y="172"/>
+                      <a:pt x="102" y="171"/>
+                      <a:pt x="105" y="169"/>
+                    </a:cubicBezTo>
+                    <a:cubicBezTo>
+                      <a:pt x="107" y="167"/>
+                      <a:pt x="110" y="165"/>
+                      <a:pt x="111" y="164"/>
+                    </a:cubicBezTo>
+                    <a:cubicBezTo>
+                      <a:pt x="111" y="153"/>
+                      <a:pt x="111" y="142"/>
+                      <a:pt x="111" y="131"/>
+                    </a:cubicBezTo>
+                    <a:cubicBezTo>
+                      <a:pt x="111" y="121"/>
+                      <a:pt x="112" y="110"/>
+                      <a:pt x="112" y="99"/>
+                    </a:cubicBezTo>
+                    <a:cubicBezTo>
+                      <a:pt x="107" y="99"/>
+                      <a:pt x="102" y="100"/>
+                      <a:pt x="96" y="100"/>
+                    </a:cubicBezTo>
+                    <a:cubicBezTo>
+                      <a:pt x="90" y="101"/>
+                      <a:pt x="84" y="102"/>
+                      <a:pt x="79" y="103"/>
+                    </a:cubicBezTo>
+                    <a:cubicBezTo>
+                      <a:pt x="73" y="104"/>
+                      <a:pt x="67" y="106"/>
+                      <a:pt x="62" y="108"/>
+                    </a:cubicBezTo>
+                    <a:cubicBezTo>
+                      <a:pt x="56" y="110"/>
+                      <a:pt x="52" y="112"/>
+                      <a:pt x="48" y="116"/>
+                    </a:cubicBezTo>
+                    <a:cubicBezTo>
+                      <a:pt x="43" y="119"/>
+                      <a:pt x="40" y="122"/>
+                      <a:pt x="38" y="127"/>
+                    </a:cubicBezTo>
+                    <a:cubicBezTo>
+                      <a:pt x="35" y="131"/>
+                      <a:pt x="34" y="136"/>
+                      <a:pt x="34" y="141"/>
+                    </a:cubicBezTo>
+                    <a:close/>
+                  </a:path>
+                </a:pathLst>
+              </a:custGeom>
+              <a:grpFill/>
+              <a:ln>
+                <a:noFill/>
+              </a:ln>
+              <a:extLst>
+                <a:ext uri="{91240B29-F687-4F45-9708-019B960494DF}">
+                  <a14:hiddenLine xmlns:a14="http://schemas.microsoft.com/office/drawing/2010/main" w="9525">
+                    <a:solidFill>
+                      <a:srgbClr val="000000"/>
+                    </a:solidFill>
+                    <a:round/>
+                    <a:headEnd/>
+                    <a:tailEnd/>
+                  </a14:hiddenLine>
+                </a:ext>
+              </a:extLst>
+            </p:spPr>
+            <p:txBody>
+              <a:bodyPr vert="horz" wrap="square" lIns="91440" tIns="45720" rIns="91440" bIns="45720" numCol="1" anchor="t" anchorCtr="0" compatLnSpc="1">
+                <a:prstTxWarp prst="textNoShape">
+                  <a:avLst/>
+                </a:prstTxWarp>
+              </a:bodyPr>
+              <a:lstStyle/>
+              <a:p>
+                <a:endParaRPr lang="en-US"/>
+              </a:p>
+            </p:txBody>
+          </p:sp>
+          <p:sp>
+            <p:nvSpPr>
+              <p:cNvPr id="17" name="Freeform 9">
+                <a:extLst>
+                  <a:ext uri="{FF2B5EF4-FFF2-40B4-BE49-F238E27FC236}">
+                    <a16:creationId xmlns:a16="http://schemas.microsoft.com/office/drawing/2014/main" id="{A26113FF-8A8B-473D-8F68-30656EAEABDB}"/>
+                  </a:ext>
+                </a:extLst>
+              </p:cNvPr>
+              <p:cNvSpPr>
+                <a:spLocks/>
+              </p:cNvSpPr>
+              <p:nvPr/>
+            </p:nvSpPr>
+            <p:spPr bwMode="auto">
+              <a:xfrm>
+                <a:off x="5508" y="1069"/>
+                <a:ext cx="152" cy="145"/>
+              </a:xfrm>
+              <a:custGeom>
+                <a:avLst/>
+                <a:gdLst>
+                  <a:gd name="T0" fmla="*/ 1 w 207"/>
+                  <a:gd name="T1" fmla="*/ 182 h 196"/>
+                  <a:gd name="T2" fmla="*/ 24 w 207"/>
+                  <a:gd name="T3" fmla="*/ 178 h 196"/>
+                  <a:gd name="T4" fmla="*/ 24 w 207"/>
+                  <a:gd name="T5" fmla="*/ 38 h 196"/>
+                  <a:gd name="T6" fmla="*/ 0 w 207"/>
+                  <a:gd name="T7" fmla="*/ 24 h 196"/>
+                  <a:gd name="T8" fmla="*/ 0 w 207"/>
+                  <a:gd name="T9" fmla="*/ 14 h 196"/>
+                  <a:gd name="T10" fmla="*/ 45 w 207"/>
+                  <a:gd name="T11" fmla="*/ 0 h 196"/>
+                  <a:gd name="T12" fmla="*/ 53 w 207"/>
+                  <a:gd name="T13" fmla="*/ 3 h 196"/>
+                  <a:gd name="T14" fmla="*/ 53 w 207"/>
+                  <a:gd name="T15" fmla="*/ 28 h 196"/>
+                  <a:gd name="T16" fmla="*/ 67 w 207"/>
+                  <a:gd name="T17" fmla="*/ 18 h 196"/>
+                  <a:gd name="T18" fmla="*/ 85 w 207"/>
+                  <a:gd name="T19" fmla="*/ 9 h 196"/>
+                  <a:gd name="T20" fmla="*/ 104 w 207"/>
+                  <a:gd name="T21" fmla="*/ 3 h 196"/>
+                  <a:gd name="T22" fmla="*/ 123 w 207"/>
+                  <a:gd name="T23" fmla="*/ 0 h 196"/>
+                  <a:gd name="T24" fmla="*/ 149 w 207"/>
+                  <a:gd name="T25" fmla="*/ 4 h 196"/>
+                  <a:gd name="T26" fmla="*/ 167 w 207"/>
+                  <a:gd name="T27" fmla="*/ 18 h 196"/>
+                  <a:gd name="T28" fmla="*/ 177 w 207"/>
+                  <a:gd name="T29" fmla="*/ 44 h 196"/>
+                  <a:gd name="T30" fmla="*/ 180 w 207"/>
+                  <a:gd name="T31" fmla="*/ 81 h 196"/>
+                  <a:gd name="T32" fmla="*/ 180 w 207"/>
+                  <a:gd name="T33" fmla="*/ 178 h 196"/>
+                  <a:gd name="T34" fmla="*/ 207 w 207"/>
+                  <a:gd name="T35" fmla="*/ 182 h 196"/>
+                  <a:gd name="T36" fmla="*/ 207 w 207"/>
+                  <a:gd name="T37" fmla="*/ 196 h 196"/>
+                  <a:gd name="T38" fmla="*/ 121 w 207"/>
+                  <a:gd name="T39" fmla="*/ 196 h 196"/>
+                  <a:gd name="T40" fmla="*/ 121 w 207"/>
+                  <a:gd name="T41" fmla="*/ 182 h 196"/>
+                  <a:gd name="T42" fmla="*/ 147 w 207"/>
+                  <a:gd name="T43" fmla="*/ 178 h 196"/>
+                  <a:gd name="T44" fmla="*/ 147 w 207"/>
+                  <a:gd name="T45" fmla="*/ 87 h 196"/>
+                  <a:gd name="T46" fmla="*/ 145 w 207"/>
+                  <a:gd name="T47" fmla="*/ 59 h 196"/>
+                  <a:gd name="T48" fmla="*/ 139 w 207"/>
+                  <a:gd name="T49" fmla="*/ 40 h 196"/>
+                  <a:gd name="T50" fmla="*/ 126 w 207"/>
+                  <a:gd name="T51" fmla="*/ 28 h 196"/>
+                  <a:gd name="T52" fmla="*/ 105 w 207"/>
+                  <a:gd name="T53" fmla="*/ 25 h 196"/>
+                  <a:gd name="T54" fmla="*/ 82 w 207"/>
+                  <a:gd name="T55" fmla="*/ 30 h 196"/>
+                  <a:gd name="T56" fmla="*/ 57 w 207"/>
+                  <a:gd name="T57" fmla="*/ 43 h 196"/>
+                  <a:gd name="T58" fmla="*/ 57 w 207"/>
+                  <a:gd name="T59" fmla="*/ 178 h 196"/>
+                  <a:gd name="T60" fmla="*/ 83 w 207"/>
+                  <a:gd name="T61" fmla="*/ 182 h 196"/>
+                  <a:gd name="T62" fmla="*/ 83 w 207"/>
+                  <a:gd name="T63" fmla="*/ 196 h 196"/>
+                  <a:gd name="T64" fmla="*/ 1 w 207"/>
+                  <a:gd name="T65" fmla="*/ 196 h 196"/>
+                  <a:gd name="T66" fmla="*/ 1 w 207"/>
+                  <a:gd name="T67" fmla="*/ 182 h 196"/>
+                </a:gdLst>
+                <a:ahLst/>
+                <a:cxnLst>
+                  <a:cxn ang="0">
+                    <a:pos x="T0" y="T1"/>
+                  </a:cxn>
+                  <a:cxn ang="0">
+                    <a:pos x="T2" y="T3"/>
+                  </a:cxn>
+                  <a:cxn ang="0">
+                    <a:pos x="T4" y="T5"/>
+                  </a:cxn>
+                  <a:cxn ang="0">
+                    <a:pos x="T6" y="T7"/>
+                  </a:cxn>
+                  <a:cxn ang="0">
+                    <a:pos x="T8" y="T9"/>
+                  </a:cxn>
+                  <a:cxn ang="0">
+                    <a:pos x="T10" y="T11"/>
+                  </a:cxn>
+                  <a:cxn ang="0">
+                    <a:pos x="T12" y="T13"/>
+                  </a:cxn>
+                  <a:cxn ang="0">
+                    <a:pos x="T14" y="T15"/>
+                  </a:cxn>
+                  <a:cxn ang="0">
+                    <a:pos x="T16" y="T17"/>
+                  </a:cxn>
+                  <a:cxn ang="0">
+                    <a:pos x="T18" y="T19"/>
+                  </a:cxn>
+                  <a:cxn ang="0">
+                    <a:pos x="T20" y="T21"/>
+                  </a:cxn>
+                  <a:cxn ang="0">
+                    <a:pos x="T22" y="T23"/>
+                  </a:cxn>
+                  <a:cxn ang="0">
+                    <a:pos x="T24" y="T25"/>
+                  </a:cxn>
+                  <a:cxn ang="0">
+                    <a:pos x="T26" y="T27"/>
+                  </a:cxn>
+                  <a:cxn ang="0">
+                    <a:pos x="T28" y="T29"/>
+                  </a:cxn>
+                  <a:cxn ang="0">
+                    <a:pos x="T30" y="T31"/>
+                  </a:cxn>
+                  <a:cxn ang="0">
+                    <a:pos x="T32" y="T33"/>
+                  </a:cxn>
+                  <a:cxn ang="0">
+                    <a:pos x="T34" y="T35"/>
+                  </a:cxn>
+                  <a:cxn ang="0">
+                    <a:pos x="T36" y="T37"/>
+                  </a:cxn>
+                  <a:cxn ang="0">
+                    <a:pos x="T38" y="T39"/>
+                  </a:cxn>
+                  <a:cxn ang="0">
+                    <a:pos x="T40" y="T41"/>
+                  </a:cxn>
+                  <a:cxn ang="0">
+                    <a:pos x="T42" y="T43"/>
+                  </a:cxn>
+                  <a:cxn ang="0">
+                    <a:pos x="T44" y="T45"/>
+                  </a:cxn>
+                  <a:cxn ang="0">
+                    <a:pos x="T46" y="T47"/>
+                  </a:cxn>
+                  <a:cxn ang="0">
+                    <a:pos x="T48" y="T49"/>
+                  </a:cxn>
+                  <a:cxn ang="0">
+                    <a:pos x="T50" y="T51"/>
+                  </a:cxn>
+                  <a:cxn ang="0">
+                    <a:pos x="T52" y="T53"/>
+                  </a:cxn>
+                  <a:cxn ang="0">
+                    <a:pos x="T54" y="T55"/>
+                  </a:cxn>
+                  <a:cxn ang="0">
+                    <a:pos x="T56" y="T57"/>
+                  </a:cxn>
+                  <a:cxn ang="0">
+                    <a:pos x="T58" y="T59"/>
+                  </a:cxn>
+                  <a:cxn ang="0">
+                    <a:pos x="T60" y="T61"/>
+                  </a:cxn>
+                  <a:cxn ang="0">
+                    <a:pos x="T62" y="T63"/>
+                  </a:cxn>
+                  <a:cxn ang="0">
+                    <a:pos x="T64" y="T65"/>
+                  </a:cxn>
+                  <a:cxn ang="0">
+                    <a:pos x="T66" y="T67"/>
+                  </a:cxn>
+                </a:cxnLst>
+                <a:rect l="0" t="0" r="r" b="b"/>
+                <a:pathLst>
+                  <a:path w="207" h="196">
+                    <a:moveTo>
+                      <a:pt x="1" y="182"/>
+                    </a:moveTo>
+                    <a:cubicBezTo>
+                      <a:pt x="24" y="178"/>
+                      <a:pt x="24" y="178"/>
+                      <a:pt x="24" y="178"/>
+                    </a:cubicBezTo>
+                    <a:cubicBezTo>
+                      <a:pt x="24" y="38"/>
+                      <a:pt x="24" y="38"/>
+                      <a:pt x="24" y="38"/>
+                    </a:cubicBezTo>
+                    <a:cubicBezTo>
+                      <a:pt x="0" y="24"/>
+                      <a:pt x="0" y="24"/>
+                      <a:pt x="0" y="24"/>
+                    </a:cubicBezTo>
+                    <a:cubicBezTo>
+                      <a:pt x="0" y="14"/>
+                      <a:pt x="0" y="14"/>
+                      <a:pt x="0" y="14"/>
+                    </a:cubicBezTo>
+                    <a:cubicBezTo>
+                      <a:pt x="45" y="0"/>
+                      <a:pt x="45" y="0"/>
+                      <a:pt x="45" y="0"/>
+                    </a:cubicBezTo>
+                    <a:cubicBezTo>
+                      <a:pt x="53" y="3"/>
+                      <a:pt x="53" y="3"/>
+                      <a:pt x="53" y="3"/>
+                    </a:cubicBezTo>
+                    <a:cubicBezTo>
+                      <a:pt x="53" y="28"/>
+                      <a:pt x="53" y="28"/>
+                      <a:pt x="53" y="28"/>
+                    </a:cubicBezTo>
+                    <a:cubicBezTo>
+                      <a:pt x="57" y="25"/>
+                      <a:pt x="62" y="21"/>
+                      <a:pt x="67" y="18"/>
+                    </a:cubicBezTo>
+                    <a:cubicBezTo>
+                      <a:pt x="73" y="15"/>
+                      <a:pt x="79" y="12"/>
+                      <a:pt x="85" y="9"/>
+                    </a:cubicBezTo>
+                    <a:cubicBezTo>
+                      <a:pt x="91" y="7"/>
+                      <a:pt x="97" y="4"/>
+                      <a:pt x="104" y="3"/>
+                    </a:cubicBezTo>
+                    <a:cubicBezTo>
+                      <a:pt x="111" y="1"/>
+                      <a:pt x="117" y="0"/>
+                      <a:pt x="123" y="0"/>
+                    </a:cubicBezTo>
+                    <a:cubicBezTo>
+                      <a:pt x="133" y="0"/>
+                      <a:pt x="142" y="1"/>
+                      <a:pt x="149" y="4"/>
+                    </a:cubicBezTo>
+                    <a:cubicBezTo>
+                      <a:pt x="157" y="7"/>
+                      <a:pt x="163" y="12"/>
+                      <a:pt x="167" y="18"/>
+                    </a:cubicBezTo>
+                    <a:cubicBezTo>
+                      <a:pt x="172" y="25"/>
+                      <a:pt x="175" y="33"/>
+                      <a:pt x="177" y="44"/>
+                    </a:cubicBezTo>
+                    <a:cubicBezTo>
+                      <a:pt x="179" y="54"/>
+                      <a:pt x="180" y="66"/>
+                      <a:pt x="180" y="81"/>
+                    </a:cubicBezTo>
+                    <a:cubicBezTo>
+                      <a:pt x="180" y="178"/>
+                      <a:pt x="180" y="178"/>
+                      <a:pt x="180" y="178"/>
+                    </a:cubicBezTo>
+                    <a:cubicBezTo>
+                      <a:pt x="207" y="182"/>
+                      <a:pt x="207" y="182"/>
+                      <a:pt x="207" y="182"/>
+                    </a:cubicBezTo>
+                    <a:cubicBezTo>
+                      <a:pt x="207" y="196"/>
+                      <a:pt x="207" y="196"/>
+                      <a:pt x="207" y="196"/>
+                    </a:cubicBezTo>
+                    <a:cubicBezTo>
+                      <a:pt x="121" y="196"/>
+                      <a:pt x="121" y="196"/>
+                      <a:pt x="121" y="196"/>
+                    </a:cubicBezTo>
+                    <a:cubicBezTo>
+                      <a:pt x="121" y="182"/>
+                      <a:pt x="121" y="182"/>
+                      <a:pt x="121" y="182"/>
+                    </a:cubicBezTo>
+                    <a:cubicBezTo>
+                      <a:pt x="147" y="178"/>
+                      <a:pt x="147" y="178"/>
+                      <a:pt x="147" y="178"/>
+                    </a:cubicBezTo>
+                    <a:cubicBezTo>
+                      <a:pt x="147" y="87"/>
+                      <a:pt x="147" y="87"/>
+                      <a:pt x="147" y="87"/>
+                    </a:cubicBezTo>
+                    <a:cubicBezTo>
+                      <a:pt x="147" y="76"/>
+                      <a:pt x="146" y="67"/>
+                      <a:pt x="145" y="59"/>
+                    </a:cubicBezTo>
+                    <a:cubicBezTo>
+                      <a:pt x="144" y="51"/>
+                      <a:pt x="142" y="45"/>
+                      <a:pt x="139" y="40"/>
+                    </a:cubicBezTo>
+                    <a:cubicBezTo>
+                      <a:pt x="136" y="34"/>
+                      <a:pt x="132" y="31"/>
+                      <a:pt x="126" y="28"/>
+                    </a:cubicBezTo>
+                    <a:cubicBezTo>
+                      <a:pt x="121" y="26"/>
+                      <a:pt x="114" y="25"/>
+                      <a:pt x="105" y="25"/>
+                    </a:cubicBezTo>
+                    <a:cubicBezTo>
+                      <a:pt x="98" y="25"/>
+                      <a:pt x="90" y="27"/>
+                      <a:pt x="82" y="30"/>
+                    </a:cubicBezTo>
+                    <a:cubicBezTo>
+                      <a:pt x="75" y="33"/>
+                      <a:pt x="66" y="37"/>
+                      <a:pt x="57" y="43"/>
+                    </a:cubicBezTo>
+                    <a:cubicBezTo>
+                      <a:pt x="57" y="178"/>
+                      <a:pt x="57" y="178"/>
+                      <a:pt x="57" y="178"/>
+                    </a:cubicBezTo>
+                    <a:cubicBezTo>
+                      <a:pt x="83" y="182"/>
+                      <a:pt x="83" y="182"/>
+                      <a:pt x="83" y="182"/>
+                    </a:cubicBezTo>
+                    <a:cubicBezTo>
+                      <a:pt x="83" y="196"/>
+                      <a:pt x="83" y="196"/>
+                      <a:pt x="83" y="196"/>
+                    </a:cubicBezTo>
+                    <a:cubicBezTo>
+                      <a:pt x="1" y="196"/>
+                      <a:pt x="1" y="196"/>
+                      <a:pt x="1" y="196"/>
+                    </a:cubicBezTo>
+                    <a:lnTo>
+                      <a:pt x="1" y="182"/>
+                    </a:lnTo>
+                    <a:close/>
+                  </a:path>
+                </a:pathLst>
+              </a:custGeom>
+              <a:grpFill/>
+              <a:ln>
+                <a:noFill/>
+              </a:ln>
+              <a:extLst>
+                <a:ext uri="{91240B29-F687-4F45-9708-019B960494DF}">
+                  <a14:hiddenLine xmlns:a14="http://schemas.microsoft.com/office/drawing/2010/main" w="9525">
+                    <a:solidFill>
+                      <a:srgbClr val="000000"/>
+                    </a:solidFill>
+                    <a:round/>
+                    <a:headEnd/>
+                    <a:tailEnd/>
+                  </a14:hiddenLine>
+                </a:ext>
+              </a:extLst>
+            </p:spPr>
+            <p:txBody>
+              <a:bodyPr vert="horz" wrap="square" lIns="91440" tIns="45720" rIns="91440" bIns="45720" numCol="1" anchor="t" anchorCtr="0" compatLnSpc="1">
+                <a:prstTxWarp prst="textNoShape">
+                  <a:avLst/>
+                </a:prstTxWarp>
+              </a:bodyPr>
+              <a:lstStyle/>
+              <a:p>
+                <a:endParaRPr lang="en-US"/>
+              </a:p>
+            </p:txBody>
+          </p:sp>
+          <p:sp>
+            <p:nvSpPr>
+              <p:cNvPr id="18" name="Freeform 10">
+                <a:extLst>
+                  <a:ext uri="{FF2B5EF4-FFF2-40B4-BE49-F238E27FC236}">
+                    <a16:creationId xmlns:a16="http://schemas.microsoft.com/office/drawing/2014/main" id="{0745DE31-2EA7-4FBB-A817-6C5F9741FB51}"/>
+                  </a:ext>
+                </a:extLst>
+              </p:cNvPr>
+              <p:cNvSpPr>
+                <a:spLocks noEditPoints="1"/>
+              </p:cNvSpPr>
+              <p:nvPr/>
+            </p:nvSpPr>
+            <p:spPr bwMode="auto">
+              <a:xfrm>
+                <a:off x="5654" y="1007"/>
+                <a:ext cx="139" cy="212"/>
+              </a:xfrm>
+              <a:custGeom>
+                <a:avLst/>
+                <a:gdLst>
+                  <a:gd name="T0" fmla="*/ 76 w 189"/>
+                  <a:gd name="T1" fmla="*/ 284 h 286"/>
+                  <a:gd name="T2" fmla="*/ 47 w 189"/>
+                  <a:gd name="T3" fmla="*/ 279 h 286"/>
+                  <a:gd name="T4" fmla="*/ 23 w 189"/>
+                  <a:gd name="T5" fmla="*/ 261 h 286"/>
+                  <a:gd name="T6" fmla="*/ 7 w 189"/>
+                  <a:gd name="T7" fmla="*/ 230 h 286"/>
+                  <a:gd name="T8" fmla="*/ 0 w 189"/>
+                  <a:gd name="T9" fmla="*/ 187 h 286"/>
+                  <a:gd name="T10" fmla="*/ 8 w 189"/>
+                  <a:gd name="T11" fmla="*/ 144 h 286"/>
+                  <a:gd name="T12" fmla="*/ 29 w 189"/>
+                  <a:gd name="T13" fmla="*/ 111 h 286"/>
+                  <a:gd name="T14" fmla="*/ 61 w 189"/>
+                  <a:gd name="T15" fmla="*/ 89 h 286"/>
+                  <a:gd name="T16" fmla="*/ 100 w 189"/>
+                  <a:gd name="T17" fmla="*/ 82 h 286"/>
+                  <a:gd name="T18" fmla="*/ 118 w 189"/>
+                  <a:gd name="T19" fmla="*/ 83 h 286"/>
+                  <a:gd name="T20" fmla="*/ 132 w 189"/>
+                  <a:gd name="T21" fmla="*/ 86 h 286"/>
+                  <a:gd name="T22" fmla="*/ 132 w 189"/>
+                  <a:gd name="T23" fmla="*/ 29 h 286"/>
+                  <a:gd name="T24" fmla="*/ 96 w 189"/>
+                  <a:gd name="T25" fmla="*/ 22 h 286"/>
+                  <a:gd name="T26" fmla="*/ 96 w 189"/>
+                  <a:gd name="T27" fmla="*/ 7 h 286"/>
+                  <a:gd name="T28" fmla="*/ 158 w 189"/>
+                  <a:gd name="T29" fmla="*/ 0 h 286"/>
+                  <a:gd name="T30" fmla="*/ 165 w 189"/>
+                  <a:gd name="T31" fmla="*/ 4 h 286"/>
+                  <a:gd name="T32" fmla="*/ 165 w 189"/>
+                  <a:gd name="T33" fmla="*/ 266 h 286"/>
+                  <a:gd name="T34" fmla="*/ 189 w 189"/>
+                  <a:gd name="T35" fmla="*/ 266 h 286"/>
+                  <a:gd name="T36" fmla="*/ 189 w 189"/>
+                  <a:gd name="T37" fmla="*/ 278 h 286"/>
+                  <a:gd name="T38" fmla="*/ 181 w 189"/>
+                  <a:gd name="T39" fmla="*/ 281 h 286"/>
+                  <a:gd name="T40" fmla="*/ 172 w 189"/>
+                  <a:gd name="T41" fmla="*/ 284 h 286"/>
+                  <a:gd name="T42" fmla="*/ 162 w 189"/>
+                  <a:gd name="T43" fmla="*/ 285 h 286"/>
+                  <a:gd name="T44" fmla="*/ 153 w 189"/>
+                  <a:gd name="T45" fmla="*/ 286 h 286"/>
+                  <a:gd name="T46" fmla="*/ 146 w 189"/>
+                  <a:gd name="T47" fmla="*/ 285 h 286"/>
+                  <a:gd name="T48" fmla="*/ 140 w 189"/>
+                  <a:gd name="T49" fmla="*/ 283 h 286"/>
+                  <a:gd name="T50" fmla="*/ 135 w 189"/>
+                  <a:gd name="T51" fmla="*/ 278 h 286"/>
+                  <a:gd name="T52" fmla="*/ 134 w 189"/>
+                  <a:gd name="T53" fmla="*/ 268 h 286"/>
+                  <a:gd name="T54" fmla="*/ 134 w 189"/>
+                  <a:gd name="T55" fmla="*/ 264 h 286"/>
+                  <a:gd name="T56" fmla="*/ 126 w 189"/>
+                  <a:gd name="T57" fmla="*/ 270 h 286"/>
+                  <a:gd name="T58" fmla="*/ 114 w 189"/>
+                  <a:gd name="T59" fmla="*/ 277 h 286"/>
+                  <a:gd name="T60" fmla="*/ 97 w 189"/>
+                  <a:gd name="T61" fmla="*/ 282 h 286"/>
+                  <a:gd name="T62" fmla="*/ 76 w 189"/>
+                  <a:gd name="T63" fmla="*/ 284 h 286"/>
+                  <a:gd name="T64" fmla="*/ 89 w 189"/>
+                  <a:gd name="T65" fmla="*/ 261 h 286"/>
+                  <a:gd name="T66" fmla="*/ 99 w 189"/>
+                  <a:gd name="T67" fmla="*/ 260 h 286"/>
+                  <a:gd name="T68" fmla="*/ 108 w 189"/>
+                  <a:gd name="T69" fmla="*/ 258 h 286"/>
+                  <a:gd name="T70" fmla="*/ 122 w 189"/>
+                  <a:gd name="T71" fmla="*/ 253 h 286"/>
+                  <a:gd name="T72" fmla="*/ 132 w 189"/>
+                  <a:gd name="T73" fmla="*/ 246 h 286"/>
+                  <a:gd name="T74" fmla="*/ 132 w 189"/>
+                  <a:gd name="T75" fmla="*/ 114 h 286"/>
+                  <a:gd name="T76" fmla="*/ 128 w 189"/>
+                  <a:gd name="T77" fmla="*/ 109 h 286"/>
+                  <a:gd name="T78" fmla="*/ 121 w 189"/>
+                  <a:gd name="T79" fmla="*/ 105 h 286"/>
+                  <a:gd name="T80" fmla="*/ 110 w 189"/>
+                  <a:gd name="T81" fmla="*/ 101 h 286"/>
+                  <a:gd name="T82" fmla="*/ 96 w 189"/>
+                  <a:gd name="T83" fmla="*/ 100 h 286"/>
+                  <a:gd name="T84" fmla="*/ 82 w 189"/>
+                  <a:gd name="T85" fmla="*/ 102 h 286"/>
+                  <a:gd name="T86" fmla="*/ 68 w 189"/>
+                  <a:gd name="T87" fmla="*/ 107 h 286"/>
+                  <a:gd name="T88" fmla="*/ 55 w 189"/>
+                  <a:gd name="T89" fmla="*/ 117 h 286"/>
+                  <a:gd name="T90" fmla="*/ 44 w 189"/>
+                  <a:gd name="T91" fmla="*/ 132 h 286"/>
+                  <a:gd name="T92" fmla="*/ 36 w 189"/>
+                  <a:gd name="T93" fmla="*/ 152 h 286"/>
+                  <a:gd name="T94" fmla="*/ 33 w 189"/>
+                  <a:gd name="T95" fmla="*/ 179 h 286"/>
+                  <a:gd name="T96" fmla="*/ 37 w 189"/>
+                  <a:gd name="T97" fmla="*/ 215 h 286"/>
+                  <a:gd name="T98" fmla="*/ 50 w 189"/>
+                  <a:gd name="T99" fmla="*/ 241 h 286"/>
+                  <a:gd name="T100" fmla="*/ 68 w 189"/>
+                  <a:gd name="T101" fmla="*/ 256 h 286"/>
+                  <a:gd name="T102" fmla="*/ 89 w 189"/>
+                  <a:gd name="T103" fmla="*/ 261 h 286"/>
+                </a:gdLst>
+                <a:ahLst/>
+                <a:cxnLst>
+                  <a:cxn ang="0">
+                    <a:pos x="T0" y="T1"/>
+                  </a:cxn>
+                  <a:cxn ang="0">
+                    <a:pos x="T2" y="T3"/>
+                  </a:cxn>
+                  <a:cxn ang="0">
+                    <a:pos x="T4" y="T5"/>
+                  </a:cxn>
+                  <a:cxn ang="0">
+                    <a:pos x="T6" y="T7"/>
+                  </a:cxn>
+                  <a:cxn ang="0">
+                    <a:pos x="T8" y="T9"/>
+                  </a:cxn>
+                  <a:cxn ang="0">
+                    <a:pos x="T10" y="T11"/>
+                  </a:cxn>
+                  <a:cxn ang="0">
+                    <a:pos x="T12" y="T13"/>
+                  </a:cxn>
+                  <a:cxn ang="0">
+                    <a:pos x="T14" y="T15"/>
+                  </a:cxn>
+                  <a:cxn ang="0">
+                    <a:pos x="T16" y="T17"/>
+                  </a:cxn>
+                  <a:cxn ang="0">
+                    <a:pos x="T18" y="T19"/>
+                  </a:cxn>
+                  <a:cxn ang="0">
+                    <a:pos x="T20" y="T21"/>
+                  </a:cxn>
+                  <a:cxn ang="0">
+                    <a:pos x="T22" y="T23"/>
+                  </a:cxn>
+                  <a:cxn ang="0">
+                    <a:pos x="T24" y="T25"/>
+                  </a:cxn>
+                  <a:cxn ang="0">
+                    <a:pos x="T26" y="T27"/>
+                  </a:cxn>
+                  <a:cxn ang="0">
+                    <a:pos x="T28" y="T29"/>
+                  </a:cxn>
+                  <a:cxn ang="0">
+                    <a:pos x="T30" y="T31"/>
+                  </a:cxn>
+                  <a:cxn ang="0">
+                    <a:pos x="T32" y="T33"/>
+                  </a:cxn>
+                  <a:cxn ang="0">
+                    <a:pos x="T34" y="T35"/>
+                  </a:cxn>
+                  <a:cxn ang="0">
+                    <a:pos x="T36" y="T37"/>
+                  </a:cxn>
+                  <a:cxn ang="0">
+                    <a:pos x="T38" y="T39"/>
+                  </a:cxn>
+                  <a:cxn ang="0">
+                    <a:pos x="T40" y="T41"/>
+                  </a:cxn>
+                  <a:cxn ang="0">
+                    <a:pos x="T42" y="T43"/>
+                  </a:cxn>
+                  <a:cxn ang="0">
+                    <a:pos x="T44" y="T45"/>
+                  </a:cxn>
+                  <a:cxn ang="0">
+                    <a:pos x="T46" y="T47"/>
+                  </a:cxn>
+                  <a:cxn ang="0">
+                    <a:pos x="T48" y="T49"/>
+                  </a:cxn>
+                  <a:cxn ang="0">
+                    <a:pos x="T50" y="T51"/>
+                  </a:cxn>
+                  <a:cxn ang="0">
+                    <a:pos x="T52" y="T53"/>
+                  </a:cxn>
+                  <a:cxn ang="0">
+                    <a:pos x="T54" y="T55"/>
+                  </a:cxn>
+                  <a:cxn ang="0">
+                    <a:pos x="T56" y="T57"/>
+                  </a:cxn>
+                  <a:cxn ang="0">
+                    <a:pos x="T58" y="T59"/>
+                  </a:cxn>
+                  <a:cxn ang="0">
+                    <a:pos x="T60" y="T61"/>
+                  </a:cxn>
+                  <a:cxn ang="0">
+                    <a:pos x="T62" y="T63"/>
+                  </a:cxn>
+                  <a:cxn ang="0">
+                    <a:pos x="T64" y="T65"/>
+                  </a:cxn>
+                  <a:cxn ang="0">
+                    <a:pos x="T66" y="T67"/>
+                  </a:cxn>
+                  <a:cxn ang="0">
+                    <a:pos x="T68" y="T69"/>
+                  </a:cxn>
+                  <a:cxn ang="0">
+                    <a:pos x="T70" y="T71"/>
+                  </a:cxn>
+                  <a:cxn ang="0">
+                    <a:pos x="T72" y="T73"/>
+                  </a:cxn>
+                  <a:cxn ang="0">
+                    <a:pos x="T74" y="T75"/>
+                  </a:cxn>
+                  <a:cxn ang="0">
+                    <a:pos x="T76" y="T77"/>
+                  </a:cxn>
+                  <a:cxn ang="0">
+                    <a:pos x="T78" y="T79"/>
+                  </a:cxn>
+                  <a:cxn ang="0">
+                    <a:pos x="T80" y="T81"/>
+                  </a:cxn>
+                  <a:cxn ang="0">
+                    <a:pos x="T82" y="T83"/>
+                  </a:cxn>
+                  <a:cxn ang="0">
+                    <a:pos x="T84" y="T85"/>
+                  </a:cxn>
+                  <a:cxn ang="0">
+                    <a:pos x="T86" y="T87"/>
+                  </a:cxn>
+                  <a:cxn ang="0">
+                    <a:pos x="T88" y="T89"/>
+                  </a:cxn>
+                  <a:cxn ang="0">
+                    <a:pos x="T90" y="T91"/>
+                  </a:cxn>
+                  <a:cxn ang="0">
+                    <a:pos x="T92" y="T93"/>
+                  </a:cxn>
+                  <a:cxn ang="0">
+                    <a:pos x="T94" y="T95"/>
+                  </a:cxn>
+                  <a:cxn ang="0">
+                    <a:pos x="T96" y="T97"/>
+                  </a:cxn>
+                  <a:cxn ang="0">
+                    <a:pos x="T98" y="T99"/>
+                  </a:cxn>
+                  <a:cxn ang="0">
+                    <a:pos x="T100" y="T101"/>
+                  </a:cxn>
+                  <a:cxn ang="0">
+                    <a:pos x="T102" y="T103"/>
+                  </a:cxn>
+                </a:cxnLst>
+                <a:rect l="0" t="0" r="r" b="b"/>
+                <a:pathLst>
+                  <a:path w="189" h="286">
+                    <a:moveTo>
+                      <a:pt x="76" y="284"/>
+                    </a:moveTo>
+                    <a:cubicBezTo>
+                      <a:pt x="66" y="284"/>
+                      <a:pt x="57" y="282"/>
+                      <a:pt x="47" y="279"/>
+                    </a:cubicBezTo>
+                    <a:cubicBezTo>
+                      <a:pt x="38" y="275"/>
+                      <a:pt x="30" y="269"/>
+                      <a:pt x="23" y="261"/>
+                    </a:cubicBezTo>
+                    <a:cubicBezTo>
+                      <a:pt x="17" y="253"/>
+                      <a:pt x="11" y="243"/>
+                      <a:pt x="7" y="230"/>
+                    </a:cubicBezTo>
+                    <a:cubicBezTo>
+                      <a:pt x="2" y="218"/>
+                      <a:pt x="0" y="204"/>
+                      <a:pt x="0" y="187"/>
+                    </a:cubicBezTo>
+                    <a:cubicBezTo>
+                      <a:pt x="0" y="172"/>
+                      <a:pt x="3" y="157"/>
+                      <a:pt x="8" y="144"/>
+                    </a:cubicBezTo>
+                    <a:cubicBezTo>
+                      <a:pt x="13" y="132"/>
+                      <a:pt x="20" y="120"/>
+                      <a:pt x="29" y="111"/>
+                    </a:cubicBezTo>
+                    <a:cubicBezTo>
+                      <a:pt x="38" y="102"/>
+                      <a:pt x="49" y="95"/>
+                      <a:pt x="61" y="89"/>
+                    </a:cubicBezTo>
+                    <a:cubicBezTo>
+                      <a:pt x="73" y="84"/>
+                      <a:pt x="86" y="82"/>
+                      <a:pt x="100" y="82"/>
+                    </a:cubicBezTo>
+                    <a:cubicBezTo>
+                      <a:pt x="106" y="82"/>
+                      <a:pt x="112" y="82"/>
+                      <a:pt x="118" y="83"/>
+                    </a:cubicBezTo>
+                    <a:cubicBezTo>
+                      <a:pt x="123" y="84"/>
+                      <a:pt x="128" y="85"/>
+                      <a:pt x="132" y="86"/>
+                    </a:cubicBezTo>
+                    <a:cubicBezTo>
+                      <a:pt x="132" y="29"/>
+                      <a:pt x="132" y="29"/>
+                      <a:pt x="132" y="29"/>
+                    </a:cubicBezTo>
+                    <a:cubicBezTo>
+                      <a:pt x="96" y="22"/>
+                      <a:pt x="96" y="22"/>
+                      <a:pt x="96" y="22"/>
+                    </a:cubicBezTo>
+                    <a:cubicBezTo>
+                      <a:pt x="96" y="7"/>
+                      <a:pt x="96" y="7"/>
+                      <a:pt x="96" y="7"/>
+                    </a:cubicBezTo>
+                    <a:cubicBezTo>
+                      <a:pt x="158" y="0"/>
+                      <a:pt x="158" y="0"/>
+                      <a:pt x="158" y="0"/>
+                    </a:cubicBezTo>
+                    <a:cubicBezTo>
+                      <a:pt x="165" y="4"/>
+                      <a:pt x="165" y="4"/>
+                      <a:pt x="165" y="4"/>
+                    </a:cubicBezTo>
+                    <a:cubicBezTo>
+                      <a:pt x="165" y="266"/>
+                      <a:pt x="165" y="266"/>
+                      <a:pt x="165" y="266"/>
+                    </a:cubicBezTo>
+                    <a:cubicBezTo>
+                      <a:pt x="189" y="266"/>
+                      <a:pt x="189" y="266"/>
+                      <a:pt x="189" y="266"/>
+                    </a:cubicBezTo>
+                    <a:cubicBezTo>
+                      <a:pt x="189" y="278"/>
+                      <a:pt x="189" y="278"/>
+                      <a:pt x="189" y="278"/>
+                    </a:cubicBezTo>
+                    <a:cubicBezTo>
+                      <a:pt x="187" y="279"/>
+                      <a:pt x="184" y="280"/>
+                      <a:pt x="181" y="281"/>
+                    </a:cubicBezTo>
+                    <a:cubicBezTo>
+                      <a:pt x="178" y="282"/>
+                      <a:pt x="175" y="283"/>
+                      <a:pt x="172" y="284"/>
+                    </a:cubicBezTo>
+                    <a:cubicBezTo>
+                      <a:pt x="169" y="284"/>
+                      <a:pt x="166" y="285"/>
+                      <a:pt x="162" y="285"/>
+                    </a:cubicBezTo>
+                    <a:cubicBezTo>
+                      <a:pt x="159" y="286"/>
+                      <a:pt x="156" y="286"/>
+                      <a:pt x="153" y="286"/>
+                    </a:cubicBezTo>
+                    <a:cubicBezTo>
+                      <a:pt x="151" y="286"/>
+                      <a:pt x="148" y="286"/>
+                      <a:pt x="146" y="285"/>
+                    </a:cubicBezTo>
+                    <a:cubicBezTo>
+                      <a:pt x="144" y="285"/>
+                      <a:pt x="142" y="284"/>
+                      <a:pt x="140" y="283"/>
+                    </a:cubicBezTo>
+                    <a:cubicBezTo>
+                      <a:pt x="138" y="282"/>
+                      <a:pt x="137" y="280"/>
+                      <a:pt x="135" y="278"/>
+                    </a:cubicBezTo>
+                    <a:cubicBezTo>
+                      <a:pt x="134" y="275"/>
+                      <a:pt x="134" y="272"/>
+                      <a:pt x="134" y="268"/>
+                    </a:cubicBezTo>
+                    <a:cubicBezTo>
+                      <a:pt x="134" y="264"/>
+                      <a:pt x="134" y="264"/>
+                      <a:pt x="134" y="264"/>
+                    </a:cubicBezTo>
+                    <a:cubicBezTo>
+                      <a:pt x="132" y="266"/>
+                      <a:pt x="129" y="268"/>
+                      <a:pt x="126" y="270"/>
+                    </a:cubicBezTo>
+                    <a:cubicBezTo>
+                      <a:pt x="123" y="273"/>
+                      <a:pt x="119" y="275"/>
+                      <a:pt x="114" y="277"/>
+                    </a:cubicBezTo>
+                    <a:cubicBezTo>
+                      <a:pt x="109" y="279"/>
+                      <a:pt x="103" y="281"/>
+                      <a:pt x="97" y="282"/>
+                    </a:cubicBezTo>
+                    <a:cubicBezTo>
+                      <a:pt x="90" y="284"/>
+                      <a:pt x="83" y="284"/>
+                      <a:pt x="76" y="284"/>
+                    </a:cubicBezTo>
+                    <a:close/>
+                    <a:moveTo>
+                      <a:pt x="89" y="261"/>
+                    </a:moveTo>
+                    <a:cubicBezTo>
+                      <a:pt x="93" y="261"/>
+                      <a:pt x="96" y="260"/>
+                      <a:pt x="99" y="260"/>
+                    </a:cubicBezTo>
+                    <a:cubicBezTo>
+                      <a:pt x="102" y="260"/>
+                      <a:pt x="105" y="259"/>
+                      <a:pt x="108" y="258"/>
+                    </a:cubicBezTo>
+                    <a:cubicBezTo>
+                      <a:pt x="114" y="257"/>
+                      <a:pt x="118" y="255"/>
+                      <a:pt x="122" y="253"/>
+                    </a:cubicBezTo>
+                    <a:cubicBezTo>
+                      <a:pt x="126" y="251"/>
+                      <a:pt x="130" y="248"/>
+                      <a:pt x="132" y="246"/>
+                    </a:cubicBezTo>
+                    <a:cubicBezTo>
+                      <a:pt x="132" y="114"/>
+                      <a:pt x="132" y="114"/>
+                      <a:pt x="132" y="114"/>
+                    </a:cubicBezTo>
+                    <a:cubicBezTo>
+                      <a:pt x="131" y="112"/>
+                      <a:pt x="130" y="111"/>
+                      <a:pt x="128" y="109"/>
+                    </a:cubicBezTo>
+                    <a:cubicBezTo>
+                      <a:pt x="126" y="107"/>
+                      <a:pt x="124" y="106"/>
+                      <a:pt x="121" y="105"/>
+                    </a:cubicBezTo>
+                    <a:cubicBezTo>
+                      <a:pt x="118" y="103"/>
+                      <a:pt x="114" y="102"/>
+                      <a:pt x="110" y="101"/>
+                    </a:cubicBezTo>
+                    <a:cubicBezTo>
+                      <a:pt x="106" y="100"/>
+                      <a:pt x="101" y="100"/>
+                      <a:pt x="96" y="100"/>
+                    </a:cubicBezTo>
+                    <a:cubicBezTo>
+                      <a:pt x="91" y="100"/>
+                      <a:pt x="87" y="101"/>
+                      <a:pt x="82" y="102"/>
+                    </a:cubicBezTo>
+                    <a:cubicBezTo>
+                      <a:pt x="77" y="103"/>
+                      <a:pt x="73" y="104"/>
+                      <a:pt x="68" y="107"/>
+                    </a:cubicBezTo>
+                    <a:cubicBezTo>
+                      <a:pt x="64" y="110"/>
+                      <a:pt x="59" y="113"/>
+                      <a:pt x="55" y="117"/>
+                    </a:cubicBezTo>
+                    <a:cubicBezTo>
+                      <a:pt x="51" y="121"/>
+                      <a:pt x="47" y="126"/>
+                      <a:pt x="44" y="132"/>
+                    </a:cubicBezTo>
+                    <a:cubicBezTo>
+                      <a:pt x="41" y="137"/>
+                      <a:pt x="38" y="144"/>
+                      <a:pt x="36" y="152"/>
+                    </a:cubicBezTo>
+                    <a:cubicBezTo>
+                      <a:pt x="34" y="160"/>
+                      <a:pt x="33" y="169"/>
+                      <a:pt x="33" y="179"/>
+                    </a:cubicBezTo>
+                    <a:cubicBezTo>
+                      <a:pt x="33" y="193"/>
+                      <a:pt x="34" y="205"/>
+                      <a:pt x="37" y="215"/>
+                    </a:cubicBezTo>
+                    <a:cubicBezTo>
+                      <a:pt x="41" y="226"/>
+                      <a:pt x="45" y="234"/>
+                      <a:pt x="50" y="241"/>
+                    </a:cubicBezTo>
+                    <a:cubicBezTo>
+                      <a:pt x="55" y="248"/>
+                      <a:pt x="61" y="253"/>
+                      <a:pt x="68" y="256"/>
+                    </a:cubicBezTo>
+                    <a:cubicBezTo>
+                      <a:pt x="75" y="259"/>
+                      <a:pt x="82" y="261"/>
+                      <a:pt x="89" y="261"/>
+                    </a:cubicBezTo>
+                    <a:close/>
+                  </a:path>
+                </a:pathLst>
+              </a:custGeom>
+              <a:grpFill/>
+              <a:ln>
+                <a:noFill/>
+              </a:ln>
+              <a:extLst>
+                <a:ext uri="{91240B29-F687-4F45-9708-019B960494DF}">
+                  <a14:hiddenLine xmlns:a14="http://schemas.microsoft.com/office/drawing/2010/main" w="9525">
+                    <a:solidFill>
+                      <a:srgbClr val="000000"/>
+                    </a:solidFill>
+                    <a:round/>
+                    <a:headEnd/>
+                    <a:tailEnd/>
+                  </a14:hiddenLine>
+                </a:ext>
+              </a:extLst>
+            </p:spPr>
+            <p:txBody>
+              <a:bodyPr vert="horz" wrap="square" lIns="91440" tIns="45720" rIns="91440" bIns="45720" numCol="1" anchor="t" anchorCtr="0" compatLnSpc="1">
+                <a:prstTxWarp prst="textNoShape">
+                  <a:avLst/>
+                </a:prstTxWarp>
+              </a:bodyPr>
+              <a:lstStyle/>
+              <a:p>
+                <a:endParaRPr lang="en-US"/>
+              </a:p>
+            </p:txBody>
+          </p:sp>
+          <p:sp>
+            <p:nvSpPr>
+              <p:cNvPr id="19" name="Freeform 11">
+                <a:extLst>
+                  <a:ext uri="{FF2B5EF4-FFF2-40B4-BE49-F238E27FC236}">
+                    <a16:creationId xmlns:a16="http://schemas.microsoft.com/office/drawing/2014/main" id="{03ABCE4C-8F3F-495D-81DE-0857738BB089}"/>
+                  </a:ext>
+                </a:extLst>
+              </p:cNvPr>
+              <p:cNvSpPr>
+                <a:spLocks noEditPoints="1"/>
+              </p:cNvSpPr>
+              <p:nvPr/>
+            </p:nvSpPr>
+            <p:spPr bwMode="auto">
+              <a:xfrm>
+                <a:off x="5784" y="1008"/>
+                <a:ext cx="31" cy="30"/>
+              </a:xfrm>
+              <a:custGeom>
+                <a:avLst/>
+                <a:gdLst>
+                  <a:gd name="T0" fmla="*/ 21 w 42"/>
+                  <a:gd name="T1" fmla="*/ 0 h 41"/>
+                  <a:gd name="T2" fmla="*/ 42 w 42"/>
+                  <a:gd name="T3" fmla="*/ 20 h 41"/>
+                  <a:gd name="T4" fmla="*/ 21 w 42"/>
+                  <a:gd name="T5" fmla="*/ 41 h 41"/>
+                  <a:gd name="T6" fmla="*/ 0 w 42"/>
+                  <a:gd name="T7" fmla="*/ 20 h 41"/>
+                  <a:gd name="T8" fmla="*/ 21 w 42"/>
+                  <a:gd name="T9" fmla="*/ 0 h 41"/>
+                  <a:gd name="T10" fmla="*/ 21 w 42"/>
+                  <a:gd name="T11" fmla="*/ 38 h 41"/>
+                  <a:gd name="T12" fmla="*/ 38 w 42"/>
+                  <a:gd name="T13" fmla="*/ 20 h 41"/>
+                  <a:gd name="T14" fmla="*/ 21 w 42"/>
+                  <a:gd name="T15" fmla="*/ 3 h 41"/>
+                  <a:gd name="T16" fmla="*/ 4 w 42"/>
+                  <a:gd name="T17" fmla="*/ 20 h 41"/>
+                  <a:gd name="T18" fmla="*/ 21 w 42"/>
+                  <a:gd name="T19" fmla="*/ 38 h 41"/>
+                  <a:gd name="T20" fmla="*/ 13 w 42"/>
+                  <a:gd name="T21" fmla="*/ 8 h 41"/>
+                  <a:gd name="T22" fmla="*/ 22 w 42"/>
+                  <a:gd name="T23" fmla="*/ 8 h 41"/>
+                  <a:gd name="T24" fmla="*/ 31 w 42"/>
+                  <a:gd name="T25" fmla="*/ 15 h 41"/>
+                  <a:gd name="T26" fmla="*/ 24 w 42"/>
+                  <a:gd name="T27" fmla="*/ 22 h 41"/>
+                  <a:gd name="T28" fmla="*/ 31 w 42"/>
+                  <a:gd name="T29" fmla="*/ 33 h 41"/>
+                  <a:gd name="T30" fmla="*/ 27 w 42"/>
+                  <a:gd name="T31" fmla="*/ 33 h 41"/>
+                  <a:gd name="T32" fmla="*/ 21 w 42"/>
+                  <a:gd name="T33" fmla="*/ 22 h 41"/>
+                  <a:gd name="T34" fmla="*/ 17 w 42"/>
+                  <a:gd name="T35" fmla="*/ 22 h 41"/>
+                  <a:gd name="T36" fmla="*/ 17 w 42"/>
+                  <a:gd name="T37" fmla="*/ 33 h 41"/>
+                  <a:gd name="T38" fmla="*/ 13 w 42"/>
+                  <a:gd name="T39" fmla="*/ 33 h 41"/>
+                  <a:gd name="T40" fmla="*/ 13 w 42"/>
+                  <a:gd name="T41" fmla="*/ 8 h 41"/>
+                  <a:gd name="T42" fmla="*/ 17 w 42"/>
+                  <a:gd name="T43" fmla="*/ 19 h 41"/>
+                  <a:gd name="T44" fmla="*/ 20 w 42"/>
+                  <a:gd name="T45" fmla="*/ 19 h 41"/>
+                  <a:gd name="T46" fmla="*/ 27 w 42"/>
+                  <a:gd name="T47" fmla="*/ 15 h 41"/>
+                  <a:gd name="T48" fmla="*/ 22 w 42"/>
+                  <a:gd name="T49" fmla="*/ 11 h 41"/>
+                  <a:gd name="T50" fmla="*/ 17 w 42"/>
+                  <a:gd name="T51" fmla="*/ 11 h 41"/>
+                  <a:gd name="T52" fmla="*/ 17 w 42"/>
+                  <a:gd name="T53" fmla="*/ 19 h 41"/>
+                </a:gdLst>
+                <a:ahLst/>
+                <a:cxnLst>
+                  <a:cxn ang="0">
+                    <a:pos x="T0" y="T1"/>
+                  </a:cxn>
+                  <a:cxn ang="0">
+                    <a:pos x="T2" y="T3"/>
+                  </a:cxn>
+                  <a:cxn ang="0">
+                    <a:pos x="T4" y="T5"/>
+                  </a:cxn>
+                  <a:cxn ang="0">
+                    <a:pos x="T6" y="T7"/>
+                  </a:cxn>
+                  <a:cxn ang="0">
+                    <a:pos x="T8" y="T9"/>
+                  </a:cxn>
+                  <a:cxn ang="0">
+                    <a:pos x="T10" y="T11"/>
+                  </a:cxn>
+                  <a:cxn ang="0">
+                    <a:pos x="T12" y="T13"/>
+                  </a:cxn>
+                  <a:cxn ang="0">
+                    <a:pos x="T14" y="T15"/>
+                  </a:cxn>
+                  <a:cxn ang="0">
+                    <a:pos x="T16" y="T17"/>
+                  </a:cxn>
+                  <a:cxn ang="0">
+                    <a:pos x="T18" y="T19"/>
+                  </a:cxn>
+                  <a:cxn ang="0">
+                    <a:pos x="T20" y="T21"/>
+                  </a:cxn>
+                  <a:cxn ang="0">
+                    <a:pos x="T22" y="T23"/>
+                  </a:cxn>
+                  <a:cxn ang="0">
+                    <a:pos x="T24" y="T25"/>
+                  </a:cxn>
+                  <a:cxn ang="0">
+                    <a:pos x="T26" y="T27"/>
+                  </a:cxn>
+                  <a:cxn ang="0">
+                    <a:pos x="T28" y="T29"/>
+                  </a:cxn>
+                  <a:cxn ang="0">
+                    <a:pos x="T30" y="T31"/>
+                  </a:cxn>
+                  <a:cxn ang="0">
+                    <a:pos x="T32" y="T33"/>
+                  </a:cxn>
+                  <a:cxn ang="0">
+                    <a:pos x="T34" y="T35"/>
+                  </a:cxn>
+                  <a:cxn ang="0">
+                    <a:pos x="T36" y="T37"/>
+                  </a:cxn>
+                  <a:cxn ang="0">
+                    <a:pos x="T38" y="T39"/>
+                  </a:cxn>
+                  <a:cxn ang="0">
+                    <a:pos x="T40" y="T41"/>
+                  </a:cxn>
+                  <a:cxn ang="0">
+                    <a:pos x="T42" y="T43"/>
+                  </a:cxn>
+                  <a:cxn ang="0">
+                    <a:pos x="T44" y="T45"/>
+                  </a:cxn>
+                  <a:cxn ang="0">
+                    <a:pos x="T46" y="T47"/>
+                  </a:cxn>
+                  <a:cxn ang="0">
+                    <a:pos x="T48" y="T49"/>
+                  </a:cxn>
+                  <a:cxn ang="0">
+                    <a:pos x="T50" y="T51"/>
+                  </a:cxn>
+                  <a:cxn ang="0">
+                    <a:pos x="T52" y="T53"/>
+                  </a:cxn>
+                </a:cxnLst>
+                <a:rect l="0" t="0" r="r" b="b"/>
+                <a:pathLst>
+                  <a:path w="42" h="41">
+                    <a:moveTo>
+                      <a:pt x="21" y="0"/>
+                    </a:moveTo>
+                    <a:cubicBezTo>
+                      <a:pt x="32" y="0"/>
+                      <a:pt x="42" y="9"/>
+                      <a:pt x="42" y="20"/>
+                    </a:cubicBezTo>
+                    <a:cubicBezTo>
+                      <a:pt x="42" y="32"/>
+                      <a:pt x="32" y="41"/>
+                      <a:pt x="21" y="41"/>
+                    </a:cubicBezTo>
+                    <a:cubicBezTo>
+                      <a:pt x="9" y="41"/>
+                      <a:pt x="0" y="32"/>
+                      <a:pt x="0" y="20"/>
+                    </a:cubicBezTo>
+                    <a:cubicBezTo>
+                      <a:pt x="0" y="9"/>
+                      <a:pt x="9" y="0"/>
+                      <a:pt x="21" y="0"/>
+                    </a:cubicBezTo>
+                    <a:close/>
+                    <a:moveTo>
+                      <a:pt x="21" y="38"/>
+                    </a:moveTo>
+                    <a:cubicBezTo>
+                      <a:pt x="31" y="38"/>
+                      <a:pt x="38" y="31"/>
+                      <a:pt x="38" y="20"/>
+                    </a:cubicBezTo>
+                    <a:cubicBezTo>
+                      <a:pt x="38" y="10"/>
+                      <a:pt x="31" y="3"/>
+                      <a:pt x="21" y="3"/>
+                    </a:cubicBezTo>
+                    <a:cubicBezTo>
+                      <a:pt x="11" y="3"/>
+                      <a:pt x="4" y="10"/>
+                      <a:pt x="4" y="20"/>
+                    </a:cubicBezTo>
+                    <a:cubicBezTo>
+                      <a:pt x="4" y="31"/>
+                      <a:pt x="11" y="38"/>
+                      <a:pt x="21" y="38"/>
+                    </a:cubicBezTo>
+                    <a:close/>
+                    <a:moveTo>
+                      <a:pt x="13" y="8"/>
+                    </a:moveTo>
+                    <a:cubicBezTo>
+                      <a:pt x="22" y="8"/>
+                      <a:pt x="22" y="8"/>
+                      <a:pt x="22" y="8"/>
+                    </a:cubicBezTo>
+                    <a:cubicBezTo>
+                      <a:pt x="28" y="8"/>
+                      <a:pt x="31" y="11"/>
+                      <a:pt x="31" y="15"/>
+                    </a:cubicBezTo>
+                    <a:cubicBezTo>
+                      <a:pt x="31" y="20"/>
+                      <a:pt x="28" y="22"/>
+                      <a:pt x="24" y="22"/>
+                    </a:cubicBezTo>
+                    <a:cubicBezTo>
+                      <a:pt x="31" y="33"/>
+                      <a:pt x="31" y="33"/>
+                      <a:pt x="31" y="33"/>
+                    </a:cubicBezTo>
+                    <a:cubicBezTo>
+                      <a:pt x="27" y="33"/>
+                      <a:pt x="27" y="33"/>
+                      <a:pt x="27" y="33"/>
+                    </a:cubicBezTo>
+                    <a:cubicBezTo>
+                      <a:pt x="21" y="22"/>
+                      <a:pt x="21" y="22"/>
+                      <a:pt x="21" y="22"/>
+                    </a:cubicBezTo>
+                    <a:cubicBezTo>
+                      <a:pt x="17" y="22"/>
+                      <a:pt x="17" y="22"/>
+                      <a:pt x="17" y="22"/>
+                    </a:cubicBezTo>
+                    <a:cubicBezTo>
+                      <a:pt x="17" y="33"/>
+                      <a:pt x="17" y="33"/>
+                      <a:pt x="17" y="33"/>
+                    </a:cubicBezTo>
+                    <a:cubicBezTo>
+                      <a:pt x="13" y="33"/>
+                      <a:pt x="13" y="33"/>
+                      <a:pt x="13" y="33"/>
+                    </a:cubicBezTo>
+                    <a:lnTo>
+                      <a:pt x="13" y="8"/>
+                    </a:lnTo>
+                    <a:close/>
+                    <a:moveTo>
+                      <a:pt x="17" y="19"/>
+                    </a:moveTo>
+                    <a:cubicBezTo>
+                      <a:pt x="20" y="19"/>
+                      <a:pt x="20" y="19"/>
+                      <a:pt x="20" y="19"/>
+                    </a:cubicBezTo>
+                    <a:cubicBezTo>
+                      <a:pt x="24" y="19"/>
+                      <a:pt x="27" y="19"/>
+                      <a:pt x="27" y="15"/>
+                    </a:cubicBezTo>
+                    <a:cubicBezTo>
+                      <a:pt x="27" y="12"/>
+                      <a:pt x="24" y="11"/>
+                      <a:pt x="22" y="11"/>
+                    </a:cubicBezTo>
+                    <a:cubicBezTo>
+                      <a:pt x="17" y="11"/>
+                      <a:pt x="17" y="11"/>
+                      <a:pt x="17" y="11"/>
+                    </a:cubicBezTo>
+                    <a:lnTo>
+                      <a:pt x="17" y="19"/>
+                    </a:lnTo>
+                    <a:close/>
+                  </a:path>
+                </a:pathLst>
+              </a:custGeom>
+              <a:grpFill/>
+              <a:ln>
+                <a:noFill/>
+              </a:ln>
+              <a:extLst>
+                <a:ext uri="{91240B29-F687-4F45-9708-019B960494DF}">
+                  <a14:hiddenLine xmlns:a14="http://schemas.microsoft.com/office/drawing/2010/main" w="9525">
+                    <a:solidFill>
+                      <a:srgbClr val="000000"/>
+                    </a:solidFill>
+                    <a:round/>
+                    <a:headEnd/>
+                    <a:tailEnd/>
+                  </a14:hiddenLine>
+                </a:ext>
+              </a:extLst>
+            </p:spPr>
+            <p:txBody>
+              <a:bodyPr vert="horz" wrap="square" lIns="91440" tIns="45720" rIns="91440" bIns="45720" numCol="1" anchor="t" anchorCtr="0" compatLnSpc="1">
+                <a:prstTxWarp prst="textNoShape">
+                  <a:avLst/>
+                </a:prstTxWarp>
+              </a:bodyPr>
+              <a:lstStyle/>
+              <a:p>
+                <a:endParaRPr lang="en-US"/>
+              </a:p>
+            </p:txBody>
+          </p:sp>
+        </p:grpSp>
+      </p:grpSp>
+    </p:spTree>
+  </p:cSld>
+  <p:clrMapOvr>
+    <a:masterClrMapping/>
+  </p:clrMapOvr>
+</p:sld>
+</file>
+
+<file path=ppt/slides/slide3.xml><?xml version="1.0" encoding="utf-8"?>
 <p:sld xmlns:a="http://schemas.openxmlformats.org/drawingml/2006/main" xmlns:r="http://schemas.openxmlformats.org/officeDocument/2006/relationships" xmlns:p="http://schemas.openxmlformats.org/presentationml/2006/main">
   <p:cSld>
     <p:spTree>
@@ -12004,7 +15973,7 @@
 </p:sld>
 </file>
 
-<file path=ppt/slides/slide3.xml><?xml version="1.0" encoding="utf-8"?>
+<file path=ppt/slides/slide4.xml><?xml version="1.0" encoding="utf-8"?>
 <p:sld xmlns:a="http://schemas.openxmlformats.org/drawingml/2006/main" xmlns:r="http://schemas.openxmlformats.org/officeDocument/2006/relationships" xmlns:p="http://schemas.openxmlformats.org/presentationml/2006/main">
   <p:cSld>
     <p:spTree>
@@ -12914,7 +16883,7 @@
 </p:sld>
 </file>
 
-<file path=ppt/slides/slide4.xml><?xml version="1.0" encoding="utf-8"?>
+<file path=ppt/slides/slide5.xml><?xml version="1.0" encoding="utf-8"?>
 <p:sld xmlns:a="http://schemas.openxmlformats.org/drawingml/2006/main" xmlns:r="http://schemas.openxmlformats.org/officeDocument/2006/relationships" xmlns:p="http://schemas.openxmlformats.org/presentationml/2006/main">
   <p:cSld>
     <p:spTree>
@@ -13582,7 +17551,7 @@
 </p:sld>
 </file>
 
-<file path=ppt/slides/slide5.xml><?xml version="1.0" encoding="utf-8"?>
+<file path=ppt/slides/slide6.xml><?xml version="1.0" encoding="utf-8"?>
 <p:sld xmlns:a="http://schemas.openxmlformats.org/drawingml/2006/main" xmlns:r="http://schemas.openxmlformats.org/officeDocument/2006/relationships" xmlns:p="http://schemas.openxmlformats.org/presentationml/2006/main">
   <p:cSld>
     <p:spTree>
@@ -14179,7 +18148,7 @@
 </p:sld>
 </file>
 
-<file path=ppt/slides/slide6.xml><?xml version="1.0" encoding="utf-8"?>
+<file path=ppt/slides/slide7.xml><?xml version="1.0" encoding="utf-8"?>
 <p:sld xmlns:a="http://schemas.openxmlformats.org/drawingml/2006/main" xmlns:r="http://schemas.openxmlformats.org/officeDocument/2006/relationships" xmlns:p="http://schemas.openxmlformats.org/presentationml/2006/main">
   <p:cSld>
     <p:spTree>
@@ -14905,7 +18874,7 @@
 </p:sld>
 </file>
 
-<file path=ppt/slides/slide7.xml><?xml version="1.0" encoding="utf-8"?>
+<file path=ppt/slides/slide8.xml><?xml version="1.0" encoding="utf-8"?>
 <p:sld xmlns:a="http://schemas.openxmlformats.org/drawingml/2006/main" xmlns:r="http://schemas.openxmlformats.org/officeDocument/2006/relationships" xmlns:p="http://schemas.openxmlformats.org/presentationml/2006/main">
   <p:cSld>
     <p:spTree>
@@ -15899,7 +19868,7 @@
 </p:sld>
 </file>
 
-<file path=ppt/slides/slide8.xml><?xml version="1.0" encoding="utf-8"?>
+<file path=ppt/slides/slide9.xml><?xml version="1.0" encoding="utf-8"?>
 <p:sld xmlns:a="http://schemas.openxmlformats.org/drawingml/2006/main" xmlns:r="http://schemas.openxmlformats.org/officeDocument/2006/relationships" xmlns:p="http://schemas.openxmlformats.org/presentationml/2006/main">
   <p:cSld>
     <p:spTree>
@@ -16581,463 +20550,6 @@
       </p:par>
     </p:tnLst>
   </p:timing>
-</p:sld>
-</file>
-
-<file path=ppt/slides/slide9.xml><?xml version="1.0" encoding="utf-8"?>
-<p:sld xmlns:a="http://schemas.openxmlformats.org/drawingml/2006/main" xmlns:r="http://schemas.openxmlformats.org/officeDocument/2006/relationships" xmlns:p="http://schemas.openxmlformats.org/presentationml/2006/main">
-  <p:cSld>
-    <p:spTree>
-      <p:nvGrpSpPr>
-        <p:cNvPr id="1" name="Shape 1502"/>
-        <p:cNvGrpSpPr/>
-        <p:nvPr/>
-      </p:nvGrpSpPr>
-      <p:grpSpPr>
-        <a:xfrm>
-          <a:off x="0" y="0"/>
-          <a:ext cx="0" cy="0"/>
-          <a:chOff x="0" y="0"/>
-          <a:chExt cx="0" cy="0"/>
-        </a:xfrm>
-      </p:grpSpPr>
-      <p:sp>
-        <p:nvSpPr>
-          <p:cNvPr id="1503" name="Google Shape;1503;p54"/>
-          <p:cNvSpPr txBox="1">
-            <a:spLocks noGrp="1"/>
-          </p:cNvSpPr>
-          <p:nvPr>
-            <p:ph type="subTitle" idx="1"/>
-          </p:nvPr>
-        </p:nvSpPr>
-        <p:spPr>
-          <a:xfrm>
-            <a:off x="693494" y="2122164"/>
-            <a:ext cx="7171671" cy="418291"/>
-          </a:xfrm>
-          <a:prstGeom prst="rect">
-            <a:avLst/>
-          </a:prstGeom>
-        </p:spPr>
-        <p:txBody>
-          <a:bodyPr spcFirstLastPara="1" wrap="square" lIns="91425" tIns="91425" rIns="91425" bIns="91425" anchor="t" anchorCtr="0">
-            <a:noAutofit/>
-          </a:bodyPr>
-          <a:lstStyle/>
-          <a:p>
-            <a:pPr marL="0" lvl="0" indent="0" algn="l" rtl="0">
-              <a:spcBef>
-                <a:spcPts val="0"/>
-              </a:spcBef>
-              <a:spcAft>
-                <a:spcPts val="0"/>
-              </a:spcAft>
-              <a:buNone/>
-            </a:pPr>
-            <a:r>
-              <a:rPr lang="en" sz="2400" dirty="0"/>
-              <a:t>WHAT QUESTIONS DO YOU HAVE?</a:t>
-            </a:r>
-            <a:endParaRPr sz="2400" dirty="0"/>
-          </a:p>
-        </p:txBody>
-      </p:sp>
-      <p:sp>
-        <p:nvSpPr>
-          <p:cNvPr id="1504" name="Google Shape;1504;p54"/>
-          <p:cNvSpPr txBox="1">
-            <a:spLocks noGrp="1"/>
-          </p:cNvSpPr>
-          <p:nvPr>
-            <p:ph type="ctrTitle"/>
-          </p:nvPr>
-        </p:nvSpPr>
-        <p:spPr>
-          <a:xfrm>
-            <a:off x="693494" y="1305339"/>
-            <a:ext cx="6601723" cy="856816"/>
-          </a:xfrm>
-          <a:prstGeom prst="rect">
-            <a:avLst/>
-          </a:prstGeom>
-        </p:spPr>
-        <p:txBody>
-          <a:bodyPr spcFirstLastPara="1" wrap="square" lIns="91425" tIns="91425" rIns="91425" bIns="91425" anchor="t" anchorCtr="0">
-            <a:noAutofit/>
-          </a:bodyPr>
-          <a:lstStyle/>
-          <a:p>
-            <a:pPr marL="0" lvl="0" indent="0" algn="l" rtl="0">
-              <a:spcBef>
-                <a:spcPts val="0"/>
-              </a:spcBef>
-              <a:spcAft>
-                <a:spcPts val="0"/>
-              </a:spcAft>
-              <a:buNone/>
-            </a:pPr>
-            <a:r>
-              <a:rPr lang="en" sz="4800" dirty="0"/>
-              <a:t>THANK YOU!</a:t>
-            </a:r>
-            <a:endParaRPr sz="4800" dirty="0"/>
-          </a:p>
-        </p:txBody>
-      </p:sp>
-      <p:sp>
-        <p:nvSpPr>
-          <p:cNvPr id="1542" name="Google Shape;1542;p54"/>
-          <p:cNvSpPr/>
-          <p:nvPr/>
-        </p:nvSpPr>
-        <p:spPr>
-          <a:xfrm>
-            <a:off x="570050" y="3746300"/>
-            <a:ext cx="939600" cy="939600"/>
-          </a:xfrm>
-          <a:prstGeom prst="snip1Rect">
-            <a:avLst>
-              <a:gd name="adj" fmla="val 11329"/>
-            </a:avLst>
-          </a:prstGeom>
-          <a:solidFill>
-            <a:schemeClr val="lt1"/>
-          </a:solidFill>
-          <a:ln w="28575" cap="flat" cmpd="sng">
-            <a:solidFill>
-              <a:schemeClr val="dk1"/>
-            </a:solidFill>
-            <a:prstDash val="solid"/>
-            <a:round/>
-            <a:headEnd type="none" w="sm" len="sm"/>
-            <a:tailEnd type="none" w="sm" len="sm"/>
-          </a:ln>
-        </p:spPr>
-        <p:txBody>
-          <a:bodyPr spcFirstLastPara="1" wrap="square" lIns="91425" tIns="91425" rIns="91425" bIns="91425" anchor="ctr" anchorCtr="0">
-            <a:noAutofit/>
-          </a:bodyPr>
-          <a:lstStyle/>
-          <a:p>
-            <a:pPr marL="0" lvl="0" indent="0" algn="l" rtl="0">
-              <a:spcBef>
-                <a:spcPts val="0"/>
-              </a:spcBef>
-              <a:spcAft>
-                <a:spcPts val="0"/>
-              </a:spcAft>
-              <a:buNone/>
-            </a:pPr>
-            <a:endParaRPr/>
-          </a:p>
-        </p:txBody>
-      </p:sp>
-      <p:sp>
-        <p:nvSpPr>
-          <p:cNvPr id="1543" name="Google Shape;1543;p54"/>
-          <p:cNvSpPr/>
-          <p:nvPr/>
-        </p:nvSpPr>
-        <p:spPr>
-          <a:xfrm>
-            <a:off x="490150" y="3665400"/>
-            <a:ext cx="939600" cy="939600"/>
-          </a:xfrm>
-          <a:prstGeom prst="snip1Rect">
-            <a:avLst>
-              <a:gd name="adj" fmla="val 11329"/>
-            </a:avLst>
-          </a:prstGeom>
-          <a:solidFill>
-            <a:schemeClr val="accent1"/>
-          </a:solidFill>
-          <a:ln w="28575" cap="flat" cmpd="sng">
-            <a:solidFill>
-              <a:schemeClr val="dk1"/>
-            </a:solidFill>
-            <a:prstDash val="solid"/>
-            <a:round/>
-            <a:headEnd type="none" w="sm" len="sm"/>
-            <a:tailEnd type="none" w="sm" len="sm"/>
-          </a:ln>
-        </p:spPr>
-        <p:txBody>
-          <a:bodyPr spcFirstLastPara="1" wrap="square" lIns="91425" tIns="91425" rIns="91425" bIns="91425" anchor="ctr" anchorCtr="0">
-            <a:noAutofit/>
-          </a:bodyPr>
-          <a:lstStyle/>
-          <a:p>
-            <a:pPr marL="0" lvl="0" indent="0" algn="l" rtl="0">
-              <a:spcBef>
-                <a:spcPts val="0"/>
-              </a:spcBef>
-              <a:spcAft>
-                <a:spcPts val="0"/>
-              </a:spcAft>
-              <a:buNone/>
-            </a:pPr>
-            <a:endParaRPr/>
-          </a:p>
-        </p:txBody>
-      </p:sp>
-      <p:sp>
-        <p:nvSpPr>
-          <p:cNvPr id="1544" name="Google Shape;1544;p54"/>
-          <p:cNvSpPr/>
-          <p:nvPr/>
-        </p:nvSpPr>
-        <p:spPr>
-          <a:xfrm>
-            <a:off x="1708675" y="3746300"/>
-            <a:ext cx="939600" cy="939600"/>
-          </a:xfrm>
-          <a:prstGeom prst="snip1Rect">
-            <a:avLst>
-              <a:gd name="adj" fmla="val 11329"/>
-            </a:avLst>
-          </a:prstGeom>
-          <a:solidFill>
-            <a:schemeClr val="lt1"/>
-          </a:solidFill>
-          <a:ln w="28575" cap="flat" cmpd="sng">
-            <a:solidFill>
-              <a:schemeClr val="dk1"/>
-            </a:solidFill>
-            <a:prstDash val="solid"/>
-            <a:round/>
-            <a:headEnd type="none" w="sm" len="sm"/>
-            <a:tailEnd type="none" w="sm" len="sm"/>
-          </a:ln>
-        </p:spPr>
-        <p:txBody>
-          <a:bodyPr spcFirstLastPara="1" wrap="square" lIns="91425" tIns="91425" rIns="91425" bIns="91425" anchor="ctr" anchorCtr="0">
-            <a:noAutofit/>
-          </a:bodyPr>
-          <a:lstStyle/>
-          <a:p>
-            <a:pPr marL="0" lvl="0" indent="0" algn="l" rtl="0">
-              <a:spcBef>
-                <a:spcPts val="0"/>
-              </a:spcBef>
-              <a:spcAft>
-                <a:spcPts val="0"/>
-              </a:spcAft>
-              <a:buNone/>
-            </a:pPr>
-            <a:endParaRPr/>
-          </a:p>
-        </p:txBody>
-      </p:sp>
-      <p:sp>
-        <p:nvSpPr>
-          <p:cNvPr id="1545" name="Google Shape;1545;p54"/>
-          <p:cNvSpPr/>
-          <p:nvPr/>
-        </p:nvSpPr>
-        <p:spPr>
-          <a:xfrm>
-            <a:off x="1628775" y="3665400"/>
-            <a:ext cx="939600" cy="939600"/>
-          </a:xfrm>
-          <a:prstGeom prst="snip1Rect">
-            <a:avLst>
-              <a:gd name="adj" fmla="val 11329"/>
-            </a:avLst>
-          </a:prstGeom>
-          <a:solidFill>
-            <a:schemeClr val="accent2"/>
-          </a:solidFill>
-          <a:ln w="28575" cap="flat" cmpd="sng">
-            <a:solidFill>
-              <a:schemeClr val="dk1"/>
-            </a:solidFill>
-            <a:prstDash val="solid"/>
-            <a:round/>
-            <a:headEnd type="none" w="sm" len="sm"/>
-            <a:tailEnd type="none" w="sm" len="sm"/>
-          </a:ln>
-        </p:spPr>
-        <p:txBody>
-          <a:bodyPr spcFirstLastPara="1" wrap="square" lIns="91425" tIns="91425" rIns="91425" bIns="91425" anchor="ctr" anchorCtr="0">
-            <a:noAutofit/>
-          </a:bodyPr>
-          <a:lstStyle/>
-          <a:p>
-            <a:pPr marL="0" lvl="0" indent="0" algn="l" rtl="0">
-              <a:spcBef>
-                <a:spcPts val="0"/>
-              </a:spcBef>
-              <a:spcAft>
-                <a:spcPts val="0"/>
-              </a:spcAft>
-              <a:buNone/>
-            </a:pPr>
-            <a:endParaRPr/>
-          </a:p>
-        </p:txBody>
-      </p:sp>
-      <p:sp>
-        <p:nvSpPr>
-          <p:cNvPr id="1546" name="Google Shape;1546;p54"/>
-          <p:cNvSpPr/>
-          <p:nvPr/>
-        </p:nvSpPr>
-        <p:spPr>
-          <a:xfrm>
-            <a:off x="2847300" y="3746300"/>
-            <a:ext cx="939600" cy="939600"/>
-          </a:xfrm>
-          <a:prstGeom prst="snip1Rect">
-            <a:avLst>
-              <a:gd name="adj" fmla="val 11329"/>
-            </a:avLst>
-          </a:prstGeom>
-          <a:solidFill>
-            <a:schemeClr val="lt1"/>
-          </a:solidFill>
-          <a:ln w="28575" cap="flat" cmpd="sng">
-            <a:solidFill>
-              <a:schemeClr val="dk1"/>
-            </a:solidFill>
-            <a:prstDash val="solid"/>
-            <a:round/>
-            <a:headEnd type="none" w="sm" len="sm"/>
-            <a:tailEnd type="none" w="sm" len="sm"/>
-          </a:ln>
-        </p:spPr>
-        <p:txBody>
-          <a:bodyPr spcFirstLastPara="1" wrap="square" lIns="91425" tIns="91425" rIns="91425" bIns="91425" anchor="ctr" anchorCtr="0">
-            <a:noAutofit/>
-          </a:bodyPr>
-          <a:lstStyle/>
-          <a:p>
-            <a:pPr marL="0" lvl="0" indent="0" algn="l" rtl="0">
-              <a:spcBef>
-                <a:spcPts val="0"/>
-              </a:spcBef>
-              <a:spcAft>
-                <a:spcPts val="0"/>
-              </a:spcAft>
-              <a:buNone/>
-            </a:pPr>
-            <a:endParaRPr/>
-          </a:p>
-        </p:txBody>
-      </p:sp>
-      <p:sp>
-        <p:nvSpPr>
-          <p:cNvPr id="1547" name="Google Shape;1547;p54"/>
-          <p:cNvSpPr/>
-          <p:nvPr/>
-        </p:nvSpPr>
-        <p:spPr>
-          <a:xfrm>
-            <a:off x="2767400" y="3665400"/>
-            <a:ext cx="939600" cy="939600"/>
-          </a:xfrm>
-          <a:prstGeom prst="snip1Rect">
-            <a:avLst>
-              <a:gd name="adj" fmla="val 11329"/>
-            </a:avLst>
-          </a:prstGeom>
-          <a:solidFill>
-            <a:schemeClr val="lt2"/>
-          </a:solidFill>
-          <a:ln w="28575" cap="flat" cmpd="sng">
-            <a:solidFill>
-              <a:schemeClr val="dk1"/>
-            </a:solidFill>
-            <a:prstDash val="solid"/>
-            <a:round/>
-            <a:headEnd type="none" w="sm" len="sm"/>
-            <a:tailEnd type="none" w="sm" len="sm"/>
-          </a:ln>
-        </p:spPr>
-        <p:txBody>
-          <a:bodyPr spcFirstLastPara="1" wrap="square" lIns="91425" tIns="91425" rIns="91425" bIns="91425" anchor="ctr" anchorCtr="0">
-            <a:noAutofit/>
-          </a:bodyPr>
-          <a:lstStyle/>
-          <a:p>
-            <a:pPr marL="0" lvl="0" indent="0" algn="l" rtl="0">
-              <a:spcBef>
-                <a:spcPts val="0"/>
-              </a:spcBef>
-              <a:spcAft>
-                <a:spcPts val="0"/>
-              </a:spcAft>
-              <a:buNone/>
-            </a:pPr>
-            <a:endParaRPr/>
-          </a:p>
-        </p:txBody>
-      </p:sp>
-      <p:sp>
-        <p:nvSpPr>
-          <p:cNvPr id="3" name="Rectangle 2"/>
-          <p:cNvSpPr/>
-          <p:nvPr/>
-        </p:nvSpPr>
-        <p:spPr>
-          <a:xfrm>
-            <a:off x="4260574" y="3856383"/>
-            <a:ext cx="4187687" cy="556591"/>
-          </a:xfrm>
-          <a:prstGeom prst="rect">
-            <a:avLst/>
-          </a:prstGeom>
-          <a:solidFill>
-            <a:schemeClr val="bg1"/>
-          </a:solidFill>
-          <a:ln>
-            <a:solidFill>
-              <a:schemeClr val="bg1"/>
-            </a:solidFill>
-          </a:ln>
-        </p:spPr>
-        <p:style>
-          <a:lnRef idx="2">
-            <a:schemeClr val="accent1">
-              <a:shade val="50000"/>
-            </a:schemeClr>
-          </a:lnRef>
-          <a:fillRef idx="1">
-            <a:schemeClr val="accent1"/>
-          </a:fillRef>
-          <a:effectRef idx="0">
-            <a:schemeClr val="accent1"/>
-          </a:effectRef>
-          <a:fontRef idx="minor">
-            <a:schemeClr val="lt1"/>
-          </a:fontRef>
-        </p:style>
-        <p:txBody>
-          <a:bodyPr rtlCol="0" anchor="ctr"/>
-          <a:lstStyle/>
-          <a:p>
-            <a:pPr algn="ctr"/>
-            <a:endParaRPr lang="en-US"/>
-          </a:p>
-        </p:txBody>
-      </p:sp>
-    </p:spTree>
-  </p:cSld>
-  <p:clrMapOvr>
-    <a:masterClrMapping/>
-  </p:clrMapOvr>
-  <mc:AlternateContent xmlns:mc="http://schemas.openxmlformats.org/markup-compatibility/2006" xmlns:p14="http://schemas.microsoft.com/office/powerpoint/2010/main">
-    <mc:Choice Requires="p14">
-      <p:transition spd="med" p14:dur="700">
-        <p:fade/>
-      </p:transition>
-    </mc:Choice>
-    <mc:Fallback xmlns="">
-      <p:transition spd="med">
-        <p:fade/>
-      </p:transition>
-    </mc:Fallback>
-  </mc:AlternateContent>
 </p:sld>
 </file>
 
@@ -17604,21 +21116,6 @@
 </file>
 
 <file path=customXml/item1.xml><?xml version="1.0" encoding="utf-8"?>
-<p:properties xmlns:p="http://schemas.microsoft.com/office/2006/metadata/properties" xmlns:xsi="http://www.w3.org/2001/XMLSchema-instance" xmlns:pc="http://schemas.microsoft.com/office/infopath/2007/PartnerControls">
-  <documentManagement/>
-</p:properties>
-</file>
-
-<file path=customXml/item2.xml><?xml version="1.0" encoding="utf-8"?>
-<?mso-contentType ?>
-<FormTemplates xmlns="http://schemas.microsoft.com/sharepoint/v3/contenttype/forms">
-  <Display>DocumentLibraryForm</Display>
-  <Edit>DocumentLibraryForm</Edit>
-  <New>DocumentLibraryForm</New>
-</FormTemplates>
-</file>
-
-<file path=customXml/item3.xml><?xml version="1.0" encoding="utf-8"?>
 <ct:contentTypeSchema xmlns:ct="http://schemas.microsoft.com/office/2006/metadata/contentType" xmlns:ma="http://schemas.microsoft.com/office/2006/metadata/properties/metaAttributes" ct:_="" ma:_="" ma:contentTypeName="Document" ma:contentTypeID="0x010100F7E48E236368D941AD67930EE5175560" ma:contentTypeVersion="13" ma:contentTypeDescription="Create a new document." ma:contentTypeScope="" ma:versionID="a8b62d4193a4647119b3edc959bbfb1d">
   <xsd:schema xmlns:xsd="http://www.w3.org/2001/XMLSchema" xmlns:xs="http://www.w3.org/2001/XMLSchema" xmlns:p="http://schemas.microsoft.com/office/2006/metadata/properties" xmlns:ns3="17e6e5dc-a594-403d-bfc5-efbaf78a0399" xmlns:ns4="44228d15-58ec-4b0a-a019-13a419712495" targetNamespace="http://schemas.microsoft.com/office/2006/metadata/properties" ma:root="true" ma:fieldsID="118fe3d96a5ccae0e4af529a0f000ce1" ns3:_="" ns4:_="">
     <xsd:import namespace="17e6e5dc-a594-403d-bfc5-efbaf78a0399"/>
@@ -17841,32 +21338,22 @@
 </ct:contentTypeSchema>
 </file>
 
-<file path=customXml/itemProps1.xml><?xml version="1.0" encoding="utf-8"?>
-<ds:datastoreItem xmlns:ds="http://schemas.openxmlformats.org/officeDocument/2006/customXml" ds:itemID="{20250E26-A743-4B3A-A820-CBA7B0238C68}">
-  <ds:schemaRefs>
-    <ds:schemaRef ds:uri="http://schemas.microsoft.com/office/2006/documentManagement/types"/>
-    <ds:schemaRef ds:uri="44228d15-58ec-4b0a-a019-13a419712495"/>
-    <ds:schemaRef ds:uri="17e6e5dc-a594-403d-bfc5-efbaf78a0399"/>
-    <ds:schemaRef ds:uri="http://purl.org/dc/terms/"/>
-    <ds:schemaRef ds:uri="http://schemas.microsoft.com/office/2006/metadata/properties"/>
-    <ds:schemaRef ds:uri="http://schemas.openxmlformats.org/package/2006/metadata/core-properties"/>
-    <ds:schemaRef ds:uri="http://purl.org/dc/elements/1.1/"/>
-    <ds:schemaRef ds:uri="http://www.w3.org/XML/1998/namespace"/>
-    <ds:schemaRef ds:uri="http://schemas.microsoft.com/office/infopath/2007/PartnerControls"/>
-    <ds:schemaRef ds:uri="http://purl.org/dc/dcmitype/"/>
-  </ds:schemaRefs>
-</ds:datastoreItem>
+<file path=customXml/item2.xml><?xml version="1.0" encoding="utf-8"?>
+<?mso-contentType ?>
+<FormTemplates xmlns="http://schemas.microsoft.com/sharepoint/v3/contenttype/forms">
+  <Display>DocumentLibraryForm</Display>
+  <Edit>DocumentLibraryForm</Edit>
+  <New>DocumentLibraryForm</New>
+</FormTemplates>
 </file>
 
-<file path=customXml/itemProps2.xml><?xml version="1.0" encoding="utf-8"?>
-<ds:datastoreItem xmlns:ds="http://schemas.openxmlformats.org/officeDocument/2006/customXml" ds:itemID="{A9484E29-245E-42D2-9DF8-7C37C811B585}">
-  <ds:schemaRefs>
-    <ds:schemaRef ds:uri="http://schemas.microsoft.com/sharepoint/v3/contenttype/forms"/>
-  </ds:schemaRefs>
-</ds:datastoreItem>
+<file path=customXml/item3.xml><?xml version="1.0" encoding="utf-8"?>
+<p:properties xmlns:p="http://schemas.microsoft.com/office/2006/metadata/properties" xmlns:xsi="http://www.w3.org/2001/XMLSchema-instance" xmlns:pc="http://schemas.microsoft.com/office/infopath/2007/PartnerControls">
+  <documentManagement/>
+</p:properties>
 </file>
 
-<file path=customXml/itemProps3.xml><?xml version="1.0" encoding="utf-8"?>
+<file path=customXml/itemProps1.xml><?xml version="1.0" encoding="utf-8"?>
 <ds:datastoreItem xmlns:ds="http://schemas.openxmlformats.org/officeDocument/2006/customXml" ds:itemID="{EFCC125F-73E4-4435-82DB-25EBFD6BD756}">
   <ds:schemaRefs>
     <ds:schemaRef ds:uri="http://schemas.microsoft.com/office/2006/metadata/contentType"/>
@@ -17883,4 +21370,29 @@
     <ds:schemaRef ds:uri="http://schemas.microsoft.com/internal/obd"/>
   </ds:schemaRefs>
 </ds:datastoreItem>
+</file>
+
+<file path=customXml/itemProps2.xml><?xml version="1.0" encoding="utf-8"?>
+<ds:datastoreItem xmlns:ds="http://schemas.openxmlformats.org/officeDocument/2006/customXml" ds:itemID="{A9484E29-245E-42D2-9DF8-7C37C811B585}">
+  <ds:schemaRefs>
+    <ds:schemaRef ds:uri="http://schemas.microsoft.com/sharepoint/v3/contenttype/forms"/>
+  </ds:schemaRefs>
+</ds:datastoreItem>
+</file>
+
+<file path=customXml/itemProps3.xml><?xml version="1.0" encoding="utf-8"?>
+<ds:datastoreItem xmlns:ds="http://schemas.openxmlformats.org/officeDocument/2006/customXml" ds:itemID="{20250E26-A743-4B3A-A820-CBA7B0238C68}">
+  <ds:schemaRefs>
+    <ds:schemaRef ds:uri="http://schemas.microsoft.com/office/2006/documentManagement/types"/>
+    <ds:schemaRef ds:uri="44228d15-58ec-4b0a-a019-13a419712495"/>
+    <ds:schemaRef ds:uri="17e6e5dc-a594-403d-bfc5-efbaf78a0399"/>
+    <ds:schemaRef ds:uri="http://purl.org/dc/terms/"/>
+    <ds:schemaRef ds:uri="http://schemas.microsoft.com/office/2006/metadata/properties"/>
+    <ds:schemaRef ds:uri="http://schemas.openxmlformats.org/package/2006/metadata/core-properties"/>
+    <ds:schemaRef ds:uri="http://purl.org/dc/elements/1.1/"/>
+    <ds:schemaRef ds:uri="http://www.w3.org/XML/1998/namespace"/>
+    <ds:schemaRef ds:uri="http://schemas.microsoft.com/office/infopath/2007/PartnerControls"/>
+    <ds:schemaRef ds:uri="http://purl.org/dc/dcmitype/"/>
+  </ds:schemaRefs>
+</ds:datastoreItem>
 </file>
</xml_diff>